<commit_message>
natural griding modified and wall model grid added
</commit_message>
<xml_diff>
--- a/docs/vv.pptx
+++ b/docs/vv.pptx
@@ -24122,10 +24122,10 @@
       </p:sp>
       <p:pic>
         <p:nvPicPr>
-          <p:cNvPr id="8" name="Picture 7">
+          <p:cNvPr id="15" name="Picture 14">
             <a:extLst>
               <a:ext uri="{FF2B5EF4-FFF2-40B4-BE49-F238E27FC236}">
-                <a16:creationId xmlns:a16="http://schemas.microsoft.com/office/drawing/2014/main" id="{7669CE41-AF51-ADD3-EE4B-CFBFE47C9E9E}"/>
+                <a16:creationId xmlns:a16="http://schemas.microsoft.com/office/drawing/2014/main" id="{FAB37A1F-AFB4-91A9-DD03-604191026725}"/>
               </a:ext>
             </a:extLst>
           </p:cNvPr>
@@ -24142,8 +24142,38 @@
         </p:blipFill>
         <p:spPr>
           <a:xfrm>
-            <a:off x="304800" y="3352800"/>
-            <a:ext cx="3657600" cy="2751965"/>
+            <a:off x="533400" y="3048000"/>
+            <a:ext cx="4019757" cy="3010055"/>
+          </a:xfrm>
+          <a:prstGeom prst="rect">
+            <a:avLst/>
+          </a:prstGeom>
+        </p:spPr>
+      </p:pic>
+      <p:pic>
+        <p:nvPicPr>
+          <p:cNvPr id="17" name="Picture 16">
+            <a:extLst>
+              <a:ext uri="{FF2B5EF4-FFF2-40B4-BE49-F238E27FC236}">
+                <a16:creationId xmlns:a16="http://schemas.microsoft.com/office/drawing/2014/main" id="{0AA73FDA-FC69-4147-69A3-B7DBCACBE950}"/>
+              </a:ext>
+            </a:extLst>
+          </p:cNvPr>
+          <p:cNvPicPr>
+            <a:picLocks noChangeAspect="1"/>
+          </p:cNvPicPr>
+          <p:nvPr/>
+        </p:nvPicPr>
+        <p:blipFill>
+          <a:blip r:embed="rId5"/>
+          <a:stretch>
+            <a:fillRect/>
+          </a:stretch>
+        </p:blipFill>
+        <p:spPr>
+          <a:xfrm>
+            <a:off x="4553157" y="3051175"/>
+            <a:ext cx="3962604" cy="3003704"/>
           </a:xfrm>
           <a:prstGeom prst="rect">
             <a:avLst/>

</xml_diff>

<commit_message>
delete a line, wall model and neumann bc with the same fixed wall stress produce exactly the same results in debug mode with the explicit schem
</commit_message>
<xml_diff>
--- a/docs/vv.pptx
+++ b/docs/vv.pptx
@@ -5,17 +5,16 @@
     <p:sldMasterId id="2147483660" r:id="rId1"/>
   </p:sldMasterIdLst>
   <p:notesMasterIdLst>
-    <p:notesMasterId r:id="rId7"/>
+    <p:notesMasterId r:id="rId6"/>
   </p:notesMasterIdLst>
   <p:handoutMasterIdLst>
-    <p:handoutMasterId r:id="rId8"/>
+    <p:handoutMasterId r:id="rId7"/>
   </p:handoutMasterIdLst>
   <p:sldIdLst>
     <p:sldId id="256" r:id="rId2"/>
-    <p:sldId id="645" r:id="rId3"/>
-    <p:sldId id="646" r:id="rId4"/>
-    <p:sldId id="643" r:id="rId5"/>
-    <p:sldId id="513" r:id="rId6"/>
+    <p:sldId id="647" r:id="rId3"/>
+    <p:sldId id="645" r:id="rId4"/>
+    <p:sldId id="646" r:id="rId5"/>
   </p:sldIdLst>
   <p:sldSz cx="9144000" cy="6858000" type="screen4x3"/>
   <p:notesSz cx="6797675" cy="9931400"/>
@@ -218,7 +217,7 @@
           <a:p>
             <a:fld id="{30C704EE-38E9-4E72-9BB6-71E8241CE3C0}" type="datetimeFigureOut">
               <a:rPr lang="en-US" smtClean="0"/>
-              <a:t>2/12/2024</a:t>
+              <a:t>2/14/2024</a:t>
             </a:fld>
             <a:endParaRPr lang="en-US"/>
           </a:p>
@@ -383,7 +382,7 @@
           <a:p>
             <a:fld id="{0D66AE9B-9EE2-43DA-9A8E-D2E5656B8B43}" type="datetimeFigureOut">
               <a:rPr lang="en-US" smtClean="0"/>
-              <a:t>2/12/2024</a:t>
+              <a:t>2/14/2024</a:t>
             </a:fld>
             <a:endParaRPr lang="en-US"/>
           </a:p>
@@ -739,6 +738,114 @@
   <p:cSld>
     <p:spTree>
       <p:nvGrpSpPr>
+        <p:cNvPr id="1" name="">
+          <a:extLst>
+            <a:ext uri="{FF2B5EF4-FFF2-40B4-BE49-F238E27FC236}">
+              <a16:creationId xmlns:a16="http://schemas.microsoft.com/office/drawing/2014/main" id="{C0539071-8D93-3A67-E5E6-839A52716C05}"/>
+            </a:ext>
+          </a:extLst>
+        </p:cNvPr>
+        <p:cNvGrpSpPr/>
+        <p:nvPr/>
+      </p:nvGrpSpPr>
+      <p:grpSpPr>
+        <a:xfrm>
+          <a:off x="0" y="0"/>
+          <a:ext cx="0" cy="0"/>
+          <a:chOff x="0" y="0"/>
+          <a:chExt cx="0" cy="0"/>
+        </a:xfrm>
+      </p:grpSpPr>
+      <p:sp>
+        <p:nvSpPr>
+          <p:cNvPr id="2" name="Slide Image Placeholder 1">
+            <a:extLst>
+              <a:ext uri="{FF2B5EF4-FFF2-40B4-BE49-F238E27FC236}">
+                <a16:creationId xmlns:a16="http://schemas.microsoft.com/office/drawing/2014/main" id="{B8B33FB5-C957-6A2A-E241-6CAE11C70CC6}"/>
+              </a:ext>
+            </a:extLst>
+          </p:cNvPr>
+          <p:cNvSpPr>
+            <a:spLocks noGrp="1" noRot="1" noChangeAspect="1"/>
+          </p:cNvSpPr>
+          <p:nvPr>
+            <p:ph type="sldImg"/>
+          </p:nvPr>
+        </p:nvSpPr>
+        <p:spPr/>
+      </p:sp>
+      <p:sp>
+        <p:nvSpPr>
+          <p:cNvPr id="3" name="Notes Placeholder 2">
+            <a:extLst>
+              <a:ext uri="{FF2B5EF4-FFF2-40B4-BE49-F238E27FC236}">
+                <a16:creationId xmlns:a16="http://schemas.microsoft.com/office/drawing/2014/main" id="{FEB59A83-72B7-CD96-A274-198E3B94AE0E}"/>
+              </a:ext>
+            </a:extLst>
+          </p:cNvPr>
+          <p:cNvSpPr>
+            <a:spLocks noGrp="1"/>
+          </p:cNvSpPr>
+          <p:nvPr>
+            <p:ph type="body" idx="1"/>
+          </p:nvPr>
+        </p:nvSpPr>
+        <p:spPr/>
+        <p:txBody>
+          <a:bodyPr/>
+          <a:lstStyle/>
+          <a:p>
+            <a:endParaRPr lang="en-US" dirty="0"/>
+          </a:p>
+        </p:txBody>
+      </p:sp>
+      <p:sp>
+        <p:nvSpPr>
+          <p:cNvPr id="4" name="Slide Number Placeholder 3">
+            <a:extLst>
+              <a:ext uri="{FF2B5EF4-FFF2-40B4-BE49-F238E27FC236}">
+                <a16:creationId xmlns:a16="http://schemas.microsoft.com/office/drawing/2014/main" id="{368DAFB5-10FE-708F-A9E2-01070680B432}"/>
+              </a:ext>
+            </a:extLst>
+          </p:cNvPr>
+          <p:cNvSpPr>
+            <a:spLocks noGrp="1"/>
+          </p:cNvSpPr>
+          <p:nvPr>
+            <p:ph type="sldNum" sz="quarter" idx="10"/>
+          </p:nvPr>
+        </p:nvSpPr>
+        <p:spPr/>
+        <p:txBody>
+          <a:bodyPr/>
+          <a:lstStyle/>
+          <a:p>
+            <a:fld id="{FFA5E540-6D76-429F-95AD-C7F13B3CAC82}" type="slidenum">
+              <a:rPr lang="en-US" smtClean="0"/>
+              <a:t>2</a:t>
+            </a:fld>
+            <a:endParaRPr lang="en-US" dirty="0"/>
+          </a:p>
+        </p:txBody>
+      </p:sp>
+    </p:spTree>
+    <p:extLst>
+      <p:ext uri="{BB962C8B-B14F-4D97-AF65-F5344CB8AC3E}">
+        <p14:creationId xmlns:p14="http://schemas.microsoft.com/office/powerpoint/2010/main" val="3962452878"/>
+      </p:ext>
+    </p:extLst>
+  </p:cSld>
+  <p:clrMapOvr>
+    <a:masterClrMapping/>
+  </p:clrMapOvr>
+</p:notes>
+</file>
+
+<file path=ppt/notesSlides/notesSlide3.xml><?xml version="1.0" encoding="utf-8"?>
+<p:notes xmlns:a="http://schemas.openxmlformats.org/drawingml/2006/main" xmlns:r="http://schemas.openxmlformats.org/officeDocument/2006/relationships" xmlns:p="http://schemas.openxmlformats.org/presentationml/2006/main">
+  <p:cSld>
+    <p:spTree>
+      <p:nvGrpSpPr>
         <p:cNvPr id="1" name=""/>
         <p:cNvGrpSpPr/>
         <p:nvPr/>
@@ -778,9 +885,38 @@
           <a:bodyPr/>
           <a:lstStyle/>
           <a:p>
+            <a:pPr marL="228600" indent="-228600">
+              <a:buAutoNum type="arabicPeriod"/>
+            </a:pPr>
             <a:r>
               <a:rPr lang="en-US" dirty="0"/>
-              <a:t>Log-law and stresses</a:t>
+              <a:t>Check the results of using constant wall stress in the wall model    using debug mode   ok</a:t>
+            </a:r>
+          </a:p>
+          <a:p>
+            <a:pPr marL="228600" indent="-228600">
+              <a:buAutoNum type="arabicPeriod"/>
+            </a:pPr>
+            <a:r>
+              <a:rPr lang="en-US" dirty="0"/>
+              <a:t>Compare implicit1D </a:t>
+            </a:r>
+            <a:r>
+              <a:rPr lang="en-US"/>
+              <a:t>results with </a:t>
+            </a:r>
+            <a:r>
+              <a:rPr lang="en-US" dirty="0"/>
+              <a:t>explicit results</a:t>
+            </a:r>
+          </a:p>
+          <a:p>
+            <a:pPr marL="228600" indent="-228600">
+              <a:buAutoNum type="arabicPeriod"/>
+            </a:pPr>
+            <a:r>
+              <a:rPr lang="en-US" dirty="0"/>
+              <a:t>Check numerical instability using Q value</a:t>
             </a:r>
           </a:p>
         </p:txBody>
@@ -802,7 +938,7 @@
           <a:p>
             <a:fld id="{FFA5E540-6D76-429F-95AD-C7F13B3CAC82}" type="slidenum">
               <a:rPr lang="en-US" smtClean="0"/>
-              <a:t>2</a:t>
+              <a:t>3</a:t>
             </a:fld>
             <a:endParaRPr lang="en-US" dirty="0"/>
           </a:p>
@@ -821,7 +957,7 @@
 </p:notes>
 </file>
 
-<file path=ppt/notesSlides/notesSlide3.xml><?xml version="1.0" encoding="utf-8"?>
+<file path=ppt/notesSlides/notesSlide4.xml><?xml version="1.0" encoding="utf-8"?>
 <p:notes xmlns:a="http://schemas.openxmlformats.org/drawingml/2006/main" xmlns:r="http://schemas.openxmlformats.org/officeDocument/2006/relationships" xmlns:p="http://schemas.openxmlformats.org/presentationml/2006/main">
   <p:cSld>
     <p:spTree>
@@ -931,7 +1067,7 @@
           <a:p>
             <a:fld id="{FFA5E540-6D76-429F-95AD-C7F13B3CAC82}" type="slidenum">
               <a:rPr lang="en-US" smtClean="0"/>
-              <a:t>3</a:t>
+              <a:t>4</a:t>
             </a:fld>
             <a:endParaRPr lang="en-US" dirty="0"/>
           </a:p>
@@ -941,183 +1077,6 @@
     <p:extLst>
       <p:ext uri="{BB962C8B-B14F-4D97-AF65-F5344CB8AC3E}">
         <p14:creationId xmlns:p14="http://schemas.microsoft.com/office/powerpoint/2010/main" val="3090747838"/>
-      </p:ext>
-    </p:extLst>
-  </p:cSld>
-  <p:clrMapOvr>
-    <a:masterClrMapping/>
-  </p:clrMapOvr>
-</p:notes>
-</file>
-
-<file path=ppt/notesSlides/notesSlide4.xml><?xml version="1.0" encoding="utf-8"?>
-<p:notes xmlns:a="http://schemas.openxmlformats.org/drawingml/2006/main" xmlns:r="http://schemas.openxmlformats.org/officeDocument/2006/relationships" xmlns:p="http://schemas.openxmlformats.org/presentationml/2006/main">
-  <p:cSld>
-    <p:spTree>
-      <p:nvGrpSpPr>
-        <p:cNvPr id="1" name=""/>
-        <p:cNvGrpSpPr/>
-        <p:nvPr/>
-      </p:nvGrpSpPr>
-      <p:grpSpPr>
-        <a:xfrm>
-          <a:off x="0" y="0"/>
-          <a:ext cx="0" cy="0"/>
-          <a:chOff x="0" y="0"/>
-          <a:chExt cx="0" cy="0"/>
-        </a:xfrm>
-      </p:grpSpPr>
-      <p:sp>
-        <p:nvSpPr>
-          <p:cNvPr id="2" name="幻灯片图像占位符 1"/>
-          <p:cNvSpPr>
-            <a:spLocks noGrp="1" noRot="1" noChangeAspect="1"/>
-          </p:cNvSpPr>
-          <p:nvPr>
-            <p:ph type="sldImg"/>
-          </p:nvPr>
-        </p:nvSpPr>
-        <p:spPr/>
-      </p:sp>
-      <p:sp>
-        <p:nvSpPr>
-          <p:cNvPr id="3" name="备注占位符 2"/>
-          <p:cNvSpPr>
-            <a:spLocks noGrp="1"/>
-          </p:cNvSpPr>
-          <p:nvPr>
-            <p:ph type="body" idx="1"/>
-          </p:nvPr>
-        </p:nvSpPr>
-        <p:spPr/>
-        <p:txBody>
-          <a:bodyPr/>
-          <a:lstStyle/>
-          <a:p>
-            <a:r>
-              <a:rPr lang="en-US" altLang="zh-CN" sz="2400" baseline="30000" dirty="0"/>
-              <a:t>Add</a:t>
-            </a:r>
-            <a:r>
-              <a:rPr lang="en-US" altLang="zh-CN" sz="2400" baseline="0" dirty="0"/>
-              <a:t> one background picture</a:t>
-            </a:r>
-            <a:endParaRPr lang="zh-CN" altLang="en-US" sz="2400" baseline="30000" dirty="0"/>
-          </a:p>
-        </p:txBody>
-      </p:sp>
-      <p:sp>
-        <p:nvSpPr>
-          <p:cNvPr id="4" name="灯片编号占位符 3"/>
-          <p:cNvSpPr>
-            <a:spLocks noGrp="1"/>
-          </p:cNvSpPr>
-          <p:nvPr>
-            <p:ph type="sldNum" sz="quarter" idx="10"/>
-          </p:nvPr>
-        </p:nvSpPr>
-        <p:spPr/>
-        <p:txBody>
-          <a:bodyPr/>
-          <a:lstStyle/>
-          <a:p>
-            <a:fld id="{FFA5E540-6D76-429F-95AD-C7F13B3CAC82}" type="slidenum">
-              <a:rPr lang="en-US" smtClean="0"/>
-              <a:pPr/>
-              <a:t>4</a:t>
-            </a:fld>
-            <a:endParaRPr lang="en-US"/>
-          </a:p>
-        </p:txBody>
-      </p:sp>
-    </p:spTree>
-    <p:extLst>
-      <p:ext uri="{BB962C8B-B14F-4D97-AF65-F5344CB8AC3E}">
-        <p14:creationId xmlns:p14="http://schemas.microsoft.com/office/powerpoint/2010/main" val="989999689"/>
-      </p:ext>
-    </p:extLst>
-  </p:cSld>
-  <p:clrMapOvr>
-    <a:masterClrMapping/>
-  </p:clrMapOvr>
-</p:notes>
-</file>
-
-<file path=ppt/notesSlides/notesSlide5.xml><?xml version="1.0" encoding="utf-8"?>
-<p:notes xmlns:a="http://schemas.openxmlformats.org/drawingml/2006/main" xmlns:r="http://schemas.openxmlformats.org/officeDocument/2006/relationships" xmlns:p="http://schemas.openxmlformats.org/presentationml/2006/main">
-  <p:cSld>
-    <p:spTree>
-      <p:nvGrpSpPr>
-        <p:cNvPr id="1" name=""/>
-        <p:cNvGrpSpPr/>
-        <p:nvPr/>
-      </p:nvGrpSpPr>
-      <p:grpSpPr>
-        <a:xfrm>
-          <a:off x="0" y="0"/>
-          <a:ext cx="0" cy="0"/>
-          <a:chOff x="0" y="0"/>
-          <a:chExt cx="0" cy="0"/>
-        </a:xfrm>
-      </p:grpSpPr>
-      <p:sp>
-        <p:nvSpPr>
-          <p:cNvPr id="2" name="幻灯片图像占位符 1"/>
-          <p:cNvSpPr>
-            <a:spLocks noGrp="1" noRot="1" noChangeAspect="1"/>
-          </p:cNvSpPr>
-          <p:nvPr>
-            <p:ph type="sldImg"/>
-          </p:nvPr>
-        </p:nvSpPr>
-        <p:spPr/>
-      </p:sp>
-      <p:sp>
-        <p:nvSpPr>
-          <p:cNvPr id="3" name="备注占位符 2"/>
-          <p:cNvSpPr>
-            <a:spLocks noGrp="1"/>
-          </p:cNvSpPr>
-          <p:nvPr>
-            <p:ph type="body" idx="1"/>
-          </p:nvPr>
-        </p:nvSpPr>
-        <p:spPr/>
-        <p:txBody>
-          <a:bodyPr/>
-          <a:lstStyle/>
-          <a:p>
-            <a:endParaRPr lang="zh-CN" altLang="en-US" dirty="0"/>
-          </a:p>
-        </p:txBody>
-      </p:sp>
-      <p:sp>
-        <p:nvSpPr>
-          <p:cNvPr id="4" name="灯片编号占位符 3"/>
-          <p:cNvSpPr>
-            <a:spLocks noGrp="1"/>
-          </p:cNvSpPr>
-          <p:nvPr>
-            <p:ph type="sldNum" sz="quarter" idx="10"/>
-          </p:nvPr>
-        </p:nvSpPr>
-        <p:spPr/>
-        <p:txBody>
-          <a:bodyPr/>
-          <a:lstStyle/>
-          <a:p>
-            <a:fld id="{FFA5E540-6D76-429F-95AD-C7F13B3CAC82}" type="slidenum">
-              <a:rPr lang="en-US" smtClean="0"/>
-              <a:t>5</a:t>
-            </a:fld>
-            <a:endParaRPr lang="en-US"/>
-          </a:p>
-        </p:txBody>
-      </p:sp>
-    </p:spTree>
-    <p:extLst>
-      <p:ext uri="{BB962C8B-B14F-4D97-AF65-F5344CB8AC3E}">
-        <p14:creationId xmlns:p14="http://schemas.microsoft.com/office/powerpoint/2010/main" val="2420947402"/>
       </p:ext>
     </p:extLst>
   </p:cSld>
@@ -20309,7 +20268,7 @@
           <a:p>
             <a:fld id="{F7015205-6E1C-4AA4-A1F5-F88A14739F8D}" type="datetime1">
               <a:rPr lang="en-US" altLang="zh-CN" smtClean="0"/>
-              <a:t>2/12/2024</a:t>
+              <a:t>2/14/2024</a:t>
             </a:fld>
             <a:endParaRPr lang="en-US"/>
           </a:p>
@@ -20519,7 +20478,7 @@
           <a:p>
             <a:fld id="{C5005B59-A863-49AB-8A46-4FABF628DCDB}" type="datetime1">
               <a:rPr lang="en-US" altLang="zh-CN" smtClean="0"/>
-              <a:t>2/12/2024</a:t>
+              <a:t>2/14/2024</a:t>
             </a:fld>
             <a:endParaRPr lang="en-US"/>
           </a:p>
@@ -20694,7 +20653,7 @@
           <a:p>
             <a:fld id="{B9B359B8-BB35-4942-BB3F-553087A1AB07}" type="datetime1">
               <a:rPr lang="en-US" altLang="zh-CN" smtClean="0"/>
-              <a:t>2/12/2024</a:t>
+              <a:t>2/14/2024</a:t>
             </a:fld>
             <a:endParaRPr lang="en-US"/>
           </a:p>
@@ -20859,7 +20818,7 @@
           <a:p>
             <a:fld id="{0051FDAB-E13B-4DED-ACB5-C97F04F9745D}" type="datetime1">
               <a:rPr lang="en-US" altLang="zh-CN" smtClean="0"/>
-              <a:t>2/12/2024</a:t>
+              <a:t>2/14/2024</a:t>
             </a:fld>
             <a:endParaRPr lang="en-US"/>
           </a:p>
@@ -21046,7 +21005,7 @@
           <a:p>
             <a:fld id="{411C2638-AFB1-4A52-81EA-13B8957633A2}" type="datetime1">
               <a:rPr lang="en-US" altLang="zh-CN" smtClean="0"/>
-              <a:t>2/12/2024</a:t>
+              <a:t>2/14/2024</a:t>
             </a:fld>
             <a:endParaRPr lang="en-US"/>
           </a:p>
@@ -21329,7 +21288,7 @@
           <a:p>
             <a:fld id="{86FEA545-9191-4074-8B47-064CD17714D7}" type="datetime1">
               <a:rPr lang="en-US" altLang="zh-CN" smtClean="0"/>
-              <a:t>2/12/2024</a:t>
+              <a:t>2/14/2024</a:t>
             </a:fld>
             <a:endParaRPr lang="en-US"/>
           </a:p>
@@ -21751,7 +21710,7 @@
           <a:p>
             <a:fld id="{FEDA739D-67B9-461E-9E24-584E6BDA3BCB}" type="datetime1">
               <a:rPr lang="en-US" altLang="zh-CN" smtClean="0"/>
-              <a:t>2/12/2024</a:t>
+              <a:t>2/14/2024</a:t>
             </a:fld>
             <a:endParaRPr lang="en-US"/>
           </a:p>
@@ -21864,7 +21823,7 @@
           <a:p>
             <a:fld id="{9B17A94F-F96B-45CF-824C-A53F0758AB69}" type="datetime1">
               <a:rPr lang="en-US" altLang="zh-CN" smtClean="0"/>
-              <a:t>2/12/2024</a:t>
+              <a:t>2/14/2024</a:t>
             </a:fld>
             <a:endParaRPr lang="en-US"/>
           </a:p>
@@ -21954,7 +21913,7 @@
           <a:p>
             <a:fld id="{0E7E811E-CB35-486D-A51A-D28D7B88C8A1}" type="datetime1">
               <a:rPr lang="en-US" altLang="zh-CN" smtClean="0"/>
-              <a:t>2/12/2024</a:t>
+              <a:t>2/14/2024</a:t>
             </a:fld>
             <a:endParaRPr lang="en-US"/>
           </a:p>
@@ -22226,7 +22185,7 @@
           <a:p>
             <a:fld id="{49060A9D-03E3-407A-91FE-4FD83FD5236C}" type="datetime1">
               <a:rPr lang="en-US" altLang="zh-CN" smtClean="0"/>
-              <a:t>2/12/2024</a:t>
+              <a:t>2/14/2024</a:t>
             </a:fld>
             <a:endParaRPr lang="en-US"/>
           </a:p>
@@ -22479,7 +22438,7 @@
           <a:p>
             <a:fld id="{27EABF16-FC76-43D1-8210-F66033CB86AD}" type="datetime1">
               <a:rPr lang="en-US" altLang="zh-CN" smtClean="0"/>
-              <a:t>2/12/2024</a:t>
+              <a:t>2/14/2024</a:t>
             </a:fld>
             <a:endParaRPr lang="en-US"/>
           </a:p>
@@ -22741,7 +22700,7 @@
           <a:p>
             <a:fld id="{5C24D9CC-1561-4C99-B045-95C038C2B123}" type="datetime1">
               <a:rPr lang="en-US" altLang="zh-CN" smtClean="0"/>
-              <a:t>2/12/2024</a:t>
+              <a:t>2/14/2024</a:t>
             </a:fld>
             <a:endParaRPr lang="en-US"/>
           </a:p>
@@ -23776,6 +23735,435 @@
   <p:cSld>
     <p:spTree>
       <p:nvGrpSpPr>
+        <p:cNvPr id="1" name="">
+          <a:extLst>
+            <a:ext uri="{FF2B5EF4-FFF2-40B4-BE49-F238E27FC236}">
+              <a16:creationId xmlns:a16="http://schemas.microsoft.com/office/drawing/2014/main" id="{2D15152C-B19F-6BB3-728D-5F7F2B035AD0}"/>
+            </a:ext>
+          </a:extLst>
+        </p:cNvPr>
+        <p:cNvGrpSpPr/>
+        <p:nvPr/>
+      </p:nvGrpSpPr>
+      <p:grpSpPr>
+        <a:xfrm>
+          <a:off x="0" y="0"/>
+          <a:ext cx="0" cy="0"/>
+          <a:chOff x="0" y="0"/>
+          <a:chExt cx="0" cy="0"/>
+        </a:xfrm>
+      </p:grpSpPr>
+      <p:sp>
+        <p:nvSpPr>
+          <p:cNvPr id="2" name="Title 1">
+            <a:extLst>
+              <a:ext uri="{FF2B5EF4-FFF2-40B4-BE49-F238E27FC236}">
+                <a16:creationId xmlns:a16="http://schemas.microsoft.com/office/drawing/2014/main" id="{D13EE2B0-B4C2-89D5-D5B9-1DF5BE70DC5F}"/>
+              </a:ext>
+            </a:extLst>
+          </p:cNvPr>
+          <p:cNvSpPr>
+            <a:spLocks noGrp="1"/>
+          </p:cNvSpPr>
+          <p:nvPr>
+            <p:ph type="title"/>
+          </p:nvPr>
+        </p:nvSpPr>
+        <p:spPr>
+          <a:xfrm>
+            <a:off x="152400" y="152400"/>
+            <a:ext cx="8610600" cy="838200"/>
+          </a:xfrm>
+        </p:spPr>
+        <p:txBody>
+          <a:bodyPr/>
+          <a:lstStyle/>
+          <a:p>
+            <a:r>
+              <a:rPr lang="en-US" altLang="zh-CN" dirty="0"/>
+              <a:t>Channel</a:t>
+            </a:r>
+            <a:endParaRPr lang="zh-CN" altLang="en-US" dirty="0"/>
+          </a:p>
+        </p:txBody>
+      </p:sp>
+      <p:sp>
+        <p:nvSpPr>
+          <p:cNvPr id="7" name="内容占位符 2">
+            <a:extLst>
+              <a:ext uri="{FF2B5EF4-FFF2-40B4-BE49-F238E27FC236}">
+                <a16:creationId xmlns:a16="http://schemas.microsoft.com/office/drawing/2014/main" id="{D2C6C04E-3AE6-BF1A-EE2B-80CAEA4AD7AC}"/>
+              </a:ext>
+            </a:extLst>
+          </p:cNvPr>
+          <p:cNvSpPr>
+            <a:spLocks noGrp="1"/>
+          </p:cNvSpPr>
+          <p:nvPr>
+            <p:ph idx="4294967295"/>
+          </p:nvPr>
+        </p:nvSpPr>
+        <p:spPr>
+          <a:xfrm>
+            <a:off x="93652" y="1068111"/>
+            <a:ext cx="9050348" cy="1979889"/>
+          </a:xfrm>
+        </p:spPr>
+        <p:txBody>
+          <a:bodyPr/>
+          <a:lstStyle/>
+          <a:p>
+            <a:r>
+              <a:rPr lang="en-US" altLang="zh-CN" sz="2400" dirty="0">
+                <a:latin typeface="+mn-lt"/>
+                <a:cs typeface="Times New Roman" panose="02020603050405020304" pitchFamily="18" charset="0"/>
+              </a:rPr>
+              <a:t>RETAU180</a:t>
+            </a:r>
+            <a:endParaRPr lang="en-US" altLang="zh-CN" sz="2000" dirty="0">
+              <a:latin typeface="+mn-lt"/>
+              <a:cs typeface="Times New Roman" panose="02020603050405020304" pitchFamily="18" charset="0"/>
+            </a:endParaRPr>
+          </a:p>
+          <a:p>
+            <a:pPr lvl="1"/>
+            <a:r>
+              <a:rPr lang="en-US" altLang="zh-CN" sz="2000" dirty="0">
+                <a:latin typeface="+mn-lt"/>
+                <a:cs typeface="Times New Roman" panose="02020603050405020304" pitchFamily="18" charset="0"/>
+              </a:rPr>
+              <a:t>Both Neumann and wall model yield acceptable profiles</a:t>
+            </a:r>
+          </a:p>
+          <a:p>
+            <a:pPr lvl="1"/>
+            <a:r>
+              <a:rPr lang="en-US" altLang="zh-CN" sz="2000" dirty="0">
+                <a:latin typeface="+mn-lt"/>
+                <a:cs typeface="Times New Roman" panose="02020603050405020304" pitchFamily="18" charset="0"/>
+              </a:rPr>
+              <a:t>The DNS grid and the finest wall model grid produce the same results, but show difference from the DNS results, demonstrating imperfection of the wall model</a:t>
+            </a:r>
+            <a:endParaRPr lang="en-US" altLang="zh-CN" sz="2000" kern="0" dirty="0">
+              <a:latin typeface="+mn-lt"/>
+              <a:cs typeface="Times New Roman" panose="02020603050405020304" pitchFamily="18" charset="0"/>
+            </a:endParaRPr>
+          </a:p>
+          <a:p>
+            <a:pPr marL="457200" lvl="1" indent="0">
+              <a:buNone/>
+            </a:pPr>
+            <a:endParaRPr lang="en-US" altLang="zh-CN" sz="2000" baseline="30000" dirty="0">
+              <a:latin typeface="+mn-lt"/>
+              <a:cs typeface="Times New Roman" panose="02020603050405020304" pitchFamily="18" charset="0"/>
+            </a:endParaRPr>
+          </a:p>
+          <a:p>
+            <a:pPr marL="457200" lvl="1" indent="0">
+              <a:buNone/>
+            </a:pPr>
+            <a:endParaRPr lang="en-US" altLang="zh-CN" sz="2000" baseline="30000" dirty="0">
+              <a:latin typeface="+mn-lt"/>
+              <a:cs typeface="Times New Roman" panose="02020603050405020304" pitchFamily="18" charset="0"/>
+            </a:endParaRPr>
+          </a:p>
+          <a:p>
+            <a:pPr marL="457200" lvl="1" indent="0">
+              <a:buNone/>
+            </a:pPr>
+            <a:endParaRPr lang="en-US" altLang="zh-CN" sz="2000" baseline="30000" dirty="0">
+              <a:latin typeface="+mn-lt"/>
+              <a:cs typeface="Times New Roman" panose="02020603050405020304" pitchFamily="18" charset="0"/>
+            </a:endParaRPr>
+          </a:p>
+          <a:p>
+            <a:pPr marL="457200" lvl="1" indent="0">
+              <a:buNone/>
+            </a:pPr>
+            <a:endParaRPr lang="en-US" altLang="zh-CN" sz="2000" baseline="30000" dirty="0">
+              <a:latin typeface="+mn-lt"/>
+              <a:cs typeface="Times New Roman" panose="02020603050405020304" pitchFamily="18" charset="0"/>
+            </a:endParaRPr>
+          </a:p>
+          <a:p>
+            <a:pPr marL="457200" lvl="1" indent="0">
+              <a:buNone/>
+            </a:pPr>
+            <a:endParaRPr lang="en-US" altLang="zh-CN" sz="2000" baseline="30000" dirty="0">
+              <a:latin typeface="+mn-lt"/>
+              <a:cs typeface="Times New Roman" panose="02020603050405020304" pitchFamily="18" charset="0"/>
+            </a:endParaRPr>
+          </a:p>
+          <a:p>
+            <a:pPr marL="457200" lvl="1" indent="0">
+              <a:buNone/>
+            </a:pPr>
+            <a:endParaRPr lang="en-US" altLang="zh-CN" sz="2000" baseline="30000" dirty="0">
+              <a:latin typeface="+mn-lt"/>
+              <a:cs typeface="Times New Roman" panose="02020603050405020304" pitchFamily="18" charset="0"/>
+            </a:endParaRPr>
+          </a:p>
+          <a:p>
+            <a:pPr marL="457200" lvl="1" indent="0">
+              <a:buNone/>
+            </a:pPr>
+            <a:endParaRPr lang="en-US" altLang="zh-CN" sz="2000" baseline="30000" dirty="0">
+              <a:latin typeface="+mn-lt"/>
+              <a:cs typeface="Times New Roman" panose="02020603050405020304" pitchFamily="18" charset="0"/>
+            </a:endParaRPr>
+          </a:p>
+          <a:p>
+            <a:pPr marL="457200" lvl="1" indent="0">
+              <a:buNone/>
+            </a:pPr>
+            <a:endParaRPr lang="en-US" altLang="zh-CN" sz="2000" baseline="30000" dirty="0">
+              <a:latin typeface="+mn-lt"/>
+              <a:cs typeface="Times New Roman" panose="02020603050405020304" pitchFamily="18" charset="0"/>
+            </a:endParaRPr>
+          </a:p>
+          <a:p>
+            <a:pPr>
+              <a:lnSpc>
+                <a:spcPct val="125000"/>
+              </a:lnSpc>
+            </a:pPr>
+            <a:endParaRPr lang="en-US" altLang="zh-CN" sz="2400" dirty="0">
+              <a:latin typeface="+mn-lt"/>
+              <a:cs typeface="Times New Roman" panose="02020603050405020304" pitchFamily="18" charset="0"/>
+            </a:endParaRPr>
+          </a:p>
+          <a:p>
+            <a:pPr marL="457200" lvl="1" indent="0">
+              <a:lnSpc>
+                <a:spcPct val="125000"/>
+              </a:lnSpc>
+              <a:buNone/>
+            </a:pPr>
+            <a:endParaRPr lang="en-US" altLang="zh-CN" sz="2000" dirty="0">
+              <a:latin typeface="+mn-lt"/>
+              <a:cs typeface="Times New Roman" panose="02020603050405020304" pitchFamily="18" charset="0"/>
+            </a:endParaRPr>
+          </a:p>
+        </p:txBody>
+      </p:sp>
+      <p:sp>
+        <p:nvSpPr>
+          <p:cNvPr id="9" name="Rectangle 2">
+            <a:extLst>
+              <a:ext uri="{FF2B5EF4-FFF2-40B4-BE49-F238E27FC236}">
+                <a16:creationId xmlns:a16="http://schemas.microsoft.com/office/drawing/2014/main" id="{39432E37-D0CA-42E2-B210-9AC1CA0029EC}"/>
+              </a:ext>
+            </a:extLst>
+          </p:cNvPr>
+          <p:cNvSpPr>
+            <a:spLocks noChangeArrowheads="1"/>
+          </p:cNvSpPr>
+          <p:nvPr/>
+        </p:nvSpPr>
+        <p:spPr bwMode="auto">
+          <a:xfrm>
+            <a:off x="0" y="0"/>
+            <a:ext cx="9144000" cy="0"/>
+          </a:xfrm>
+          <a:prstGeom prst="rect">
+            <a:avLst/>
+          </a:prstGeom>
+          <a:noFill/>
+          <a:ln>
+            <a:noFill/>
+          </a:ln>
+          <a:effectLst/>
+          <a:extLst>
+            <a:ext uri="{909E8E84-426E-40DD-AFC4-6F175D3DCCD1}">
+              <a14:hiddenFill xmlns:a14="http://schemas.microsoft.com/office/drawing/2010/main">
+                <a:solidFill>
+                  <a:schemeClr val="accent1"/>
+                </a:solidFill>
+              </a14:hiddenFill>
+            </a:ext>
+            <a:ext uri="{91240B29-F687-4F45-9708-019B960494DF}">
+              <a14:hiddenLine xmlns:a14="http://schemas.microsoft.com/office/drawing/2010/main" w="9525">
+                <a:solidFill>
+                  <a:schemeClr val="tx1"/>
+                </a:solidFill>
+                <a:miter lim="800000"/>
+                <a:headEnd/>
+                <a:tailEnd/>
+              </a14:hiddenLine>
+            </a:ext>
+            <a:ext uri="{AF507438-7753-43E0-B8FC-AC1667EBCBE1}">
+              <a14:hiddenEffects xmlns:a14="http://schemas.microsoft.com/office/drawing/2010/main">
+                <a:effectLst>
+                  <a:outerShdw dist="35921" dir="2700000" algn="ctr" rotWithShape="0">
+                    <a:schemeClr val="bg2"/>
+                  </a:outerShdw>
+                </a:effectLst>
+              </a14:hiddenEffects>
+            </a:ext>
+          </a:extLst>
+        </p:spPr>
+        <p:txBody>
+          <a:bodyPr vert="horz" wrap="none" lIns="91440" tIns="45720" rIns="91440" bIns="45720" numCol="1" anchor="ctr" anchorCtr="0" compatLnSpc="1">
+            <a:prstTxWarp prst="textNoShape">
+              <a:avLst/>
+            </a:prstTxWarp>
+            <a:spAutoFit/>
+          </a:bodyPr>
+          <a:lstStyle/>
+          <a:p>
+            <a:endParaRPr lang="zh-CN" altLang="en-US"/>
+          </a:p>
+        </p:txBody>
+      </p:sp>
+      <p:pic>
+        <p:nvPicPr>
+          <p:cNvPr id="49" name="Picture 48">
+            <a:extLst>
+              <a:ext uri="{FF2B5EF4-FFF2-40B4-BE49-F238E27FC236}">
+                <a16:creationId xmlns:a16="http://schemas.microsoft.com/office/drawing/2014/main" id="{D5A11D27-84BB-2B33-F838-7B95FFEEDBE5}"/>
+              </a:ext>
+            </a:extLst>
+          </p:cNvPr>
+          <p:cNvPicPr>
+            <a:picLocks noChangeAspect="1"/>
+          </p:cNvPicPr>
+          <p:nvPr/>
+        </p:nvPicPr>
+        <p:blipFill>
+          <a:blip r:embed="rId3"/>
+          <a:stretch>
+            <a:fillRect/>
+          </a:stretch>
+        </p:blipFill>
+        <p:spPr>
+          <a:xfrm>
+            <a:off x="457200" y="3445612"/>
+            <a:ext cx="4026107" cy="3003704"/>
+          </a:xfrm>
+          <a:prstGeom prst="rect">
+            <a:avLst/>
+          </a:prstGeom>
+        </p:spPr>
+      </p:pic>
+      <p:sp>
+        <p:nvSpPr>
+          <p:cNvPr id="59" name="TextBox 58">
+            <a:extLst>
+              <a:ext uri="{FF2B5EF4-FFF2-40B4-BE49-F238E27FC236}">
+                <a16:creationId xmlns:a16="http://schemas.microsoft.com/office/drawing/2014/main" id="{BB6B4FBE-508A-E38E-975C-A4488FB09E39}"/>
+              </a:ext>
+            </a:extLst>
+          </p:cNvPr>
+          <p:cNvSpPr txBox="1"/>
+          <p:nvPr/>
+        </p:nvSpPr>
+        <p:spPr>
+          <a:xfrm>
+            <a:off x="1786861" y="6412468"/>
+            <a:ext cx="1184940" cy="369332"/>
+          </a:xfrm>
+          <a:prstGeom prst="rect">
+            <a:avLst/>
+          </a:prstGeom>
+          <a:noFill/>
+        </p:spPr>
+        <p:txBody>
+          <a:bodyPr wrap="none" rtlCol="0">
+            <a:spAutoFit/>
+          </a:bodyPr>
+          <a:lstStyle/>
+          <a:p>
+            <a:r>
+              <a:rPr lang="en-US" dirty="0"/>
+              <a:t>Neumann</a:t>
+            </a:r>
+          </a:p>
+        </p:txBody>
+      </p:sp>
+      <p:sp>
+        <p:nvSpPr>
+          <p:cNvPr id="60" name="TextBox 59">
+            <a:extLst>
+              <a:ext uri="{FF2B5EF4-FFF2-40B4-BE49-F238E27FC236}">
+                <a16:creationId xmlns:a16="http://schemas.microsoft.com/office/drawing/2014/main" id="{CAB6FECC-5F82-6284-E96C-30D32FA6BC32}"/>
+              </a:ext>
+            </a:extLst>
+          </p:cNvPr>
+          <p:cNvSpPr txBox="1"/>
+          <p:nvPr/>
+        </p:nvSpPr>
+        <p:spPr>
+          <a:xfrm>
+            <a:off x="6039727" y="6412468"/>
+            <a:ext cx="1317412" cy="369332"/>
+          </a:xfrm>
+          <a:prstGeom prst="rect">
+            <a:avLst/>
+          </a:prstGeom>
+          <a:noFill/>
+        </p:spPr>
+        <p:txBody>
+          <a:bodyPr wrap="none" rtlCol="0">
+            <a:spAutoFit/>
+          </a:bodyPr>
+          <a:lstStyle/>
+          <a:p>
+            <a:r>
+              <a:rPr lang="en-US" dirty="0"/>
+              <a:t>Wall model</a:t>
+            </a:r>
+          </a:p>
+        </p:txBody>
+      </p:sp>
+      <p:pic>
+        <p:nvPicPr>
+          <p:cNvPr id="4" name="Picture 3">
+            <a:extLst>
+              <a:ext uri="{FF2B5EF4-FFF2-40B4-BE49-F238E27FC236}">
+                <a16:creationId xmlns:a16="http://schemas.microsoft.com/office/drawing/2014/main" id="{FD88229E-DD92-3F94-4CF6-74514DEE22C8}"/>
+              </a:ext>
+            </a:extLst>
+          </p:cNvPr>
+          <p:cNvPicPr>
+            <a:picLocks noChangeAspect="1"/>
+          </p:cNvPicPr>
+          <p:nvPr/>
+        </p:nvPicPr>
+        <p:blipFill>
+          <a:blip r:embed="rId4"/>
+          <a:stretch>
+            <a:fillRect/>
+          </a:stretch>
+        </p:blipFill>
+        <p:spPr>
+          <a:xfrm>
+            <a:off x="4572000" y="3444240"/>
+            <a:ext cx="3981655" cy="2991004"/>
+          </a:xfrm>
+          <a:prstGeom prst="rect">
+            <a:avLst/>
+          </a:prstGeom>
+        </p:spPr>
+      </p:pic>
+    </p:spTree>
+    <p:extLst>
+      <p:ext uri="{BB962C8B-B14F-4D97-AF65-F5344CB8AC3E}">
+        <p14:creationId xmlns:p14="http://schemas.microsoft.com/office/powerpoint/2010/main" val="3334254190"/>
+      </p:ext>
+    </p:extLst>
+  </p:cSld>
+  <p:clrMapOvr>
+    <a:masterClrMapping/>
+  </p:clrMapOvr>
+  <p:transition spd="med" advTm="63997"/>
+</p:sld>
+</file>
+
+<file path=ppt/slides/slide3.xml><?xml version="1.0" encoding="utf-8"?>
+<p:sld xmlns:a="http://schemas.openxmlformats.org/drawingml/2006/main" xmlns:r="http://schemas.openxmlformats.org/officeDocument/2006/relationships" xmlns:p="http://schemas.openxmlformats.org/presentationml/2006/main">
+  <p:cSld>
+    <p:spTree>
+      <p:nvGrpSpPr>
         <p:cNvPr id="1" name=""/>
         <p:cNvGrpSpPr/>
         <p:nvPr/>
@@ -23816,247 +24204,6 @@
           </a:p>
         </p:txBody>
       </p:sp>
-      <mc:AlternateContent xmlns:mc="http://schemas.openxmlformats.org/markup-compatibility/2006">
-        <mc:Choice xmlns:a14="http://schemas.microsoft.com/office/drawing/2010/main" Requires="a14">
-          <p:sp>
-            <p:nvSpPr>
-              <p:cNvPr id="7" name="内容占位符 2"/>
-              <p:cNvSpPr>
-                <a:spLocks noGrp="1"/>
-              </p:cNvSpPr>
-              <p:nvPr>
-                <p:ph idx="4294967295"/>
-              </p:nvPr>
-            </p:nvSpPr>
-            <p:spPr>
-              <a:xfrm>
-                <a:off x="93652" y="1068110"/>
-                <a:ext cx="9050348" cy="1827489"/>
-              </a:xfrm>
-            </p:spPr>
-            <p:txBody>
-              <a:bodyPr/>
-              <a:lstStyle/>
-              <a:p>
-                <a:r>
-                  <a:rPr lang="en-US" altLang="zh-CN" sz="2400" dirty="0">
-                    <a:latin typeface="+mn-lt"/>
-                    <a:cs typeface="Times New Roman" panose="02020603050405020304" pitchFamily="18" charset="0"/>
-                  </a:rPr>
-                  <a:t>High-Reynolds-number wall-bounded turbulence is common in industrial engineering, but is inaccessible to DNS/LES</a:t>
-                </a:r>
-                <a:endParaRPr lang="en-US" altLang="zh-CN" sz="2000" dirty="0">
-                  <a:latin typeface="+mn-lt"/>
-                  <a:cs typeface="Times New Roman" panose="02020603050405020304" pitchFamily="18" charset="0"/>
-                </a:endParaRPr>
-              </a:p>
-              <a:p>
-                <a:pPr lvl="1"/>
-                <a:r>
-                  <a:rPr lang="en-US" altLang="zh-CN" sz="2000" dirty="0">
-                    <a:latin typeface="+mn-lt"/>
-                    <a:cs typeface="Times New Roman" panose="02020603050405020304" pitchFamily="18" charset="0"/>
-                  </a:rPr>
-                  <a:t>LES of a whole aircraft will be ready in 2045</a:t>
-                </a:r>
-              </a:p>
-              <a:p>
-                <a:pPr lvl="1"/>
-                <a:r>
-                  <a:rPr lang="en-US" altLang="zh-CN" sz="2000" dirty="0">
-                    <a:latin typeface="+mn-lt"/>
-                    <a:cs typeface="Times New Roman" panose="02020603050405020304" pitchFamily="18" charset="0"/>
-                  </a:rPr>
-                  <a:t>The highest computable </a:t>
-                </a:r>
-                <a14:m>
-                  <m:oMath xmlns:m="http://schemas.openxmlformats.org/officeDocument/2006/math">
-                    <m:sSub>
-                      <m:sSubPr>
-                        <m:ctrlPr>
-                          <a:rPr lang="en-US" altLang="zh-CN" sz="2000" i="1" smtClean="0">
-                            <a:latin typeface="Cambria Math" panose="02040503050406030204" pitchFamily="18" charset="0"/>
-                            <a:cs typeface="Times New Roman" panose="02020603050405020304" pitchFamily="18" charset="0"/>
-                          </a:rPr>
-                        </m:ctrlPr>
-                      </m:sSubPr>
-                      <m:e>
-                        <m:r>
-                          <a:rPr lang="en-US" altLang="zh-CN" sz="2000" b="0" i="1" smtClean="0">
-                            <a:latin typeface="Cambria Math" panose="02040503050406030204" pitchFamily="18" charset="0"/>
-                            <a:cs typeface="Times New Roman" panose="02020603050405020304" pitchFamily="18" charset="0"/>
-                          </a:rPr>
-                          <m:t>𝑅𝑒</m:t>
-                        </m:r>
-                      </m:e>
-                      <m:sub>
-                        <m:r>
-                          <a:rPr lang="zh-CN" altLang="en-US" sz="2000" i="1" smtClean="0">
-                            <a:latin typeface="Cambria Math" panose="02040503050406030204" pitchFamily="18" charset="0"/>
-                            <a:cs typeface="Times New Roman" panose="02020603050405020304" pitchFamily="18" charset="0"/>
-                          </a:rPr>
-                          <m:t>𝜏</m:t>
-                        </m:r>
-                      </m:sub>
-                    </m:sSub>
-                  </m:oMath>
-                </a14:m>
-                <a:r>
-                  <a:rPr lang="en-US" altLang="zh-CN" sz="2000" dirty="0">
-                    <a:latin typeface="+mn-lt"/>
-                    <a:cs typeface="Times New Roman" panose="02020603050405020304" pitchFamily="18" charset="0"/>
-                  </a:rPr>
-                  <a:t> ~ 10</a:t>
-                </a:r>
-                <a:r>
-                  <a:rPr lang="en-US" altLang="zh-CN" sz="2000" baseline="30000" dirty="0">
-                    <a:latin typeface="+mn-lt"/>
-                    <a:cs typeface="Times New Roman" panose="02020603050405020304" pitchFamily="18" charset="0"/>
-                  </a:rPr>
-                  <a:t>4</a:t>
-                </a:r>
-                <a:r>
-                  <a:rPr lang="en-US" altLang="zh-CN" sz="2000" dirty="0">
-                    <a:latin typeface="+mn-lt"/>
-                    <a:cs typeface="Times New Roman" panose="02020603050405020304" pitchFamily="18" charset="0"/>
-                  </a:rPr>
-                  <a:t> for channel</a:t>
-                </a:r>
-              </a:p>
-              <a:p>
-                <a:pPr lvl="1"/>
-                <a:endParaRPr lang="en-US" altLang="zh-CN" sz="2000" baseline="30000" dirty="0">
-                  <a:latin typeface="+mn-lt"/>
-                  <a:cs typeface="Times New Roman" panose="02020603050405020304" pitchFamily="18" charset="0"/>
-                </a:endParaRPr>
-              </a:p>
-              <a:p>
-                <a:pPr marL="457200" lvl="1" indent="0">
-                  <a:buNone/>
-                </a:pPr>
-                <a:endParaRPr lang="en-US" altLang="zh-CN" sz="2000" baseline="30000" dirty="0">
-                  <a:latin typeface="+mn-lt"/>
-                  <a:cs typeface="Times New Roman" panose="02020603050405020304" pitchFamily="18" charset="0"/>
-                </a:endParaRPr>
-              </a:p>
-              <a:p>
-                <a:pPr marL="457200" lvl="1" indent="0">
-                  <a:buNone/>
-                </a:pPr>
-                <a:endParaRPr lang="en-US" altLang="zh-CN" sz="2000" baseline="30000" dirty="0">
-                  <a:latin typeface="+mn-lt"/>
-                  <a:cs typeface="Times New Roman" panose="02020603050405020304" pitchFamily="18" charset="0"/>
-                </a:endParaRPr>
-              </a:p>
-              <a:p>
-                <a:pPr marL="457200" lvl="1" indent="0">
-                  <a:buNone/>
-                </a:pPr>
-                <a:endParaRPr lang="en-US" altLang="zh-CN" sz="2000" baseline="30000" dirty="0">
-                  <a:latin typeface="+mn-lt"/>
-                  <a:cs typeface="Times New Roman" panose="02020603050405020304" pitchFamily="18" charset="0"/>
-                </a:endParaRPr>
-              </a:p>
-              <a:p>
-                <a:pPr marL="457200" lvl="1" indent="0">
-                  <a:buNone/>
-                </a:pPr>
-                <a:endParaRPr lang="en-US" altLang="zh-CN" sz="2000" baseline="30000" dirty="0">
-                  <a:latin typeface="+mn-lt"/>
-                  <a:cs typeface="Times New Roman" panose="02020603050405020304" pitchFamily="18" charset="0"/>
-                </a:endParaRPr>
-              </a:p>
-              <a:p>
-                <a:pPr marL="457200" lvl="1" indent="0">
-                  <a:buNone/>
-                </a:pPr>
-                <a:endParaRPr lang="en-US" altLang="zh-CN" sz="2000" baseline="30000" dirty="0">
-                  <a:latin typeface="+mn-lt"/>
-                  <a:cs typeface="Times New Roman" panose="02020603050405020304" pitchFamily="18" charset="0"/>
-                </a:endParaRPr>
-              </a:p>
-              <a:p>
-                <a:pPr marL="457200" lvl="1" indent="0">
-                  <a:buNone/>
-                </a:pPr>
-                <a:endParaRPr lang="en-US" altLang="zh-CN" sz="2000" baseline="30000" dirty="0">
-                  <a:latin typeface="+mn-lt"/>
-                  <a:cs typeface="Times New Roman" panose="02020603050405020304" pitchFamily="18" charset="0"/>
-                </a:endParaRPr>
-              </a:p>
-              <a:p>
-                <a:pPr marL="457200" lvl="1" indent="0">
-                  <a:buNone/>
-                </a:pPr>
-                <a:endParaRPr lang="en-US" altLang="zh-CN" sz="2000" baseline="30000" dirty="0">
-                  <a:latin typeface="+mn-lt"/>
-                  <a:cs typeface="Times New Roman" panose="02020603050405020304" pitchFamily="18" charset="0"/>
-                </a:endParaRPr>
-              </a:p>
-              <a:p>
-                <a:pPr>
-                  <a:lnSpc>
-                    <a:spcPct val="125000"/>
-                  </a:lnSpc>
-                </a:pPr>
-                <a:endParaRPr lang="en-US" altLang="zh-CN" sz="2400" dirty="0">
-                  <a:latin typeface="+mn-lt"/>
-                  <a:cs typeface="Times New Roman" panose="02020603050405020304" pitchFamily="18" charset="0"/>
-                </a:endParaRPr>
-              </a:p>
-              <a:p>
-                <a:pPr marL="457200" lvl="1" indent="0">
-                  <a:lnSpc>
-                    <a:spcPct val="125000"/>
-                  </a:lnSpc>
-                  <a:buNone/>
-                </a:pPr>
-                <a:endParaRPr lang="en-US" altLang="zh-CN" sz="2000" dirty="0">
-                  <a:latin typeface="+mn-lt"/>
-                  <a:cs typeface="Times New Roman" panose="02020603050405020304" pitchFamily="18" charset="0"/>
-                </a:endParaRPr>
-              </a:p>
-            </p:txBody>
-          </p:sp>
-        </mc:Choice>
-        <mc:Fallback>
-          <p:sp>
-            <p:nvSpPr>
-              <p:cNvPr id="7" name="内容占位符 2"/>
-              <p:cNvSpPr>
-                <a:spLocks noGrp="1" noRot="1" noChangeAspect="1" noMove="1" noResize="1" noEditPoints="1" noAdjustHandles="1" noChangeArrowheads="1" noChangeShapeType="1" noTextEdit="1"/>
-              </p:cNvSpPr>
-              <p:nvPr>
-                <p:ph idx="4294967295"/>
-              </p:nvPr>
-            </p:nvSpPr>
-            <p:spPr>
-              <a:xfrm>
-                <a:off x="93652" y="1068110"/>
-                <a:ext cx="9050348" cy="1827489"/>
-              </a:xfrm>
-              <a:blipFill>
-                <a:blip r:embed="rId3"/>
-                <a:stretch>
-                  <a:fillRect l="-875" t="-2333" r="-943"/>
-                </a:stretch>
-              </a:blipFill>
-            </p:spPr>
-            <p:txBody>
-              <a:bodyPr/>
-              <a:lstStyle/>
-              <a:p>
-                <a:r>
-                  <a:rPr lang="en-US">
-                    <a:noFill/>
-                  </a:rPr>
-                  <a:t> </a:t>
-                </a:r>
-              </a:p>
-            </p:txBody>
-          </p:sp>
-        </mc:Fallback>
-      </mc:AlternateContent>
       <p:sp>
         <p:nvSpPr>
           <p:cNvPr id="9" name="Rectangle 2"/>
@@ -24120,12 +24267,315 @@
           </a:p>
         </p:txBody>
       </p:sp>
+      <p:sp>
+        <p:nvSpPr>
+          <p:cNvPr id="18" name="内容占位符 2">
+            <a:extLst>
+              <a:ext uri="{FF2B5EF4-FFF2-40B4-BE49-F238E27FC236}">
+                <a16:creationId xmlns:a16="http://schemas.microsoft.com/office/drawing/2014/main" id="{5B83F688-3AAF-6E92-D5A4-B8DCA97B9756}"/>
+              </a:ext>
+            </a:extLst>
+          </p:cNvPr>
+          <p:cNvSpPr txBox="1">
+            <a:spLocks/>
+          </p:cNvSpPr>
+          <p:nvPr/>
+        </p:nvSpPr>
+        <p:spPr bwMode="auto">
+          <a:xfrm>
+            <a:off x="93652" y="1068111"/>
+            <a:ext cx="9050348" cy="1446487"/>
+          </a:xfrm>
+          <a:prstGeom prst="rect">
+            <a:avLst/>
+          </a:prstGeom>
+          <a:noFill/>
+          <a:ln>
+            <a:noFill/>
+          </a:ln>
+          <a:extLst>
+            <a:ext uri="{909E8E84-426E-40DD-AFC4-6F175D3DCCD1}">
+              <a14:hiddenFill xmlns:a14="http://schemas.microsoft.com/office/drawing/2010/main">
+                <a:solidFill>
+                  <a:srgbClr val="FFFFFF"/>
+                </a:solidFill>
+              </a14:hiddenFill>
+            </a:ext>
+            <a:ext uri="{91240B29-F687-4F45-9708-019B960494DF}">
+              <a14:hiddenLine xmlns:a14="http://schemas.microsoft.com/office/drawing/2010/main" w="28575">
+                <a:solidFill>
+                  <a:srgbClr val="000000"/>
+                </a:solidFill>
+                <a:miter lim="800000"/>
+                <a:headEnd/>
+                <a:tailEnd/>
+              </a14:hiddenLine>
+            </a:ext>
+          </a:extLst>
+        </p:spPr>
+        <p:txBody>
+          <a:bodyPr vert="horz" wrap="square" lIns="91440" tIns="45720" rIns="91440" bIns="45720" numCol="1" anchor="t" anchorCtr="0" compatLnSpc="1">
+            <a:prstTxWarp prst="textNoShape">
+              <a:avLst/>
+            </a:prstTxWarp>
+          </a:bodyPr>
+          <a:lstStyle>
+            <a:lvl1pPr marL="342900" indent="-342900" algn="l" rtl="0" eaLnBrk="1" fontAlgn="base" hangingPunct="1">
+              <a:spcBef>
+                <a:spcPct val="30000"/>
+              </a:spcBef>
+              <a:spcAft>
+                <a:spcPct val="0"/>
+              </a:spcAft>
+              <a:buClr>
+                <a:schemeClr val="hlink"/>
+              </a:buClr>
+              <a:buFont typeface="Wingdings" pitchFamily="2" charset="2"/>
+              <a:buChar char="§"/>
+              <a:defRPr sz="3200">
+                <a:solidFill>
+                  <a:srgbClr val="000066"/>
+                </a:solidFill>
+                <a:latin typeface="微软雅黑" pitchFamily="34" charset="-122"/>
+                <a:ea typeface="微软雅黑" pitchFamily="34" charset="-122"/>
+                <a:cs typeface="+mn-cs"/>
+              </a:defRPr>
+            </a:lvl1pPr>
+            <a:lvl2pPr marL="742950" indent="-285750" algn="l" rtl="0" eaLnBrk="1" fontAlgn="base" hangingPunct="1">
+              <a:spcBef>
+                <a:spcPct val="30000"/>
+              </a:spcBef>
+              <a:spcAft>
+                <a:spcPct val="0"/>
+              </a:spcAft>
+              <a:buClr>
+                <a:schemeClr val="tx2"/>
+              </a:buClr>
+              <a:buSzPct val="85000"/>
+              <a:buFont typeface="Wingdings" pitchFamily="2" charset="2"/>
+              <a:buChar char="Ø"/>
+              <a:defRPr sz="2800">
+                <a:solidFill>
+                  <a:srgbClr val="006666"/>
+                </a:solidFill>
+                <a:latin typeface="微软雅黑" pitchFamily="34" charset="-122"/>
+                <a:ea typeface="微软雅黑" pitchFamily="34" charset="-122"/>
+              </a:defRPr>
+            </a:lvl2pPr>
+            <a:lvl3pPr marL="1143000" indent="-228600" algn="l" rtl="0" eaLnBrk="1" fontAlgn="base" hangingPunct="1">
+              <a:spcBef>
+                <a:spcPct val="30000"/>
+              </a:spcBef>
+              <a:spcAft>
+                <a:spcPct val="0"/>
+              </a:spcAft>
+              <a:buClr>
+                <a:schemeClr val="hlink"/>
+              </a:buClr>
+              <a:buSzPct val="95000"/>
+              <a:buFont typeface="Wingdings 2" pitchFamily="18" charset="2"/>
+              <a:buChar char="¡"/>
+              <a:defRPr sz="2400">
+                <a:solidFill>
+                  <a:schemeClr val="hlink"/>
+                </a:solidFill>
+                <a:latin typeface="微软雅黑" pitchFamily="34" charset="-122"/>
+                <a:ea typeface="微软雅黑" pitchFamily="34" charset="-122"/>
+              </a:defRPr>
+            </a:lvl3pPr>
+            <a:lvl4pPr marL="1600200" indent="-228600" algn="l" rtl="0" eaLnBrk="1" fontAlgn="base" hangingPunct="1">
+              <a:spcBef>
+                <a:spcPct val="30000"/>
+              </a:spcBef>
+              <a:spcAft>
+                <a:spcPct val="0"/>
+              </a:spcAft>
+              <a:buClr>
+                <a:schemeClr val="tx2"/>
+              </a:buClr>
+              <a:buSzPct val="90000"/>
+              <a:buFont typeface="Wingdings" pitchFamily="2" charset="2"/>
+              <a:buChar char="Ø"/>
+              <a:defRPr sz="2000">
+                <a:solidFill>
+                  <a:srgbClr val="990099"/>
+                </a:solidFill>
+                <a:latin typeface="微软雅黑" pitchFamily="34" charset="-122"/>
+                <a:ea typeface="微软雅黑" pitchFamily="34" charset="-122"/>
+              </a:defRPr>
+            </a:lvl4pPr>
+            <a:lvl5pPr marL="2057400" indent="-228600" algn="l" rtl="0" eaLnBrk="1" fontAlgn="base" hangingPunct="1">
+              <a:spcBef>
+                <a:spcPct val="30000"/>
+              </a:spcBef>
+              <a:spcAft>
+                <a:spcPct val="0"/>
+              </a:spcAft>
+              <a:buClr>
+                <a:schemeClr val="hlink"/>
+              </a:buClr>
+              <a:buFont typeface="Wingdings 2" pitchFamily="18" charset="2"/>
+              <a:buChar char="¡"/>
+              <a:defRPr sz="2000">
+                <a:solidFill>
+                  <a:schemeClr val="tx1"/>
+                </a:solidFill>
+                <a:latin typeface="微软雅黑" pitchFamily="34" charset="-122"/>
+                <a:ea typeface="微软雅黑" pitchFamily="34" charset="-122"/>
+              </a:defRPr>
+            </a:lvl5pPr>
+            <a:lvl6pPr marL="2514600" indent="-228600" algn="l" rtl="0" eaLnBrk="1" fontAlgn="base" hangingPunct="1">
+              <a:spcBef>
+                <a:spcPct val="30000"/>
+              </a:spcBef>
+              <a:spcAft>
+                <a:spcPct val="0"/>
+              </a:spcAft>
+              <a:buClr>
+                <a:schemeClr val="hlink"/>
+              </a:buClr>
+              <a:buFont typeface="Wingdings 2" pitchFamily="18" charset="2"/>
+              <a:buChar char="¡"/>
+              <a:defRPr sz="2000">
+                <a:solidFill>
+                  <a:schemeClr val="tx1"/>
+                </a:solidFill>
+                <a:latin typeface="+mn-lt"/>
+                <a:ea typeface="+mn-ea"/>
+              </a:defRPr>
+            </a:lvl6pPr>
+            <a:lvl7pPr marL="2971800" indent="-228600" algn="l" rtl="0" eaLnBrk="1" fontAlgn="base" hangingPunct="1">
+              <a:spcBef>
+                <a:spcPct val="30000"/>
+              </a:spcBef>
+              <a:spcAft>
+                <a:spcPct val="0"/>
+              </a:spcAft>
+              <a:buClr>
+                <a:schemeClr val="hlink"/>
+              </a:buClr>
+              <a:buFont typeface="Wingdings 2" pitchFamily="18" charset="2"/>
+              <a:buChar char="¡"/>
+              <a:defRPr sz="2000">
+                <a:solidFill>
+                  <a:schemeClr val="tx1"/>
+                </a:solidFill>
+                <a:latin typeface="+mn-lt"/>
+                <a:ea typeface="+mn-ea"/>
+              </a:defRPr>
+            </a:lvl7pPr>
+            <a:lvl8pPr marL="3429000" indent="-228600" algn="l" rtl="0" eaLnBrk="1" fontAlgn="base" hangingPunct="1">
+              <a:spcBef>
+                <a:spcPct val="30000"/>
+              </a:spcBef>
+              <a:spcAft>
+                <a:spcPct val="0"/>
+              </a:spcAft>
+              <a:buClr>
+                <a:schemeClr val="hlink"/>
+              </a:buClr>
+              <a:buFont typeface="Wingdings 2" pitchFamily="18" charset="2"/>
+              <a:buChar char="¡"/>
+              <a:defRPr sz="2000">
+                <a:solidFill>
+                  <a:schemeClr val="tx1"/>
+                </a:solidFill>
+                <a:latin typeface="+mn-lt"/>
+                <a:ea typeface="+mn-ea"/>
+              </a:defRPr>
+            </a:lvl8pPr>
+            <a:lvl9pPr marL="3886200" indent="-228600" algn="l" rtl="0" eaLnBrk="1" fontAlgn="base" hangingPunct="1">
+              <a:spcBef>
+                <a:spcPct val="30000"/>
+              </a:spcBef>
+              <a:spcAft>
+                <a:spcPct val="0"/>
+              </a:spcAft>
+              <a:buClr>
+                <a:schemeClr val="hlink"/>
+              </a:buClr>
+              <a:buFont typeface="Wingdings 2" pitchFamily="18" charset="2"/>
+              <a:buChar char="¡"/>
+              <a:defRPr sz="2000">
+                <a:solidFill>
+                  <a:schemeClr val="tx1"/>
+                </a:solidFill>
+                <a:latin typeface="+mn-lt"/>
+                <a:ea typeface="+mn-ea"/>
+              </a:defRPr>
+            </a:lvl9pPr>
+          </a:lstStyle>
+          <a:p>
+            <a:r>
+              <a:rPr lang="en-US" altLang="zh-CN" sz="2400" kern="0" dirty="0">
+                <a:latin typeface="+mn-lt"/>
+                <a:cs typeface="Times New Roman" panose="02020603050405020304" pitchFamily="18" charset="0"/>
+              </a:rPr>
+              <a:t>RETAU5200</a:t>
+            </a:r>
+            <a:endParaRPr lang="en-US" altLang="zh-CN" sz="2000" kern="0" dirty="0">
+              <a:latin typeface="+mn-lt"/>
+              <a:cs typeface="Times New Roman" panose="02020603050405020304" pitchFamily="18" charset="0"/>
+            </a:endParaRPr>
+          </a:p>
+          <a:p>
+            <a:pPr lvl="1"/>
+            <a:r>
+              <a:rPr lang="en-US" altLang="zh-CN" sz="2000" dirty="0">
+                <a:latin typeface="+mn-lt"/>
+                <a:cs typeface="Times New Roman" panose="02020603050405020304" pitchFamily="18" charset="0"/>
+              </a:rPr>
+              <a:t>Neither Neumann nor wall model yields acceptable profiles</a:t>
+            </a:r>
+          </a:p>
+          <a:p>
+            <a:pPr lvl="1"/>
+            <a:r>
+              <a:rPr lang="en-US" altLang="zh-CN" sz="2000" kern="0" dirty="0">
+                <a:latin typeface="+mn-lt"/>
+                <a:cs typeface="Times New Roman" panose="02020603050405020304" pitchFamily="18" charset="0"/>
+              </a:rPr>
+              <a:t>Resolutions are insufficient</a:t>
+            </a:r>
+          </a:p>
+        </p:txBody>
+      </p:sp>
       <p:pic>
         <p:nvPicPr>
-          <p:cNvPr id="15" name="Picture 14">
+          <p:cNvPr id="36" name="Picture 35">
             <a:extLst>
               <a:ext uri="{FF2B5EF4-FFF2-40B4-BE49-F238E27FC236}">
-                <a16:creationId xmlns:a16="http://schemas.microsoft.com/office/drawing/2014/main" id="{FAB37A1F-AFB4-91A9-DD03-604191026725}"/>
+                <a16:creationId xmlns:a16="http://schemas.microsoft.com/office/drawing/2014/main" id="{A8525D05-0C2D-7294-E8C6-96683A2E1D5F}"/>
+              </a:ext>
+            </a:extLst>
+          </p:cNvPr>
+          <p:cNvPicPr>
+            <a:picLocks noChangeAspect="1"/>
+          </p:cNvPicPr>
+          <p:nvPr/>
+        </p:nvPicPr>
+        <p:blipFill>
+          <a:blip r:embed="rId3"/>
+          <a:stretch>
+            <a:fillRect/>
+          </a:stretch>
+        </p:blipFill>
+        <p:spPr>
+          <a:xfrm>
+            <a:off x="4724400" y="3390745"/>
+            <a:ext cx="3968954" cy="3010055"/>
+          </a:xfrm>
+          <a:prstGeom prst="rect">
+            <a:avLst/>
+          </a:prstGeom>
+        </p:spPr>
+      </p:pic>
+      <p:pic>
+        <p:nvPicPr>
+          <p:cNvPr id="55" name="Picture 54">
+            <a:extLst>
+              <a:ext uri="{FF2B5EF4-FFF2-40B4-BE49-F238E27FC236}">
+                <a16:creationId xmlns:a16="http://schemas.microsoft.com/office/drawing/2014/main" id="{17CB35E4-3428-7F51-3B97-A61FF179DC1A}"/>
               </a:ext>
             </a:extLst>
           </p:cNvPr>
@@ -24142,44 +24592,84 @@
         </p:blipFill>
         <p:spPr>
           <a:xfrm>
-            <a:off x="533400" y="3048000"/>
-            <a:ext cx="4019757" cy="3010055"/>
+            <a:off x="457200" y="3390745"/>
+            <a:ext cx="3956253" cy="2984653"/>
           </a:xfrm>
           <a:prstGeom prst="rect">
             <a:avLst/>
           </a:prstGeom>
         </p:spPr>
       </p:pic>
-      <p:pic>
-        <p:nvPicPr>
-          <p:cNvPr id="17" name="Picture 16">
+      <p:sp>
+        <p:nvSpPr>
+          <p:cNvPr id="41" name="TextBox 40">
             <a:extLst>
               <a:ext uri="{FF2B5EF4-FFF2-40B4-BE49-F238E27FC236}">
-                <a16:creationId xmlns:a16="http://schemas.microsoft.com/office/drawing/2014/main" id="{0AA73FDA-FC69-4147-69A3-B7DBCACBE950}"/>
+                <a16:creationId xmlns:a16="http://schemas.microsoft.com/office/drawing/2014/main" id="{CEFC1CA4-6BDA-687A-BF4B-114098DF5FEC}"/>
               </a:ext>
             </a:extLst>
           </p:cNvPr>
-          <p:cNvPicPr>
-            <a:picLocks noChangeAspect="1"/>
-          </p:cNvPicPr>
+          <p:cNvSpPr txBox="1"/>
           <p:nvPr/>
-        </p:nvPicPr>
-        <p:blipFill>
-          <a:blip r:embed="rId5"/>
-          <a:stretch>
-            <a:fillRect/>
-          </a:stretch>
-        </p:blipFill>
+        </p:nvSpPr>
         <p:spPr>
           <a:xfrm>
-            <a:off x="4553157" y="3051175"/>
-            <a:ext cx="3962604" cy="3003704"/>
+            <a:off x="1786861" y="6412468"/>
+            <a:ext cx="1184940" cy="369332"/>
           </a:xfrm>
           <a:prstGeom prst="rect">
             <a:avLst/>
           </a:prstGeom>
+          <a:noFill/>
         </p:spPr>
-      </p:pic>
+        <p:txBody>
+          <a:bodyPr wrap="none" rtlCol="0">
+            <a:spAutoFit/>
+          </a:bodyPr>
+          <a:lstStyle/>
+          <a:p>
+            <a:r>
+              <a:rPr lang="en-US" dirty="0"/>
+              <a:t>Neumann</a:t>
+            </a:r>
+          </a:p>
+        </p:txBody>
+      </p:sp>
+      <p:sp>
+        <p:nvSpPr>
+          <p:cNvPr id="42" name="TextBox 41">
+            <a:extLst>
+              <a:ext uri="{FF2B5EF4-FFF2-40B4-BE49-F238E27FC236}">
+                <a16:creationId xmlns:a16="http://schemas.microsoft.com/office/drawing/2014/main" id="{1312CB8D-E9F5-FF1E-4ED8-D2F0EB944E34}"/>
+              </a:ext>
+            </a:extLst>
+          </p:cNvPr>
+          <p:cNvSpPr txBox="1"/>
+          <p:nvPr/>
+        </p:nvSpPr>
+        <p:spPr>
+          <a:xfrm>
+            <a:off x="6039727" y="6412468"/>
+            <a:ext cx="1317412" cy="369332"/>
+          </a:xfrm>
+          <a:prstGeom prst="rect">
+            <a:avLst/>
+          </a:prstGeom>
+          <a:noFill/>
+        </p:spPr>
+        <p:txBody>
+          <a:bodyPr wrap="none" rtlCol="0">
+            <a:spAutoFit/>
+          </a:bodyPr>
+          <a:lstStyle/>
+          <a:p>
+            <a:r>
+              <a:rPr lang="en-US" dirty="0"/>
+              <a:t>Wall model</a:t>
+            </a:r>
+          </a:p>
+        </p:txBody>
+      </p:sp>
     </p:spTree>
     <p:extLst>
       <p:ext uri="{BB962C8B-B14F-4D97-AF65-F5344CB8AC3E}">
@@ -24194,7 +24684,7 @@
 </p:sld>
 </file>
 
-<file path=ppt/slides/slide3.xml><?xml version="1.0" encoding="utf-8"?>
+<file path=ppt/slides/slide4.xml><?xml version="1.0" encoding="utf-8"?>
 <p:sld xmlns:a="http://schemas.openxmlformats.org/drawingml/2006/main" xmlns:r="http://schemas.openxmlformats.org/officeDocument/2006/relationships" xmlns:p="http://schemas.openxmlformats.org/presentationml/2006/main">
   <p:cSld>
     <p:spTree>
@@ -24446,30 +24936,6 @@
                 </a:endParaRPr>
               </a:p>
               <a:p>
-                <a:pPr>
-                  <a:lnSpc>
-                    <a:spcPct val="125000"/>
-                  </a:lnSpc>
-                </a:pPr>
-                <a:r>
-                  <a:rPr lang="en-US" altLang="zh-CN" sz="2400" dirty="0">
-                    <a:latin typeface="+mn-lt"/>
-                    <a:cs typeface="Times New Roman" panose="02020603050405020304" pitchFamily="18" charset="0"/>
-                  </a:rPr>
-                  <a:t>Wall-modelled LES</a:t>
-                </a:r>
-              </a:p>
-              <a:p>
-                <a:pPr lvl="1"/>
-                <a:r>
-                  <a:rPr lang="en-US" altLang="zh-CN" sz="2000" dirty="0">
-                    <a:latin typeface="+mn-lt"/>
-                    <a:cs typeface="Times New Roman" panose="02020603050405020304" pitchFamily="18" charset="0"/>
-                  </a:rPr>
-                  <a:t>The expensive inner layer (~0.1δ) is modelled by eddy viscosity or modified wall-shear stress and heat flux</a:t>
-                </a:r>
-              </a:p>
-              <a:p>
                 <a:pPr lvl="1">
                   <a:lnSpc>
                     <a:spcPct val="125000"/>
@@ -24486,7 +24952,13 @@
         <mc:Fallback xmlns="">
           <p:sp>
             <p:nvSpPr>
-              <p:cNvPr id="7" name="内容占位符 2"/>
+              <p:cNvPr id="7" name="内容占位符 2">
+                <a:extLst>
+                  <a:ext uri="{FF2B5EF4-FFF2-40B4-BE49-F238E27FC236}">
+                    <a16:creationId xmlns:a16="http://schemas.microsoft.com/office/drawing/2014/main" id="{A7064020-A8FD-D083-3E6B-AB4AA320E5C7}"/>
+                  </a:ext>
+                </a:extLst>
+              </p:cNvPr>
               <p:cNvSpPr>
                 <a:spLocks noGrp="1" noRot="1" noChangeAspect="1" noMove="1" noResize="1" noEditPoints="1" noAdjustHandles="1" noChangeArrowheads="1" noChangeShapeType="1" noTextEdit="1"/>
               </p:cNvSpPr>
@@ -24590,176 +25062,6 @@
           </a:p>
         </p:txBody>
       </p:sp>
-      <p:sp>
-        <p:nvSpPr>
-          <p:cNvPr id="6" name="文本框 5">
-            <a:extLst>
-              <a:ext uri="{FF2B5EF4-FFF2-40B4-BE49-F238E27FC236}">
-                <a16:creationId xmlns:a16="http://schemas.microsoft.com/office/drawing/2014/main" id="{E9B2BCD5-BD9E-7978-1D93-3F0F2E00664F}"/>
-              </a:ext>
-            </a:extLst>
-          </p:cNvPr>
-          <p:cNvSpPr txBox="1"/>
-          <p:nvPr/>
-        </p:nvSpPr>
-        <p:spPr>
-          <a:xfrm>
-            <a:off x="8549391" y="6488668"/>
-            <a:ext cx="633507" cy="369332"/>
-          </a:xfrm>
-          <a:prstGeom prst="rect">
-            <a:avLst/>
-          </a:prstGeom>
-          <a:noFill/>
-        </p:spPr>
-        <p:txBody>
-          <a:bodyPr wrap="none" rtlCol="0">
-            <a:spAutoFit/>
-          </a:bodyPr>
-          <a:lstStyle/>
-          <a:p>
-            <a:r>
-              <a:rPr lang="en-US" altLang="zh-CN" dirty="0"/>
-              <a:t>1/12</a:t>
-            </a:r>
-            <a:endParaRPr lang="zh-CN" altLang="en-US" dirty="0"/>
-          </a:p>
-        </p:txBody>
-      </p:sp>
-      <p:pic>
-        <p:nvPicPr>
-          <p:cNvPr id="10" name="Picture 9">
-            <a:extLst>
-              <a:ext uri="{FF2B5EF4-FFF2-40B4-BE49-F238E27FC236}">
-                <a16:creationId xmlns:a16="http://schemas.microsoft.com/office/drawing/2014/main" id="{2D0CC69F-9DA2-C3F9-0768-DDC0C3615F99}"/>
-              </a:ext>
-            </a:extLst>
-          </p:cNvPr>
-          <p:cNvPicPr>
-            <a:picLocks noChangeAspect="1"/>
-          </p:cNvPicPr>
-          <p:nvPr/>
-        </p:nvPicPr>
-        <p:blipFill>
-          <a:blip r:embed="rId4"/>
-          <a:stretch>
-            <a:fillRect/>
-          </a:stretch>
-        </p:blipFill>
-        <p:spPr>
-          <a:xfrm>
-            <a:off x="4726984" y="2649859"/>
-            <a:ext cx="4035136" cy="3198439"/>
-          </a:xfrm>
-          <a:prstGeom prst="rect">
-            <a:avLst/>
-          </a:prstGeom>
-        </p:spPr>
-      </p:pic>
-      <p:pic>
-        <p:nvPicPr>
-          <p:cNvPr id="11" name="Picture 10">
-            <a:extLst>
-              <a:ext uri="{FF2B5EF4-FFF2-40B4-BE49-F238E27FC236}">
-                <a16:creationId xmlns:a16="http://schemas.microsoft.com/office/drawing/2014/main" id="{D28BCEC2-5205-1979-0D06-9228679B7BEA}"/>
-              </a:ext>
-            </a:extLst>
-          </p:cNvPr>
-          <p:cNvPicPr>
-            <a:picLocks noChangeAspect="1"/>
-          </p:cNvPicPr>
-          <p:nvPr/>
-        </p:nvPicPr>
-        <p:blipFill>
-          <a:blip r:embed="rId5"/>
-          <a:stretch>
-            <a:fillRect/>
-          </a:stretch>
-        </p:blipFill>
-        <p:spPr>
-          <a:xfrm>
-            <a:off x="463330" y="2639468"/>
-            <a:ext cx="3920836" cy="2875773"/>
-          </a:xfrm>
-          <a:prstGeom prst="rect">
-            <a:avLst/>
-          </a:prstGeom>
-        </p:spPr>
-      </p:pic>
-      <p:sp>
-        <p:nvSpPr>
-          <p:cNvPr id="13" name="TextBox 12">
-            <a:extLst>
-              <a:ext uri="{FF2B5EF4-FFF2-40B4-BE49-F238E27FC236}">
-                <a16:creationId xmlns:a16="http://schemas.microsoft.com/office/drawing/2014/main" id="{40AD2EEF-476A-28F6-ACBE-EF2538BADFA2}"/>
-              </a:ext>
-            </a:extLst>
-          </p:cNvPr>
-          <p:cNvSpPr txBox="1"/>
-          <p:nvPr/>
-        </p:nvSpPr>
-        <p:spPr>
-          <a:xfrm>
-            <a:off x="2779309" y="4800600"/>
-            <a:ext cx="2005677" cy="369332"/>
-          </a:xfrm>
-          <a:prstGeom prst="rect">
-            <a:avLst/>
-          </a:prstGeom>
-          <a:noFill/>
-        </p:spPr>
-        <p:txBody>
-          <a:bodyPr wrap="none" rtlCol="0">
-            <a:spAutoFit/>
-          </a:bodyPr>
-          <a:lstStyle/>
-          <a:p>
-            <a:r>
-              <a:rPr lang="en-US" dirty="0"/>
-              <a:t>Deck et al. (2014)</a:t>
-            </a:r>
-          </a:p>
-        </p:txBody>
-      </p:sp>
-      <p:sp>
-        <p:nvSpPr>
-          <p:cNvPr id="14" name="TextBox 13">
-            <a:extLst>
-              <a:ext uri="{FF2B5EF4-FFF2-40B4-BE49-F238E27FC236}">
-                <a16:creationId xmlns:a16="http://schemas.microsoft.com/office/drawing/2014/main" id="{535832A4-FC2B-7ACB-BEA9-B3E76EEE2BEE}"/>
-              </a:ext>
-            </a:extLst>
-          </p:cNvPr>
-          <p:cNvSpPr txBox="1"/>
-          <p:nvPr/>
-        </p:nvSpPr>
-        <p:spPr>
-          <a:xfrm>
-            <a:off x="6633906" y="4985266"/>
-            <a:ext cx="1787669" cy="369332"/>
-          </a:xfrm>
-          <a:prstGeom prst="rect">
-            <a:avLst/>
-          </a:prstGeom>
-          <a:noFill/>
-        </p:spPr>
-        <p:txBody>
-          <a:bodyPr wrap="none" rtlCol="0">
-            <a:spAutoFit/>
-          </a:bodyPr>
-          <a:lstStyle/>
-          <a:p>
-            <a:r>
-              <a:rPr lang="en-US" dirty="0" err="1"/>
-              <a:t>Pirozzoli</a:t>
-            </a:r>
-            <a:r>
-              <a:rPr lang="en-US" dirty="0"/>
-              <a:t> (2022)</a:t>
-            </a:r>
-          </a:p>
-        </p:txBody>
-      </p:sp>
     </p:spTree>
     <p:extLst>
       <p:ext uri="{BB962C8B-B14F-4D97-AF65-F5344CB8AC3E}">
@@ -24771,246 +25073,6 @@
     <a:masterClrMapping/>
   </p:clrMapOvr>
   <p:transition spd="med" advTm="63997"/>
-</p:sld>
-</file>
-
-<file path=ppt/slides/slide4.xml><?xml version="1.0" encoding="utf-8"?>
-<p:sld xmlns:a="http://schemas.openxmlformats.org/drawingml/2006/main" xmlns:r="http://schemas.openxmlformats.org/officeDocument/2006/relationships" xmlns:p="http://schemas.openxmlformats.org/presentationml/2006/main">
-  <p:cSld>
-    <p:spTree>
-      <p:nvGrpSpPr>
-        <p:cNvPr id="1" name=""/>
-        <p:cNvGrpSpPr/>
-        <p:nvPr/>
-      </p:nvGrpSpPr>
-      <p:grpSpPr>
-        <a:xfrm>
-          <a:off x="0" y="0"/>
-          <a:ext cx="0" cy="0"/>
-          <a:chOff x="0" y="0"/>
-          <a:chExt cx="0" cy="0"/>
-        </a:xfrm>
-      </p:grpSpPr>
-      <p:sp>
-        <p:nvSpPr>
-          <p:cNvPr id="3" name="内容占位符 2"/>
-          <p:cNvSpPr>
-            <a:spLocks noGrp="1"/>
-          </p:cNvSpPr>
-          <p:nvPr>
-            <p:ph idx="1"/>
-          </p:nvPr>
-        </p:nvSpPr>
-        <p:spPr>
-          <a:xfrm>
-            <a:off x="437621" y="1373816"/>
-            <a:ext cx="5886979" cy="4924425"/>
-          </a:xfrm>
-        </p:spPr>
-        <p:txBody>
-          <a:bodyPr/>
-          <a:lstStyle/>
-          <a:p>
-            <a:r>
-              <a:rPr lang="en-US" altLang="zh-CN" sz="2800" dirty="0">
-                <a:latin typeface="+mj-lt"/>
-                <a:cs typeface="Times New Roman" panose="02020603050405020304" pitchFamily="18" charset="0"/>
-              </a:rPr>
-              <a:t>Background</a:t>
-            </a:r>
-          </a:p>
-          <a:p>
-            <a:r>
-              <a:rPr lang="en-US" altLang="zh-CN" sz="2800" dirty="0">
-                <a:latin typeface="+mj-lt"/>
-                <a:cs typeface="Times New Roman" panose="02020603050405020304" pitchFamily="18" charset="0"/>
-              </a:rPr>
-              <a:t>Content</a:t>
-            </a:r>
-            <a:endParaRPr lang="en-US" altLang="zh-CN" sz="2000" dirty="0">
-              <a:latin typeface="+mj-lt"/>
-              <a:cs typeface="Times New Roman" panose="02020603050405020304" pitchFamily="18" charset="0"/>
-            </a:endParaRPr>
-          </a:p>
-          <a:p>
-            <a:pPr lvl="1"/>
-            <a:r>
-              <a:rPr lang="en-US" altLang="zh-CN" sz="2000" dirty="0" err="1">
-                <a:latin typeface="+mj-lt"/>
-                <a:cs typeface="Times New Roman" panose="02020603050405020304" pitchFamily="18" charset="0"/>
-              </a:rPr>
-              <a:t>RLTurb</a:t>
-            </a:r>
-            <a:endParaRPr lang="en-US" altLang="zh-CN" sz="2000" dirty="0">
-              <a:latin typeface="+mj-lt"/>
-              <a:cs typeface="Times New Roman" panose="02020603050405020304" pitchFamily="18" charset="0"/>
-            </a:endParaRPr>
-          </a:p>
-          <a:p>
-            <a:pPr lvl="1"/>
-            <a:r>
-              <a:rPr lang="en-US" altLang="zh-CN" sz="2000" dirty="0">
-                <a:latin typeface="+mj-lt"/>
-                <a:cs typeface="Times New Roman" panose="02020603050405020304" pitchFamily="18" charset="0"/>
-              </a:rPr>
-              <a:t>RLWM-IC</a:t>
-            </a:r>
-          </a:p>
-          <a:p>
-            <a:pPr lvl="1"/>
-            <a:r>
-              <a:rPr lang="en-US" altLang="zh-CN" sz="2000" dirty="0">
-                <a:latin typeface="+mj-lt"/>
-                <a:cs typeface="Times New Roman" panose="02020603050405020304" pitchFamily="18" charset="0"/>
-              </a:rPr>
-              <a:t>RLWM</a:t>
-            </a:r>
-          </a:p>
-          <a:p>
-            <a:r>
-              <a:rPr lang="en-US" altLang="zh-CN" sz="2800" dirty="0">
-                <a:latin typeface="+mj-lt"/>
-                <a:cs typeface="Times New Roman" panose="02020603050405020304" pitchFamily="18" charset="0"/>
-              </a:rPr>
-              <a:t>Drag reduction of pipe flow</a:t>
-            </a:r>
-            <a:endParaRPr lang="zh-CN" altLang="en-US" sz="2800" dirty="0">
-              <a:latin typeface="+mj-lt"/>
-              <a:cs typeface="Times New Roman" panose="02020603050405020304" pitchFamily="18" charset="0"/>
-            </a:endParaRPr>
-          </a:p>
-          <a:p>
-            <a:r>
-              <a:rPr lang="en-US" altLang="zh-CN" sz="2800" dirty="0">
-                <a:latin typeface="+mj-lt"/>
-                <a:cs typeface="Times New Roman" panose="02020603050405020304" pitchFamily="18" charset="0"/>
-              </a:rPr>
-              <a:t>Past research</a:t>
-            </a:r>
-          </a:p>
-          <a:p>
-            <a:pPr lvl="1"/>
-            <a:r>
-              <a:rPr lang="en-US" altLang="zh-CN" sz="2400" dirty="0">
-                <a:latin typeface="+mj-lt"/>
-                <a:cs typeface="Times New Roman" panose="02020603050405020304" pitchFamily="18" charset="0"/>
-              </a:rPr>
-              <a:t>AMD-IDDES</a:t>
-            </a:r>
-          </a:p>
-          <a:p>
-            <a:pPr lvl="1"/>
-            <a:r>
-              <a:rPr lang="en-US" altLang="zh-CN" sz="2400" dirty="0">
-                <a:latin typeface="+mj-lt"/>
-                <a:cs typeface="Times New Roman" panose="02020603050405020304" pitchFamily="18" charset="0"/>
-              </a:rPr>
-              <a:t>Iced wing flow</a:t>
-            </a:r>
-            <a:endParaRPr lang="zh-CN" altLang="en-US" sz="2400" dirty="0">
-              <a:latin typeface="+mj-lt"/>
-              <a:cs typeface="Times New Roman" panose="02020603050405020304" pitchFamily="18" charset="0"/>
-            </a:endParaRPr>
-          </a:p>
-        </p:txBody>
-      </p:sp>
-      <p:sp>
-        <p:nvSpPr>
-          <p:cNvPr id="2" name="标题 1"/>
-          <p:cNvSpPr>
-            <a:spLocks noGrp="1"/>
-          </p:cNvSpPr>
-          <p:nvPr>
-            <p:ph type="title"/>
-          </p:nvPr>
-        </p:nvSpPr>
-        <p:spPr/>
-        <p:txBody>
-          <a:bodyPr/>
-          <a:lstStyle/>
-          <a:p>
-            <a:r>
-              <a:rPr lang="en-US" altLang="zh-CN" dirty="0"/>
-              <a:t>Outline</a:t>
-            </a:r>
-            <a:endParaRPr lang="zh-CN" altLang="en-US" dirty="0"/>
-          </a:p>
-        </p:txBody>
-      </p:sp>
-    </p:spTree>
-    <p:extLst>
-      <p:ext uri="{BB962C8B-B14F-4D97-AF65-F5344CB8AC3E}">
-        <p14:creationId xmlns:p14="http://schemas.microsoft.com/office/powerpoint/2010/main" val="3823752556"/>
-      </p:ext>
-    </p:extLst>
-  </p:cSld>
-  <p:clrMapOvr>
-    <a:masterClrMapping/>
-  </p:clrMapOvr>
-  <p:transition spd="med"/>
-</p:sld>
-</file>
-
-<file path=ppt/slides/slide5.xml><?xml version="1.0" encoding="utf-8"?>
-<p:sld xmlns:a="http://schemas.openxmlformats.org/drawingml/2006/main" xmlns:r="http://schemas.openxmlformats.org/officeDocument/2006/relationships" xmlns:p="http://schemas.openxmlformats.org/presentationml/2006/main">
-  <p:cSld>
-    <p:spTree>
-      <p:nvGrpSpPr>
-        <p:cNvPr id="1" name=""/>
-        <p:cNvGrpSpPr/>
-        <p:nvPr/>
-      </p:nvGrpSpPr>
-      <p:grpSpPr>
-        <a:xfrm>
-          <a:off x="0" y="0"/>
-          <a:ext cx="0" cy="0"/>
-          <a:chOff x="0" y="0"/>
-          <a:chExt cx="0" cy="0"/>
-        </a:xfrm>
-      </p:grpSpPr>
-      <p:sp>
-        <p:nvSpPr>
-          <p:cNvPr id="2" name="Title 1"/>
-          <p:cNvSpPr>
-            <a:spLocks noGrp="1"/>
-          </p:cNvSpPr>
-          <p:nvPr>
-            <p:ph type="ctrTitle"/>
-          </p:nvPr>
-        </p:nvSpPr>
-        <p:spPr>
-          <a:xfrm>
-            <a:off x="152400" y="2286000"/>
-            <a:ext cx="8839200" cy="1600200"/>
-          </a:xfrm>
-        </p:spPr>
-        <p:txBody>
-          <a:bodyPr/>
-          <a:lstStyle/>
-          <a:p>
-            <a:r>
-              <a:rPr lang="en-US" altLang="zh-CN" sz="6000" dirty="0"/>
-              <a:t>Thank you</a:t>
-            </a:r>
-            <a:r>
-              <a:rPr lang="zh-CN" altLang="en-US" sz="6000" dirty="0"/>
-              <a:t>！</a:t>
-            </a:r>
-            <a:endParaRPr lang="en-US" sz="6000" dirty="0"/>
-          </a:p>
-        </p:txBody>
-      </p:sp>
-    </p:spTree>
-    <p:extLst>
-      <p:ext uri="{BB962C8B-B14F-4D97-AF65-F5344CB8AC3E}">
-        <p14:creationId xmlns:p14="http://schemas.microsoft.com/office/powerpoint/2010/main" val="435151847"/>
-      </p:ext>
-    </p:extLst>
-  </p:cSld>
-  <p:clrMapOvr>
-    <a:masterClrMapping/>
-  </p:clrMapOvr>
-  <p:transition spd="med" advTm="10765"/>
 </p:sld>
 </file>
 

</xml_diff>

<commit_message>
always update wall model
</commit_message>
<xml_diff>
--- a/docs/vv.pptx
+++ b/docs/vv.pptx
@@ -5,35 +5,37 @@
     <p:sldMasterId id="2147483660" r:id="rId1"/>
   </p:sldMasterIdLst>
   <p:notesMasterIdLst>
-    <p:notesMasterId r:id="rId25"/>
+    <p:notesMasterId r:id="rId27"/>
   </p:notesMasterIdLst>
   <p:handoutMasterIdLst>
-    <p:handoutMasterId r:id="rId26"/>
+    <p:handoutMasterId r:id="rId28"/>
   </p:handoutMasterIdLst>
   <p:sldIdLst>
     <p:sldId id="256" r:id="rId2"/>
     <p:sldId id="647" r:id="rId3"/>
     <p:sldId id="654" r:id="rId4"/>
     <p:sldId id="665" r:id="rId5"/>
-    <p:sldId id="648" r:id="rId6"/>
-    <p:sldId id="666" r:id="rId7"/>
-    <p:sldId id="650" r:id="rId8"/>
-    <p:sldId id="667" r:id="rId9"/>
-    <p:sldId id="645" r:id="rId10"/>
-    <p:sldId id="658" r:id="rId11"/>
-    <p:sldId id="669" r:id="rId12"/>
-    <p:sldId id="660" r:id="rId13"/>
-    <p:sldId id="661" r:id="rId14"/>
-    <p:sldId id="662" r:id="rId15"/>
-    <p:sldId id="663" r:id="rId16"/>
-    <p:sldId id="664" r:id="rId17"/>
-    <p:sldId id="668" r:id="rId18"/>
-    <p:sldId id="651" r:id="rId19"/>
-    <p:sldId id="653" r:id="rId20"/>
-    <p:sldId id="655" r:id="rId21"/>
-    <p:sldId id="656" r:id="rId22"/>
-    <p:sldId id="649" r:id="rId23"/>
-    <p:sldId id="646" r:id="rId24"/>
+    <p:sldId id="671" r:id="rId6"/>
+    <p:sldId id="648" r:id="rId7"/>
+    <p:sldId id="666" r:id="rId8"/>
+    <p:sldId id="650" r:id="rId9"/>
+    <p:sldId id="667" r:id="rId10"/>
+    <p:sldId id="645" r:id="rId11"/>
+    <p:sldId id="658" r:id="rId12"/>
+    <p:sldId id="669" r:id="rId13"/>
+    <p:sldId id="660" r:id="rId14"/>
+    <p:sldId id="661" r:id="rId15"/>
+    <p:sldId id="662" r:id="rId16"/>
+    <p:sldId id="663" r:id="rId17"/>
+    <p:sldId id="664" r:id="rId18"/>
+    <p:sldId id="668" r:id="rId19"/>
+    <p:sldId id="670" r:id="rId20"/>
+    <p:sldId id="651" r:id="rId21"/>
+    <p:sldId id="653" r:id="rId22"/>
+    <p:sldId id="655" r:id="rId23"/>
+    <p:sldId id="656" r:id="rId24"/>
+    <p:sldId id="649" r:id="rId25"/>
+    <p:sldId id="646" r:id="rId26"/>
   </p:sldIdLst>
   <p:sldSz cx="9144000" cy="6858000" type="screen4x3"/>
   <p:notesSz cx="6797675" cy="9931400"/>
@@ -820,7 +822,7 @@
           <a:p>
             <a:fld id="{FFA5E540-6D76-429F-95AD-C7F13B3CAC82}" type="slidenum">
               <a:rPr lang="en-US" smtClean="0"/>
-              <a:t>10</a:t>
+              <a:t>11</a:t>
             </a:fld>
             <a:endParaRPr lang="en-US" dirty="0"/>
           </a:p>
@@ -907,7 +909,7 @@
           <a:p>
             <a:fld id="{FFA5E540-6D76-429F-95AD-C7F13B3CAC82}" type="slidenum">
               <a:rPr lang="en-US" smtClean="0"/>
-              <a:t>11</a:t>
+              <a:t>12</a:t>
             </a:fld>
             <a:endParaRPr lang="en-US" dirty="0"/>
           </a:p>
@@ -994,7 +996,7 @@
           <a:p>
             <a:fld id="{FFA5E540-6D76-429F-95AD-C7F13B3CAC82}" type="slidenum">
               <a:rPr lang="en-US" smtClean="0"/>
-              <a:t>12</a:t>
+              <a:t>13</a:t>
             </a:fld>
             <a:endParaRPr lang="en-US" dirty="0"/>
           </a:p>
@@ -1081,7 +1083,7 @@
           <a:p>
             <a:fld id="{FFA5E540-6D76-429F-95AD-C7F13B3CAC82}" type="slidenum">
               <a:rPr lang="en-US" smtClean="0"/>
-              <a:t>13</a:t>
+              <a:t>14</a:t>
             </a:fld>
             <a:endParaRPr lang="en-US" dirty="0"/>
           </a:p>
@@ -1168,7 +1170,7 @@
           <a:p>
             <a:fld id="{FFA5E540-6D76-429F-95AD-C7F13B3CAC82}" type="slidenum">
               <a:rPr lang="en-US" smtClean="0"/>
-              <a:t>14</a:t>
+              <a:t>15</a:t>
             </a:fld>
             <a:endParaRPr lang="en-US" dirty="0"/>
           </a:p>
@@ -1255,7 +1257,7 @@
           <a:p>
             <a:fld id="{FFA5E540-6D76-429F-95AD-C7F13B3CAC82}" type="slidenum">
               <a:rPr lang="en-US" smtClean="0"/>
-              <a:t>15</a:t>
+              <a:t>16</a:t>
             </a:fld>
             <a:endParaRPr lang="en-US" dirty="0"/>
           </a:p>
@@ -1342,7 +1344,7 @@
           <a:p>
             <a:fld id="{FFA5E540-6D76-429F-95AD-C7F13B3CAC82}" type="slidenum">
               <a:rPr lang="en-US" smtClean="0"/>
-              <a:t>16</a:t>
+              <a:t>17</a:t>
             </a:fld>
             <a:endParaRPr lang="en-US" dirty="0"/>
           </a:p>
@@ -1453,7 +1455,7 @@
           <a:p>
             <a:fld id="{FFA5E540-6D76-429F-95AD-C7F13B3CAC82}" type="slidenum">
               <a:rPr lang="en-US" smtClean="0"/>
-              <a:t>18</a:t>
+              <a:t>20</a:t>
             </a:fld>
             <a:endParaRPr lang="en-US" dirty="0"/>
           </a:p>
@@ -1564,7 +1566,7 @@
           <a:p>
             <a:fld id="{FFA5E540-6D76-429F-95AD-C7F13B3CAC82}" type="slidenum">
               <a:rPr lang="en-US" smtClean="0"/>
-              <a:t>19</a:t>
+              <a:t>21</a:t>
             </a:fld>
             <a:endParaRPr lang="en-US" dirty="0"/>
           </a:p>
@@ -1675,7 +1677,7 @@
           <a:p>
             <a:fld id="{FFA5E540-6D76-429F-95AD-C7F13B3CAC82}" type="slidenum">
               <a:rPr lang="en-US" smtClean="0"/>
-              <a:t>20</a:t>
+              <a:t>22</a:t>
             </a:fld>
             <a:endParaRPr lang="en-US" dirty="0"/>
           </a:p>
@@ -1894,7 +1896,7 @@
           <a:p>
             <a:fld id="{FFA5E540-6D76-429F-95AD-C7F13B3CAC82}" type="slidenum">
               <a:rPr lang="en-US" smtClean="0"/>
-              <a:t>21</a:t>
+              <a:t>23</a:t>
             </a:fld>
             <a:endParaRPr lang="en-US" dirty="0"/>
           </a:p>
@@ -2002,7 +2004,7 @@
           <a:p>
             <a:fld id="{FFA5E540-6D76-429F-95AD-C7F13B3CAC82}" type="slidenum">
               <a:rPr lang="en-US" smtClean="0"/>
-              <a:t>22</a:t>
+              <a:t>24</a:t>
             </a:fld>
             <a:endParaRPr lang="en-US" dirty="0"/>
           </a:p>
@@ -2110,7 +2112,7 @@
           <a:p>
             <a:fld id="{FFA5E540-6D76-429F-95AD-C7F13B3CAC82}" type="slidenum">
               <a:rPr lang="en-US" smtClean="0"/>
-              <a:t>23</a:t>
+              <a:t>25</a:t>
             </a:fld>
             <a:endParaRPr lang="en-US" dirty="0"/>
           </a:p>
@@ -2434,7 +2436,7 @@
           <a:p>
             <a:fld id="{FFA5E540-6D76-429F-95AD-C7F13B3CAC82}" type="slidenum">
               <a:rPr lang="en-US" smtClean="0"/>
-              <a:t>5</a:t>
+              <a:t>6</a:t>
             </a:fld>
             <a:endParaRPr lang="en-US" dirty="0"/>
           </a:p>
@@ -2542,7 +2544,7 @@
           <a:p>
             <a:fld id="{FFA5E540-6D76-429F-95AD-C7F13B3CAC82}" type="slidenum">
               <a:rPr lang="en-US" smtClean="0"/>
-              <a:t>6</a:t>
+              <a:t>7</a:t>
             </a:fld>
             <a:endParaRPr lang="en-US" dirty="0"/>
           </a:p>
@@ -2650,7 +2652,7 @@
           <a:p>
             <a:fld id="{FFA5E540-6D76-429F-95AD-C7F13B3CAC82}" type="slidenum">
               <a:rPr lang="en-US" smtClean="0"/>
-              <a:t>7</a:t>
+              <a:t>8</a:t>
             </a:fld>
             <a:endParaRPr lang="en-US" dirty="0"/>
           </a:p>
@@ -2758,7 +2760,7 @@
           <a:p>
             <a:fld id="{FFA5E540-6D76-429F-95AD-C7F13B3CAC82}" type="slidenum">
               <a:rPr lang="en-US" smtClean="0"/>
-              <a:t>8</a:t>
+              <a:t>9</a:t>
             </a:fld>
             <a:endParaRPr lang="en-US" dirty="0"/>
           </a:p>
@@ -2845,7 +2847,7 @@
           <a:p>
             <a:fld id="{FFA5E540-6D76-429F-95AD-C7F13B3CAC82}" type="slidenum">
               <a:rPr lang="en-US" smtClean="0"/>
-              <a:t>9</a:t>
+              <a:t>10</a:t>
             </a:fld>
             <a:endParaRPr lang="en-US" dirty="0"/>
           </a:p>
@@ -25616,6 +25618,531 @@
           </a:p>
         </p:txBody>
       </p:sp>
+      <p:sp>
+        <p:nvSpPr>
+          <p:cNvPr id="18" name="内容占位符 2">
+            <a:extLst>
+              <a:ext uri="{FF2B5EF4-FFF2-40B4-BE49-F238E27FC236}">
+                <a16:creationId xmlns:a16="http://schemas.microsoft.com/office/drawing/2014/main" id="{5B83F688-3AAF-6E92-D5A4-B8DCA97B9756}"/>
+              </a:ext>
+            </a:extLst>
+          </p:cNvPr>
+          <p:cNvSpPr txBox="1">
+            <a:spLocks/>
+          </p:cNvSpPr>
+          <p:nvPr/>
+        </p:nvSpPr>
+        <p:spPr bwMode="auto">
+          <a:xfrm>
+            <a:off x="93652" y="1068111"/>
+            <a:ext cx="9050348" cy="1446487"/>
+          </a:xfrm>
+          <a:prstGeom prst="rect">
+            <a:avLst/>
+          </a:prstGeom>
+          <a:noFill/>
+          <a:ln>
+            <a:noFill/>
+          </a:ln>
+          <a:extLst>
+            <a:ext uri="{909E8E84-426E-40DD-AFC4-6F175D3DCCD1}">
+              <a14:hiddenFill xmlns:a14="http://schemas.microsoft.com/office/drawing/2010/main">
+                <a:solidFill>
+                  <a:srgbClr val="FFFFFF"/>
+                </a:solidFill>
+              </a14:hiddenFill>
+            </a:ext>
+            <a:ext uri="{91240B29-F687-4F45-9708-019B960494DF}">
+              <a14:hiddenLine xmlns:a14="http://schemas.microsoft.com/office/drawing/2010/main" w="28575">
+                <a:solidFill>
+                  <a:srgbClr val="000000"/>
+                </a:solidFill>
+                <a:miter lim="800000"/>
+                <a:headEnd/>
+                <a:tailEnd/>
+              </a14:hiddenLine>
+            </a:ext>
+          </a:extLst>
+        </p:spPr>
+        <p:txBody>
+          <a:bodyPr vert="horz" wrap="square" lIns="91440" tIns="45720" rIns="91440" bIns="45720" numCol="1" anchor="t" anchorCtr="0" compatLnSpc="1">
+            <a:prstTxWarp prst="textNoShape">
+              <a:avLst/>
+            </a:prstTxWarp>
+          </a:bodyPr>
+          <a:lstStyle>
+            <a:lvl1pPr marL="342900" indent="-342900" algn="l" rtl="0" eaLnBrk="1" fontAlgn="base" hangingPunct="1">
+              <a:spcBef>
+                <a:spcPct val="30000"/>
+              </a:spcBef>
+              <a:spcAft>
+                <a:spcPct val="0"/>
+              </a:spcAft>
+              <a:buClr>
+                <a:schemeClr val="hlink"/>
+              </a:buClr>
+              <a:buFont typeface="Wingdings" pitchFamily="2" charset="2"/>
+              <a:buChar char="§"/>
+              <a:defRPr sz="3200">
+                <a:solidFill>
+                  <a:srgbClr val="000066"/>
+                </a:solidFill>
+                <a:latin typeface="微软雅黑" pitchFamily="34" charset="-122"/>
+                <a:ea typeface="微软雅黑" pitchFamily="34" charset="-122"/>
+                <a:cs typeface="+mn-cs"/>
+              </a:defRPr>
+            </a:lvl1pPr>
+            <a:lvl2pPr marL="742950" indent="-285750" algn="l" rtl="0" eaLnBrk="1" fontAlgn="base" hangingPunct="1">
+              <a:spcBef>
+                <a:spcPct val="30000"/>
+              </a:spcBef>
+              <a:spcAft>
+                <a:spcPct val="0"/>
+              </a:spcAft>
+              <a:buClr>
+                <a:schemeClr val="tx2"/>
+              </a:buClr>
+              <a:buSzPct val="85000"/>
+              <a:buFont typeface="Wingdings" pitchFamily="2" charset="2"/>
+              <a:buChar char="Ø"/>
+              <a:defRPr sz="2800">
+                <a:solidFill>
+                  <a:srgbClr val="006666"/>
+                </a:solidFill>
+                <a:latin typeface="微软雅黑" pitchFamily="34" charset="-122"/>
+                <a:ea typeface="微软雅黑" pitchFamily="34" charset="-122"/>
+              </a:defRPr>
+            </a:lvl2pPr>
+            <a:lvl3pPr marL="1143000" indent="-228600" algn="l" rtl="0" eaLnBrk="1" fontAlgn="base" hangingPunct="1">
+              <a:spcBef>
+                <a:spcPct val="30000"/>
+              </a:spcBef>
+              <a:spcAft>
+                <a:spcPct val="0"/>
+              </a:spcAft>
+              <a:buClr>
+                <a:schemeClr val="hlink"/>
+              </a:buClr>
+              <a:buSzPct val="95000"/>
+              <a:buFont typeface="Wingdings 2" pitchFamily="18" charset="2"/>
+              <a:buChar char="¡"/>
+              <a:defRPr sz="2400">
+                <a:solidFill>
+                  <a:schemeClr val="hlink"/>
+                </a:solidFill>
+                <a:latin typeface="微软雅黑" pitchFamily="34" charset="-122"/>
+                <a:ea typeface="微软雅黑" pitchFamily="34" charset="-122"/>
+              </a:defRPr>
+            </a:lvl3pPr>
+            <a:lvl4pPr marL="1600200" indent="-228600" algn="l" rtl="0" eaLnBrk="1" fontAlgn="base" hangingPunct="1">
+              <a:spcBef>
+                <a:spcPct val="30000"/>
+              </a:spcBef>
+              <a:spcAft>
+                <a:spcPct val="0"/>
+              </a:spcAft>
+              <a:buClr>
+                <a:schemeClr val="tx2"/>
+              </a:buClr>
+              <a:buSzPct val="90000"/>
+              <a:buFont typeface="Wingdings" pitchFamily="2" charset="2"/>
+              <a:buChar char="Ø"/>
+              <a:defRPr sz="2000">
+                <a:solidFill>
+                  <a:srgbClr val="990099"/>
+                </a:solidFill>
+                <a:latin typeface="微软雅黑" pitchFamily="34" charset="-122"/>
+                <a:ea typeface="微软雅黑" pitchFamily="34" charset="-122"/>
+              </a:defRPr>
+            </a:lvl4pPr>
+            <a:lvl5pPr marL="2057400" indent="-228600" algn="l" rtl="0" eaLnBrk="1" fontAlgn="base" hangingPunct="1">
+              <a:spcBef>
+                <a:spcPct val="30000"/>
+              </a:spcBef>
+              <a:spcAft>
+                <a:spcPct val="0"/>
+              </a:spcAft>
+              <a:buClr>
+                <a:schemeClr val="hlink"/>
+              </a:buClr>
+              <a:buFont typeface="Wingdings 2" pitchFamily="18" charset="2"/>
+              <a:buChar char="¡"/>
+              <a:defRPr sz="2000">
+                <a:solidFill>
+                  <a:schemeClr val="tx1"/>
+                </a:solidFill>
+                <a:latin typeface="微软雅黑" pitchFamily="34" charset="-122"/>
+                <a:ea typeface="微软雅黑" pitchFamily="34" charset="-122"/>
+              </a:defRPr>
+            </a:lvl5pPr>
+            <a:lvl6pPr marL="2514600" indent="-228600" algn="l" rtl="0" eaLnBrk="1" fontAlgn="base" hangingPunct="1">
+              <a:spcBef>
+                <a:spcPct val="30000"/>
+              </a:spcBef>
+              <a:spcAft>
+                <a:spcPct val="0"/>
+              </a:spcAft>
+              <a:buClr>
+                <a:schemeClr val="hlink"/>
+              </a:buClr>
+              <a:buFont typeface="Wingdings 2" pitchFamily="18" charset="2"/>
+              <a:buChar char="¡"/>
+              <a:defRPr sz="2000">
+                <a:solidFill>
+                  <a:schemeClr val="tx1"/>
+                </a:solidFill>
+                <a:latin typeface="+mn-lt"/>
+                <a:ea typeface="+mn-ea"/>
+              </a:defRPr>
+            </a:lvl6pPr>
+            <a:lvl7pPr marL="2971800" indent="-228600" algn="l" rtl="0" eaLnBrk="1" fontAlgn="base" hangingPunct="1">
+              <a:spcBef>
+                <a:spcPct val="30000"/>
+              </a:spcBef>
+              <a:spcAft>
+                <a:spcPct val="0"/>
+              </a:spcAft>
+              <a:buClr>
+                <a:schemeClr val="hlink"/>
+              </a:buClr>
+              <a:buFont typeface="Wingdings 2" pitchFamily="18" charset="2"/>
+              <a:buChar char="¡"/>
+              <a:defRPr sz="2000">
+                <a:solidFill>
+                  <a:schemeClr val="tx1"/>
+                </a:solidFill>
+                <a:latin typeface="+mn-lt"/>
+                <a:ea typeface="+mn-ea"/>
+              </a:defRPr>
+            </a:lvl7pPr>
+            <a:lvl8pPr marL="3429000" indent="-228600" algn="l" rtl="0" eaLnBrk="1" fontAlgn="base" hangingPunct="1">
+              <a:spcBef>
+                <a:spcPct val="30000"/>
+              </a:spcBef>
+              <a:spcAft>
+                <a:spcPct val="0"/>
+              </a:spcAft>
+              <a:buClr>
+                <a:schemeClr val="hlink"/>
+              </a:buClr>
+              <a:buFont typeface="Wingdings 2" pitchFamily="18" charset="2"/>
+              <a:buChar char="¡"/>
+              <a:defRPr sz="2000">
+                <a:solidFill>
+                  <a:schemeClr val="tx1"/>
+                </a:solidFill>
+                <a:latin typeface="+mn-lt"/>
+                <a:ea typeface="+mn-ea"/>
+              </a:defRPr>
+            </a:lvl8pPr>
+            <a:lvl9pPr marL="3886200" indent="-228600" algn="l" rtl="0" eaLnBrk="1" fontAlgn="base" hangingPunct="1">
+              <a:spcBef>
+                <a:spcPct val="30000"/>
+              </a:spcBef>
+              <a:spcAft>
+                <a:spcPct val="0"/>
+              </a:spcAft>
+              <a:buClr>
+                <a:schemeClr val="hlink"/>
+              </a:buClr>
+              <a:buFont typeface="Wingdings 2" pitchFamily="18" charset="2"/>
+              <a:buChar char="¡"/>
+              <a:defRPr sz="2000">
+                <a:solidFill>
+                  <a:schemeClr val="tx1"/>
+                </a:solidFill>
+                <a:latin typeface="+mn-lt"/>
+                <a:ea typeface="+mn-ea"/>
+              </a:defRPr>
+            </a:lvl9pPr>
+          </a:lstStyle>
+          <a:p>
+            <a:r>
+              <a:rPr lang="en-US" altLang="zh-CN" sz="2400" kern="0" dirty="0">
+                <a:latin typeface="+mn-lt"/>
+                <a:cs typeface="Times New Roman" panose="02020603050405020304" pitchFamily="18" charset="0"/>
+              </a:rPr>
+              <a:t>RETAU5200</a:t>
+            </a:r>
+            <a:endParaRPr lang="en-US" altLang="zh-CN" sz="2000" kern="0" dirty="0">
+              <a:latin typeface="+mn-lt"/>
+              <a:cs typeface="Times New Roman" panose="02020603050405020304" pitchFamily="18" charset="0"/>
+            </a:endParaRPr>
+          </a:p>
+          <a:p>
+            <a:pPr lvl="1"/>
+            <a:r>
+              <a:rPr lang="en-US" altLang="zh-CN" sz="2000" dirty="0">
+                <a:latin typeface="+mn-lt"/>
+                <a:cs typeface="Times New Roman" panose="02020603050405020304" pitchFamily="18" charset="0"/>
+              </a:rPr>
+              <a:t>Neither Neumann nor wall model yields acceptable profiles</a:t>
+            </a:r>
+          </a:p>
+          <a:p>
+            <a:pPr lvl="1"/>
+            <a:r>
+              <a:rPr lang="en-US" altLang="zh-CN" sz="2000" kern="0" dirty="0">
+                <a:latin typeface="+mn-lt"/>
+                <a:cs typeface="Times New Roman" panose="02020603050405020304" pitchFamily="18" charset="0"/>
+              </a:rPr>
+              <a:t>Resolutions are insufficient</a:t>
+            </a:r>
+          </a:p>
+        </p:txBody>
+      </p:sp>
+      <p:pic>
+        <p:nvPicPr>
+          <p:cNvPr id="8" name="Picture 7">
+            <a:extLst>
+              <a:ext uri="{FF2B5EF4-FFF2-40B4-BE49-F238E27FC236}">
+                <a16:creationId xmlns:a16="http://schemas.microsoft.com/office/drawing/2014/main" id="{9A407A00-2EDD-F2E4-D7E8-2AAB53D81723}"/>
+              </a:ext>
+            </a:extLst>
+          </p:cNvPr>
+          <p:cNvPicPr>
+            <a:picLocks noChangeAspect="1"/>
+          </p:cNvPicPr>
+          <p:nvPr/>
+        </p:nvPicPr>
+        <p:blipFill>
+          <a:blip r:embed="rId3"/>
+          <a:stretch>
+            <a:fillRect/>
+          </a:stretch>
+        </p:blipFill>
+        <p:spPr>
+          <a:xfrm>
+            <a:off x="4191000" y="2618643"/>
+            <a:ext cx="3200400" cy="2410557"/>
+          </a:xfrm>
+          <a:prstGeom prst="rect">
+            <a:avLst/>
+          </a:prstGeom>
+        </p:spPr>
+      </p:pic>
+      <p:pic>
+        <p:nvPicPr>
+          <p:cNvPr id="11" name="Picture 10">
+            <a:extLst>
+              <a:ext uri="{FF2B5EF4-FFF2-40B4-BE49-F238E27FC236}">
+                <a16:creationId xmlns:a16="http://schemas.microsoft.com/office/drawing/2014/main" id="{EE43C99D-87F0-BDA6-6BBC-EDCE9C3EEC27}"/>
+              </a:ext>
+            </a:extLst>
+          </p:cNvPr>
+          <p:cNvPicPr>
+            <a:picLocks noChangeAspect="1"/>
+          </p:cNvPicPr>
+          <p:nvPr/>
+        </p:nvPicPr>
+        <p:blipFill>
+          <a:blip r:embed="rId4"/>
+          <a:stretch>
+            <a:fillRect/>
+          </a:stretch>
+        </p:blipFill>
+        <p:spPr>
+          <a:xfrm>
+            <a:off x="990600" y="2607437"/>
+            <a:ext cx="3200400" cy="2405429"/>
+          </a:xfrm>
+          <a:prstGeom prst="rect">
+            <a:avLst/>
+          </a:prstGeom>
+        </p:spPr>
+      </p:pic>
+      <p:sp>
+        <p:nvSpPr>
+          <p:cNvPr id="3" name="TextBox 2">
+            <a:extLst>
+              <a:ext uri="{FF2B5EF4-FFF2-40B4-BE49-F238E27FC236}">
+                <a16:creationId xmlns:a16="http://schemas.microsoft.com/office/drawing/2014/main" id="{CEFC1CA4-6BDA-687A-BF4B-114098DF5FEC}"/>
+              </a:ext>
+            </a:extLst>
+          </p:cNvPr>
+          <p:cNvSpPr txBox="1"/>
+          <p:nvPr/>
+        </p:nvSpPr>
+        <p:spPr>
+          <a:xfrm>
+            <a:off x="4394792" y="2923905"/>
+            <a:ext cx="1184940" cy="369332"/>
+          </a:xfrm>
+          <a:prstGeom prst="rect">
+            <a:avLst/>
+          </a:prstGeom>
+          <a:noFill/>
+        </p:spPr>
+        <p:txBody>
+          <a:bodyPr wrap="none" rtlCol="0">
+            <a:spAutoFit/>
+          </a:bodyPr>
+          <a:lstStyle/>
+          <a:p>
+            <a:r>
+              <a:rPr lang="en-US" dirty="0"/>
+              <a:t>Neumann</a:t>
+            </a:r>
+          </a:p>
+        </p:txBody>
+      </p:sp>
+      <p:sp>
+        <p:nvSpPr>
+          <p:cNvPr id="4" name="TextBox 3">
+            <a:extLst>
+              <a:ext uri="{FF2B5EF4-FFF2-40B4-BE49-F238E27FC236}">
+                <a16:creationId xmlns:a16="http://schemas.microsoft.com/office/drawing/2014/main" id="{1312CB8D-E9F5-FF1E-4ED8-D2F0EB944E34}"/>
+              </a:ext>
+            </a:extLst>
+          </p:cNvPr>
+          <p:cNvSpPr txBox="1"/>
+          <p:nvPr/>
+        </p:nvSpPr>
+        <p:spPr>
+          <a:xfrm>
+            <a:off x="1194392" y="2893935"/>
+            <a:ext cx="1317412" cy="369332"/>
+          </a:xfrm>
+          <a:prstGeom prst="rect">
+            <a:avLst/>
+          </a:prstGeom>
+          <a:noFill/>
+        </p:spPr>
+        <p:txBody>
+          <a:bodyPr wrap="none" rtlCol="0">
+            <a:spAutoFit/>
+          </a:bodyPr>
+          <a:lstStyle/>
+          <a:p>
+            <a:r>
+              <a:rPr lang="en-US" dirty="0"/>
+              <a:t>Wall model</a:t>
+            </a:r>
+          </a:p>
+        </p:txBody>
+      </p:sp>
+    </p:spTree>
+    <p:extLst>
+      <p:ext uri="{BB962C8B-B14F-4D97-AF65-F5344CB8AC3E}">
+        <p14:creationId xmlns:p14="http://schemas.microsoft.com/office/powerpoint/2010/main" val="1039208005"/>
+      </p:ext>
+    </p:extLst>
+  </p:cSld>
+  <p:clrMapOvr>
+    <a:masterClrMapping/>
+  </p:clrMapOvr>
+  <p:transition spd="med" advTm="63997"/>
+</p:sld>
+</file>
+
+<file path=ppt/slides/slide11.xml><?xml version="1.0" encoding="utf-8"?>
+<p:sld xmlns:a="http://schemas.openxmlformats.org/drawingml/2006/main" xmlns:r="http://schemas.openxmlformats.org/officeDocument/2006/relationships" xmlns:p="http://schemas.openxmlformats.org/presentationml/2006/main">
+  <p:cSld>
+    <p:spTree>
+      <p:nvGrpSpPr>
+        <p:cNvPr id="1" name=""/>
+        <p:cNvGrpSpPr/>
+        <p:nvPr/>
+      </p:nvGrpSpPr>
+      <p:grpSpPr>
+        <a:xfrm>
+          <a:off x="0" y="0"/>
+          <a:ext cx="0" cy="0"/>
+          <a:chOff x="0" y="0"/>
+          <a:chExt cx="0" cy="0"/>
+        </a:xfrm>
+      </p:grpSpPr>
+      <p:sp>
+        <p:nvSpPr>
+          <p:cNvPr id="2" name="Title 1"/>
+          <p:cNvSpPr>
+            <a:spLocks noGrp="1"/>
+          </p:cNvSpPr>
+          <p:nvPr>
+            <p:ph type="title"/>
+          </p:nvPr>
+        </p:nvSpPr>
+        <p:spPr>
+          <a:xfrm>
+            <a:off x="152400" y="152400"/>
+            <a:ext cx="8610600" cy="838200"/>
+          </a:xfrm>
+        </p:spPr>
+        <p:txBody>
+          <a:bodyPr/>
+          <a:lstStyle/>
+          <a:p>
+            <a:r>
+              <a:rPr lang="en-US" altLang="zh-CN" dirty="0"/>
+              <a:t>Channel</a:t>
+            </a:r>
+            <a:endParaRPr lang="zh-CN" altLang="en-US" dirty="0"/>
+          </a:p>
+        </p:txBody>
+      </p:sp>
+      <p:sp>
+        <p:nvSpPr>
+          <p:cNvPr id="9" name="Rectangle 2"/>
+          <p:cNvSpPr>
+            <a:spLocks noChangeArrowheads="1"/>
+          </p:cNvSpPr>
+          <p:nvPr/>
+        </p:nvSpPr>
+        <p:spPr bwMode="auto">
+          <a:xfrm>
+            <a:off x="0" y="0"/>
+            <a:ext cx="9144000" cy="0"/>
+          </a:xfrm>
+          <a:prstGeom prst="rect">
+            <a:avLst/>
+          </a:prstGeom>
+          <a:noFill/>
+          <a:ln>
+            <a:noFill/>
+          </a:ln>
+          <a:effectLst/>
+          <a:extLst>
+            <a:ext uri="{909E8E84-426E-40DD-AFC4-6F175D3DCCD1}">
+              <a14:hiddenFill xmlns:a14="http://schemas.microsoft.com/office/drawing/2010/main">
+                <a:solidFill>
+                  <a:schemeClr val="accent1"/>
+                </a:solidFill>
+              </a14:hiddenFill>
+            </a:ext>
+            <a:ext uri="{91240B29-F687-4F45-9708-019B960494DF}">
+              <a14:hiddenLine xmlns:a14="http://schemas.microsoft.com/office/drawing/2010/main" w="9525">
+                <a:solidFill>
+                  <a:schemeClr val="tx1"/>
+                </a:solidFill>
+                <a:miter lim="800000"/>
+                <a:headEnd/>
+                <a:tailEnd/>
+              </a14:hiddenLine>
+            </a:ext>
+            <a:ext uri="{AF507438-7753-43E0-B8FC-AC1667EBCBE1}">
+              <a14:hiddenEffects xmlns:a14="http://schemas.microsoft.com/office/drawing/2010/main">
+                <a:effectLst>
+                  <a:outerShdw dist="35921" dir="2700000" algn="ctr" rotWithShape="0">
+                    <a:schemeClr val="bg2"/>
+                  </a:outerShdw>
+                </a:effectLst>
+              </a14:hiddenEffects>
+            </a:ext>
+          </a:extLst>
+        </p:spPr>
+        <p:txBody>
+          <a:bodyPr vert="horz" wrap="none" lIns="91440" tIns="45720" rIns="91440" bIns="45720" numCol="1" anchor="ctr" anchorCtr="0" compatLnSpc="1">
+            <a:prstTxWarp prst="textNoShape">
+              <a:avLst/>
+            </a:prstTxWarp>
+            <a:spAutoFit/>
+          </a:bodyPr>
+          <a:lstStyle/>
+          <a:p>
+            <a:endParaRPr lang="zh-CN" altLang="en-US"/>
+          </a:p>
+        </p:txBody>
+      </p:sp>
       <p:pic>
         <p:nvPicPr>
           <p:cNvPr id="5" name="Picture 4">
@@ -25983,7 +26510,7 @@
 </p:sld>
 </file>
 
-<file path=ppt/slides/slide11.xml><?xml version="1.0" encoding="utf-8"?>
+<file path=ppt/slides/slide12.xml><?xml version="1.0" encoding="utf-8"?>
 <p:sld xmlns:a="http://schemas.openxmlformats.org/drawingml/2006/main" xmlns:r="http://schemas.openxmlformats.org/officeDocument/2006/relationships" xmlns:p="http://schemas.openxmlformats.org/presentationml/2006/main">
   <p:cSld>
     <p:spTree>
@@ -26428,7 +26955,7 @@
 </p:sld>
 </file>
 
-<file path=ppt/slides/slide12.xml><?xml version="1.0" encoding="utf-8"?>
+<file path=ppt/slides/slide13.xml><?xml version="1.0" encoding="utf-8"?>
 <p:sld xmlns:a="http://schemas.openxmlformats.org/drawingml/2006/main" xmlns:r="http://schemas.openxmlformats.org/officeDocument/2006/relationships" xmlns:p="http://schemas.openxmlformats.org/presentationml/2006/main">
   <p:cSld>
     <p:spTree>
@@ -26873,7 +27400,7 @@
 </p:sld>
 </file>
 
-<file path=ppt/slides/slide13.xml><?xml version="1.0" encoding="utf-8"?>
+<file path=ppt/slides/slide14.xml><?xml version="1.0" encoding="utf-8"?>
 <p:sld xmlns:a="http://schemas.openxmlformats.org/drawingml/2006/main" xmlns:r="http://schemas.openxmlformats.org/officeDocument/2006/relationships" xmlns:p="http://schemas.openxmlformats.org/presentationml/2006/main">
   <p:cSld>
     <p:spTree>
@@ -27288,7 +27815,7 @@
 </p:sld>
 </file>
 
-<file path=ppt/slides/slide14.xml><?xml version="1.0" encoding="utf-8"?>
+<file path=ppt/slides/slide15.xml><?xml version="1.0" encoding="utf-8"?>
 <p:sld xmlns:a="http://schemas.openxmlformats.org/drawingml/2006/main" xmlns:r="http://schemas.openxmlformats.org/officeDocument/2006/relationships" xmlns:p="http://schemas.openxmlformats.org/presentationml/2006/main">
   <p:cSld>
     <p:spTree>
@@ -27793,7 +28320,7 @@
 </p:sld>
 </file>
 
-<file path=ppt/slides/slide15.xml><?xml version="1.0" encoding="utf-8"?>
+<file path=ppt/slides/slide16.xml><?xml version="1.0" encoding="utf-8"?>
 <p:sld xmlns:a="http://schemas.openxmlformats.org/drawingml/2006/main" xmlns:r="http://schemas.openxmlformats.org/officeDocument/2006/relationships" xmlns:p="http://schemas.openxmlformats.org/presentationml/2006/main">
   <p:cSld>
     <p:spTree>
@@ -27918,7 +28445,7 @@
         <p:spPr bwMode="auto">
           <a:xfrm>
             <a:off x="93652" y="1068113"/>
-            <a:ext cx="8610600" cy="932338"/>
+            <a:ext cx="4783148" cy="932338"/>
           </a:xfrm>
           <a:prstGeom prst="rect">
             <a:avLst/>
@@ -28159,17 +28686,17 @@
                 <a:latin typeface="+mn-lt"/>
                 <a:cs typeface="Times New Roman" panose="02020603050405020304" pitchFamily="18" charset="0"/>
               </a:rPr>
-              <a:t>CFL0.5</a:t>
+              <a:t>CFL</a:t>
             </a:r>
           </a:p>
         </p:txBody>
       </p:sp>
       <p:pic>
         <p:nvPicPr>
-          <p:cNvPr id="5" name="Picture 4">
+          <p:cNvPr id="4" name="Picture 3">
             <a:extLst>
               <a:ext uri="{FF2B5EF4-FFF2-40B4-BE49-F238E27FC236}">
-                <a16:creationId xmlns:a16="http://schemas.microsoft.com/office/drawing/2014/main" id="{AF53D56A-ECC1-45DE-6E74-59B6182C61C9}"/>
+                <a16:creationId xmlns:a16="http://schemas.microsoft.com/office/drawing/2014/main" id="{1C3B916A-6DE7-1652-FF19-C3A7BF292D4C}"/>
               </a:ext>
             </a:extLst>
           </p:cNvPr>
@@ -28186,8 +28713,8 @@
         </p:blipFill>
         <p:spPr>
           <a:xfrm>
-            <a:off x="-228600" y="1905000"/>
-            <a:ext cx="3200400" cy="2397728"/>
+            <a:off x="-302394" y="1981200"/>
+            <a:ext cx="3200400" cy="2424859"/>
           </a:xfrm>
           <a:prstGeom prst="rect">
             <a:avLst/>
@@ -28196,10 +28723,10 @@
       </p:pic>
       <p:pic>
         <p:nvPicPr>
-          <p:cNvPr id="10" name="Picture 9">
+          <p:cNvPr id="7" name="Picture 6">
             <a:extLst>
               <a:ext uri="{FF2B5EF4-FFF2-40B4-BE49-F238E27FC236}">
-                <a16:creationId xmlns:a16="http://schemas.microsoft.com/office/drawing/2014/main" id="{145F60B9-0522-F3BE-C533-646559AF64FB}"/>
+                <a16:creationId xmlns:a16="http://schemas.microsoft.com/office/drawing/2014/main" id="{CC667EED-56A1-0AA4-AEE5-0F00328C189D}"/>
               </a:ext>
             </a:extLst>
           </p:cNvPr>
@@ -28216,8 +28743,8 @@
         </p:blipFill>
         <p:spPr>
           <a:xfrm>
-            <a:off x="2971800" y="1912219"/>
-            <a:ext cx="3200400" cy="2420948"/>
+            <a:off x="2895600" y="1992752"/>
+            <a:ext cx="3200400" cy="2409290"/>
           </a:xfrm>
           <a:prstGeom prst="rect">
             <a:avLst/>
@@ -28226,10 +28753,10 @@
       </p:pic>
       <p:pic>
         <p:nvPicPr>
-          <p:cNvPr id="12" name="Picture 11">
+          <p:cNvPr id="14" name="Picture 13">
             <a:extLst>
               <a:ext uri="{FF2B5EF4-FFF2-40B4-BE49-F238E27FC236}">
-                <a16:creationId xmlns:a16="http://schemas.microsoft.com/office/drawing/2014/main" id="{96221B43-44A3-761F-D30F-7F110DDABC54}"/>
+                <a16:creationId xmlns:a16="http://schemas.microsoft.com/office/drawing/2014/main" id="{CD121F3D-BE76-64CA-8390-8B0D96110E99}"/>
               </a:ext>
             </a:extLst>
           </p:cNvPr>
@@ -28246,8 +28773,8 @@
         </p:blipFill>
         <p:spPr>
           <a:xfrm>
-            <a:off x="-228600" y="4301926"/>
-            <a:ext cx="3200400" cy="2408018"/>
+            <a:off x="2895600" y="4400820"/>
+            <a:ext cx="3200400" cy="2408068"/>
           </a:xfrm>
           <a:prstGeom prst="rect">
             <a:avLst/>
@@ -28256,10 +28783,10 @@
       </p:pic>
       <p:pic>
         <p:nvPicPr>
-          <p:cNvPr id="15" name="Picture 14">
+          <p:cNvPr id="18" name="Picture 17">
             <a:extLst>
               <a:ext uri="{FF2B5EF4-FFF2-40B4-BE49-F238E27FC236}">
-                <a16:creationId xmlns:a16="http://schemas.microsoft.com/office/drawing/2014/main" id="{F8DE271E-8906-B962-836F-79390583624D}"/>
+                <a16:creationId xmlns:a16="http://schemas.microsoft.com/office/drawing/2014/main" id="{4C1D288E-6D0F-6C6F-50C7-913B194E279C}"/>
               </a:ext>
             </a:extLst>
           </p:cNvPr>
@@ -28276,68 +28803,8 @@
         </p:blipFill>
         <p:spPr>
           <a:xfrm>
-            <a:off x="2971800" y="4333167"/>
-            <a:ext cx="3200400" cy="2395171"/>
-          </a:xfrm>
-          <a:prstGeom prst="rect">
-            <a:avLst/>
-          </a:prstGeom>
-        </p:spPr>
-      </p:pic>
-      <p:pic>
-        <p:nvPicPr>
-          <p:cNvPr id="20" name="Picture 19">
-            <a:extLst>
-              <a:ext uri="{FF2B5EF4-FFF2-40B4-BE49-F238E27FC236}">
-                <a16:creationId xmlns:a16="http://schemas.microsoft.com/office/drawing/2014/main" id="{C7329EFE-0603-5AFE-09EB-E2BCB4411417}"/>
-              </a:ext>
-            </a:extLst>
-          </p:cNvPr>
-          <p:cNvPicPr>
-            <a:picLocks noChangeAspect="1"/>
-          </p:cNvPicPr>
-          <p:nvPr/>
-        </p:nvPicPr>
-        <p:blipFill>
-          <a:blip r:embed="rId7"/>
-          <a:stretch>
-            <a:fillRect/>
-          </a:stretch>
-        </p:blipFill>
-        <p:spPr>
-          <a:xfrm>
-            <a:off x="6172200" y="1935719"/>
-            <a:ext cx="3200400" cy="2392680"/>
-          </a:xfrm>
-          <a:prstGeom prst="rect">
-            <a:avLst/>
-          </a:prstGeom>
-        </p:spPr>
-      </p:pic>
-      <p:pic>
-        <p:nvPicPr>
-          <p:cNvPr id="22" name="Picture 21">
-            <a:extLst>
-              <a:ext uri="{FF2B5EF4-FFF2-40B4-BE49-F238E27FC236}">
-                <a16:creationId xmlns:a16="http://schemas.microsoft.com/office/drawing/2014/main" id="{D0B50E0F-DB14-987C-35C1-B83AB0FB0FBC}"/>
-              </a:ext>
-            </a:extLst>
-          </p:cNvPr>
-          <p:cNvPicPr>
-            <a:picLocks noChangeAspect="1"/>
-          </p:cNvPicPr>
-          <p:nvPr/>
-        </p:nvPicPr>
-        <p:blipFill>
-          <a:blip r:embed="rId8"/>
-          <a:stretch>
-            <a:fillRect/>
-          </a:stretch>
-        </p:blipFill>
-        <p:spPr>
-          <a:xfrm>
-            <a:off x="6172200" y="4333167"/>
-            <a:ext cx="3200400" cy="2381220"/>
+            <a:off x="-304800" y="4402042"/>
+            <a:ext cx="3200400" cy="2393879"/>
           </a:xfrm>
           <a:prstGeom prst="rect">
             <a:avLst/>
@@ -28358,7 +28825,7 @@
 </p:sld>
 </file>
 
-<file path=ppt/slides/slide16.xml><?xml version="1.0" encoding="utf-8"?>
+<file path=ppt/slides/slide17.xml><?xml version="1.0" encoding="utf-8"?>
 <p:sld xmlns:a="http://schemas.openxmlformats.org/drawingml/2006/main" xmlns:r="http://schemas.openxmlformats.org/officeDocument/2006/relationships" xmlns:p="http://schemas.openxmlformats.org/presentationml/2006/main">
   <p:cSld>
     <p:spTree>
@@ -28751,7 +29218,7 @@
         </p:blipFill>
         <p:spPr>
           <a:xfrm>
-            <a:off x="1219200" y="1983785"/>
+            <a:off x="-990600" y="2527455"/>
             <a:ext cx="3200400" cy="2396435"/>
           </a:xfrm>
           <a:prstGeom prst="rect">
@@ -28781,7 +29248,7 @@
         </p:blipFill>
         <p:spPr>
           <a:xfrm>
-            <a:off x="4495800" y="1970930"/>
+            <a:off x="2286000" y="2514600"/>
             <a:ext cx="3200400" cy="2409290"/>
           </a:xfrm>
           <a:prstGeom prst="rect">
@@ -28811,8 +29278,38 @@
         </p:blipFill>
         <p:spPr>
           <a:xfrm>
-            <a:off x="1219200" y="4380220"/>
+            <a:off x="-990600" y="4923890"/>
             <a:ext cx="3200400" cy="2401580"/>
+          </a:xfrm>
+          <a:prstGeom prst="rect">
+            <a:avLst/>
+          </a:prstGeom>
+        </p:spPr>
+      </p:pic>
+      <p:pic>
+        <p:nvPicPr>
+          <p:cNvPr id="5" name="Picture 4">
+            <a:extLst>
+              <a:ext uri="{FF2B5EF4-FFF2-40B4-BE49-F238E27FC236}">
+                <a16:creationId xmlns:a16="http://schemas.microsoft.com/office/drawing/2014/main" id="{4129898F-AB8F-B346-D62C-0EE8441CC3F0}"/>
+              </a:ext>
+            </a:extLst>
+          </p:cNvPr>
+          <p:cNvPicPr>
+            <a:picLocks noChangeAspect="1"/>
+          </p:cNvPicPr>
+          <p:nvPr/>
+        </p:nvPicPr>
+        <p:blipFill>
+          <a:blip r:embed="rId6"/>
+          <a:stretch>
+            <a:fillRect/>
+          </a:stretch>
+        </p:blipFill>
+        <p:spPr>
+          <a:xfrm>
+            <a:off x="2286000" y="4950517"/>
+            <a:ext cx="3200400" cy="2388815"/>
           </a:xfrm>
           <a:prstGeom prst="rect">
             <a:avLst/>
@@ -28833,7 +29330,7 @@
 </p:sld>
 </file>
 
-<file path=ppt/slides/slide17.xml><?xml version="1.0" encoding="utf-8"?>
+<file path=ppt/slides/slide18.xml><?xml version="1.0" encoding="utf-8"?>
 <p:sld xmlns:a="http://schemas.openxmlformats.org/drawingml/2006/main" xmlns:r="http://schemas.openxmlformats.org/officeDocument/2006/relationships" xmlns:p="http://schemas.openxmlformats.org/presentationml/2006/main">
   <p:cSld>
     <p:spTree>
@@ -28850,36 +29347,6 @@
           <a:chExt cx="0" cy="0"/>
         </a:xfrm>
       </p:grpSpPr>
-      <p:pic>
-        <p:nvPicPr>
-          <p:cNvPr id="5" name="Picture 4">
-            <a:extLst>
-              <a:ext uri="{FF2B5EF4-FFF2-40B4-BE49-F238E27FC236}">
-                <a16:creationId xmlns:a16="http://schemas.microsoft.com/office/drawing/2014/main" id="{AA64513B-3257-D6B7-185E-605233E48E94}"/>
-              </a:ext>
-            </a:extLst>
-          </p:cNvPr>
-          <p:cNvPicPr>
-            <a:picLocks noChangeAspect="1"/>
-          </p:cNvPicPr>
-          <p:nvPr/>
-        </p:nvPicPr>
-        <p:blipFill>
-          <a:blip r:embed="rId2"/>
-          <a:stretch>
-            <a:fillRect/>
-          </a:stretch>
-        </p:blipFill>
-        <p:spPr>
-          <a:xfrm>
-            <a:off x="2590800" y="2590800"/>
-            <a:ext cx="3200400" cy="2391339"/>
-          </a:xfrm>
-          <a:prstGeom prst="rect">
-            <a:avLst/>
-          </a:prstGeom>
-        </p:spPr>
-      </p:pic>
       <p:sp>
         <p:nvSpPr>
           <p:cNvPr id="6" name="Title 1">
@@ -28916,22 +29383,22 @@
       </p:sp>
       <p:sp>
         <p:nvSpPr>
-          <p:cNvPr id="7" name="Rectangle 2">
+          <p:cNvPr id="8" name="内容占位符 2">
             <a:extLst>
               <a:ext uri="{FF2B5EF4-FFF2-40B4-BE49-F238E27FC236}">
-                <a16:creationId xmlns:a16="http://schemas.microsoft.com/office/drawing/2014/main" id="{C265F459-F5F2-3B99-F640-E154B1F95DD6}"/>
+                <a16:creationId xmlns:a16="http://schemas.microsoft.com/office/drawing/2014/main" id="{2CA7BECD-9996-EA33-E05F-D04BFFAF531D}"/>
               </a:ext>
             </a:extLst>
           </p:cNvPr>
-          <p:cNvSpPr>
-            <a:spLocks noChangeArrowheads="1"/>
+          <p:cNvSpPr txBox="1">
+            <a:spLocks/>
           </p:cNvSpPr>
           <p:nvPr/>
         </p:nvSpPr>
         <p:spPr bwMode="auto">
           <a:xfrm>
-            <a:off x="0" y="0"/>
-            <a:ext cx="9144000" cy="0"/>
+            <a:off x="93652" y="1068112"/>
+            <a:ext cx="9202748" cy="1903687"/>
           </a:xfrm>
           <a:prstGeom prst="rect">
             <a:avLst/>
@@ -28940,46 +29407,465 @@
           <a:ln>
             <a:noFill/>
           </a:ln>
-          <a:effectLst/>
           <a:extLst>
             <a:ext uri="{909E8E84-426E-40DD-AFC4-6F175D3DCCD1}">
               <a14:hiddenFill xmlns:a14="http://schemas.microsoft.com/office/drawing/2010/main">
                 <a:solidFill>
-                  <a:schemeClr val="accent1"/>
+                  <a:srgbClr val="FFFFFF"/>
                 </a:solidFill>
               </a14:hiddenFill>
             </a:ext>
             <a:ext uri="{91240B29-F687-4F45-9708-019B960494DF}">
-              <a14:hiddenLine xmlns:a14="http://schemas.microsoft.com/office/drawing/2010/main" w="9525">
+              <a14:hiddenLine xmlns:a14="http://schemas.microsoft.com/office/drawing/2010/main" w="28575">
                 <a:solidFill>
-                  <a:schemeClr val="tx1"/>
+                  <a:srgbClr val="000000"/>
                 </a:solidFill>
                 <a:miter lim="800000"/>
                 <a:headEnd/>
                 <a:tailEnd/>
               </a14:hiddenLine>
             </a:ext>
-            <a:ext uri="{AF507438-7753-43E0-B8FC-AC1667EBCBE1}">
-              <a14:hiddenEffects xmlns:a14="http://schemas.microsoft.com/office/drawing/2010/main">
-                <a:effectLst>
-                  <a:outerShdw dist="35921" dir="2700000" algn="ctr" rotWithShape="0">
-                    <a:schemeClr val="bg2"/>
-                  </a:outerShdw>
-                </a:effectLst>
-              </a14:hiddenEffects>
-            </a:ext>
           </a:extLst>
         </p:spPr>
         <p:txBody>
-          <a:bodyPr vert="horz" wrap="none" lIns="91440" tIns="45720" rIns="91440" bIns="45720" numCol="1" anchor="ctr" anchorCtr="0" compatLnSpc="1">
+          <a:bodyPr vert="horz" wrap="square" lIns="91440" tIns="45720" rIns="91440" bIns="45720" numCol="1" anchor="t" anchorCtr="0" compatLnSpc="1">
             <a:prstTxWarp prst="textNoShape">
               <a:avLst/>
             </a:prstTxWarp>
-            <a:spAutoFit/>
           </a:bodyPr>
+          <a:lstStyle>
+            <a:lvl1pPr marL="342900" indent="-342900" algn="l" rtl="0" eaLnBrk="1" fontAlgn="base" hangingPunct="1">
+              <a:spcBef>
+                <a:spcPct val="30000"/>
+              </a:spcBef>
+              <a:spcAft>
+                <a:spcPct val="0"/>
+              </a:spcAft>
+              <a:buClr>
+                <a:schemeClr val="hlink"/>
+              </a:buClr>
+              <a:buFont typeface="Wingdings" pitchFamily="2" charset="2"/>
+              <a:buChar char="§"/>
+              <a:defRPr sz="3200">
+                <a:solidFill>
+                  <a:srgbClr val="000066"/>
+                </a:solidFill>
+                <a:latin typeface="微软雅黑" pitchFamily="34" charset="-122"/>
+                <a:ea typeface="微软雅黑" pitchFamily="34" charset="-122"/>
+                <a:cs typeface="+mn-cs"/>
+              </a:defRPr>
+            </a:lvl1pPr>
+            <a:lvl2pPr marL="742950" indent="-285750" algn="l" rtl="0" eaLnBrk="1" fontAlgn="base" hangingPunct="1">
+              <a:spcBef>
+                <a:spcPct val="30000"/>
+              </a:spcBef>
+              <a:spcAft>
+                <a:spcPct val="0"/>
+              </a:spcAft>
+              <a:buClr>
+                <a:schemeClr val="tx2"/>
+              </a:buClr>
+              <a:buSzPct val="85000"/>
+              <a:buFont typeface="Wingdings" pitchFamily="2" charset="2"/>
+              <a:buChar char="Ø"/>
+              <a:defRPr sz="2800">
+                <a:solidFill>
+                  <a:srgbClr val="006666"/>
+                </a:solidFill>
+                <a:latin typeface="微软雅黑" pitchFamily="34" charset="-122"/>
+                <a:ea typeface="微软雅黑" pitchFamily="34" charset="-122"/>
+              </a:defRPr>
+            </a:lvl2pPr>
+            <a:lvl3pPr marL="1143000" indent="-228600" algn="l" rtl="0" eaLnBrk="1" fontAlgn="base" hangingPunct="1">
+              <a:spcBef>
+                <a:spcPct val="30000"/>
+              </a:spcBef>
+              <a:spcAft>
+                <a:spcPct val="0"/>
+              </a:spcAft>
+              <a:buClr>
+                <a:schemeClr val="hlink"/>
+              </a:buClr>
+              <a:buSzPct val="95000"/>
+              <a:buFont typeface="Wingdings 2" pitchFamily="18" charset="2"/>
+              <a:buChar char="¡"/>
+              <a:defRPr sz="2400">
+                <a:solidFill>
+                  <a:schemeClr val="hlink"/>
+                </a:solidFill>
+                <a:latin typeface="微软雅黑" pitchFamily="34" charset="-122"/>
+                <a:ea typeface="微软雅黑" pitchFamily="34" charset="-122"/>
+              </a:defRPr>
+            </a:lvl3pPr>
+            <a:lvl4pPr marL="1600200" indent="-228600" algn="l" rtl="0" eaLnBrk="1" fontAlgn="base" hangingPunct="1">
+              <a:spcBef>
+                <a:spcPct val="30000"/>
+              </a:spcBef>
+              <a:spcAft>
+                <a:spcPct val="0"/>
+              </a:spcAft>
+              <a:buClr>
+                <a:schemeClr val="tx2"/>
+              </a:buClr>
+              <a:buSzPct val="90000"/>
+              <a:buFont typeface="Wingdings" pitchFamily="2" charset="2"/>
+              <a:buChar char="Ø"/>
+              <a:defRPr sz="2000">
+                <a:solidFill>
+                  <a:srgbClr val="990099"/>
+                </a:solidFill>
+                <a:latin typeface="微软雅黑" pitchFamily="34" charset="-122"/>
+                <a:ea typeface="微软雅黑" pitchFamily="34" charset="-122"/>
+              </a:defRPr>
+            </a:lvl4pPr>
+            <a:lvl5pPr marL="2057400" indent="-228600" algn="l" rtl="0" eaLnBrk="1" fontAlgn="base" hangingPunct="1">
+              <a:spcBef>
+                <a:spcPct val="30000"/>
+              </a:spcBef>
+              <a:spcAft>
+                <a:spcPct val="0"/>
+              </a:spcAft>
+              <a:buClr>
+                <a:schemeClr val="hlink"/>
+              </a:buClr>
+              <a:buFont typeface="Wingdings 2" pitchFamily="18" charset="2"/>
+              <a:buChar char="¡"/>
+              <a:defRPr sz="2000">
+                <a:solidFill>
+                  <a:schemeClr val="tx1"/>
+                </a:solidFill>
+                <a:latin typeface="微软雅黑" pitchFamily="34" charset="-122"/>
+                <a:ea typeface="微软雅黑" pitchFamily="34" charset="-122"/>
+              </a:defRPr>
+            </a:lvl5pPr>
+            <a:lvl6pPr marL="2514600" indent="-228600" algn="l" rtl="0" eaLnBrk="1" fontAlgn="base" hangingPunct="1">
+              <a:spcBef>
+                <a:spcPct val="30000"/>
+              </a:spcBef>
+              <a:spcAft>
+                <a:spcPct val="0"/>
+              </a:spcAft>
+              <a:buClr>
+                <a:schemeClr val="hlink"/>
+              </a:buClr>
+              <a:buFont typeface="Wingdings 2" pitchFamily="18" charset="2"/>
+              <a:buChar char="¡"/>
+              <a:defRPr sz="2000">
+                <a:solidFill>
+                  <a:schemeClr val="tx1"/>
+                </a:solidFill>
+                <a:latin typeface="+mn-lt"/>
+                <a:ea typeface="+mn-ea"/>
+              </a:defRPr>
+            </a:lvl6pPr>
+            <a:lvl7pPr marL="2971800" indent="-228600" algn="l" rtl="0" eaLnBrk="1" fontAlgn="base" hangingPunct="1">
+              <a:spcBef>
+                <a:spcPct val="30000"/>
+              </a:spcBef>
+              <a:spcAft>
+                <a:spcPct val="0"/>
+              </a:spcAft>
+              <a:buClr>
+                <a:schemeClr val="hlink"/>
+              </a:buClr>
+              <a:buFont typeface="Wingdings 2" pitchFamily="18" charset="2"/>
+              <a:buChar char="¡"/>
+              <a:defRPr sz="2000">
+                <a:solidFill>
+                  <a:schemeClr val="tx1"/>
+                </a:solidFill>
+                <a:latin typeface="+mn-lt"/>
+                <a:ea typeface="+mn-ea"/>
+              </a:defRPr>
+            </a:lvl7pPr>
+            <a:lvl8pPr marL="3429000" indent="-228600" algn="l" rtl="0" eaLnBrk="1" fontAlgn="base" hangingPunct="1">
+              <a:spcBef>
+                <a:spcPct val="30000"/>
+              </a:spcBef>
+              <a:spcAft>
+                <a:spcPct val="0"/>
+              </a:spcAft>
+              <a:buClr>
+                <a:schemeClr val="hlink"/>
+              </a:buClr>
+              <a:buFont typeface="Wingdings 2" pitchFamily="18" charset="2"/>
+              <a:buChar char="¡"/>
+              <a:defRPr sz="2000">
+                <a:solidFill>
+                  <a:schemeClr val="tx1"/>
+                </a:solidFill>
+                <a:latin typeface="+mn-lt"/>
+                <a:ea typeface="+mn-ea"/>
+              </a:defRPr>
+            </a:lvl8pPr>
+            <a:lvl9pPr marL="3886200" indent="-228600" algn="l" rtl="0" eaLnBrk="1" fontAlgn="base" hangingPunct="1">
+              <a:spcBef>
+                <a:spcPct val="30000"/>
+              </a:spcBef>
+              <a:spcAft>
+                <a:spcPct val="0"/>
+              </a:spcAft>
+              <a:buClr>
+                <a:schemeClr val="hlink"/>
+              </a:buClr>
+              <a:buFont typeface="Wingdings 2" pitchFamily="18" charset="2"/>
+              <a:buChar char="¡"/>
+              <a:defRPr sz="2000">
+                <a:solidFill>
+                  <a:schemeClr val="tx1"/>
+                </a:solidFill>
+                <a:latin typeface="+mn-lt"/>
+                <a:ea typeface="+mn-ea"/>
+              </a:defRPr>
+            </a:lvl9pPr>
+          </a:lstStyle>
+          <a:p>
+            <a:r>
+              <a:rPr lang="en-US" altLang="zh-CN" sz="2400" kern="0" dirty="0">
+                <a:latin typeface="+mn-lt"/>
+                <a:cs typeface="Times New Roman" panose="02020603050405020304" pitchFamily="18" charset="0"/>
+              </a:rPr>
+              <a:t>RETAU5200</a:t>
+            </a:r>
+            <a:endParaRPr lang="en-US" altLang="zh-CN" sz="2000" kern="0" dirty="0">
+              <a:latin typeface="+mn-lt"/>
+              <a:cs typeface="Times New Roman" panose="02020603050405020304" pitchFamily="18" charset="0"/>
+            </a:endParaRPr>
+          </a:p>
+          <a:p>
+            <a:pPr lvl="1"/>
+            <a:r>
+              <a:rPr lang="en-US" altLang="zh-CN" sz="2000" dirty="0">
+                <a:latin typeface="+mn-lt"/>
+                <a:cs typeface="Times New Roman" panose="02020603050405020304" pitchFamily="18" charset="0"/>
+              </a:rPr>
+              <a:t>Domain size hardly influences the results. The outer layer is negligibly influenced</a:t>
+            </a:r>
+          </a:p>
+          <a:p>
+            <a:pPr lvl="1"/>
+            <a:r>
+              <a:rPr lang="en-US" altLang="zh-CN" sz="2000" dirty="0">
+                <a:latin typeface="+mn-lt"/>
+                <a:cs typeface="Times New Roman" panose="02020603050405020304" pitchFamily="18" charset="0"/>
+              </a:rPr>
+              <a:t>Longer domain needs longer transient time (larger structures resolved, longer periods?) </a:t>
+            </a:r>
+          </a:p>
+        </p:txBody>
+      </p:sp>
+      <p:pic>
+        <p:nvPicPr>
+          <p:cNvPr id="11" name="Picture 10">
+            <a:extLst>
+              <a:ext uri="{FF2B5EF4-FFF2-40B4-BE49-F238E27FC236}">
+                <a16:creationId xmlns:a16="http://schemas.microsoft.com/office/drawing/2014/main" id="{E2630609-308B-8633-CD1A-6158822B26DC}"/>
+              </a:ext>
+            </a:extLst>
+          </p:cNvPr>
+          <p:cNvPicPr>
+            <a:picLocks noChangeAspect="1"/>
+          </p:cNvPicPr>
+          <p:nvPr/>
+        </p:nvPicPr>
+        <p:blipFill>
+          <a:blip r:embed="rId2"/>
+          <a:stretch>
+            <a:fillRect/>
+          </a:stretch>
+        </p:blipFill>
+        <p:spPr>
+          <a:xfrm>
+            <a:off x="-304800" y="2983162"/>
+            <a:ext cx="3200400" cy="2381220"/>
+          </a:xfrm>
+          <a:prstGeom prst="rect">
+            <a:avLst/>
+          </a:prstGeom>
+        </p:spPr>
+      </p:pic>
+      <p:pic>
+        <p:nvPicPr>
+          <p:cNvPr id="13" name="Picture 12">
+            <a:extLst>
+              <a:ext uri="{FF2B5EF4-FFF2-40B4-BE49-F238E27FC236}">
+                <a16:creationId xmlns:a16="http://schemas.microsoft.com/office/drawing/2014/main" id="{386F3BE4-8913-CAA8-F26E-778284745CF9}"/>
+              </a:ext>
+            </a:extLst>
+          </p:cNvPr>
+          <p:cNvPicPr>
+            <a:picLocks noChangeAspect="1"/>
+          </p:cNvPicPr>
+          <p:nvPr/>
+        </p:nvPicPr>
+        <p:blipFill>
+          <a:blip r:embed="rId3"/>
+          <a:stretch>
+            <a:fillRect/>
+          </a:stretch>
+        </p:blipFill>
+        <p:spPr>
+          <a:xfrm>
+            <a:off x="3048000" y="2942179"/>
+            <a:ext cx="3200400" cy="2422203"/>
+          </a:xfrm>
+          <a:prstGeom prst="rect">
+            <a:avLst/>
+          </a:prstGeom>
+        </p:spPr>
+      </p:pic>
+      <p:pic>
+        <p:nvPicPr>
+          <p:cNvPr id="15" name="Picture 14">
+            <a:extLst>
+              <a:ext uri="{FF2B5EF4-FFF2-40B4-BE49-F238E27FC236}">
+                <a16:creationId xmlns:a16="http://schemas.microsoft.com/office/drawing/2014/main" id="{ECEA8E5F-4A55-85EE-A594-9A4E5891371D}"/>
+              </a:ext>
+            </a:extLst>
+          </p:cNvPr>
+          <p:cNvPicPr>
+            <a:picLocks noChangeAspect="1"/>
+          </p:cNvPicPr>
+          <p:nvPr/>
+        </p:nvPicPr>
+        <p:blipFill>
+          <a:blip r:embed="rId4"/>
+          <a:stretch>
+            <a:fillRect/>
+          </a:stretch>
+        </p:blipFill>
+        <p:spPr>
+          <a:xfrm>
+            <a:off x="-304800" y="5364382"/>
+            <a:ext cx="3200400" cy="2404153"/>
+          </a:xfrm>
+          <a:prstGeom prst="rect">
+            <a:avLst/>
+          </a:prstGeom>
+        </p:spPr>
+      </p:pic>
+      <p:pic>
+        <p:nvPicPr>
+          <p:cNvPr id="17" name="Picture 16">
+            <a:extLst>
+              <a:ext uri="{FF2B5EF4-FFF2-40B4-BE49-F238E27FC236}">
+                <a16:creationId xmlns:a16="http://schemas.microsoft.com/office/drawing/2014/main" id="{0300D5A1-D905-059E-56BB-62668C325DA7}"/>
+              </a:ext>
+            </a:extLst>
+          </p:cNvPr>
+          <p:cNvPicPr>
+            <a:picLocks noChangeAspect="1"/>
+          </p:cNvPicPr>
+          <p:nvPr/>
+        </p:nvPicPr>
+        <p:blipFill>
+          <a:blip r:embed="rId5"/>
+          <a:stretch>
+            <a:fillRect/>
+          </a:stretch>
+        </p:blipFill>
+        <p:spPr>
+          <a:xfrm>
+            <a:off x="3047198" y="5364382"/>
+            <a:ext cx="3200400" cy="2408018"/>
+          </a:xfrm>
+          <a:prstGeom prst="rect">
+            <a:avLst/>
+          </a:prstGeom>
+        </p:spPr>
+      </p:pic>
+      <p:pic>
+        <p:nvPicPr>
+          <p:cNvPr id="19" name="Picture 18">
+            <a:extLst>
+              <a:ext uri="{FF2B5EF4-FFF2-40B4-BE49-F238E27FC236}">
+                <a16:creationId xmlns:a16="http://schemas.microsoft.com/office/drawing/2014/main" id="{F80313AA-D024-368E-D24B-947AF83A4E32}"/>
+              </a:ext>
+            </a:extLst>
+          </p:cNvPr>
+          <p:cNvPicPr>
+            <a:picLocks noChangeAspect="1"/>
+          </p:cNvPicPr>
+          <p:nvPr/>
+        </p:nvPicPr>
+        <p:blipFill>
+          <a:blip r:embed="rId6"/>
+          <a:stretch>
+            <a:fillRect/>
+          </a:stretch>
+        </p:blipFill>
+        <p:spPr>
+          <a:xfrm>
+            <a:off x="6247598" y="2942179"/>
+            <a:ext cx="3200400" cy="2379915"/>
+          </a:xfrm>
+          <a:prstGeom prst="rect">
+            <a:avLst/>
+          </a:prstGeom>
+        </p:spPr>
+      </p:pic>
+    </p:spTree>
+    <p:extLst>
+      <p:ext uri="{BB962C8B-B14F-4D97-AF65-F5344CB8AC3E}">
+        <p14:creationId xmlns:p14="http://schemas.microsoft.com/office/powerpoint/2010/main" val="2404903028"/>
+      </p:ext>
+    </p:extLst>
+  </p:cSld>
+  <p:clrMapOvr>
+    <a:masterClrMapping/>
+  </p:clrMapOvr>
+  <p:transition spd="med"/>
+</p:sld>
+</file>
+
+<file path=ppt/slides/slide19.xml><?xml version="1.0" encoding="utf-8"?>
+<p:sld xmlns:a="http://schemas.openxmlformats.org/drawingml/2006/main" xmlns:r="http://schemas.openxmlformats.org/officeDocument/2006/relationships" xmlns:p="http://schemas.openxmlformats.org/presentationml/2006/main">
+  <p:cSld>
+    <p:spTree>
+      <p:nvGrpSpPr>
+        <p:cNvPr id="1" name=""/>
+        <p:cNvGrpSpPr/>
+        <p:nvPr/>
+      </p:nvGrpSpPr>
+      <p:grpSpPr>
+        <a:xfrm>
+          <a:off x="0" y="0"/>
+          <a:ext cx="0" cy="0"/>
+          <a:chOff x="0" y="0"/>
+          <a:chExt cx="0" cy="0"/>
+        </a:xfrm>
+      </p:grpSpPr>
+      <p:sp>
+        <p:nvSpPr>
+          <p:cNvPr id="6" name="Title 1">
+            <a:extLst>
+              <a:ext uri="{FF2B5EF4-FFF2-40B4-BE49-F238E27FC236}">
+                <a16:creationId xmlns:a16="http://schemas.microsoft.com/office/drawing/2014/main" id="{672A50A6-DF4F-C15D-3695-4B8C888F16FF}"/>
+              </a:ext>
+            </a:extLst>
+          </p:cNvPr>
+          <p:cNvSpPr>
+            <a:spLocks noGrp="1"/>
+          </p:cNvSpPr>
+          <p:nvPr>
+            <p:ph type="title"/>
+          </p:nvPr>
+        </p:nvSpPr>
+        <p:spPr>
+          <a:xfrm>
+            <a:off x="152400" y="152400"/>
+            <a:ext cx="8610600" cy="838200"/>
+          </a:xfrm>
+        </p:spPr>
+        <p:txBody>
+          <a:bodyPr/>
           <a:lstStyle/>
           <a:p>
-            <a:endParaRPr lang="zh-CN" altLang="en-US"/>
+            <a:r>
+              <a:rPr lang="en-US" altLang="zh-CN" dirty="0"/>
+              <a:t>Channel</a:t>
+            </a:r>
+            <a:endParaRPr lang="zh-CN" altLang="en-US" dirty="0"/>
           </a:p>
         </p:txBody>
       </p:sp>
@@ -29241,15 +30127,135 @@
                 <a:latin typeface="+mn-lt"/>
                 <a:cs typeface="Times New Roman" panose="02020603050405020304" pitchFamily="18" charset="0"/>
               </a:rPr>
-              <a:t>Large domain</a:t>
+              <a:t>ACC does not influence the statistics</a:t>
             </a:r>
           </a:p>
         </p:txBody>
       </p:sp>
+      <p:pic>
+        <p:nvPicPr>
+          <p:cNvPr id="3" name="Picture 2">
+            <a:extLst>
+              <a:ext uri="{FF2B5EF4-FFF2-40B4-BE49-F238E27FC236}">
+                <a16:creationId xmlns:a16="http://schemas.microsoft.com/office/drawing/2014/main" id="{0CD99542-3386-2991-496D-8A08632C5858}"/>
+              </a:ext>
+            </a:extLst>
+          </p:cNvPr>
+          <p:cNvPicPr>
+            <a:picLocks noChangeAspect="1"/>
+          </p:cNvPicPr>
+          <p:nvPr/>
+        </p:nvPicPr>
+        <p:blipFill>
+          <a:blip r:embed="rId2"/>
+          <a:stretch>
+            <a:fillRect/>
+          </a:stretch>
+        </p:blipFill>
+        <p:spPr>
+          <a:xfrm>
+            <a:off x="457200" y="1981200"/>
+            <a:ext cx="3200400" cy="2411895"/>
+          </a:xfrm>
+          <a:prstGeom prst="rect">
+            <a:avLst/>
+          </a:prstGeom>
+        </p:spPr>
+      </p:pic>
+      <p:pic>
+        <p:nvPicPr>
+          <p:cNvPr id="5" name="Picture 4">
+            <a:extLst>
+              <a:ext uri="{FF2B5EF4-FFF2-40B4-BE49-F238E27FC236}">
+                <a16:creationId xmlns:a16="http://schemas.microsoft.com/office/drawing/2014/main" id="{B92FA21C-1460-E650-01C8-4ED777F7473F}"/>
+              </a:ext>
+            </a:extLst>
+          </p:cNvPr>
+          <p:cNvPicPr>
+            <a:picLocks noChangeAspect="1"/>
+          </p:cNvPicPr>
+          <p:nvPr/>
+        </p:nvPicPr>
+        <p:blipFill>
+          <a:blip r:embed="rId3"/>
+          <a:stretch>
+            <a:fillRect/>
+          </a:stretch>
+        </p:blipFill>
+        <p:spPr>
+          <a:xfrm>
+            <a:off x="3886202" y="1994079"/>
+            <a:ext cx="3200400" cy="2399016"/>
+          </a:xfrm>
+          <a:prstGeom prst="rect">
+            <a:avLst/>
+          </a:prstGeom>
+        </p:spPr>
+      </p:pic>
+      <p:pic>
+        <p:nvPicPr>
+          <p:cNvPr id="9" name="Picture 8">
+            <a:extLst>
+              <a:ext uri="{FF2B5EF4-FFF2-40B4-BE49-F238E27FC236}">
+                <a16:creationId xmlns:a16="http://schemas.microsoft.com/office/drawing/2014/main" id="{6D992492-230E-65F7-FA3D-2249B97D53DB}"/>
+              </a:ext>
+            </a:extLst>
+          </p:cNvPr>
+          <p:cNvPicPr>
+            <a:picLocks noChangeAspect="1"/>
+          </p:cNvPicPr>
+          <p:nvPr/>
+        </p:nvPicPr>
+        <p:blipFill>
+          <a:blip r:embed="rId4"/>
+          <a:stretch>
+            <a:fillRect/>
+          </a:stretch>
+        </p:blipFill>
+        <p:spPr>
+          <a:xfrm>
+            <a:off x="457198" y="4393095"/>
+            <a:ext cx="3200400" cy="2378607"/>
+          </a:xfrm>
+          <a:prstGeom prst="rect">
+            <a:avLst/>
+          </a:prstGeom>
+        </p:spPr>
+      </p:pic>
+      <p:pic>
+        <p:nvPicPr>
+          <p:cNvPr id="12" name="Picture 11">
+            <a:extLst>
+              <a:ext uri="{FF2B5EF4-FFF2-40B4-BE49-F238E27FC236}">
+                <a16:creationId xmlns:a16="http://schemas.microsoft.com/office/drawing/2014/main" id="{AFACF0B2-940A-0964-8826-554AAF75E296}"/>
+              </a:ext>
+            </a:extLst>
+          </p:cNvPr>
+          <p:cNvPicPr>
+            <a:picLocks noChangeAspect="1"/>
+          </p:cNvPicPr>
+          <p:nvPr/>
+        </p:nvPicPr>
+        <p:blipFill>
+          <a:blip r:embed="rId5"/>
+          <a:stretch>
+            <a:fillRect/>
+          </a:stretch>
+        </p:blipFill>
+        <p:spPr>
+          <a:xfrm>
+            <a:off x="3886202" y="4393095"/>
+            <a:ext cx="3200400" cy="2401580"/>
+          </a:xfrm>
+          <a:prstGeom prst="rect">
+            <a:avLst/>
+          </a:prstGeom>
+        </p:spPr>
+      </p:pic>
     </p:spTree>
     <p:extLst>
       <p:ext uri="{BB962C8B-B14F-4D97-AF65-F5344CB8AC3E}">
-        <p14:creationId xmlns:p14="http://schemas.microsoft.com/office/powerpoint/2010/main" val="2404903028"/>
+        <p14:creationId xmlns:p14="http://schemas.microsoft.com/office/powerpoint/2010/main" val="3794358770"/>
       </p:ext>
     </p:extLst>
   </p:cSld>
@@ -29260,7 +30266,306 @@
 </p:sld>
 </file>
 
-<file path=ppt/slides/slide18.xml><?xml version="1.0" encoding="utf-8"?>
+<file path=ppt/slides/slide2.xml><?xml version="1.0" encoding="utf-8"?>
+<p:sld xmlns:a="http://schemas.openxmlformats.org/drawingml/2006/main" xmlns:r="http://schemas.openxmlformats.org/officeDocument/2006/relationships" xmlns:p="http://schemas.openxmlformats.org/presentationml/2006/main">
+  <p:cSld>
+    <p:spTree>
+      <p:nvGrpSpPr>
+        <p:cNvPr id="1" name="">
+          <a:extLst>
+            <a:ext uri="{FF2B5EF4-FFF2-40B4-BE49-F238E27FC236}">
+              <a16:creationId xmlns:a16="http://schemas.microsoft.com/office/drawing/2014/main" id="{2D15152C-B19F-6BB3-728D-5F7F2B035AD0}"/>
+            </a:ext>
+          </a:extLst>
+        </p:cNvPr>
+        <p:cNvGrpSpPr/>
+        <p:nvPr/>
+      </p:nvGrpSpPr>
+      <p:grpSpPr>
+        <a:xfrm>
+          <a:off x="0" y="0"/>
+          <a:ext cx="0" cy="0"/>
+          <a:chOff x="0" y="0"/>
+          <a:chExt cx="0" cy="0"/>
+        </a:xfrm>
+      </p:grpSpPr>
+      <p:sp>
+        <p:nvSpPr>
+          <p:cNvPr id="2" name="Title 1">
+            <a:extLst>
+              <a:ext uri="{FF2B5EF4-FFF2-40B4-BE49-F238E27FC236}">
+                <a16:creationId xmlns:a16="http://schemas.microsoft.com/office/drawing/2014/main" id="{D13EE2B0-B4C2-89D5-D5B9-1DF5BE70DC5F}"/>
+              </a:ext>
+            </a:extLst>
+          </p:cNvPr>
+          <p:cNvSpPr>
+            <a:spLocks noGrp="1"/>
+          </p:cNvSpPr>
+          <p:nvPr>
+            <p:ph type="title"/>
+          </p:nvPr>
+        </p:nvSpPr>
+        <p:spPr>
+          <a:xfrm>
+            <a:off x="152400" y="152400"/>
+            <a:ext cx="8610600" cy="838200"/>
+          </a:xfrm>
+        </p:spPr>
+        <p:txBody>
+          <a:bodyPr/>
+          <a:lstStyle/>
+          <a:p>
+            <a:r>
+              <a:rPr lang="en-US" altLang="zh-CN" dirty="0"/>
+              <a:t>Channel</a:t>
+            </a:r>
+            <a:endParaRPr lang="zh-CN" altLang="en-US" dirty="0"/>
+          </a:p>
+        </p:txBody>
+      </p:sp>
+      <p:sp>
+        <p:nvSpPr>
+          <p:cNvPr id="7" name="内容占位符 2">
+            <a:extLst>
+              <a:ext uri="{FF2B5EF4-FFF2-40B4-BE49-F238E27FC236}">
+                <a16:creationId xmlns:a16="http://schemas.microsoft.com/office/drawing/2014/main" id="{D2C6C04E-3AE6-BF1A-EE2B-80CAEA4AD7AC}"/>
+              </a:ext>
+            </a:extLst>
+          </p:cNvPr>
+          <p:cNvSpPr>
+            <a:spLocks noGrp="1"/>
+          </p:cNvSpPr>
+          <p:nvPr>
+            <p:ph idx="4294967295"/>
+          </p:nvPr>
+        </p:nvSpPr>
+        <p:spPr>
+          <a:xfrm>
+            <a:off x="93652" y="1068111"/>
+            <a:ext cx="9050348" cy="1979889"/>
+          </a:xfrm>
+        </p:spPr>
+        <p:txBody>
+          <a:bodyPr/>
+          <a:lstStyle/>
+          <a:p>
+            <a:r>
+              <a:rPr lang="en-US" altLang="zh-CN" sz="2400" dirty="0">
+                <a:latin typeface="+mn-lt"/>
+                <a:cs typeface="Times New Roman" panose="02020603050405020304" pitchFamily="18" charset="0"/>
+              </a:rPr>
+              <a:t>RETAU180</a:t>
+            </a:r>
+            <a:endParaRPr lang="en-US" altLang="zh-CN" sz="2000" dirty="0">
+              <a:latin typeface="+mn-lt"/>
+              <a:cs typeface="Times New Roman" panose="02020603050405020304" pitchFamily="18" charset="0"/>
+            </a:endParaRPr>
+          </a:p>
+          <a:p>
+            <a:pPr lvl="1"/>
+            <a:r>
+              <a:rPr lang="en-US" altLang="zh-CN" sz="2000" dirty="0">
+                <a:latin typeface="+mn-lt"/>
+                <a:cs typeface="Times New Roman" panose="02020603050405020304" pitchFamily="18" charset="0"/>
+              </a:rPr>
+              <a:t>Both Neumann and wall model yield acceptable profiles</a:t>
+            </a:r>
+          </a:p>
+          <a:p>
+            <a:pPr lvl="1"/>
+            <a:r>
+              <a:rPr lang="en-US" altLang="zh-CN" sz="2000" dirty="0">
+                <a:latin typeface="+mn-lt"/>
+                <a:cs typeface="Times New Roman" panose="02020603050405020304" pitchFamily="18" charset="0"/>
+              </a:rPr>
+              <a:t>The DNS grid and the finest wall model grid produce the same results, but show difference from the DNS results, demonstrating imperfection of the wall model</a:t>
+            </a:r>
+            <a:endParaRPr lang="en-US" altLang="zh-CN" sz="2000" kern="0" dirty="0">
+              <a:latin typeface="+mn-lt"/>
+              <a:cs typeface="Times New Roman" panose="02020603050405020304" pitchFamily="18" charset="0"/>
+            </a:endParaRPr>
+          </a:p>
+          <a:p>
+            <a:pPr marL="457200" lvl="1" indent="0">
+              <a:buNone/>
+            </a:pPr>
+            <a:endParaRPr lang="en-US" altLang="zh-CN" sz="2000" baseline="30000" dirty="0">
+              <a:latin typeface="+mn-lt"/>
+              <a:cs typeface="Times New Roman" panose="02020603050405020304" pitchFamily="18" charset="0"/>
+            </a:endParaRPr>
+          </a:p>
+          <a:p>
+            <a:pPr marL="457200" lvl="1" indent="0">
+              <a:buNone/>
+            </a:pPr>
+            <a:endParaRPr lang="en-US" altLang="zh-CN" sz="2000" baseline="30000" dirty="0">
+              <a:latin typeface="+mn-lt"/>
+              <a:cs typeface="Times New Roman" panose="02020603050405020304" pitchFamily="18" charset="0"/>
+            </a:endParaRPr>
+          </a:p>
+          <a:p>
+            <a:pPr marL="457200" lvl="1" indent="0">
+              <a:buNone/>
+            </a:pPr>
+            <a:endParaRPr lang="en-US" altLang="zh-CN" sz="2000" baseline="30000" dirty="0">
+              <a:latin typeface="+mn-lt"/>
+              <a:cs typeface="Times New Roman" panose="02020603050405020304" pitchFamily="18" charset="0"/>
+            </a:endParaRPr>
+          </a:p>
+          <a:p>
+            <a:pPr marL="457200" lvl="1" indent="0">
+              <a:buNone/>
+            </a:pPr>
+            <a:endParaRPr lang="en-US" altLang="zh-CN" sz="2000" baseline="30000" dirty="0">
+              <a:latin typeface="+mn-lt"/>
+              <a:cs typeface="Times New Roman" panose="02020603050405020304" pitchFamily="18" charset="0"/>
+            </a:endParaRPr>
+          </a:p>
+          <a:p>
+            <a:pPr marL="457200" lvl="1" indent="0">
+              <a:buNone/>
+            </a:pPr>
+            <a:endParaRPr lang="en-US" altLang="zh-CN" sz="2000" baseline="30000" dirty="0">
+              <a:latin typeface="+mn-lt"/>
+              <a:cs typeface="Times New Roman" panose="02020603050405020304" pitchFamily="18" charset="0"/>
+            </a:endParaRPr>
+          </a:p>
+          <a:p>
+            <a:pPr marL="457200" lvl="1" indent="0">
+              <a:buNone/>
+            </a:pPr>
+            <a:endParaRPr lang="en-US" altLang="zh-CN" sz="2000" baseline="30000" dirty="0">
+              <a:latin typeface="+mn-lt"/>
+              <a:cs typeface="Times New Roman" panose="02020603050405020304" pitchFamily="18" charset="0"/>
+            </a:endParaRPr>
+          </a:p>
+          <a:p>
+            <a:pPr marL="457200" lvl="1" indent="0">
+              <a:buNone/>
+            </a:pPr>
+            <a:endParaRPr lang="en-US" altLang="zh-CN" sz="2000" baseline="30000" dirty="0">
+              <a:latin typeface="+mn-lt"/>
+              <a:cs typeface="Times New Roman" panose="02020603050405020304" pitchFamily="18" charset="0"/>
+            </a:endParaRPr>
+          </a:p>
+          <a:p>
+            <a:pPr marL="457200" lvl="1" indent="0">
+              <a:buNone/>
+            </a:pPr>
+            <a:endParaRPr lang="en-US" altLang="zh-CN" sz="2000" baseline="30000" dirty="0">
+              <a:latin typeface="+mn-lt"/>
+              <a:cs typeface="Times New Roman" panose="02020603050405020304" pitchFamily="18" charset="0"/>
+            </a:endParaRPr>
+          </a:p>
+          <a:p>
+            <a:pPr>
+              <a:lnSpc>
+                <a:spcPct val="125000"/>
+              </a:lnSpc>
+            </a:pPr>
+            <a:endParaRPr lang="en-US" altLang="zh-CN" sz="2400" dirty="0">
+              <a:latin typeface="+mn-lt"/>
+              <a:cs typeface="Times New Roman" panose="02020603050405020304" pitchFamily="18" charset="0"/>
+            </a:endParaRPr>
+          </a:p>
+          <a:p>
+            <a:pPr marL="457200" lvl="1" indent="0">
+              <a:lnSpc>
+                <a:spcPct val="125000"/>
+              </a:lnSpc>
+              <a:buNone/>
+            </a:pPr>
+            <a:endParaRPr lang="en-US" altLang="zh-CN" sz="2000" dirty="0">
+              <a:latin typeface="+mn-lt"/>
+              <a:cs typeface="Times New Roman" panose="02020603050405020304" pitchFamily="18" charset="0"/>
+            </a:endParaRPr>
+          </a:p>
+        </p:txBody>
+      </p:sp>
+      <p:sp>
+        <p:nvSpPr>
+          <p:cNvPr id="9" name="Rectangle 2">
+            <a:extLst>
+              <a:ext uri="{FF2B5EF4-FFF2-40B4-BE49-F238E27FC236}">
+                <a16:creationId xmlns:a16="http://schemas.microsoft.com/office/drawing/2014/main" id="{39432E37-D0CA-42E2-B210-9AC1CA0029EC}"/>
+              </a:ext>
+            </a:extLst>
+          </p:cNvPr>
+          <p:cNvSpPr>
+            <a:spLocks noChangeArrowheads="1"/>
+          </p:cNvSpPr>
+          <p:nvPr/>
+        </p:nvSpPr>
+        <p:spPr bwMode="auto">
+          <a:xfrm>
+            <a:off x="0" y="0"/>
+            <a:ext cx="9144000" cy="0"/>
+          </a:xfrm>
+          <a:prstGeom prst="rect">
+            <a:avLst/>
+          </a:prstGeom>
+          <a:noFill/>
+          <a:ln>
+            <a:noFill/>
+          </a:ln>
+          <a:effectLst/>
+          <a:extLst>
+            <a:ext uri="{909E8E84-426E-40DD-AFC4-6F175D3DCCD1}">
+              <a14:hiddenFill xmlns:a14="http://schemas.microsoft.com/office/drawing/2010/main">
+                <a:solidFill>
+                  <a:schemeClr val="accent1"/>
+                </a:solidFill>
+              </a14:hiddenFill>
+            </a:ext>
+            <a:ext uri="{91240B29-F687-4F45-9708-019B960494DF}">
+              <a14:hiddenLine xmlns:a14="http://schemas.microsoft.com/office/drawing/2010/main" w="9525">
+                <a:solidFill>
+                  <a:schemeClr val="tx1"/>
+                </a:solidFill>
+                <a:miter lim="800000"/>
+                <a:headEnd/>
+                <a:tailEnd/>
+              </a14:hiddenLine>
+            </a:ext>
+            <a:ext uri="{AF507438-7753-43E0-B8FC-AC1667EBCBE1}">
+              <a14:hiddenEffects xmlns:a14="http://schemas.microsoft.com/office/drawing/2010/main">
+                <a:effectLst>
+                  <a:outerShdw dist="35921" dir="2700000" algn="ctr" rotWithShape="0">
+                    <a:schemeClr val="bg2"/>
+                  </a:outerShdw>
+                </a:effectLst>
+              </a14:hiddenEffects>
+            </a:ext>
+          </a:extLst>
+        </p:spPr>
+        <p:txBody>
+          <a:bodyPr vert="horz" wrap="none" lIns="91440" tIns="45720" rIns="91440" bIns="45720" numCol="1" anchor="ctr" anchorCtr="0" compatLnSpc="1">
+            <a:prstTxWarp prst="textNoShape">
+              <a:avLst/>
+            </a:prstTxWarp>
+            <a:spAutoFit/>
+          </a:bodyPr>
+          <a:lstStyle/>
+          <a:p>
+            <a:endParaRPr lang="zh-CN" altLang="en-US"/>
+          </a:p>
+        </p:txBody>
+      </p:sp>
+    </p:spTree>
+    <p:extLst>
+      <p:ext uri="{BB962C8B-B14F-4D97-AF65-F5344CB8AC3E}">
+        <p14:creationId xmlns:p14="http://schemas.microsoft.com/office/powerpoint/2010/main" val="3334254190"/>
+      </p:ext>
+    </p:extLst>
+  </p:cSld>
+  <p:clrMapOvr>
+    <a:masterClrMapping/>
+  </p:clrMapOvr>
+  <p:transition spd="med" advTm="63997"/>
+</p:sld>
+</file>
+
+<file path=ppt/slides/slide20.xml><?xml version="1.0" encoding="utf-8"?>
 <p:sld xmlns:a="http://schemas.openxmlformats.org/drawingml/2006/main" xmlns:r="http://schemas.openxmlformats.org/officeDocument/2006/relationships" xmlns:p="http://schemas.openxmlformats.org/presentationml/2006/main">
   <p:cSld>
     <p:spTree>
@@ -29913,7 +31218,7 @@
 </p:sld>
 </file>
 
-<file path=ppt/slides/slide19.xml><?xml version="1.0" encoding="utf-8"?>
+<file path=ppt/slides/slide21.xml><?xml version="1.0" encoding="utf-8"?>
 <p:sld xmlns:a="http://schemas.openxmlformats.org/drawingml/2006/main" xmlns:r="http://schemas.openxmlformats.org/officeDocument/2006/relationships" xmlns:p="http://schemas.openxmlformats.org/presentationml/2006/main">
   <p:cSld>
     <p:spTree>
@@ -30566,306 +31871,7 @@
 </p:sld>
 </file>
 
-<file path=ppt/slides/slide2.xml><?xml version="1.0" encoding="utf-8"?>
-<p:sld xmlns:a="http://schemas.openxmlformats.org/drawingml/2006/main" xmlns:r="http://schemas.openxmlformats.org/officeDocument/2006/relationships" xmlns:p="http://schemas.openxmlformats.org/presentationml/2006/main">
-  <p:cSld>
-    <p:spTree>
-      <p:nvGrpSpPr>
-        <p:cNvPr id="1" name="">
-          <a:extLst>
-            <a:ext uri="{FF2B5EF4-FFF2-40B4-BE49-F238E27FC236}">
-              <a16:creationId xmlns:a16="http://schemas.microsoft.com/office/drawing/2014/main" id="{2D15152C-B19F-6BB3-728D-5F7F2B035AD0}"/>
-            </a:ext>
-          </a:extLst>
-        </p:cNvPr>
-        <p:cNvGrpSpPr/>
-        <p:nvPr/>
-      </p:nvGrpSpPr>
-      <p:grpSpPr>
-        <a:xfrm>
-          <a:off x="0" y="0"/>
-          <a:ext cx="0" cy="0"/>
-          <a:chOff x="0" y="0"/>
-          <a:chExt cx="0" cy="0"/>
-        </a:xfrm>
-      </p:grpSpPr>
-      <p:sp>
-        <p:nvSpPr>
-          <p:cNvPr id="2" name="Title 1">
-            <a:extLst>
-              <a:ext uri="{FF2B5EF4-FFF2-40B4-BE49-F238E27FC236}">
-                <a16:creationId xmlns:a16="http://schemas.microsoft.com/office/drawing/2014/main" id="{D13EE2B0-B4C2-89D5-D5B9-1DF5BE70DC5F}"/>
-              </a:ext>
-            </a:extLst>
-          </p:cNvPr>
-          <p:cNvSpPr>
-            <a:spLocks noGrp="1"/>
-          </p:cNvSpPr>
-          <p:nvPr>
-            <p:ph type="title"/>
-          </p:nvPr>
-        </p:nvSpPr>
-        <p:spPr>
-          <a:xfrm>
-            <a:off x="152400" y="152400"/>
-            <a:ext cx="8610600" cy="838200"/>
-          </a:xfrm>
-        </p:spPr>
-        <p:txBody>
-          <a:bodyPr/>
-          <a:lstStyle/>
-          <a:p>
-            <a:r>
-              <a:rPr lang="en-US" altLang="zh-CN" dirty="0"/>
-              <a:t>Channel</a:t>
-            </a:r>
-            <a:endParaRPr lang="zh-CN" altLang="en-US" dirty="0"/>
-          </a:p>
-        </p:txBody>
-      </p:sp>
-      <p:sp>
-        <p:nvSpPr>
-          <p:cNvPr id="7" name="内容占位符 2">
-            <a:extLst>
-              <a:ext uri="{FF2B5EF4-FFF2-40B4-BE49-F238E27FC236}">
-                <a16:creationId xmlns:a16="http://schemas.microsoft.com/office/drawing/2014/main" id="{D2C6C04E-3AE6-BF1A-EE2B-80CAEA4AD7AC}"/>
-              </a:ext>
-            </a:extLst>
-          </p:cNvPr>
-          <p:cNvSpPr>
-            <a:spLocks noGrp="1"/>
-          </p:cNvSpPr>
-          <p:nvPr>
-            <p:ph idx="4294967295"/>
-          </p:nvPr>
-        </p:nvSpPr>
-        <p:spPr>
-          <a:xfrm>
-            <a:off x="93652" y="1068111"/>
-            <a:ext cx="9050348" cy="1979889"/>
-          </a:xfrm>
-        </p:spPr>
-        <p:txBody>
-          <a:bodyPr/>
-          <a:lstStyle/>
-          <a:p>
-            <a:r>
-              <a:rPr lang="en-US" altLang="zh-CN" sz="2400" dirty="0">
-                <a:latin typeface="+mn-lt"/>
-                <a:cs typeface="Times New Roman" panose="02020603050405020304" pitchFamily="18" charset="0"/>
-              </a:rPr>
-              <a:t>RETAU180</a:t>
-            </a:r>
-            <a:endParaRPr lang="en-US" altLang="zh-CN" sz="2000" dirty="0">
-              <a:latin typeface="+mn-lt"/>
-              <a:cs typeface="Times New Roman" panose="02020603050405020304" pitchFamily="18" charset="0"/>
-            </a:endParaRPr>
-          </a:p>
-          <a:p>
-            <a:pPr lvl="1"/>
-            <a:r>
-              <a:rPr lang="en-US" altLang="zh-CN" sz="2000" dirty="0">
-                <a:latin typeface="+mn-lt"/>
-                <a:cs typeface="Times New Roman" panose="02020603050405020304" pitchFamily="18" charset="0"/>
-              </a:rPr>
-              <a:t>Both Neumann and wall model yield acceptable profiles</a:t>
-            </a:r>
-          </a:p>
-          <a:p>
-            <a:pPr lvl="1"/>
-            <a:r>
-              <a:rPr lang="en-US" altLang="zh-CN" sz="2000" dirty="0">
-                <a:latin typeface="+mn-lt"/>
-                <a:cs typeface="Times New Roman" panose="02020603050405020304" pitchFamily="18" charset="0"/>
-              </a:rPr>
-              <a:t>The DNS grid and the finest wall model grid produce the same results, but show difference from the DNS results, demonstrating imperfection of the wall model</a:t>
-            </a:r>
-            <a:endParaRPr lang="en-US" altLang="zh-CN" sz="2000" kern="0" dirty="0">
-              <a:latin typeface="+mn-lt"/>
-              <a:cs typeface="Times New Roman" panose="02020603050405020304" pitchFamily="18" charset="0"/>
-            </a:endParaRPr>
-          </a:p>
-          <a:p>
-            <a:pPr marL="457200" lvl="1" indent="0">
-              <a:buNone/>
-            </a:pPr>
-            <a:endParaRPr lang="en-US" altLang="zh-CN" sz="2000" baseline="30000" dirty="0">
-              <a:latin typeface="+mn-lt"/>
-              <a:cs typeface="Times New Roman" panose="02020603050405020304" pitchFamily="18" charset="0"/>
-            </a:endParaRPr>
-          </a:p>
-          <a:p>
-            <a:pPr marL="457200" lvl="1" indent="0">
-              <a:buNone/>
-            </a:pPr>
-            <a:endParaRPr lang="en-US" altLang="zh-CN" sz="2000" baseline="30000" dirty="0">
-              <a:latin typeface="+mn-lt"/>
-              <a:cs typeface="Times New Roman" panose="02020603050405020304" pitchFamily="18" charset="0"/>
-            </a:endParaRPr>
-          </a:p>
-          <a:p>
-            <a:pPr marL="457200" lvl="1" indent="0">
-              <a:buNone/>
-            </a:pPr>
-            <a:endParaRPr lang="en-US" altLang="zh-CN" sz="2000" baseline="30000" dirty="0">
-              <a:latin typeface="+mn-lt"/>
-              <a:cs typeface="Times New Roman" panose="02020603050405020304" pitchFamily="18" charset="0"/>
-            </a:endParaRPr>
-          </a:p>
-          <a:p>
-            <a:pPr marL="457200" lvl="1" indent="0">
-              <a:buNone/>
-            </a:pPr>
-            <a:endParaRPr lang="en-US" altLang="zh-CN" sz="2000" baseline="30000" dirty="0">
-              <a:latin typeface="+mn-lt"/>
-              <a:cs typeface="Times New Roman" panose="02020603050405020304" pitchFamily="18" charset="0"/>
-            </a:endParaRPr>
-          </a:p>
-          <a:p>
-            <a:pPr marL="457200" lvl="1" indent="0">
-              <a:buNone/>
-            </a:pPr>
-            <a:endParaRPr lang="en-US" altLang="zh-CN" sz="2000" baseline="30000" dirty="0">
-              <a:latin typeface="+mn-lt"/>
-              <a:cs typeface="Times New Roman" panose="02020603050405020304" pitchFamily="18" charset="0"/>
-            </a:endParaRPr>
-          </a:p>
-          <a:p>
-            <a:pPr marL="457200" lvl="1" indent="0">
-              <a:buNone/>
-            </a:pPr>
-            <a:endParaRPr lang="en-US" altLang="zh-CN" sz="2000" baseline="30000" dirty="0">
-              <a:latin typeface="+mn-lt"/>
-              <a:cs typeface="Times New Roman" panose="02020603050405020304" pitchFamily="18" charset="0"/>
-            </a:endParaRPr>
-          </a:p>
-          <a:p>
-            <a:pPr marL="457200" lvl="1" indent="0">
-              <a:buNone/>
-            </a:pPr>
-            <a:endParaRPr lang="en-US" altLang="zh-CN" sz="2000" baseline="30000" dirty="0">
-              <a:latin typeface="+mn-lt"/>
-              <a:cs typeface="Times New Roman" panose="02020603050405020304" pitchFamily="18" charset="0"/>
-            </a:endParaRPr>
-          </a:p>
-          <a:p>
-            <a:pPr marL="457200" lvl="1" indent="0">
-              <a:buNone/>
-            </a:pPr>
-            <a:endParaRPr lang="en-US" altLang="zh-CN" sz="2000" baseline="30000" dirty="0">
-              <a:latin typeface="+mn-lt"/>
-              <a:cs typeface="Times New Roman" panose="02020603050405020304" pitchFamily="18" charset="0"/>
-            </a:endParaRPr>
-          </a:p>
-          <a:p>
-            <a:pPr>
-              <a:lnSpc>
-                <a:spcPct val="125000"/>
-              </a:lnSpc>
-            </a:pPr>
-            <a:endParaRPr lang="en-US" altLang="zh-CN" sz="2400" dirty="0">
-              <a:latin typeface="+mn-lt"/>
-              <a:cs typeface="Times New Roman" panose="02020603050405020304" pitchFamily="18" charset="0"/>
-            </a:endParaRPr>
-          </a:p>
-          <a:p>
-            <a:pPr marL="457200" lvl="1" indent="0">
-              <a:lnSpc>
-                <a:spcPct val="125000"/>
-              </a:lnSpc>
-              <a:buNone/>
-            </a:pPr>
-            <a:endParaRPr lang="en-US" altLang="zh-CN" sz="2000" dirty="0">
-              <a:latin typeface="+mn-lt"/>
-              <a:cs typeface="Times New Roman" panose="02020603050405020304" pitchFamily="18" charset="0"/>
-            </a:endParaRPr>
-          </a:p>
-        </p:txBody>
-      </p:sp>
-      <p:sp>
-        <p:nvSpPr>
-          <p:cNvPr id="9" name="Rectangle 2">
-            <a:extLst>
-              <a:ext uri="{FF2B5EF4-FFF2-40B4-BE49-F238E27FC236}">
-                <a16:creationId xmlns:a16="http://schemas.microsoft.com/office/drawing/2014/main" id="{39432E37-D0CA-42E2-B210-9AC1CA0029EC}"/>
-              </a:ext>
-            </a:extLst>
-          </p:cNvPr>
-          <p:cNvSpPr>
-            <a:spLocks noChangeArrowheads="1"/>
-          </p:cNvSpPr>
-          <p:nvPr/>
-        </p:nvSpPr>
-        <p:spPr bwMode="auto">
-          <a:xfrm>
-            <a:off x="0" y="0"/>
-            <a:ext cx="9144000" cy="0"/>
-          </a:xfrm>
-          <a:prstGeom prst="rect">
-            <a:avLst/>
-          </a:prstGeom>
-          <a:noFill/>
-          <a:ln>
-            <a:noFill/>
-          </a:ln>
-          <a:effectLst/>
-          <a:extLst>
-            <a:ext uri="{909E8E84-426E-40DD-AFC4-6F175D3DCCD1}">
-              <a14:hiddenFill xmlns:a14="http://schemas.microsoft.com/office/drawing/2010/main">
-                <a:solidFill>
-                  <a:schemeClr val="accent1"/>
-                </a:solidFill>
-              </a14:hiddenFill>
-            </a:ext>
-            <a:ext uri="{91240B29-F687-4F45-9708-019B960494DF}">
-              <a14:hiddenLine xmlns:a14="http://schemas.microsoft.com/office/drawing/2010/main" w="9525">
-                <a:solidFill>
-                  <a:schemeClr val="tx1"/>
-                </a:solidFill>
-                <a:miter lim="800000"/>
-                <a:headEnd/>
-                <a:tailEnd/>
-              </a14:hiddenLine>
-            </a:ext>
-            <a:ext uri="{AF507438-7753-43E0-B8FC-AC1667EBCBE1}">
-              <a14:hiddenEffects xmlns:a14="http://schemas.microsoft.com/office/drawing/2010/main">
-                <a:effectLst>
-                  <a:outerShdw dist="35921" dir="2700000" algn="ctr" rotWithShape="0">
-                    <a:schemeClr val="bg2"/>
-                  </a:outerShdw>
-                </a:effectLst>
-              </a14:hiddenEffects>
-            </a:ext>
-          </a:extLst>
-        </p:spPr>
-        <p:txBody>
-          <a:bodyPr vert="horz" wrap="none" lIns="91440" tIns="45720" rIns="91440" bIns="45720" numCol="1" anchor="ctr" anchorCtr="0" compatLnSpc="1">
-            <a:prstTxWarp prst="textNoShape">
-              <a:avLst/>
-            </a:prstTxWarp>
-            <a:spAutoFit/>
-          </a:bodyPr>
-          <a:lstStyle/>
-          <a:p>
-            <a:endParaRPr lang="zh-CN" altLang="en-US"/>
-          </a:p>
-        </p:txBody>
-      </p:sp>
-    </p:spTree>
-    <p:extLst>
-      <p:ext uri="{BB962C8B-B14F-4D97-AF65-F5344CB8AC3E}">
-        <p14:creationId xmlns:p14="http://schemas.microsoft.com/office/powerpoint/2010/main" val="3334254190"/>
-      </p:ext>
-    </p:extLst>
-  </p:cSld>
-  <p:clrMapOvr>
-    <a:masterClrMapping/>
-  </p:clrMapOvr>
-  <p:transition spd="med" advTm="63997"/>
-</p:sld>
-</file>
-
-<file path=ppt/slides/slide20.xml><?xml version="1.0" encoding="utf-8"?>
+<file path=ppt/slides/slide22.xml><?xml version="1.0" encoding="utf-8"?>
 <p:sld xmlns:a="http://schemas.openxmlformats.org/drawingml/2006/main" xmlns:r="http://schemas.openxmlformats.org/officeDocument/2006/relationships" xmlns:p="http://schemas.openxmlformats.org/presentationml/2006/main">
   <p:cSld>
     <p:spTree>
@@ -31386,7 +32392,7 @@
 </p:sld>
 </file>
 
-<file path=ppt/slides/slide21.xml><?xml version="1.0" encoding="utf-8"?>
+<file path=ppt/slides/slide23.xml><?xml version="1.0" encoding="utf-8"?>
 <p:sld xmlns:a="http://schemas.openxmlformats.org/drawingml/2006/main" xmlns:r="http://schemas.openxmlformats.org/officeDocument/2006/relationships" xmlns:p="http://schemas.openxmlformats.org/presentationml/2006/main">
   <p:cSld>
     <p:spTree>
@@ -32073,7 +33079,7 @@
 </p:sld>
 </file>
 
-<file path=ppt/slides/slide22.xml><?xml version="1.0" encoding="utf-8"?>
+<file path=ppt/slides/slide24.xml><?xml version="1.0" encoding="utf-8"?>
 <p:sld xmlns:a="http://schemas.openxmlformats.org/drawingml/2006/main" xmlns:r="http://schemas.openxmlformats.org/officeDocument/2006/relationships" xmlns:p="http://schemas.openxmlformats.org/presentationml/2006/main">
   <p:cSld>
     <p:spTree>
@@ -32453,7 +33459,7 @@
 </p:sld>
 </file>
 
-<file path=ppt/slides/slide23.xml><?xml version="1.0" encoding="utf-8"?>
+<file path=ppt/slides/slide25.xml><?xml version="1.0" encoding="utf-8"?>
 <p:sld xmlns:a="http://schemas.openxmlformats.org/drawingml/2006/main" xmlns:r="http://schemas.openxmlformats.org/officeDocument/2006/relationships" xmlns:p="http://schemas.openxmlformats.org/presentationml/2006/main">
   <p:cSld>
     <p:spTree>
@@ -33834,7 +34840,7 @@
         </p:blipFill>
         <p:spPr>
           <a:xfrm>
-            <a:off x="4343400" y="1981200"/>
+            <a:off x="4572000" y="1748805"/>
             <a:ext cx="3200400" cy="2410558"/>
           </a:xfrm>
           <a:prstGeom prst="rect">
@@ -33864,7 +34870,7 @@
         </p:blipFill>
         <p:spPr>
           <a:xfrm>
-            <a:off x="1138646" y="1981200"/>
+            <a:off x="1367246" y="1748805"/>
             <a:ext cx="3200400" cy="2392631"/>
           </a:xfrm>
           <a:prstGeom prst="rect">
@@ -33894,7 +34900,7 @@
         </p:blipFill>
         <p:spPr>
           <a:xfrm>
-            <a:off x="1138646" y="4391758"/>
+            <a:off x="1367246" y="4159363"/>
             <a:ext cx="3200400" cy="2393837"/>
           </a:xfrm>
           <a:prstGeom prst="rect">
@@ -33917,6 +34923,454 @@
 </file>
 
 <file path=ppt/slides/slide5.xml><?xml version="1.0" encoding="utf-8"?>
+<p:sld xmlns:a="http://schemas.openxmlformats.org/drawingml/2006/main" xmlns:r="http://schemas.openxmlformats.org/officeDocument/2006/relationships" xmlns:p="http://schemas.openxmlformats.org/presentationml/2006/main">
+  <p:cSld>
+    <p:spTree>
+      <p:nvGrpSpPr>
+        <p:cNvPr id="1" name=""/>
+        <p:cNvGrpSpPr/>
+        <p:nvPr/>
+      </p:nvGrpSpPr>
+      <p:grpSpPr>
+        <a:xfrm>
+          <a:off x="0" y="0"/>
+          <a:ext cx="0" cy="0"/>
+          <a:chOff x="0" y="0"/>
+          <a:chExt cx="0" cy="0"/>
+        </a:xfrm>
+      </p:grpSpPr>
+      <p:sp>
+        <p:nvSpPr>
+          <p:cNvPr id="6" name="Title 1">
+            <a:extLst>
+              <a:ext uri="{FF2B5EF4-FFF2-40B4-BE49-F238E27FC236}">
+                <a16:creationId xmlns:a16="http://schemas.microsoft.com/office/drawing/2014/main" id="{672A50A6-DF4F-C15D-3695-4B8C888F16FF}"/>
+              </a:ext>
+            </a:extLst>
+          </p:cNvPr>
+          <p:cNvSpPr>
+            <a:spLocks noGrp="1"/>
+          </p:cNvSpPr>
+          <p:nvPr>
+            <p:ph type="title"/>
+          </p:nvPr>
+        </p:nvSpPr>
+        <p:spPr>
+          <a:xfrm>
+            <a:off x="152400" y="152400"/>
+            <a:ext cx="8610600" cy="838200"/>
+          </a:xfrm>
+        </p:spPr>
+        <p:txBody>
+          <a:bodyPr/>
+          <a:lstStyle/>
+          <a:p>
+            <a:r>
+              <a:rPr lang="en-US" altLang="zh-CN" dirty="0"/>
+              <a:t>Channel</a:t>
+            </a:r>
+            <a:endParaRPr lang="zh-CN" altLang="en-US" dirty="0"/>
+          </a:p>
+        </p:txBody>
+      </p:sp>
+      <p:sp>
+        <p:nvSpPr>
+          <p:cNvPr id="8" name="内容占位符 2">
+            <a:extLst>
+              <a:ext uri="{FF2B5EF4-FFF2-40B4-BE49-F238E27FC236}">
+                <a16:creationId xmlns:a16="http://schemas.microsoft.com/office/drawing/2014/main" id="{2CA7BECD-9996-EA33-E05F-D04BFFAF531D}"/>
+              </a:ext>
+            </a:extLst>
+          </p:cNvPr>
+          <p:cNvSpPr txBox="1">
+            <a:spLocks/>
+          </p:cNvSpPr>
+          <p:nvPr/>
+        </p:nvSpPr>
+        <p:spPr bwMode="auto">
+          <a:xfrm>
+            <a:off x="93652" y="1068113"/>
+            <a:ext cx="8610600" cy="932338"/>
+          </a:xfrm>
+          <a:prstGeom prst="rect">
+            <a:avLst/>
+          </a:prstGeom>
+          <a:noFill/>
+          <a:ln>
+            <a:noFill/>
+          </a:ln>
+          <a:extLst>
+            <a:ext uri="{909E8E84-426E-40DD-AFC4-6F175D3DCCD1}">
+              <a14:hiddenFill xmlns:a14="http://schemas.microsoft.com/office/drawing/2010/main">
+                <a:solidFill>
+                  <a:srgbClr val="FFFFFF"/>
+                </a:solidFill>
+              </a14:hiddenFill>
+            </a:ext>
+            <a:ext uri="{91240B29-F687-4F45-9708-019B960494DF}">
+              <a14:hiddenLine xmlns:a14="http://schemas.microsoft.com/office/drawing/2010/main" w="28575">
+                <a:solidFill>
+                  <a:srgbClr val="000000"/>
+                </a:solidFill>
+                <a:miter lim="800000"/>
+                <a:headEnd/>
+                <a:tailEnd/>
+              </a14:hiddenLine>
+            </a:ext>
+          </a:extLst>
+        </p:spPr>
+        <p:txBody>
+          <a:bodyPr vert="horz" wrap="square" lIns="91440" tIns="45720" rIns="91440" bIns="45720" numCol="1" anchor="t" anchorCtr="0" compatLnSpc="1">
+            <a:prstTxWarp prst="textNoShape">
+              <a:avLst/>
+            </a:prstTxWarp>
+          </a:bodyPr>
+          <a:lstStyle>
+            <a:lvl1pPr marL="342900" indent="-342900" algn="l" rtl="0" eaLnBrk="1" fontAlgn="base" hangingPunct="1">
+              <a:spcBef>
+                <a:spcPct val="30000"/>
+              </a:spcBef>
+              <a:spcAft>
+                <a:spcPct val="0"/>
+              </a:spcAft>
+              <a:buClr>
+                <a:schemeClr val="hlink"/>
+              </a:buClr>
+              <a:buFont typeface="Wingdings" pitchFamily="2" charset="2"/>
+              <a:buChar char="§"/>
+              <a:defRPr sz="3200">
+                <a:solidFill>
+                  <a:srgbClr val="000066"/>
+                </a:solidFill>
+                <a:latin typeface="微软雅黑" pitchFamily="34" charset="-122"/>
+                <a:ea typeface="微软雅黑" pitchFamily="34" charset="-122"/>
+                <a:cs typeface="+mn-cs"/>
+              </a:defRPr>
+            </a:lvl1pPr>
+            <a:lvl2pPr marL="742950" indent="-285750" algn="l" rtl="0" eaLnBrk="1" fontAlgn="base" hangingPunct="1">
+              <a:spcBef>
+                <a:spcPct val="30000"/>
+              </a:spcBef>
+              <a:spcAft>
+                <a:spcPct val="0"/>
+              </a:spcAft>
+              <a:buClr>
+                <a:schemeClr val="tx2"/>
+              </a:buClr>
+              <a:buSzPct val="85000"/>
+              <a:buFont typeface="Wingdings" pitchFamily="2" charset="2"/>
+              <a:buChar char="Ø"/>
+              <a:defRPr sz="2800">
+                <a:solidFill>
+                  <a:srgbClr val="006666"/>
+                </a:solidFill>
+                <a:latin typeface="微软雅黑" pitchFamily="34" charset="-122"/>
+                <a:ea typeface="微软雅黑" pitchFamily="34" charset="-122"/>
+              </a:defRPr>
+            </a:lvl2pPr>
+            <a:lvl3pPr marL="1143000" indent="-228600" algn="l" rtl="0" eaLnBrk="1" fontAlgn="base" hangingPunct="1">
+              <a:spcBef>
+                <a:spcPct val="30000"/>
+              </a:spcBef>
+              <a:spcAft>
+                <a:spcPct val="0"/>
+              </a:spcAft>
+              <a:buClr>
+                <a:schemeClr val="hlink"/>
+              </a:buClr>
+              <a:buSzPct val="95000"/>
+              <a:buFont typeface="Wingdings 2" pitchFamily="18" charset="2"/>
+              <a:buChar char="¡"/>
+              <a:defRPr sz="2400">
+                <a:solidFill>
+                  <a:schemeClr val="hlink"/>
+                </a:solidFill>
+                <a:latin typeface="微软雅黑" pitchFamily="34" charset="-122"/>
+                <a:ea typeface="微软雅黑" pitchFamily="34" charset="-122"/>
+              </a:defRPr>
+            </a:lvl3pPr>
+            <a:lvl4pPr marL="1600200" indent="-228600" algn="l" rtl="0" eaLnBrk="1" fontAlgn="base" hangingPunct="1">
+              <a:spcBef>
+                <a:spcPct val="30000"/>
+              </a:spcBef>
+              <a:spcAft>
+                <a:spcPct val="0"/>
+              </a:spcAft>
+              <a:buClr>
+                <a:schemeClr val="tx2"/>
+              </a:buClr>
+              <a:buSzPct val="90000"/>
+              <a:buFont typeface="Wingdings" pitchFamily="2" charset="2"/>
+              <a:buChar char="Ø"/>
+              <a:defRPr sz="2000">
+                <a:solidFill>
+                  <a:srgbClr val="990099"/>
+                </a:solidFill>
+                <a:latin typeface="微软雅黑" pitchFamily="34" charset="-122"/>
+                <a:ea typeface="微软雅黑" pitchFamily="34" charset="-122"/>
+              </a:defRPr>
+            </a:lvl4pPr>
+            <a:lvl5pPr marL="2057400" indent="-228600" algn="l" rtl="0" eaLnBrk="1" fontAlgn="base" hangingPunct="1">
+              <a:spcBef>
+                <a:spcPct val="30000"/>
+              </a:spcBef>
+              <a:spcAft>
+                <a:spcPct val="0"/>
+              </a:spcAft>
+              <a:buClr>
+                <a:schemeClr val="hlink"/>
+              </a:buClr>
+              <a:buFont typeface="Wingdings 2" pitchFamily="18" charset="2"/>
+              <a:buChar char="¡"/>
+              <a:defRPr sz="2000">
+                <a:solidFill>
+                  <a:schemeClr val="tx1"/>
+                </a:solidFill>
+                <a:latin typeface="微软雅黑" pitchFamily="34" charset="-122"/>
+                <a:ea typeface="微软雅黑" pitchFamily="34" charset="-122"/>
+              </a:defRPr>
+            </a:lvl5pPr>
+            <a:lvl6pPr marL="2514600" indent="-228600" algn="l" rtl="0" eaLnBrk="1" fontAlgn="base" hangingPunct="1">
+              <a:spcBef>
+                <a:spcPct val="30000"/>
+              </a:spcBef>
+              <a:spcAft>
+                <a:spcPct val="0"/>
+              </a:spcAft>
+              <a:buClr>
+                <a:schemeClr val="hlink"/>
+              </a:buClr>
+              <a:buFont typeface="Wingdings 2" pitchFamily="18" charset="2"/>
+              <a:buChar char="¡"/>
+              <a:defRPr sz="2000">
+                <a:solidFill>
+                  <a:schemeClr val="tx1"/>
+                </a:solidFill>
+                <a:latin typeface="+mn-lt"/>
+                <a:ea typeface="+mn-ea"/>
+              </a:defRPr>
+            </a:lvl6pPr>
+            <a:lvl7pPr marL="2971800" indent="-228600" algn="l" rtl="0" eaLnBrk="1" fontAlgn="base" hangingPunct="1">
+              <a:spcBef>
+                <a:spcPct val="30000"/>
+              </a:spcBef>
+              <a:spcAft>
+                <a:spcPct val="0"/>
+              </a:spcAft>
+              <a:buClr>
+                <a:schemeClr val="hlink"/>
+              </a:buClr>
+              <a:buFont typeface="Wingdings 2" pitchFamily="18" charset="2"/>
+              <a:buChar char="¡"/>
+              <a:defRPr sz="2000">
+                <a:solidFill>
+                  <a:schemeClr val="tx1"/>
+                </a:solidFill>
+                <a:latin typeface="+mn-lt"/>
+                <a:ea typeface="+mn-ea"/>
+              </a:defRPr>
+            </a:lvl7pPr>
+            <a:lvl8pPr marL="3429000" indent="-228600" algn="l" rtl="0" eaLnBrk="1" fontAlgn="base" hangingPunct="1">
+              <a:spcBef>
+                <a:spcPct val="30000"/>
+              </a:spcBef>
+              <a:spcAft>
+                <a:spcPct val="0"/>
+              </a:spcAft>
+              <a:buClr>
+                <a:schemeClr val="hlink"/>
+              </a:buClr>
+              <a:buFont typeface="Wingdings 2" pitchFamily="18" charset="2"/>
+              <a:buChar char="¡"/>
+              <a:defRPr sz="2000">
+                <a:solidFill>
+                  <a:schemeClr val="tx1"/>
+                </a:solidFill>
+                <a:latin typeface="+mn-lt"/>
+                <a:ea typeface="+mn-ea"/>
+              </a:defRPr>
+            </a:lvl8pPr>
+            <a:lvl9pPr marL="3886200" indent="-228600" algn="l" rtl="0" eaLnBrk="1" fontAlgn="base" hangingPunct="1">
+              <a:spcBef>
+                <a:spcPct val="30000"/>
+              </a:spcBef>
+              <a:spcAft>
+                <a:spcPct val="0"/>
+              </a:spcAft>
+              <a:buClr>
+                <a:schemeClr val="hlink"/>
+              </a:buClr>
+              <a:buFont typeface="Wingdings 2" pitchFamily="18" charset="2"/>
+              <a:buChar char="¡"/>
+              <a:defRPr sz="2000">
+                <a:solidFill>
+                  <a:schemeClr val="tx1"/>
+                </a:solidFill>
+                <a:latin typeface="+mn-lt"/>
+                <a:ea typeface="+mn-ea"/>
+              </a:defRPr>
+            </a:lvl9pPr>
+          </a:lstStyle>
+          <a:p>
+            <a:r>
+              <a:rPr lang="en-US" altLang="zh-CN" sz="2400" kern="0" dirty="0">
+                <a:latin typeface="+mn-lt"/>
+                <a:cs typeface="Times New Roman" panose="02020603050405020304" pitchFamily="18" charset="0"/>
+              </a:rPr>
+              <a:t>RETAU180</a:t>
+            </a:r>
+            <a:endParaRPr lang="en-US" altLang="zh-CN" sz="2000" kern="0" dirty="0">
+              <a:latin typeface="+mn-lt"/>
+              <a:cs typeface="Times New Roman" panose="02020603050405020304" pitchFamily="18" charset="0"/>
+            </a:endParaRPr>
+          </a:p>
+          <a:p>
+            <a:pPr lvl="1"/>
+            <a:r>
+              <a:rPr lang="en-US" altLang="zh-CN" sz="2000" dirty="0">
+                <a:latin typeface="+mn-lt"/>
+                <a:cs typeface="Times New Roman" panose="02020603050405020304" pitchFamily="18" charset="0"/>
+              </a:rPr>
+              <a:t>ACC does not influence the statistics</a:t>
+            </a:r>
+          </a:p>
+        </p:txBody>
+      </p:sp>
+      <p:pic>
+        <p:nvPicPr>
+          <p:cNvPr id="4" name="Picture 3">
+            <a:extLst>
+              <a:ext uri="{FF2B5EF4-FFF2-40B4-BE49-F238E27FC236}">
+                <a16:creationId xmlns:a16="http://schemas.microsoft.com/office/drawing/2014/main" id="{EA2324CD-E7DF-6B6E-6B48-C69B5D783DAC}"/>
+              </a:ext>
+            </a:extLst>
+          </p:cNvPr>
+          <p:cNvPicPr>
+            <a:picLocks noChangeAspect="1"/>
+          </p:cNvPicPr>
+          <p:nvPr/>
+        </p:nvPicPr>
+        <p:blipFill>
+          <a:blip r:embed="rId2"/>
+          <a:stretch>
+            <a:fillRect/>
+          </a:stretch>
+        </p:blipFill>
+        <p:spPr>
+          <a:xfrm>
+            <a:off x="1066800" y="1981200"/>
+            <a:ext cx="3200400" cy="2413247"/>
+          </a:xfrm>
+          <a:prstGeom prst="rect">
+            <a:avLst/>
+          </a:prstGeom>
+        </p:spPr>
+      </p:pic>
+      <p:pic>
+        <p:nvPicPr>
+          <p:cNvPr id="10" name="Picture 9">
+            <a:extLst>
+              <a:ext uri="{FF2B5EF4-FFF2-40B4-BE49-F238E27FC236}">
+                <a16:creationId xmlns:a16="http://schemas.microsoft.com/office/drawing/2014/main" id="{0CA86D08-19D3-8A62-9FCC-F3831C1ABD23}"/>
+              </a:ext>
+            </a:extLst>
+          </p:cNvPr>
+          <p:cNvPicPr>
+            <a:picLocks noChangeAspect="1"/>
+          </p:cNvPicPr>
+          <p:nvPr/>
+        </p:nvPicPr>
+        <p:blipFill>
+          <a:blip r:embed="rId3"/>
+          <a:stretch>
+            <a:fillRect/>
+          </a:stretch>
+        </p:blipFill>
+        <p:spPr>
+          <a:xfrm>
+            <a:off x="4267200" y="2010878"/>
+            <a:ext cx="3200400" cy="2387519"/>
+          </a:xfrm>
+          <a:prstGeom prst="rect">
+            <a:avLst/>
+          </a:prstGeom>
+        </p:spPr>
+      </p:pic>
+      <p:pic>
+        <p:nvPicPr>
+          <p:cNvPr id="13" name="Picture 12">
+            <a:extLst>
+              <a:ext uri="{FF2B5EF4-FFF2-40B4-BE49-F238E27FC236}">
+                <a16:creationId xmlns:a16="http://schemas.microsoft.com/office/drawing/2014/main" id="{A8518244-07FD-3FFE-6EF7-9A1D63919549}"/>
+              </a:ext>
+            </a:extLst>
+          </p:cNvPr>
+          <p:cNvPicPr>
+            <a:picLocks noChangeAspect="1"/>
+          </p:cNvPicPr>
+          <p:nvPr/>
+        </p:nvPicPr>
+        <p:blipFill>
+          <a:blip r:embed="rId4"/>
+          <a:stretch>
+            <a:fillRect/>
+          </a:stretch>
+        </p:blipFill>
+        <p:spPr>
+          <a:xfrm>
+            <a:off x="1066800" y="4394447"/>
+            <a:ext cx="3200400" cy="2395171"/>
+          </a:xfrm>
+          <a:prstGeom prst="rect">
+            <a:avLst/>
+          </a:prstGeom>
+        </p:spPr>
+      </p:pic>
+      <p:pic>
+        <p:nvPicPr>
+          <p:cNvPr id="15" name="Picture 14">
+            <a:extLst>
+              <a:ext uri="{FF2B5EF4-FFF2-40B4-BE49-F238E27FC236}">
+                <a16:creationId xmlns:a16="http://schemas.microsoft.com/office/drawing/2014/main" id="{5F348A18-1C96-3C4E-DE98-BA2202505C7F}"/>
+              </a:ext>
+            </a:extLst>
+          </p:cNvPr>
+          <p:cNvPicPr>
+            <a:picLocks noChangeAspect="1"/>
+          </p:cNvPicPr>
+          <p:nvPr/>
+        </p:nvPicPr>
+        <p:blipFill>
+          <a:blip r:embed="rId5"/>
+          <a:stretch>
+            <a:fillRect/>
+          </a:stretch>
+        </p:blipFill>
+        <p:spPr>
+          <a:xfrm>
+            <a:off x="4267200" y="4394447"/>
+            <a:ext cx="3200400" cy="2426277"/>
+          </a:xfrm>
+          <a:prstGeom prst="rect">
+            <a:avLst/>
+          </a:prstGeom>
+        </p:spPr>
+      </p:pic>
+    </p:spTree>
+    <p:extLst>
+      <p:ext uri="{BB962C8B-B14F-4D97-AF65-F5344CB8AC3E}">
+        <p14:creationId xmlns:p14="http://schemas.microsoft.com/office/powerpoint/2010/main" val="1699782982"/>
+      </p:ext>
+    </p:extLst>
+  </p:cSld>
+  <p:clrMapOvr>
+    <a:masterClrMapping/>
+  </p:clrMapOvr>
+  <p:transition spd="med"/>
+</p:sld>
+</file>
+
+<file path=ppt/slides/slide6.xml><?xml version="1.0" encoding="utf-8"?>
 <p:sld xmlns:a="http://schemas.openxmlformats.org/drawingml/2006/main" xmlns:r="http://schemas.openxmlformats.org/officeDocument/2006/relationships" xmlns:p="http://schemas.openxmlformats.org/presentationml/2006/main">
   <p:cSld>
     <p:spTree>
@@ -34377,7 +35831,7 @@
 </p:sld>
 </file>
 
-<file path=ppt/slides/slide6.xml><?xml version="1.0" encoding="utf-8"?>
+<file path=ppt/slides/slide7.xml><?xml version="1.0" encoding="utf-8"?>
 <p:sld xmlns:a="http://schemas.openxmlformats.org/drawingml/2006/main" xmlns:r="http://schemas.openxmlformats.org/officeDocument/2006/relationships" xmlns:p="http://schemas.openxmlformats.org/presentationml/2006/main">
   <p:cSld>
     <p:spTree>
@@ -34673,7 +36127,7 @@
 </p:sld>
 </file>
 
-<file path=ppt/slides/slide7.xml><?xml version="1.0" encoding="utf-8"?>
+<file path=ppt/slides/slide8.xml><?xml version="1.0" encoding="utf-8"?>
 <p:sld xmlns:a="http://schemas.openxmlformats.org/drawingml/2006/main" xmlns:r="http://schemas.openxmlformats.org/officeDocument/2006/relationships" xmlns:p="http://schemas.openxmlformats.org/presentationml/2006/main">
   <p:cSld>
     <p:spTree>
@@ -35069,7 +36523,7 @@
 </p:sld>
 </file>
 
-<file path=ppt/slides/slide8.xml><?xml version="1.0" encoding="utf-8"?>
+<file path=ppt/slides/slide9.xml><?xml version="1.0" encoding="utf-8"?>
 <p:sld xmlns:a="http://schemas.openxmlformats.org/drawingml/2006/main" xmlns:r="http://schemas.openxmlformats.org/officeDocument/2006/relationships" xmlns:p="http://schemas.openxmlformats.org/presentationml/2006/main">
   <p:cSld>
     <p:spTree>
@@ -35507,531 +36961,6 @@
     <p:extLst>
       <p:ext uri="{BB962C8B-B14F-4D97-AF65-F5344CB8AC3E}">
         <p14:creationId xmlns:p14="http://schemas.microsoft.com/office/powerpoint/2010/main" val="1503813011"/>
-      </p:ext>
-    </p:extLst>
-  </p:cSld>
-  <p:clrMapOvr>
-    <a:masterClrMapping/>
-  </p:clrMapOvr>
-  <p:transition spd="med" advTm="63997"/>
-</p:sld>
-</file>
-
-<file path=ppt/slides/slide9.xml><?xml version="1.0" encoding="utf-8"?>
-<p:sld xmlns:a="http://schemas.openxmlformats.org/drawingml/2006/main" xmlns:r="http://schemas.openxmlformats.org/officeDocument/2006/relationships" xmlns:p="http://schemas.openxmlformats.org/presentationml/2006/main">
-  <p:cSld>
-    <p:spTree>
-      <p:nvGrpSpPr>
-        <p:cNvPr id="1" name=""/>
-        <p:cNvGrpSpPr/>
-        <p:nvPr/>
-      </p:nvGrpSpPr>
-      <p:grpSpPr>
-        <a:xfrm>
-          <a:off x="0" y="0"/>
-          <a:ext cx="0" cy="0"/>
-          <a:chOff x="0" y="0"/>
-          <a:chExt cx="0" cy="0"/>
-        </a:xfrm>
-      </p:grpSpPr>
-      <p:sp>
-        <p:nvSpPr>
-          <p:cNvPr id="2" name="Title 1"/>
-          <p:cNvSpPr>
-            <a:spLocks noGrp="1"/>
-          </p:cNvSpPr>
-          <p:nvPr>
-            <p:ph type="title"/>
-          </p:nvPr>
-        </p:nvSpPr>
-        <p:spPr>
-          <a:xfrm>
-            <a:off x="152400" y="152400"/>
-            <a:ext cx="8610600" cy="838200"/>
-          </a:xfrm>
-        </p:spPr>
-        <p:txBody>
-          <a:bodyPr/>
-          <a:lstStyle/>
-          <a:p>
-            <a:r>
-              <a:rPr lang="en-US" altLang="zh-CN" dirty="0"/>
-              <a:t>Channel</a:t>
-            </a:r>
-            <a:endParaRPr lang="zh-CN" altLang="en-US" dirty="0"/>
-          </a:p>
-        </p:txBody>
-      </p:sp>
-      <p:sp>
-        <p:nvSpPr>
-          <p:cNvPr id="9" name="Rectangle 2"/>
-          <p:cNvSpPr>
-            <a:spLocks noChangeArrowheads="1"/>
-          </p:cNvSpPr>
-          <p:nvPr/>
-        </p:nvSpPr>
-        <p:spPr bwMode="auto">
-          <a:xfrm>
-            <a:off x="0" y="0"/>
-            <a:ext cx="9144000" cy="0"/>
-          </a:xfrm>
-          <a:prstGeom prst="rect">
-            <a:avLst/>
-          </a:prstGeom>
-          <a:noFill/>
-          <a:ln>
-            <a:noFill/>
-          </a:ln>
-          <a:effectLst/>
-          <a:extLst>
-            <a:ext uri="{909E8E84-426E-40DD-AFC4-6F175D3DCCD1}">
-              <a14:hiddenFill xmlns:a14="http://schemas.microsoft.com/office/drawing/2010/main">
-                <a:solidFill>
-                  <a:schemeClr val="accent1"/>
-                </a:solidFill>
-              </a14:hiddenFill>
-            </a:ext>
-            <a:ext uri="{91240B29-F687-4F45-9708-019B960494DF}">
-              <a14:hiddenLine xmlns:a14="http://schemas.microsoft.com/office/drawing/2010/main" w="9525">
-                <a:solidFill>
-                  <a:schemeClr val="tx1"/>
-                </a:solidFill>
-                <a:miter lim="800000"/>
-                <a:headEnd/>
-                <a:tailEnd/>
-              </a14:hiddenLine>
-            </a:ext>
-            <a:ext uri="{AF507438-7753-43E0-B8FC-AC1667EBCBE1}">
-              <a14:hiddenEffects xmlns:a14="http://schemas.microsoft.com/office/drawing/2010/main">
-                <a:effectLst>
-                  <a:outerShdw dist="35921" dir="2700000" algn="ctr" rotWithShape="0">
-                    <a:schemeClr val="bg2"/>
-                  </a:outerShdw>
-                </a:effectLst>
-              </a14:hiddenEffects>
-            </a:ext>
-          </a:extLst>
-        </p:spPr>
-        <p:txBody>
-          <a:bodyPr vert="horz" wrap="none" lIns="91440" tIns="45720" rIns="91440" bIns="45720" numCol="1" anchor="ctr" anchorCtr="0" compatLnSpc="1">
-            <a:prstTxWarp prst="textNoShape">
-              <a:avLst/>
-            </a:prstTxWarp>
-            <a:spAutoFit/>
-          </a:bodyPr>
-          <a:lstStyle/>
-          <a:p>
-            <a:endParaRPr lang="zh-CN" altLang="en-US"/>
-          </a:p>
-        </p:txBody>
-      </p:sp>
-      <p:sp>
-        <p:nvSpPr>
-          <p:cNvPr id="18" name="内容占位符 2">
-            <a:extLst>
-              <a:ext uri="{FF2B5EF4-FFF2-40B4-BE49-F238E27FC236}">
-                <a16:creationId xmlns:a16="http://schemas.microsoft.com/office/drawing/2014/main" id="{5B83F688-3AAF-6E92-D5A4-B8DCA97B9756}"/>
-              </a:ext>
-            </a:extLst>
-          </p:cNvPr>
-          <p:cNvSpPr txBox="1">
-            <a:spLocks/>
-          </p:cNvSpPr>
-          <p:nvPr/>
-        </p:nvSpPr>
-        <p:spPr bwMode="auto">
-          <a:xfrm>
-            <a:off x="93652" y="1068111"/>
-            <a:ext cx="9050348" cy="1446487"/>
-          </a:xfrm>
-          <a:prstGeom prst="rect">
-            <a:avLst/>
-          </a:prstGeom>
-          <a:noFill/>
-          <a:ln>
-            <a:noFill/>
-          </a:ln>
-          <a:extLst>
-            <a:ext uri="{909E8E84-426E-40DD-AFC4-6F175D3DCCD1}">
-              <a14:hiddenFill xmlns:a14="http://schemas.microsoft.com/office/drawing/2010/main">
-                <a:solidFill>
-                  <a:srgbClr val="FFFFFF"/>
-                </a:solidFill>
-              </a14:hiddenFill>
-            </a:ext>
-            <a:ext uri="{91240B29-F687-4F45-9708-019B960494DF}">
-              <a14:hiddenLine xmlns:a14="http://schemas.microsoft.com/office/drawing/2010/main" w="28575">
-                <a:solidFill>
-                  <a:srgbClr val="000000"/>
-                </a:solidFill>
-                <a:miter lim="800000"/>
-                <a:headEnd/>
-                <a:tailEnd/>
-              </a14:hiddenLine>
-            </a:ext>
-          </a:extLst>
-        </p:spPr>
-        <p:txBody>
-          <a:bodyPr vert="horz" wrap="square" lIns="91440" tIns="45720" rIns="91440" bIns="45720" numCol="1" anchor="t" anchorCtr="0" compatLnSpc="1">
-            <a:prstTxWarp prst="textNoShape">
-              <a:avLst/>
-            </a:prstTxWarp>
-          </a:bodyPr>
-          <a:lstStyle>
-            <a:lvl1pPr marL="342900" indent="-342900" algn="l" rtl="0" eaLnBrk="1" fontAlgn="base" hangingPunct="1">
-              <a:spcBef>
-                <a:spcPct val="30000"/>
-              </a:spcBef>
-              <a:spcAft>
-                <a:spcPct val="0"/>
-              </a:spcAft>
-              <a:buClr>
-                <a:schemeClr val="hlink"/>
-              </a:buClr>
-              <a:buFont typeface="Wingdings" pitchFamily="2" charset="2"/>
-              <a:buChar char="§"/>
-              <a:defRPr sz="3200">
-                <a:solidFill>
-                  <a:srgbClr val="000066"/>
-                </a:solidFill>
-                <a:latin typeface="微软雅黑" pitchFamily="34" charset="-122"/>
-                <a:ea typeface="微软雅黑" pitchFamily="34" charset="-122"/>
-                <a:cs typeface="+mn-cs"/>
-              </a:defRPr>
-            </a:lvl1pPr>
-            <a:lvl2pPr marL="742950" indent="-285750" algn="l" rtl="0" eaLnBrk="1" fontAlgn="base" hangingPunct="1">
-              <a:spcBef>
-                <a:spcPct val="30000"/>
-              </a:spcBef>
-              <a:spcAft>
-                <a:spcPct val="0"/>
-              </a:spcAft>
-              <a:buClr>
-                <a:schemeClr val="tx2"/>
-              </a:buClr>
-              <a:buSzPct val="85000"/>
-              <a:buFont typeface="Wingdings" pitchFamily="2" charset="2"/>
-              <a:buChar char="Ø"/>
-              <a:defRPr sz="2800">
-                <a:solidFill>
-                  <a:srgbClr val="006666"/>
-                </a:solidFill>
-                <a:latin typeface="微软雅黑" pitchFamily="34" charset="-122"/>
-                <a:ea typeface="微软雅黑" pitchFamily="34" charset="-122"/>
-              </a:defRPr>
-            </a:lvl2pPr>
-            <a:lvl3pPr marL="1143000" indent="-228600" algn="l" rtl="0" eaLnBrk="1" fontAlgn="base" hangingPunct="1">
-              <a:spcBef>
-                <a:spcPct val="30000"/>
-              </a:spcBef>
-              <a:spcAft>
-                <a:spcPct val="0"/>
-              </a:spcAft>
-              <a:buClr>
-                <a:schemeClr val="hlink"/>
-              </a:buClr>
-              <a:buSzPct val="95000"/>
-              <a:buFont typeface="Wingdings 2" pitchFamily="18" charset="2"/>
-              <a:buChar char="¡"/>
-              <a:defRPr sz="2400">
-                <a:solidFill>
-                  <a:schemeClr val="hlink"/>
-                </a:solidFill>
-                <a:latin typeface="微软雅黑" pitchFamily="34" charset="-122"/>
-                <a:ea typeface="微软雅黑" pitchFamily="34" charset="-122"/>
-              </a:defRPr>
-            </a:lvl3pPr>
-            <a:lvl4pPr marL="1600200" indent="-228600" algn="l" rtl="0" eaLnBrk="1" fontAlgn="base" hangingPunct="1">
-              <a:spcBef>
-                <a:spcPct val="30000"/>
-              </a:spcBef>
-              <a:spcAft>
-                <a:spcPct val="0"/>
-              </a:spcAft>
-              <a:buClr>
-                <a:schemeClr val="tx2"/>
-              </a:buClr>
-              <a:buSzPct val="90000"/>
-              <a:buFont typeface="Wingdings" pitchFamily="2" charset="2"/>
-              <a:buChar char="Ø"/>
-              <a:defRPr sz="2000">
-                <a:solidFill>
-                  <a:srgbClr val="990099"/>
-                </a:solidFill>
-                <a:latin typeface="微软雅黑" pitchFamily="34" charset="-122"/>
-                <a:ea typeface="微软雅黑" pitchFamily="34" charset="-122"/>
-              </a:defRPr>
-            </a:lvl4pPr>
-            <a:lvl5pPr marL="2057400" indent="-228600" algn="l" rtl="0" eaLnBrk="1" fontAlgn="base" hangingPunct="1">
-              <a:spcBef>
-                <a:spcPct val="30000"/>
-              </a:spcBef>
-              <a:spcAft>
-                <a:spcPct val="0"/>
-              </a:spcAft>
-              <a:buClr>
-                <a:schemeClr val="hlink"/>
-              </a:buClr>
-              <a:buFont typeface="Wingdings 2" pitchFamily="18" charset="2"/>
-              <a:buChar char="¡"/>
-              <a:defRPr sz="2000">
-                <a:solidFill>
-                  <a:schemeClr val="tx1"/>
-                </a:solidFill>
-                <a:latin typeface="微软雅黑" pitchFamily="34" charset="-122"/>
-                <a:ea typeface="微软雅黑" pitchFamily="34" charset="-122"/>
-              </a:defRPr>
-            </a:lvl5pPr>
-            <a:lvl6pPr marL="2514600" indent="-228600" algn="l" rtl="0" eaLnBrk="1" fontAlgn="base" hangingPunct="1">
-              <a:spcBef>
-                <a:spcPct val="30000"/>
-              </a:spcBef>
-              <a:spcAft>
-                <a:spcPct val="0"/>
-              </a:spcAft>
-              <a:buClr>
-                <a:schemeClr val="hlink"/>
-              </a:buClr>
-              <a:buFont typeface="Wingdings 2" pitchFamily="18" charset="2"/>
-              <a:buChar char="¡"/>
-              <a:defRPr sz="2000">
-                <a:solidFill>
-                  <a:schemeClr val="tx1"/>
-                </a:solidFill>
-                <a:latin typeface="+mn-lt"/>
-                <a:ea typeface="+mn-ea"/>
-              </a:defRPr>
-            </a:lvl6pPr>
-            <a:lvl7pPr marL="2971800" indent="-228600" algn="l" rtl="0" eaLnBrk="1" fontAlgn="base" hangingPunct="1">
-              <a:spcBef>
-                <a:spcPct val="30000"/>
-              </a:spcBef>
-              <a:spcAft>
-                <a:spcPct val="0"/>
-              </a:spcAft>
-              <a:buClr>
-                <a:schemeClr val="hlink"/>
-              </a:buClr>
-              <a:buFont typeface="Wingdings 2" pitchFamily="18" charset="2"/>
-              <a:buChar char="¡"/>
-              <a:defRPr sz="2000">
-                <a:solidFill>
-                  <a:schemeClr val="tx1"/>
-                </a:solidFill>
-                <a:latin typeface="+mn-lt"/>
-                <a:ea typeface="+mn-ea"/>
-              </a:defRPr>
-            </a:lvl7pPr>
-            <a:lvl8pPr marL="3429000" indent="-228600" algn="l" rtl="0" eaLnBrk="1" fontAlgn="base" hangingPunct="1">
-              <a:spcBef>
-                <a:spcPct val="30000"/>
-              </a:spcBef>
-              <a:spcAft>
-                <a:spcPct val="0"/>
-              </a:spcAft>
-              <a:buClr>
-                <a:schemeClr val="hlink"/>
-              </a:buClr>
-              <a:buFont typeface="Wingdings 2" pitchFamily="18" charset="2"/>
-              <a:buChar char="¡"/>
-              <a:defRPr sz="2000">
-                <a:solidFill>
-                  <a:schemeClr val="tx1"/>
-                </a:solidFill>
-                <a:latin typeface="+mn-lt"/>
-                <a:ea typeface="+mn-ea"/>
-              </a:defRPr>
-            </a:lvl8pPr>
-            <a:lvl9pPr marL="3886200" indent="-228600" algn="l" rtl="0" eaLnBrk="1" fontAlgn="base" hangingPunct="1">
-              <a:spcBef>
-                <a:spcPct val="30000"/>
-              </a:spcBef>
-              <a:spcAft>
-                <a:spcPct val="0"/>
-              </a:spcAft>
-              <a:buClr>
-                <a:schemeClr val="hlink"/>
-              </a:buClr>
-              <a:buFont typeface="Wingdings 2" pitchFamily="18" charset="2"/>
-              <a:buChar char="¡"/>
-              <a:defRPr sz="2000">
-                <a:solidFill>
-                  <a:schemeClr val="tx1"/>
-                </a:solidFill>
-                <a:latin typeface="+mn-lt"/>
-                <a:ea typeface="+mn-ea"/>
-              </a:defRPr>
-            </a:lvl9pPr>
-          </a:lstStyle>
-          <a:p>
-            <a:r>
-              <a:rPr lang="en-US" altLang="zh-CN" sz="2400" kern="0" dirty="0">
-                <a:latin typeface="+mn-lt"/>
-                <a:cs typeface="Times New Roman" panose="02020603050405020304" pitchFamily="18" charset="0"/>
-              </a:rPr>
-              <a:t>RETAU5200</a:t>
-            </a:r>
-            <a:endParaRPr lang="en-US" altLang="zh-CN" sz="2000" kern="0" dirty="0">
-              <a:latin typeface="+mn-lt"/>
-              <a:cs typeface="Times New Roman" panose="02020603050405020304" pitchFamily="18" charset="0"/>
-            </a:endParaRPr>
-          </a:p>
-          <a:p>
-            <a:pPr lvl="1"/>
-            <a:r>
-              <a:rPr lang="en-US" altLang="zh-CN" sz="2000" dirty="0">
-                <a:latin typeface="+mn-lt"/>
-                <a:cs typeface="Times New Roman" panose="02020603050405020304" pitchFamily="18" charset="0"/>
-              </a:rPr>
-              <a:t>Neither Neumann nor wall model yields acceptable profiles</a:t>
-            </a:r>
-          </a:p>
-          <a:p>
-            <a:pPr lvl="1"/>
-            <a:r>
-              <a:rPr lang="en-US" altLang="zh-CN" sz="2000" kern="0" dirty="0">
-                <a:latin typeface="+mn-lt"/>
-                <a:cs typeface="Times New Roman" panose="02020603050405020304" pitchFamily="18" charset="0"/>
-              </a:rPr>
-              <a:t>Resolutions are insufficient</a:t>
-            </a:r>
-          </a:p>
-        </p:txBody>
-      </p:sp>
-      <p:pic>
-        <p:nvPicPr>
-          <p:cNvPr id="8" name="Picture 7">
-            <a:extLst>
-              <a:ext uri="{FF2B5EF4-FFF2-40B4-BE49-F238E27FC236}">
-                <a16:creationId xmlns:a16="http://schemas.microsoft.com/office/drawing/2014/main" id="{9A407A00-2EDD-F2E4-D7E8-2AAB53D81723}"/>
-              </a:ext>
-            </a:extLst>
-          </p:cNvPr>
-          <p:cNvPicPr>
-            <a:picLocks noChangeAspect="1"/>
-          </p:cNvPicPr>
-          <p:nvPr/>
-        </p:nvPicPr>
-        <p:blipFill>
-          <a:blip r:embed="rId3"/>
-          <a:stretch>
-            <a:fillRect/>
-          </a:stretch>
-        </p:blipFill>
-        <p:spPr>
-          <a:xfrm>
-            <a:off x="4191000" y="2618643"/>
-            <a:ext cx="3200400" cy="2410557"/>
-          </a:xfrm>
-          <a:prstGeom prst="rect">
-            <a:avLst/>
-          </a:prstGeom>
-        </p:spPr>
-      </p:pic>
-      <p:pic>
-        <p:nvPicPr>
-          <p:cNvPr id="11" name="Picture 10">
-            <a:extLst>
-              <a:ext uri="{FF2B5EF4-FFF2-40B4-BE49-F238E27FC236}">
-                <a16:creationId xmlns:a16="http://schemas.microsoft.com/office/drawing/2014/main" id="{EE43C99D-87F0-BDA6-6BBC-EDCE9C3EEC27}"/>
-              </a:ext>
-            </a:extLst>
-          </p:cNvPr>
-          <p:cNvPicPr>
-            <a:picLocks noChangeAspect="1"/>
-          </p:cNvPicPr>
-          <p:nvPr/>
-        </p:nvPicPr>
-        <p:blipFill>
-          <a:blip r:embed="rId4"/>
-          <a:stretch>
-            <a:fillRect/>
-          </a:stretch>
-        </p:blipFill>
-        <p:spPr>
-          <a:xfrm>
-            <a:off x="990600" y="2607437"/>
-            <a:ext cx="3200400" cy="2405429"/>
-          </a:xfrm>
-          <a:prstGeom prst="rect">
-            <a:avLst/>
-          </a:prstGeom>
-        </p:spPr>
-      </p:pic>
-      <p:sp>
-        <p:nvSpPr>
-          <p:cNvPr id="3" name="TextBox 2">
-            <a:extLst>
-              <a:ext uri="{FF2B5EF4-FFF2-40B4-BE49-F238E27FC236}">
-                <a16:creationId xmlns:a16="http://schemas.microsoft.com/office/drawing/2014/main" id="{CEFC1CA4-6BDA-687A-BF4B-114098DF5FEC}"/>
-              </a:ext>
-            </a:extLst>
-          </p:cNvPr>
-          <p:cNvSpPr txBox="1"/>
-          <p:nvPr/>
-        </p:nvSpPr>
-        <p:spPr>
-          <a:xfrm>
-            <a:off x="4394792" y="2923905"/>
-            <a:ext cx="1184940" cy="369332"/>
-          </a:xfrm>
-          <a:prstGeom prst="rect">
-            <a:avLst/>
-          </a:prstGeom>
-          <a:noFill/>
-        </p:spPr>
-        <p:txBody>
-          <a:bodyPr wrap="none" rtlCol="0">
-            <a:spAutoFit/>
-          </a:bodyPr>
-          <a:lstStyle/>
-          <a:p>
-            <a:r>
-              <a:rPr lang="en-US" dirty="0"/>
-              <a:t>Neumann</a:t>
-            </a:r>
-          </a:p>
-        </p:txBody>
-      </p:sp>
-      <p:sp>
-        <p:nvSpPr>
-          <p:cNvPr id="4" name="TextBox 3">
-            <a:extLst>
-              <a:ext uri="{FF2B5EF4-FFF2-40B4-BE49-F238E27FC236}">
-                <a16:creationId xmlns:a16="http://schemas.microsoft.com/office/drawing/2014/main" id="{1312CB8D-E9F5-FF1E-4ED8-D2F0EB944E34}"/>
-              </a:ext>
-            </a:extLst>
-          </p:cNvPr>
-          <p:cNvSpPr txBox="1"/>
-          <p:nvPr/>
-        </p:nvSpPr>
-        <p:spPr>
-          <a:xfrm>
-            <a:off x="1194392" y="2893935"/>
-            <a:ext cx="1317412" cy="369332"/>
-          </a:xfrm>
-          <a:prstGeom prst="rect">
-            <a:avLst/>
-          </a:prstGeom>
-          <a:noFill/>
-        </p:spPr>
-        <p:txBody>
-          <a:bodyPr wrap="none" rtlCol="0">
-            <a:spAutoFit/>
-          </a:bodyPr>
-          <a:lstStyle/>
-          <a:p>
-            <a:r>
-              <a:rPr lang="en-US" dirty="0"/>
-              <a:t>Wall model</a:t>
-            </a:r>
-          </a:p>
-        </p:txBody>
-      </p:sp>
-    </p:spTree>
-    <p:extLst>
-      <p:ext uri="{BB962C8B-B14F-4D97-AF65-F5344CB8AC3E}">
-        <p14:creationId xmlns:p14="http://schemas.microsoft.com/office/powerpoint/2010/main" val="1039208005"/>
       </p:ext>
     </p:extLst>
   </p:cSld>

</xml_diff>

<commit_message>
various minor changes. no major functions added
</commit_message>
<xml_diff>
--- a/docs/vv.pptx
+++ b/docs/vv.pptx
@@ -5,10 +5,10 @@
     <p:sldMasterId id="2147483660" r:id="rId1"/>
   </p:sldMasterIdLst>
   <p:notesMasterIdLst>
-    <p:notesMasterId r:id="rId31"/>
+    <p:notesMasterId r:id="rId32"/>
   </p:notesMasterIdLst>
   <p:handoutMasterIdLst>
-    <p:handoutMasterId r:id="rId32"/>
+    <p:handoutMasterId r:id="rId33"/>
   </p:handoutMasterIdLst>
   <p:sldIdLst>
     <p:sldId id="256" r:id="rId2"/>
@@ -20,26 +20,27 @@
     <p:sldId id="666" r:id="rId8"/>
     <p:sldId id="677" r:id="rId9"/>
     <p:sldId id="682" r:id="rId10"/>
-    <p:sldId id="650" r:id="rId11"/>
-    <p:sldId id="667" r:id="rId12"/>
-    <p:sldId id="679" r:id="rId13"/>
-    <p:sldId id="681" r:id="rId14"/>
-    <p:sldId id="645" r:id="rId15"/>
-    <p:sldId id="658" r:id="rId16"/>
-    <p:sldId id="669" r:id="rId17"/>
-    <p:sldId id="673" r:id="rId18"/>
-    <p:sldId id="661" r:id="rId19"/>
-    <p:sldId id="662" r:id="rId20"/>
-    <p:sldId id="676" r:id="rId21"/>
-    <p:sldId id="663" r:id="rId22"/>
-    <p:sldId id="678" r:id="rId23"/>
-    <p:sldId id="668" r:id="rId24"/>
-    <p:sldId id="670" r:id="rId25"/>
-    <p:sldId id="664" r:id="rId26"/>
-    <p:sldId id="675" r:id="rId27"/>
-    <p:sldId id="655" r:id="rId28"/>
-    <p:sldId id="649" r:id="rId29"/>
-    <p:sldId id="680" r:id="rId30"/>
+    <p:sldId id="684" r:id="rId11"/>
+    <p:sldId id="650" r:id="rId12"/>
+    <p:sldId id="667" r:id="rId13"/>
+    <p:sldId id="679" r:id="rId14"/>
+    <p:sldId id="681" r:id="rId15"/>
+    <p:sldId id="645" r:id="rId16"/>
+    <p:sldId id="658" r:id="rId17"/>
+    <p:sldId id="669" r:id="rId18"/>
+    <p:sldId id="673" r:id="rId19"/>
+    <p:sldId id="661" r:id="rId20"/>
+    <p:sldId id="662" r:id="rId21"/>
+    <p:sldId id="676" r:id="rId22"/>
+    <p:sldId id="663" r:id="rId23"/>
+    <p:sldId id="678" r:id="rId24"/>
+    <p:sldId id="668" r:id="rId25"/>
+    <p:sldId id="670" r:id="rId26"/>
+    <p:sldId id="664" r:id="rId27"/>
+    <p:sldId id="675" r:id="rId28"/>
+    <p:sldId id="655" r:id="rId29"/>
+    <p:sldId id="649" r:id="rId30"/>
+    <p:sldId id="680" r:id="rId31"/>
   </p:sldIdLst>
   <p:sldSz cx="9144000" cy="6858000" type="screen4x3"/>
   <p:notesSz cx="6797675" cy="9931400"/>
@@ -856,7 +857,7 @@
     </p:spTree>
     <p:extLst>
       <p:ext uri="{BB962C8B-B14F-4D97-AF65-F5344CB8AC3E}">
-        <p14:creationId xmlns:p14="http://schemas.microsoft.com/office/powerpoint/2010/main" val="3305118987"/>
+        <p14:creationId xmlns:p14="http://schemas.microsoft.com/office/powerpoint/2010/main" val="1728248813"/>
       </p:ext>
     </p:extLst>
   </p:cSld>
@@ -871,7 +872,13 @@
   <p:cSld>
     <p:spTree>
       <p:nvGrpSpPr>
-        <p:cNvPr id="1" name=""/>
+        <p:cNvPr id="1" name="">
+          <a:extLst>
+            <a:ext uri="{FF2B5EF4-FFF2-40B4-BE49-F238E27FC236}">
+              <a16:creationId xmlns:a16="http://schemas.microsoft.com/office/drawing/2014/main" id="{9BBB1A3A-0F8B-8CC4-7B65-DD508165D59C}"/>
+            </a:ext>
+          </a:extLst>
+        </p:cNvPr>
         <p:cNvGrpSpPr/>
         <p:nvPr/>
       </p:nvGrpSpPr>
@@ -885,7 +892,13 @@
       </p:grpSpPr>
       <p:sp>
         <p:nvSpPr>
-          <p:cNvPr id="2" name="Slide Image Placeholder 1"/>
+          <p:cNvPr id="2" name="Slide Image Placeholder 1">
+            <a:extLst>
+              <a:ext uri="{FF2B5EF4-FFF2-40B4-BE49-F238E27FC236}">
+                <a16:creationId xmlns:a16="http://schemas.microsoft.com/office/drawing/2014/main" id="{8C48DF48-D2FF-8B3B-980F-E738BE820377}"/>
+              </a:ext>
+            </a:extLst>
+          </p:cNvPr>
           <p:cNvSpPr>
             <a:spLocks noGrp="1" noRot="1" noChangeAspect="1"/>
           </p:cNvSpPr>
@@ -897,7 +910,13 @@
       </p:sp>
       <p:sp>
         <p:nvSpPr>
-          <p:cNvPr id="3" name="Notes Placeholder 2"/>
+          <p:cNvPr id="3" name="Notes Placeholder 2">
+            <a:extLst>
+              <a:ext uri="{FF2B5EF4-FFF2-40B4-BE49-F238E27FC236}">
+                <a16:creationId xmlns:a16="http://schemas.microsoft.com/office/drawing/2014/main" id="{8F5F6223-BF06-5DCF-0E5F-9568F632C461}"/>
+              </a:ext>
+            </a:extLst>
+          </p:cNvPr>
           <p:cNvSpPr>
             <a:spLocks noGrp="1"/>
           </p:cNvSpPr>
@@ -910,16 +929,19 @@
           <a:bodyPr/>
           <a:lstStyle/>
           <a:p>
-            <a:pPr marL="0" indent="0">
-              <a:buNone/>
-            </a:pPr>
             <a:endParaRPr lang="en-US" dirty="0"/>
           </a:p>
         </p:txBody>
       </p:sp>
       <p:sp>
         <p:nvSpPr>
-          <p:cNvPr id="4" name="Slide Number Placeholder 3"/>
+          <p:cNvPr id="4" name="Slide Number Placeholder 3">
+            <a:extLst>
+              <a:ext uri="{FF2B5EF4-FFF2-40B4-BE49-F238E27FC236}">
+                <a16:creationId xmlns:a16="http://schemas.microsoft.com/office/drawing/2014/main" id="{E2AC06BD-499A-7408-23DF-16318FDE3CFF}"/>
+              </a:ext>
+            </a:extLst>
+          </p:cNvPr>
           <p:cNvSpPr>
             <a:spLocks noGrp="1"/>
           </p:cNvSpPr>
@@ -943,7 +965,7 @@
     </p:spTree>
     <p:extLst>
       <p:ext uri="{BB962C8B-B14F-4D97-AF65-F5344CB8AC3E}">
-        <p14:creationId xmlns:p14="http://schemas.microsoft.com/office/powerpoint/2010/main" val="2859619452"/>
+        <p14:creationId xmlns:p14="http://schemas.microsoft.com/office/powerpoint/2010/main" val="3305118987"/>
       </p:ext>
     </p:extLst>
   </p:cSld>
@@ -1030,7 +1052,7 @@
     </p:spTree>
     <p:extLst>
       <p:ext uri="{BB962C8B-B14F-4D97-AF65-F5344CB8AC3E}">
-        <p14:creationId xmlns:p14="http://schemas.microsoft.com/office/powerpoint/2010/main" val="903497370"/>
+        <p14:creationId xmlns:p14="http://schemas.microsoft.com/office/powerpoint/2010/main" val="2859619452"/>
       </p:ext>
     </p:extLst>
   </p:cSld>
@@ -1117,7 +1139,7 @@
     </p:spTree>
     <p:extLst>
       <p:ext uri="{BB962C8B-B14F-4D97-AF65-F5344CB8AC3E}">
-        <p14:creationId xmlns:p14="http://schemas.microsoft.com/office/powerpoint/2010/main" val="463014086"/>
+        <p14:creationId xmlns:p14="http://schemas.microsoft.com/office/powerpoint/2010/main" val="903497370"/>
       </p:ext>
     </p:extLst>
   </p:cSld>
@@ -1204,7 +1226,7 @@
     </p:spTree>
     <p:extLst>
       <p:ext uri="{BB962C8B-B14F-4D97-AF65-F5344CB8AC3E}">
-        <p14:creationId xmlns:p14="http://schemas.microsoft.com/office/powerpoint/2010/main" val="3705224790"/>
+        <p14:creationId xmlns:p14="http://schemas.microsoft.com/office/powerpoint/2010/main" val="463014086"/>
       </p:ext>
     </p:extLst>
   </p:cSld>
@@ -1291,7 +1313,7 @@
     </p:spTree>
     <p:extLst>
       <p:ext uri="{BB962C8B-B14F-4D97-AF65-F5344CB8AC3E}">
-        <p14:creationId xmlns:p14="http://schemas.microsoft.com/office/powerpoint/2010/main" val="104754045"/>
+        <p14:creationId xmlns:p14="http://schemas.microsoft.com/office/powerpoint/2010/main" val="3705224790"/>
       </p:ext>
     </p:extLst>
   </p:cSld>
@@ -1378,7 +1400,7 @@
     </p:spTree>
     <p:extLst>
       <p:ext uri="{BB962C8B-B14F-4D97-AF65-F5344CB8AC3E}">
-        <p14:creationId xmlns:p14="http://schemas.microsoft.com/office/powerpoint/2010/main" val="9479848"/>
+        <p14:creationId xmlns:p14="http://schemas.microsoft.com/office/powerpoint/2010/main" val="104754045"/>
       </p:ext>
     </p:extLst>
   </p:cSld>
@@ -1465,7 +1487,7 @@
     </p:spTree>
     <p:extLst>
       <p:ext uri="{BB962C8B-B14F-4D97-AF65-F5344CB8AC3E}">
-        <p14:creationId xmlns:p14="http://schemas.microsoft.com/office/powerpoint/2010/main" val="1390806527"/>
+        <p14:creationId xmlns:p14="http://schemas.microsoft.com/office/powerpoint/2010/main" val="9479848"/>
       </p:ext>
     </p:extLst>
   </p:cSld>
@@ -1552,7 +1574,7 @@
     </p:spTree>
     <p:extLst>
       <p:ext uri="{BB962C8B-B14F-4D97-AF65-F5344CB8AC3E}">
-        <p14:creationId xmlns:p14="http://schemas.microsoft.com/office/powerpoint/2010/main" val="2934220991"/>
+        <p14:creationId xmlns:p14="http://schemas.microsoft.com/office/powerpoint/2010/main" val="1390806527"/>
       </p:ext>
     </p:extLst>
   </p:cSld>
@@ -1639,7 +1661,7 @@
     </p:spTree>
     <p:extLst>
       <p:ext uri="{BB962C8B-B14F-4D97-AF65-F5344CB8AC3E}">
-        <p14:creationId xmlns:p14="http://schemas.microsoft.com/office/powerpoint/2010/main" val="2977735411"/>
+        <p14:creationId xmlns:p14="http://schemas.microsoft.com/office/powerpoint/2010/main" val="2934220991"/>
       </p:ext>
     </p:extLst>
   </p:cSld>
@@ -1825,7 +1847,7 @@
           <a:p>
             <a:fld id="{FFA5E540-6D76-429F-95AD-C7F13B3CAC82}" type="slidenum">
               <a:rPr lang="en-US" smtClean="0"/>
-              <a:t>25</a:t>
+              <a:t>23</a:t>
             </a:fld>
             <a:endParaRPr lang="en-US" dirty="0"/>
           </a:p>
@@ -1834,7 +1856,7 @@
     </p:spTree>
     <p:extLst>
       <p:ext uri="{BB962C8B-B14F-4D97-AF65-F5344CB8AC3E}">
-        <p14:creationId xmlns:p14="http://schemas.microsoft.com/office/powerpoint/2010/main" val="2519188471"/>
+        <p14:creationId xmlns:p14="http://schemas.microsoft.com/office/powerpoint/2010/main" val="2977735411"/>
       </p:ext>
     </p:extLst>
   </p:cSld>
@@ -1921,6 +1943,93 @@
     </p:spTree>
     <p:extLst>
       <p:ext uri="{BB962C8B-B14F-4D97-AF65-F5344CB8AC3E}">
+        <p14:creationId xmlns:p14="http://schemas.microsoft.com/office/powerpoint/2010/main" val="2519188471"/>
+      </p:ext>
+    </p:extLst>
+  </p:cSld>
+  <p:clrMapOvr>
+    <a:masterClrMapping/>
+  </p:clrMapOvr>
+</p:notes>
+</file>
+
+<file path=ppt/notesSlides/notesSlide22.xml><?xml version="1.0" encoding="utf-8"?>
+<p:notes xmlns:a="http://schemas.openxmlformats.org/drawingml/2006/main" xmlns:r="http://schemas.openxmlformats.org/officeDocument/2006/relationships" xmlns:p="http://schemas.openxmlformats.org/presentationml/2006/main">
+  <p:cSld>
+    <p:spTree>
+      <p:nvGrpSpPr>
+        <p:cNvPr id="1" name=""/>
+        <p:cNvGrpSpPr/>
+        <p:nvPr/>
+      </p:nvGrpSpPr>
+      <p:grpSpPr>
+        <a:xfrm>
+          <a:off x="0" y="0"/>
+          <a:ext cx="0" cy="0"/>
+          <a:chOff x="0" y="0"/>
+          <a:chExt cx="0" cy="0"/>
+        </a:xfrm>
+      </p:grpSpPr>
+      <p:sp>
+        <p:nvSpPr>
+          <p:cNvPr id="2" name="Slide Image Placeholder 1"/>
+          <p:cNvSpPr>
+            <a:spLocks noGrp="1" noRot="1" noChangeAspect="1"/>
+          </p:cNvSpPr>
+          <p:nvPr>
+            <p:ph type="sldImg"/>
+          </p:nvPr>
+        </p:nvSpPr>
+        <p:spPr/>
+      </p:sp>
+      <p:sp>
+        <p:nvSpPr>
+          <p:cNvPr id="3" name="Notes Placeholder 2"/>
+          <p:cNvSpPr>
+            <a:spLocks noGrp="1"/>
+          </p:cNvSpPr>
+          <p:nvPr>
+            <p:ph type="body" idx="1"/>
+          </p:nvPr>
+        </p:nvSpPr>
+        <p:spPr/>
+        <p:txBody>
+          <a:bodyPr/>
+          <a:lstStyle/>
+          <a:p>
+            <a:pPr marL="0" indent="0">
+              <a:buNone/>
+            </a:pPr>
+            <a:endParaRPr lang="en-US" dirty="0"/>
+          </a:p>
+        </p:txBody>
+      </p:sp>
+      <p:sp>
+        <p:nvSpPr>
+          <p:cNvPr id="4" name="Slide Number Placeholder 3"/>
+          <p:cNvSpPr>
+            <a:spLocks noGrp="1"/>
+          </p:cNvSpPr>
+          <p:nvPr>
+            <p:ph type="sldNum" sz="quarter" idx="10"/>
+          </p:nvPr>
+        </p:nvSpPr>
+        <p:spPr/>
+        <p:txBody>
+          <a:bodyPr/>
+          <a:lstStyle/>
+          <a:p>
+            <a:fld id="{FFA5E540-6D76-429F-95AD-C7F13B3CAC82}" type="slidenum">
+              <a:rPr lang="en-US" smtClean="0"/>
+              <a:t>27</a:t>
+            </a:fld>
+            <a:endParaRPr lang="en-US" dirty="0"/>
+          </a:p>
+        </p:txBody>
+      </p:sp>
+    </p:spTree>
+    <p:extLst>
+      <p:ext uri="{BB962C8B-B14F-4D97-AF65-F5344CB8AC3E}">
         <p14:creationId xmlns:p14="http://schemas.microsoft.com/office/powerpoint/2010/main" val="3841435580"/>
       </p:ext>
     </p:extLst>
@@ -1931,7 +2040,7 @@
 </p:notes>
 </file>
 
-<file path=ppt/notesSlides/notesSlide22.xml><?xml version="1.0" encoding="utf-8"?>
+<file path=ppt/notesSlides/notesSlide23.xml><?xml version="1.0" encoding="utf-8"?>
 <p:notes xmlns:a="http://schemas.openxmlformats.org/drawingml/2006/main" xmlns:r="http://schemas.openxmlformats.org/officeDocument/2006/relationships" xmlns:p="http://schemas.openxmlformats.org/presentationml/2006/main">
   <p:cSld>
     <p:spTree>
@@ -2023,7 +2132,7 @@
           <a:p>
             <a:fld id="{FFA5E540-6D76-429F-95AD-C7F13B3CAC82}" type="slidenum">
               <a:rPr lang="en-US" smtClean="0"/>
-              <a:t>27</a:t>
+              <a:t>28</a:t>
             </a:fld>
             <a:endParaRPr lang="en-US" dirty="0"/>
           </a:p>
@@ -2033,114 +2142,6 @@
     <p:extLst>
       <p:ext uri="{BB962C8B-B14F-4D97-AF65-F5344CB8AC3E}">
         <p14:creationId xmlns:p14="http://schemas.microsoft.com/office/powerpoint/2010/main" val="3186069772"/>
-      </p:ext>
-    </p:extLst>
-  </p:cSld>
-  <p:clrMapOvr>
-    <a:masterClrMapping/>
-  </p:clrMapOvr>
-</p:notes>
-</file>
-
-<file path=ppt/notesSlides/notesSlide23.xml><?xml version="1.0" encoding="utf-8"?>
-<p:notes xmlns:a="http://schemas.openxmlformats.org/drawingml/2006/main" xmlns:r="http://schemas.openxmlformats.org/officeDocument/2006/relationships" xmlns:p="http://schemas.openxmlformats.org/presentationml/2006/main">
-  <p:cSld>
-    <p:spTree>
-      <p:nvGrpSpPr>
-        <p:cNvPr id="1" name="">
-          <a:extLst>
-            <a:ext uri="{FF2B5EF4-FFF2-40B4-BE49-F238E27FC236}">
-              <a16:creationId xmlns:a16="http://schemas.microsoft.com/office/drawing/2014/main" id="{C882B80B-CB29-A50D-A6FD-FD13EE274D25}"/>
-            </a:ext>
-          </a:extLst>
-        </p:cNvPr>
-        <p:cNvGrpSpPr/>
-        <p:nvPr/>
-      </p:nvGrpSpPr>
-      <p:grpSpPr>
-        <a:xfrm>
-          <a:off x="0" y="0"/>
-          <a:ext cx="0" cy="0"/>
-          <a:chOff x="0" y="0"/>
-          <a:chExt cx="0" cy="0"/>
-        </a:xfrm>
-      </p:grpSpPr>
-      <p:sp>
-        <p:nvSpPr>
-          <p:cNvPr id="2" name="Slide Image Placeholder 1">
-            <a:extLst>
-              <a:ext uri="{FF2B5EF4-FFF2-40B4-BE49-F238E27FC236}">
-                <a16:creationId xmlns:a16="http://schemas.microsoft.com/office/drawing/2014/main" id="{3B4AD0FE-F436-7846-4C90-2D2DFA3BE74D}"/>
-              </a:ext>
-            </a:extLst>
-          </p:cNvPr>
-          <p:cNvSpPr>
-            <a:spLocks noGrp="1" noRot="1" noChangeAspect="1"/>
-          </p:cNvSpPr>
-          <p:nvPr>
-            <p:ph type="sldImg"/>
-          </p:nvPr>
-        </p:nvSpPr>
-        <p:spPr/>
-      </p:sp>
-      <p:sp>
-        <p:nvSpPr>
-          <p:cNvPr id="3" name="Notes Placeholder 2">
-            <a:extLst>
-              <a:ext uri="{FF2B5EF4-FFF2-40B4-BE49-F238E27FC236}">
-                <a16:creationId xmlns:a16="http://schemas.microsoft.com/office/drawing/2014/main" id="{C913C41C-7569-43A2-D2A2-9644A4B7406A}"/>
-              </a:ext>
-            </a:extLst>
-          </p:cNvPr>
-          <p:cNvSpPr>
-            <a:spLocks noGrp="1"/>
-          </p:cNvSpPr>
-          <p:nvPr>
-            <p:ph type="body" idx="1"/>
-          </p:nvPr>
-        </p:nvSpPr>
-        <p:spPr/>
-        <p:txBody>
-          <a:bodyPr/>
-          <a:lstStyle/>
-          <a:p>
-            <a:endParaRPr lang="en-US" dirty="0"/>
-          </a:p>
-        </p:txBody>
-      </p:sp>
-      <p:sp>
-        <p:nvSpPr>
-          <p:cNvPr id="4" name="Slide Number Placeholder 3">
-            <a:extLst>
-              <a:ext uri="{FF2B5EF4-FFF2-40B4-BE49-F238E27FC236}">
-                <a16:creationId xmlns:a16="http://schemas.microsoft.com/office/drawing/2014/main" id="{4EC37134-B491-46FE-58C3-889B9BADFCED}"/>
-              </a:ext>
-            </a:extLst>
-          </p:cNvPr>
-          <p:cNvSpPr>
-            <a:spLocks noGrp="1"/>
-          </p:cNvSpPr>
-          <p:nvPr>
-            <p:ph type="sldNum" sz="quarter" idx="10"/>
-          </p:nvPr>
-        </p:nvSpPr>
-        <p:spPr/>
-        <p:txBody>
-          <a:bodyPr/>
-          <a:lstStyle/>
-          <a:p>
-            <a:fld id="{FFA5E540-6D76-429F-95AD-C7F13B3CAC82}" type="slidenum">
-              <a:rPr lang="en-US" smtClean="0"/>
-              <a:t>28</a:t>
-            </a:fld>
-            <a:endParaRPr lang="en-US" dirty="0"/>
-          </a:p>
-        </p:txBody>
-      </p:sp>
-    </p:spTree>
-    <p:extLst>
-      <p:ext uri="{BB962C8B-B14F-4D97-AF65-F5344CB8AC3E}">
-        <p14:creationId xmlns:p14="http://schemas.microsoft.com/office/powerpoint/2010/main" val="3062646772"/>
       </p:ext>
     </p:extLst>
   </p:cSld>
@@ -2240,6 +2241,114 @@
             <a:fld id="{FFA5E540-6D76-429F-95AD-C7F13B3CAC82}" type="slidenum">
               <a:rPr lang="en-US" smtClean="0"/>
               <a:t>29</a:t>
+            </a:fld>
+            <a:endParaRPr lang="en-US" dirty="0"/>
+          </a:p>
+        </p:txBody>
+      </p:sp>
+    </p:spTree>
+    <p:extLst>
+      <p:ext uri="{BB962C8B-B14F-4D97-AF65-F5344CB8AC3E}">
+        <p14:creationId xmlns:p14="http://schemas.microsoft.com/office/powerpoint/2010/main" val="3062646772"/>
+      </p:ext>
+    </p:extLst>
+  </p:cSld>
+  <p:clrMapOvr>
+    <a:masterClrMapping/>
+  </p:clrMapOvr>
+</p:notes>
+</file>
+
+<file path=ppt/notesSlides/notesSlide25.xml><?xml version="1.0" encoding="utf-8"?>
+<p:notes xmlns:a="http://schemas.openxmlformats.org/drawingml/2006/main" xmlns:r="http://schemas.openxmlformats.org/officeDocument/2006/relationships" xmlns:p="http://schemas.openxmlformats.org/presentationml/2006/main">
+  <p:cSld>
+    <p:spTree>
+      <p:nvGrpSpPr>
+        <p:cNvPr id="1" name="">
+          <a:extLst>
+            <a:ext uri="{FF2B5EF4-FFF2-40B4-BE49-F238E27FC236}">
+              <a16:creationId xmlns:a16="http://schemas.microsoft.com/office/drawing/2014/main" id="{C882B80B-CB29-A50D-A6FD-FD13EE274D25}"/>
+            </a:ext>
+          </a:extLst>
+        </p:cNvPr>
+        <p:cNvGrpSpPr/>
+        <p:nvPr/>
+      </p:nvGrpSpPr>
+      <p:grpSpPr>
+        <a:xfrm>
+          <a:off x="0" y="0"/>
+          <a:ext cx="0" cy="0"/>
+          <a:chOff x="0" y="0"/>
+          <a:chExt cx="0" cy="0"/>
+        </a:xfrm>
+      </p:grpSpPr>
+      <p:sp>
+        <p:nvSpPr>
+          <p:cNvPr id="2" name="Slide Image Placeholder 1">
+            <a:extLst>
+              <a:ext uri="{FF2B5EF4-FFF2-40B4-BE49-F238E27FC236}">
+                <a16:creationId xmlns:a16="http://schemas.microsoft.com/office/drawing/2014/main" id="{3B4AD0FE-F436-7846-4C90-2D2DFA3BE74D}"/>
+              </a:ext>
+            </a:extLst>
+          </p:cNvPr>
+          <p:cNvSpPr>
+            <a:spLocks noGrp="1" noRot="1" noChangeAspect="1"/>
+          </p:cNvSpPr>
+          <p:nvPr>
+            <p:ph type="sldImg"/>
+          </p:nvPr>
+        </p:nvSpPr>
+        <p:spPr/>
+      </p:sp>
+      <p:sp>
+        <p:nvSpPr>
+          <p:cNvPr id="3" name="Notes Placeholder 2">
+            <a:extLst>
+              <a:ext uri="{FF2B5EF4-FFF2-40B4-BE49-F238E27FC236}">
+                <a16:creationId xmlns:a16="http://schemas.microsoft.com/office/drawing/2014/main" id="{C913C41C-7569-43A2-D2A2-9644A4B7406A}"/>
+              </a:ext>
+            </a:extLst>
+          </p:cNvPr>
+          <p:cNvSpPr>
+            <a:spLocks noGrp="1"/>
+          </p:cNvSpPr>
+          <p:nvPr>
+            <p:ph type="body" idx="1"/>
+          </p:nvPr>
+        </p:nvSpPr>
+        <p:spPr/>
+        <p:txBody>
+          <a:bodyPr/>
+          <a:lstStyle/>
+          <a:p>
+            <a:endParaRPr lang="en-US" dirty="0"/>
+          </a:p>
+        </p:txBody>
+      </p:sp>
+      <p:sp>
+        <p:nvSpPr>
+          <p:cNvPr id="4" name="Slide Number Placeholder 3">
+            <a:extLst>
+              <a:ext uri="{FF2B5EF4-FFF2-40B4-BE49-F238E27FC236}">
+                <a16:creationId xmlns:a16="http://schemas.microsoft.com/office/drawing/2014/main" id="{4EC37134-B491-46FE-58C3-889B9BADFCED}"/>
+              </a:ext>
+            </a:extLst>
+          </p:cNvPr>
+          <p:cNvSpPr>
+            <a:spLocks noGrp="1"/>
+          </p:cNvSpPr>
+          <p:nvPr>
+            <p:ph type="sldNum" sz="quarter" idx="10"/>
+          </p:nvPr>
+        </p:nvSpPr>
+        <p:spPr/>
+        <p:txBody>
+          <a:bodyPr/>
+          <a:lstStyle/>
+          <a:p>
+            <a:fld id="{FFA5E540-6D76-429F-95AD-C7F13B3CAC82}" type="slidenum">
+              <a:rPr lang="en-US" smtClean="0"/>
+              <a:t>30</a:t>
             </a:fld>
             <a:endParaRPr lang="en-US" dirty="0"/>
           </a:p>
@@ -2767,7 +2876,7 @@
     </p:spTree>
     <p:extLst>
       <p:ext uri="{BB962C8B-B14F-4D97-AF65-F5344CB8AC3E}">
-        <p14:creationId xmlns:p14="http://schemas.microsoft.com/office/powerpoint/2010/main" val="4119098890"/>
+        <p14:creationId xmlns:p14="http://schemas.microsoft.com/office/powerpoint/2010/main" val="3506827854"/>
       </p:ext>
     </p:extLst>
   </p:cSld>
@@ -2875,7 +2984,7 @@
     </p:spTree>
     <p:extLst>
       <p:ext uri="{BB962C8B-B14F-4D97-AF65-F5344CB8AC3E}">
-        <p14:creationId xmlns:p14="http://schemas.microsoft.com/office/powerpoint/2010/main" val="2389906920"/>
+        <p14:creationId xmlns:p14="http://schemas.microsoft.com/office/powerpoint/2010/main" val="4119098890"/>
       </p:ext>
     </p:extLst>
   </p:cSld>
@@ -2983,7 +3092,7 @@
     </p:spTree>
     <p:extLst>
       <p:ext uri="{BB962C8B-B14F-4D97-AF65-F5344CB8AC3E}">
-        <p14:creationId xmlns:p14="http://schemas.microsoft.com/office/powerpoint/2010/main" val="1728248813"/>
+        <p14:creationId xmlns:p14="http://schemas.microsoft.com/office/powerpoint/2010/main" val="2389906920"/>
       </p:ext>
     </p:extLst>
   </p:cSld>
@@ -25667,6 +25776,374 @@
       </p:sp>
       <p:sp>
         <p:nvSpPr>
+          <p:cNvPr id="3" name="内容占位符 2">
+            <a:extLst>
+              <a:ext uri="{FF2B5EF4-FFF2-40B4-BE49-F238E27FC236}">
+                <a16:creationId xmlns:a16="http://schemas.microsoft.com/office/drawing/2014/main" id="{546BAD6D-09F4-5710-5F64-F0C2FF48AF3D}"/>
+              </a:ext>
+            </a:extLst>
+          </p:cNvPr>
+          <p:cNvSpPr txBox="1">
+            <a:spLocks/>
+          </p:cNvSpPr>
+          <p:nvPr/>
+        </p:nvSpPr>
+        <p:spPr bwMode="auto">
+          <a:xfrm>
+            <a:off x="93652" y="1068113"/>
+            <a:ext cx="8897948" cy="1065487"/>
+          </a:xfrm>
+          <a:prstGeom prst="rect">
+            <a:avLst/>
+          </a:prstGeom>
+          <a:noFill/>
+          <a:ln>
+            <a:noFill/>
+          </a:ln>
+          <a:extLst>
+            <a:ext uri="{909E8E84-426E-40DD-AFC4-6F175D3DCCD1}">
+              <a14:hiddenFill xmlns:a14="http://schemas.microsoft.com/office/drawing/2010/main">
+                <a:solidFill>
+                  <a:srgbClr val="FFFFFF"/>
+                </a:solidFill>
+              </a14:hiddenFill>
+            </a:ext>
+            <a:ext uri="{91240B29-F687-4F45-9708-019B960494DF}">
+              <a14:hiddenLine xmlns:a14="http://schemas.microsoft.com/office/drawing/2010/main" w="28575">
+                <a:solidFill>
+                  <a:srgbClr val="000000"/>
+                </a:solidFill>
+                <a:miter lim="800000"/>
+                <a:headEnd/>
+                <a:tailEnd/>
+              </a14:hiddenLine>
+            </a:ext>
+          </a:extLst>
+        </p:spPr>
+        <p:txBody>
+          <a:bodyPr vert="horz" wrap="square" lIns="91440" tIns="45720" rIns="91440" bIns="45720" numCol="1" anchor="t" anchorCtr="0" compatLnSpc="1">
+            <a:prstTxWarp prst="textNoShape">
+              <a:avLst/>
+            </a:prstTxWarp>
+          </a:bodyPr>
+          <a:lstStyle>
+            <a:lvl1pPr marL="342900" indent="-342900" algn="l" rtl="0" eaLnBrk="1" fontAlgn="base" hangingPunct="1">
+              <a:spcBef>
+                <a:spcPct val="30000"/>
+              </a:spcBef>
+              <a:spcAft>
+                <a:spcPct val="0"/>
+              </a:spcAft>
+              <a:buClr>
+                <a:schemeClr val="hlink"/>
+              </a:buClr>
+              <a:buFont typeface="Wingdings" pitchFamily="2" charset="2"/>
+              <a:buChar char="§"/>
+              <a:defRPr sz="3200">
+                <a:solidFill>
+                  <a:srgbClr val="000066"/>
+                </a:solidFill>
+                <a:latin typeface="微软雅黑" pitchFamily="34" charset="-122"/>
+                <a:ea typeface="微软雅黑" pitchFamily="34" charset="-122"/>
+                <a:cs typeface="+mn-cs"/>
+              </a:defRPr>
+            </a:lvl1pPr>
+            <a:lvl2pPr marL="742950" indent="-285750" algn="l" rtl="0" eaLnBrk="1" fontAlgn="base" hangingPunct="1">
+              <a:spcBef>
+                <a:spcPct val="30000"/>
+              </a:spcBef>
+              <a:spcAft>
+                <a:spcPct val="0"/>
+              </a:spcAft>
+              <a:buClr>
+                <a:schemeClr val="tx2"/>
+              </a:buClr>
+              <a:buSzPct val="85000"/>
+              <a:buFont typeface="Wingdings" pitchFamily="2" charset="2"/>
+              <a:buChar char="Ø"/>
+              <a:defRPr sz="2800">
+                <a:solidFill>
+                  <a:srgbClr val="006666"/>
+                </a:solidFill>
+                <a:latin typeface="微软雅黑" pitchFamily="34" charset="-122"/>
+                <a:ea typeface="微软雅黑" pitchFamily="34" charset="-122"/>
+              </a:defRPr>
+            </a:lvl2pPr>
+            <a:lvl3pPr marL="1143000" indent="-228600" algn="l" rtl="0" eaLnBrk="1" fontAlgn="base" hangingPunct="1">
+              <a:spcBef>
+                <a:spcPct val="30000"/>
+              </a:spcBef>
+              <a:spcAft>
+                <a:spcPct val="0"/>
+              </a:spcAft>
+              <a:buClr>
+                <a:schemeClr val="hlink"/>
+              </a:buClr>
+              <a:buSzPct val="95000"/>
+              <a:buFont typeface="Wingdings 2" pitchFamily="18" charset="2"/>
+              <a:buChar char="¡"/>
+              <a:defRPr sz="2400">
+                <a:solidFill>
+                  <a:schemeClr val="hlink"/>
+                </a:solidFill>
+                <a:latin typeface="微软雅黑" pitchFamily="34" charset="-122"/>
+                <a:ea typeface="微软雅黑" pitchFamily="34" charset="-122"/>
+              </a:defRPr>
+            </a:lvl3pPr>
+            <a:lvl4pPr marL="1600200" indent="-228600" algn="l" rtl="0" eaLnBrk="1" fontAlgn="base" hangingPunct="1">
+              <a:spcBef>
+                <a:spcPct val="30000"/>
+              </a:spcBef>
+              <a:spcAft>
+                <a:spcPct val="0"/>
+              </a:spcAft>
+              <a:buClr>
+                <a:schemeClr val="tx2"/>
+              </a:buClr>
+              <a:buSzPct val="90000"/>
+              <a:buFont typeface="Wingdings" pitchFamily="2" charset="2"/>
+              <a:buChar char="Ø"/>
+              <a:defRPr sz="2000">
+                <a:solidFill>
+                  <a:srgbClr val="990099"/>
+                </a:solidFill>
+                <a:latin typeface="微软雅黑" pitchFamily="34" charset="-122"/>
+                <a:ea typeface="微软雅黑" pitchFamily="34" charset="-122"/>
+              </a:defRPr>
+            </a:lvl4pPr>
+            <a:lvl5pPr marL="2057400" indent="-228600" algn="l" rtl="0" eaLnBrk="1" fontAlgn="base" hangingPunct="1">
+              <a:spcBef>
+                <a:spcPct val="30000"/>
+              </a:spcBef>
+              <a:spcAft>
+                <a:spcPct val="0"/>
+              </a:spcAft>
+              <a:buClr>
+                <a:schemeClr val="hlink"/>
+              </a:buClr>
+              <a:buFont typeface="Wingdings 2" pitchFamily="18" charset="2"/>
+              <a:buChar char="¡"/>
+              <a:defRPr sz="2000">
+                <a:solidFill>
+                  <a:schemeClr val="tx1"/>
+                </a:solidFill>
+                <a:latin typeface="微软雅黑" pitchFamily="34" charset="-122"/>
+                <a:ea typeface="微软雅黑" pitchFamily="34" charset="-122"/>
+              </a:defRPr>
+            </a:lvl5pPr>
+            <a:lvl6pPr marL="2514600" indent="-228600" algn="l" rtl="0" eaLnBrk="1" fontAlgn="base" hangingPunct="1">
+              <a:spcBef>
+                <a:spcPct val="30000"/>
+              </a:spcBef>
+              <a:spcAft>
+                <a:spcPct val="0"/>
+              </a:spcAft>
+              <a:buClr>
+                <a:schemeClr val="hlink"/>
+              </a:buClr>
+              <a:buFont typeface="Wingdings 2" pitchFamily="18" charset="2"/>
+              <a:buChar char="¡"/>
+              <a:defRPr sz="2000">
+                <a:solidFill>
+                  <a:schemeClr val="tx1"/>
+                </a:solidFill>
+                <a:latin typeface="+mn-lt"/>
+                <a:ea typeface="+mn-ea"/>
+              </a:defRPr>
+            </a:lvl6pPr>
+            <a:lvl7pPr marL="2971800" indent="-228600" algn="l" rtl="0" eaLnBrk="1" fontAlgn="base" hangingPunct="1">
+              <a:spcBef>
+                <a:spcPct val="30000"/>
+              </a:spcBef>
+              <a:spcAft>
+                <a:spcPct val="0"/>
+              </a:spcAft>
+              <a:buClr>
+                <a:schemeClr val="hlink"/>
+              </a:buClr>
+              <a:buFont typeface="Wingdings 2" pitchFamily="18" charset="2"/>
+              <a:buChar char="¡"/>
+              <a:defRPr sz="2000">
+                <a:solidFill>
+                  <a:schemeClr val="tx1"/>
+                </a:solidFill>
+                <a:latin typeface="+mn-lt"/>
+                <a:ea typeface="+mn-ea"/>
+              </a:defRPr>
+            </a:lvl7pPr>
+            <a:lvl8pPr marL="3429000" indent="-228600" algn="l" rtl="0" eaLnBrk="1" fontAlgn="base" hangingPunct="1">
+              <a:spcBef>
+                <a:spcPct val="30000"/>
+              </a:spcBef>
+              <a:spcAft>
+                <a:spcPct val="0"/>
+              </a:spcAft>
+              <a:buClr>
+                <a:schemeClr val="hlink"/>
+              </a:buClr>
+              <a:buFont typeface="Wingdings 2" pitchFamily="18" charset="2"/>
+              <a:buChar char="¡"/>
+              <a:defRPr sz="2000">
+                <a:solidFill>
+                  <a:schemeClr val="tx1"/>
+                </a:solidFill>
+                <a:latin typeface="+mn-lt"/>
+                <a:ea typeface="+mn-ea"/>
+              </a:defRPr>
+            </a:lvl8pPr>
+            <a:lvl9pPr marL="3886200" indent="-228600" algn="l" rtl="0" eaLnBrk="1" fontAlgn="base" hangingPunct="1">
+              <a:spcBef>
+                <a:spcPct val="30000"/>
+              </a:spcBef>
+              <a:spcAft>
+                <a:spcPct val="0"/>
+              </a:spcAft>
+              <a:buClr>
+                <a:schemeClr val="hlink"/>
+              </a:buClr>
+              <a:buFont typeface="Wingdings 2" pitchFamily="18" charset="2"/>
+              <a:buChar char="¡"/>
+              <a:defRPr sz="2000">
+                <a:solidFill>
+                  <a:schemeClr val="tx1"/>
+                </a:solidFill>
+                <a:latin typeface="+mn-lt"/>
+                <a:ea typeface="+mn-ea"/>
+              </a:defRPr>
+            </a:lvl9pPr>
+          </a:lstStyle>
+          <a:p>
+            <a:r>
+              <a:rPr lang="en-US" altLang="zh-CN" sz="2400" kern="0" dirty="0">
+                <a:latin typeface="+mn-lt"/>
+                <a:cs typeface="Times New Roman" panose="02020603050405020304" pitchFamily="18" charset="0"/>
+              </a:rPr>
+              <a:t>RETAU550</a:t>
+            </a:r>
+            <a:endParaRPr lang="en-US" altLang="zh-CN" sz="2000" kern="0" dirty="0">
+              <a:latin typeface="+mn-lt"/>
+              <a:cs typeface="Times New Roman" panose="02020603050405020304" pitchFamily="18" charset="0"/>
+            </a:endParaRPr>
+          </a:p>
+          <a:p>
+            <a:pPr lvl="1"/>
+            <a:r>
+              <a:rPr lang="en-US" altLang="zh-CN" sz="2000">
+                <a:latin typeface="+mn-lt"/>
+                <a:cs typeface="Times New Roman" panose="02020603050405020304" pitchFamily="18" charset="0"/>
+              </a:rPr>
+              <a:t>Grid convergence</a:t>
+            </a:r>
+            <a:endParaRPr lang="en-US" altLang="zh-CN" sz="2000" dirty="0">
+              <a:latin typeface="+mn-lt"/>
+              <a:cs typeface="Times New Roman" panose="02020603050405020304" pitchFamily="18" charset="0"/>
+            </a:endParaRPr>
+          </a:p>
+        </p:txBody>
+      </p:sp>
+      <p:pic>
+        <p:nvPicPr>
+          <p:cNvPr id="5" name="Picture 4">
+            <a:extLst>
+              <a:ext uri="{FF2B5EF4-FFF2-40B4-BE49-F238E27FC236}">
+                <a16:creationId xmlns:a16="http://schemas.microsoft.com/office/drawing/2014/main" id="{0B213BC0-765B-C51D-7191-D1280CCF4158}"/>
+              </a:ext>
+            </a:extLst>
+          </p:cNvPr>
+          <p:cNvPicPr>
+            <a:picLocks noChangeAspect="1"/>
+          </p:cNvPicPr>
+          <p:nvPr/>
+        </p:nvPicPr>
+        <p:blipFill>
+          <a:blip r:embed="rId3"/>
+          <a:stretch>
+            <a:fillRect/>
+          </a:stretch>
+        </p:blipFill>
+        <p:spPr>
+          <a:xfrm>
+            <a:off x="1676400" y="2133600"/>
+            <a:ext cx="5572735" cy="4202095"/>
+          </a:xfrm>
+          <a:prstGeom prst="rect">
+            <a:avLst/>
+          </a:prstGeom>
+        </p:spPr>
+      </p:pic>
+    </p:spTree>
+    <p:extLst>
+      <p:ext uri="{BB962C8B-B14F-4D97-AF65-F5344CB8AC3E}">
+        <p14:creationId xmlns:p14="http://schemas.microsoft.com/office/powerpoint/2010/main" val="3030650885"/>
+      </p:ext>
+    </p:extLst>
+  </p:cSld>
+  <p:clrMapOvr>
+    <a:masterClrMapping/>
+  </p:clrMapOvr>
+  <p:transition spd="med" advTm="63997"/>
+</p:sld>
+</file>
+
+<file path=ppt/slides/slide11.xml><?xml version="1.0" encoding="utf-8"?>
+<p:sld xmlns:a="http://schemas.openxmlformats.org/drawingml/2006/main" xmlns:r="http://schemas.openxmlformats.org/officeDocument/2006/relationships" xmlns:p="http://schemas.openxmlformats.org/presentationml/2006/main">
+  <p:cSld>
+    <p:spTree>
+      <p:nvGrpSpPr>
+        <p:cNvPr id="1" name="">
+          <a:extLst>
+            <a:ext uri="{FF2B5EF4-FFF2-40B4-BE49-F238E27FC236}">
+              <a16:creationId xmlns:a16="http://schemas.microsoft.com/office/drawing/2014/main" id="{E36FAF1C-FB3C-6E4F-3EF6-B91416465A30}"/>
+            </a:ext>
+          </a:extLst>
+        </p:cNvPr>
+        <p:cNvGrpSpPr/>
+        <p:nvPr/>
+      </p:nvGrpSpPr>
+      <p:grpSpPr>
+        <a:xfrm>
+          <a:off x="0" y="0"/>
+          <a:ext cx="0" cy="0"/>
+          <a:chOff x="0" y="0"/>
+          <a:chExt cx="0" cy="0"/>
+        </a:xfrm>
+      </p:grpSpPr>
+      <p:sp>
+        <p:nvSpPr>
+          <p:cNvPr id="2" name="Title 1">
+            <a:extLst>
+              <a:ext uri="{FF2B5EF4-FFF2-40B4-BE49-F238E27FC236}">
+                <a16:creationId xmlns:a16="http://schemas.microsoft.com/office/drawing/2014/main" id="{5ADC8DE3-593B-5208-402D-39D2452CA6CD}"/>
+              </a:ext>
+            </a:extLst>
+          </p:cNvPr>
+          <p:cNvSpPr>
+            <a:spLocks noGrp="1"/>
+          </p:cNvSpPr>
+          <p:nvPr>
+            <p:ph type="title"/>
+          </p:nvPr>
+        </p:nvSpPr>
+        <p:spPr>
+          <a:xfrm>
+            <a:off x="152400" y="152400"/>
+            <a:ext cx="8610600" cy="838200"/>
+          </a:xfrm>
+        </p:spPr>
+        <p:txBody>
+          <a:bodyPr/>
+          <a:lstStyle/>
+          <a:p>
+            <a:r>
+              <a:rPr lang="en-US" altLang="zh-CN" dirty="0"/>
+              <a:t>Channel</a:t>
+            </a:r>
+            <a:endParaRPr lang="zh-CN" altLang="en-US" dirty="0"/>
+          </a:p>
+        </p:txBody>
+      </p:sp>
+      <p:sp>
+        <p:nvSpPr>
           <p:cNvPr id="7" name="内容占位符 2">
             <a:extLst>
               <a:ext uri="{FF2B5EF4-FFF2-40B4-BE49-F238E27FC236}">
@@ -26004,7 +26481,7 @@
 </p:sld>
 </file>
 
-<file path=ppt/slides/slide11.xml><?xml version="1.0" encoding="utf-8"?>
+<file path=ppt/slides/slide12.xml><?xml version="1.0" encoding="utf-8"?>
 <p:sld xmlns:a="http://schemas.openxmlformats.org/drawingml/2006/main" xmlns:r="http://schemas.openxmlformats.org/officeDocument/2006/relationships" xmlns:p="http://schemas.openxmlformats.org/presentationml/2006/main">
   <p:cSld>
     <p:spTree>
@@ -26452,7 +26929,7 @@
 </p:sld>
 </file>
 
-<file path=ppt/slides/slide12.xml><?xml version="1.0" encoding="utf-8"?>
+<file path=ppt/slides/slide13.xml><?xml version="1.0" encoding="utf-8"?>
 <p:sld xmlns:a="http://schemas.openxmlformats.org/drawingml/2006/main" xmlns:r="http://schemas.openxmlformats.org/officeDocument/2006/relationships" xmlns:p="http://schemas.openxmlformats.org/presentationml/2006/main">
   <p:cSld>
     <p:spTree>
@@ -26906,7 +27383,7 @@
 </p:sld>
 </file>
 
-<file path=ppt/slides/slide13.xml><?xml version="1.0" encoding="utf-8"?>
+<file path=ppt/slides/slide14.xml><?xml version="1.0" encoding="utf-8"?>
 <p:sld xmlns:a="http://schemas.openxmlformats.org/drawingml/2006/main" xmlns:r="http://schemas.openxmlformats.org/officeDocument/2006/relationships" xmlns:p="http://schemas.openxmlformats.org/presentationml/2006/main">
   <p:cSld>
     <p:spTree>
@@ -27245,17 +27722,17 @@
                 <a:latin typeface="+mn-lt"/>
                 <a:cs typeface="Times New Roman" panose="02020603050405020304" pitchFamily="18" charset="0"/>
               </a:rPr>
-              <a:t>Why eddy viscosity is so small?</a:t>
+              <a:t>As Re increases, the influence of Cs is less</a:t>
             </a:r>
           </a:p>
         </p:txBody>
       </p:sp>
       <p:pic>
         <p:nvPicPr>
-          <p:cNvPr id="23" name="Picture 22">
+          <p:cNvPr id="25" name="Picture 24">
             <a:extLst>
               <a:ext uri="{FF2B5EF4-FFF2-40B4-BE49-F238E27FC236}">
-                <a16:creationId xmlns:a16="http://schemas.microsoft.com/office/drawing/2014/main" id="{0855273A-438C-9A07-EC26-58B8C3A23C3B}"/>
+                <a16:creationId xmlns:a16="http://schemas.microsoft.com/office/drawing/2014/main" id="{4AAE87AF-C77B-93F0-0A0E-3A7AB94A35BC}"/>
               </a:ext>
             </a:extLst>
           </p:cNvPr>
@@ -27272,37 +27749,7 @@
         </p:blipFill>
         <p:spPr>
           <a:xfrm>
-            <a:off x="1380067" y="2407355"/>
-            <a:ext cx="3200400" cy="2390108"/>
-          </a:xfrm>
-          <a:prstGeom prst="rect">
-            <a:avLst/>
-          </a:prstGeom>
-        </p:spPr>
-      </p:pic>
-      <p:pic>
-        <p:nvPicPr>
-          <p:cNvPr id="25" name="Picture 24">
-            <a:extLst>
-              <a:ext uri="{FF2B5EF4-FFF2-40B4-BE49-F238E27FC236}">
-                <a16:creationId xmlns:a16="http://schemas.microsoft.com/office/drawing/2014/main" id="{4AAE87AF-C77B-93F0-0A0E-3A7AB94A35BC}"/>
-              </a:ext>
-            </a:extLst>
-          </p:cNvPr>
-          <p:cNvPicPr>
-            <a:picLocks noChangeAspect="1"/>
-          </p:cNvPicPr>
-          <p:nvPr/>
-        </p:nvPicPr>
-        <p:blipFill>
-          <a:blip r:embed="rId4"/>
-          <a:stretch>
-            <a:fillRect/>
-          </a:stretch>
-        </p:blipFill>
-        <p:spPr>
-          <a:xfrm>
-            <a:off x="4648200" y="2407985"/>
+            <a:off x="4411133" y="2664432"/>
             <a:ext cx="3200400" cy="2401580"/>
           </a:xfrm>
           <a:prstGeom prst="rect">
@@ -27325,14 +27772,14 @@
           <p:nvPr/>
         </p:nvPicPr>
         <p:blipFill>
-          <a:blip r:embed="rId5"/>
+          <a:blip r:embed="rId4"/>
           <a:stretch>
             <a:fillRect/>
           </a:stretch>
         </p:blipFill>
         <p:spPr>
           <a:xfrm>
-            <a:off x="1380067" y="4797463"/>
+            <a:off x="1143000" y="5053910"/>
             <a:ext cx="3200400" cy="2383711"/>
           </a:xfrm>
           <a:prstGeom prst="rect">
@@ -27355,6 +27802,36 @@
           <p:nvPr/>
         </p:nvPicPr>
         <p:blipFill>
+          <a:blip r:embed="rId5"/>
+          <a:stretch>
+            <a:fillRect/>
+          </a:stretch>
+        </p:blipFill>
+        <p:spPr>
+          <a:xfrm>
+            <a:off x="4419600" y="5066012"/>
+            <a:ext cx="3200400" cy="2401588"/>
+          </a:xfrm>
+          <a:prstGeom prst="rect">
+            <a:avLst/>
+          </a:prstGeom>
+        </p:spPr>
+      </p:pic>
+      <p:pic>
+        <p:nvPicPr>
+          <p:cNvPr id="35" name="Picture 34">
+            <a:extLst>
+              <a:ext uri="{FF2B5EF4-FFF2-40B4-BE49-F238E27FC236}">
+                <a16:creationId xmlns:a16="http://schemas.microsoft.com/office/drawing/2014/main" id="{183654BF-4D16-5823-4E56-766A2126CE83}"/>
+              </a:ext>
+            </a:extLst>
+          </p:cNvPr>
+          <p:cNvPicPr>
+            <a:picLocks noChangeAspect="1"/>
+          </p:cNvPicPr>
+          <p:nvPr/>
+        </p:nvPicPr>
+        <p:blipFill>
           <a:blip r:embed="rId6"/>
           <a:stretch>
             <a:fillRect/>
@@ -27362,8 +27839,8 @@
         </p:blipFill>
         <p:spPr>
           <a:xfrm>
-            <a:off x="4656667" y="4809565"/>
-            <a:ext cx="3200400" cy="2401588"/>
+            <a:off x="1210733" y="2669552"/>
+            <a:ext cx="3200400" cy="2391339"/>
           </a:xfrm>
           <a:prstGeom prst="rect">
             <a:avLst/>
@@ -27384,7 +27861,7 @@
 </p:sld>
 </file>
 
-<file path=ppt/slides/slide14.xml><?xml version="1.0" encoding="utf-8"?>
+<file path=ppt/slides/slide15.xml><?xml version="1.0" encoding="utf-8"?>
 <p:sld xmlns:a="http://schemas.openxmlformats.org/drawingml/2006/main" xmlns:r="http://schemas.openxmlformats.org/officeDocument/2006/relationships" xmlns:p="http://schemas.openxmlformats.org/presentationml/2006/main">
   <p:cSld>
     <p:spTree>
@@ -27909,7 +28386,7 @@
 </p:sld>
 </file>
 
-<file path=ppt/slides/slide15.xml><?xml version="1.0" encoding="utf-8"?>
+<file path=ppt/slides/slide16.xml><?xml version="1.0" encoding="utf-8"?>
 <p:sld xmlns:a="http://schemas.openxmlformats.org/drawingml/2006/main" xmlns:r="http://schemas.openxmlformats.org/officeDocument/2006/relationships" xmlns:p="http://schemas.openxmlformats.org/presentationml/2006/main">
   <p:cSld>
     <p:spTree>
@@ -28394,7 +28871,7 @@
 </p:sld>
 </file>
 
-<file path=ppt/slides/slide16.xml><?xml version="1.0" encoding="utf-8"?>
+<file path=ppt/slides/slide17.xml><?xml version="1.0" encoding="utf-8"?>
 <p:sld xmlns:a="http://schemas.openxmlformats.org/drawingml/2006/main" xmlns:r="http://schemas.openxmlformats.org/officeDocument/2006/relationships" xmlns:p="http://schemas.openxmlformats.org/presentationml/2006/main">
   <p:cSld>
     <p:spTree>
@@ -28839,7 +29316,7 @@
 </p:sld>
 </file>
 
-<file path=ppt/slides/slide17.xml><?xml version="1.0" encoding="utf-8"?>
+<file path=ppt/slides/slide18.xml><?xml version="1.0" encoding="utf-8"?>
 <p:sld xmlns:a="http://schemas.openxmlformats.org/drawingml/2006/main" xmlns:r="http://schemas.openxmlformats.org/officeDocument/2006/relationships" xmlns:p="http://schemas.openxmlformats.org/presentationml/2006/main">
   <p:cSld>
     <p:spTree>
@@ -29344,7 +29821,7 @@
 </p:sld>
 </file>
 
-<file path=ppt/slides/slide18.xml><?xml version="1.0" encoding="utf-8"?>
+<file path=ppt/slides/slide19.xml><?xml version="1.0" encoding="utf-8"?>
 <p:sld xmlns:a="http://schemas.openxmlformats.org/drawingml/2006/main" xmlns:r="http://schemas.openxmlformats.org/officeDocument/2006/relationships" xmlns:p="http://schemas.openxmlformats.org/presentationml/2006/main">
   <p:cSld>
     <p:spTree>
@@ -29749,511 +30226,6 @@
     <p:extLst>
       <p:ext uri="{BB962C8B-B14F-4D97-AF65-F5344CB8AC3E}">
         <p14:creationId xmlns:p14="http://schemas.microsoft.com/office/powerpoint/2010/main" val="1101504850"/>
-      </p:ext>
-    </p:extLst>
-  </p:cSld>
-  <p:clrMapOvr>
-    <a:masterClrMapping/>
-  </p:clrMapOvr>
-  <p:transition spd="med" advTm="63997"/>
-</p:sld>
-</file>
-
-<file path=ppt/slides/slide19.xml><?xml version="1.0" encoding="utf-8"?>
-<p:sld xmlns:a="http://schemas.openxmlformats.org/drawingml/2006/main" xmlns:r="http://schemas.openxmlformats.org/officeDocument/2006/relationships" xmlns:p="http://schemas.openxmlformats.org/presentationml/2006/main">
-  <p:cSld>
-    <p:spTree>
-      <p:nvGrpSpPr>
-        <p:cNvPr id="1" name=""/>
-        <p:cNvGrpSpPr/>
-        <p:nvPr/>
-      </p:nvGrpSpPr>
-      <p:grpSpPr>
-        <a:xfrm>
-          <a:off x="0" y="0"/>
-          <a:ext cx="0" cy="0"/>
-          <a:chOff x="0" y="0"/>
-          <a:chExt cx="0" cy="0"/>
-        </a:xfrm>
-      </p:grpSpPr>
-      <p:sp>
-        <p:nvSpPr>
-          <p:cNvPr id="2" name="Title 1"/>
-          <p:cNvSpPr>
-            <a:spLocks noGrp="1"/>
-          </p:cNvSpPr>
-          <p:nvPr>
-            <p:ph type="title"/>
-          </p:nvPr>
-        </p:nvSpPr>
-        <p:spPr>
-          <a:xfrm>
-            <a:off x="152400" y="152400"/>
-            <a:ext cx="8610600" cy="838200"/>
-          </a:xfrm>
-        </p:spPr>
-        <p:txBody>
-          <a:bodyPr/>
-          <a:lstStyle/>
-          <a:p>
-            <a:r>
-              <a:rPr lang="en-US" altLang="zh-CN" dirty="0"/>
-              <a:t>Channel</a:t>
-            </a:r>
-            <a:endParaRPr lang="zh-CN" altLang="en-US" dirty="0"/>
-          </a:p>
-        </p:txBody>
-      </p:sp>
-      <p:sp>
-        <p:nvSpPr>
-          <p:cNvPr id="9" name="Rectangle 2"/>
-          <p:cNvSpPr>
-            <a:spLocks noChangeArrowheads="1"/>
-          </p:cNvSpPr>
-          <p:nvPr/>
-        </p:nvSpPr>
-        <p:spPr bwMode="auto">
-          <a:xfrm>
-            <a:off x="0" y="0"/>
-            <a:ext cx="9144000" cy="0"/>
-          </a:xfrm>
-          <a:prstGeom prst="rect">
-            <a:avLst/>
-          </a:prstGeom>
-          <a:noFill/>
-          <a:ln>
-            <a:noFill/>
-          </a:ln>
-          <a:effectLst/>
-          <a:extLst>
-            <a:ext uri="{909E8E84-426E-40DD-AFC4-6F175D3DCCD1}">
-              <a14:hiddenFill xmlns:a14="http://schemas.microsoft.com/office/drawing/2010/main">
-                <a:solidFill>
-                  <a:schemeClr val="accent1"/>
-                </a:solidFill>
-              </a14:hiddenFill>
-            </a:ext>
-            <a:ext uri="{91240B29-F687-4F45-9708-019B960494DF}">
-              <a14:hiddenLine xmlns:a14="http://schemas.microsoft.com/office/drawing/2010/main" w="9525">
-                <a:solidFill>
-                  <a:schemeClr val="tx1"/>
-                </a:solidFill>
-                <a:miter lim="800000"/>
-                <a:headEnd/>
-                <a:tailEnd/>
-              </a14:hiddenLine>
-            </a:ext>
-            <a:ext uri="{AF507438-7753-43E0-B8FC-AC1667EBCBE1}">
-              <a14:hiddenEffects xmlns:a14="http://schemas.microsoft.com/office/drawing/2010/main">
-                <a:effectLst>
-                  <a:outerShdw dist="35921" dir="2700000" algn="ctr" rotWithShape="0">
-                    <a:schemeClr val="bg2"/>
-                  </a:outerShdw>
-                </a:effectLst>
-              </a14:hiddenEffects>
-            </a:ext>
-          </a:extLst>
-        </p:spPr>
-        <p:txBody>
-          <a:bodyPr vert="horz" wrap="none" lIns="91440" tIns="45720" rIns="91440" bIns="45720" numCol="1" anchor="ctr" anchorCtr="0" compatLnSpc="1">
-            <a:prstTxWarp prst="textNoShape">
-              <a:avLst/>
-            </a:prstTxWarp>
-            <a:spAutoFit/>
-          </a:bodyPr>
-          <a:lstStyle/>
-          <a:p>
-            <a:endParaRPr lang="zh-CN" altLang="en-US"/>
-          </a:p>
-        </p:txBody>
-      </p:sp>
-      <p:sp>
-        <p:nvSpPr>
-          <p:cNvPr id="17" name="内容占位符 2">
-            <a:extLst>
-              <a:ext uri="{FF2B5EF4-FFF2-40B4-BE49-F238E27FC236}">
-                <a16:creationId xmlns:a16="http://schemas.microsoft.com/office/drawing/2014/main" id="{D7B13CA5-CF5D-287A-9ACB-EF5CA77485F1}"/>
-              </a:ext>
-            </a:extLst>
-          </p:cNvPr>
-          <p:cNvSpPr txBox="1">
-            <a:spLocks/>
-          </p:cNvSpPr>
-          <p:nvPr/>
-        </p:nvSpPr>
-        <p:spPr bwMode="auto">
-          <a:xfrm>
-            <a:off x="93652" y="1068113"/>
-            <a:ext cx="8610600" cy="1211060"/>
-          </a:xfrm>
-          <a:prstGeom prst="rect">
-            <a:avLst/>
-          </a:prstGeom>
-          <a:noFill/>
-          <a:ln>
-            <a:noFill/>
-          </a:ln>
-          <a:extLst>
-            <a:ext uri="{909E8E84-426E-40DD-AFC4-6F175D3DCCD1}">
-              <a14:hiddenFill xmlns:a14="http://schemas.microsoft.com/office/drawing/2010/main">
-                <a:solidFill>
-                  <a:srgbClr val="FFFFFF"/>
-                </a:solidFill>
-              </a14:hiddenFill>
-            </a:ext>
-            <a:ext uri="{91240B29-F687-4F45-9708-019B960494DF}">
-              <a14:hiddenLine xmlns:a14="http://schemas.microsoft.com/office/drawing/2010/main" w="28575">
-                <a:solidFill>
-                  <a:srgbClr val="000000"/>
-                </a:solidFill>
-                <a:miter lim="800000"/>
-                <a:headEnd/>
-                <a:tailEnd/>
-              </a14:hiddenLine>
-            </a:ext>
-          </a:extLst>
-        </p:spPr>
-        <p:txBody>
-          <a:bodyPr vert="horz" wrap="square" lIns="91440" tIns="45720" rIns="91440" bIns="45720" numCol="1" anchor="t" anchorCtr="0" compatLnSpc="1">
-            <a:prstTxWarp prst="textNoShape">
-              <a:avLst/>
-            </a:prstTxWarp>
-          </a:bodyPr>
-          <a:lstStyle>
-            <a:lvl1pPr marL="342900" indent="-342900" algn="l" rtl="0" eaLnBrk="1" fontAlgn="base" hangingPunct="1">
-              <a:spcBef>
-                <a:spcPct val="30000"/>
-              </a:spcBef>
-              <a:spcAft>
-                <a:spcPct val="0"/>
-              </a:spcAft>
-              <a:buClr>
-                <a:schemeClr val="hlink"/>
-              </a:buClr>
-              <a:buFont typeface="Wingdings" pitchFamily="2" charset="2"/>
-              <a:buChar char="§"/>
-              <a:defRPr sz="3200">
-                <a:solidFill>
-                  <a:srgbClr val="000066"/>
-                </a:solidFill>
-                <a:latin typeface="微软雅黑" pitchFamily="34" charset="-122"/>
-                <a:ea typeface="微软雅黑" pitchFamily="34" charset="-122"/>
-                <a:cs typeface="+mn-cs"/>
-              </a:defRPr>
-            </a:lvl1pPr>
-            <a:lvl2pPr marL="742950" indent="-285750" algn="l" rtl="0" eaLnBrk="1" fontAlgn="base" hangingPunct="1">
-              <a:spcBef>
-                <a:spcPct val="30000"/>
-              </a:spcBef>
-              <a:spcAft>
-                <a:spcPct val="0"/>
-              </a:spcAft>
-              <a:buClr>
-                <a:schemeClr val="tx2"/>
-              </a:buClr>
-              <a:buSzPct val="85000"/>
-              <a:buFont typeface="Wingdings" pitchFamily="2" charset="2"/>
-              <a:buChar char="Ø"/>
-              <a:defRPr sz="2800">
-                <a:solidFill>
-                  <a:srgbClr val="006666"/>
-                </a:solidFill>
-                <a:latin typeface="微软雅黑" pitchFamily="34" charset="-122"/>
-                <a:ea typeface="微软雅黑" pitchFamily="34" charset="-122"/>
-              </a:defRPr>
-            </a:lvl2pPr>
-            <a:lvl3pPr marL="1143000" indent="-228600" algn="l" rtl="0" eaLnBrk="1" fontAlgn="base" hangingPunct="1">
-              <a:spcBef>
-                <a:spcPct val="30000"/>
-              </a:spcBef>
-              <a:spcAft>
-                <a:spcPct val="0"/>
-              </a:spcAft>
-              <a:buClr>
-                <a:schemeClr val="hlink"/>
-              </a:buClr>
-              <a:buSzPct val="95000"/>
-              <a:buFont typeface="Wingdings 2" pitchFamily="18" charset="2"/>
-              <a:buChar char="¡"/>
-              <a:defRPr sz="2400">
-                <a:solidFill>
-                  <a:schemeClr val="hlink"/>
-                </a:solidFill>
-                <a:latin typeface="微软雅黑" pitchFamily="34" charset="-122"/>
-                <a:ea typeface="微软雅黑" pitchFamily="34" charset="-122"/>
-              </a:defRPr>
-            </a:lvl3pPr>
-            <a:lvl4pPr marL="1600200" indent="-228600" algn="l" rtl="0" eaLnBrk="1" fontAlgn="base" hangingPunct="1">
-              <a:spcBef>
-                <a:spcPct val="30000"/>
-              </a:spcBef>
-              <a:spcAft>
-                <a:spcPct val="0"/>
-              </a:spcAft>
-              <a:buClr>
-                <a:schemeClr val="tx2"/>
-              </a:buClr>
-              <a:buSzPct val="90000"/>
-              <a:buFont typeface="Wingdings" pitchFamily="2" charset="2"/>
-              <a:buChar char="Ø"/>
-              <a:defRPr sz="2000">
-                <a:solidFill>
-                  <a:srgbClr val="990099"/>
-                </a:solidFill>
-                <a:latin typeface="微软雅黑" pitchFamily="34" charset="-122"/>
-                <a:ea typeface="微软雅黑" pitchFamily="34" charset="-122"/>
-              </a:defRPr>
-            </a:lvl4pPr>
-            <a:lvl5pPr marL="2057400" indent="-228600" algn="l" rtl="0" eaLnBrk="1" fontAlgn="base" hangingPunct="1">
-              <a:spcBef>
-                <a:spcPct val="30000"/>
-              </a:spcBef>
-              <a:spcAft>
-                <a:spcPct val="0"/>
-              </a:spcAft>
-              <a:buClr>
-                <a:schemeClr val="hlink"/>
-              </a:buClr>
-              <a:buFont typeface="Wingdings 2" pitchFamily="18" charset="2"/>
-              <a:buChar char="¡"/>
-              <a:defRPr sz="2000">
-                <a:solidFill>
-                  <a:schemeClr val="tx1"/>
-                </a:solidFill>
-                <a:latin typeface="微软雅黑" pitchFamily="34" charset="-122"/>
-                <a:ea typeface="微软雅黑" pitchFamily="34" charset="-122"/>
-              </a:defRPr>
-            </a:lvl5pPr>
-            <a:lvl6pPr marL="2514600" indent="-228600" algn="l" rtl="0" eaLnBrk="1" fontAlgn="base" hangingPunct="1">
-              <a:spcBef>
-                <a:spcPct val="30000"/>
-              </a:spcBef>
-              <a:spcAft>
-                <a:spcPct val="0"/>
-              </a:spcAft>
-              <a:buClr>
-                <a:schemeClr val="hlink"/>
-              </a:buClr>
-              <a:buFont typeface="Wingdings 2" pitchFamily="18" charset="2"/>
-              <a:buChar char="¡"/>
-              <a:defRPr sz="2000">
-                <a:solidFill>
-                  <a:schemeClr val="tx1"/>
-                </a:solidFill>
-                <a:latin typeface="+mn-lt"/>
-                <a:ea typeface="+mn-ea"/>
-              </a:defRPr>
-            </a:lvl6pPr>
-            <a:lvl7pPr marL="2971800" indent="-228600" algn="l" rtl="0" eaLnBrk="1" fontAlgn="base" hangingPunct="1">
-              <a:spcBef>
-                <a:spcPct val="30000"/>
-              </a:spcBef>
-              <a:spcAft>
-                <a:spcPct val="0"/>
-              </a:spcAft>
-              <a:buClr>
-                <a:schemeClr val="hlink"/>
-              </a:buClr>
-              <a:buFont typeface="Wingdings 2" pitchFamily="18" charset="2"/>
-              <a:buChar char="¡"/>
-              <a:defRPr sz="2000">
-                <a:solidFill>
-                  <a:schemeClr val="tx1"/>
-                </a:solidFill>
-                <a:latin typeface="+mn-lt"/>
-                <a:ea typeface="+mn-ea"/>
-              </a:defRPr>
-            </a:lvl7pPr>
-            <a:lvl8pPr marL="3429000" indent="-228600" algn="l" rtl="0" eaLnBrk="1" fontAlgn="base" hangingPunct="1">
-              <a:spcBef>
-                <a:spcPct val="30000"/>
-              </a:spcBef>
-              <a:spcAft>
-                <a:spcPct val="0"/>
-              </a:spcAft>
-              <a:buClr>
-                <a:schemeClr val="hlink"/>
-              </a:buClr>
-              <a:buFont typeface="Wingdings 2" pitchFamily="18" charset="2"/>
-              <a:buChar char="¡"/>
-              <a:defRPr sz="2000">
-                <a:solidFill>
-                  <a:schemeClr val="tx1"/>
-                </a:solidFill>
-                <a:latin typeface="+mn-lt"/>
-                <a:ea typeface="+mn-ea"/>
-              </a:defRPr>
-            </a:lvl8pPr>
-            <a:lvl9pPr marL="3886200" indent="-228600" algn="l" rtl="0" eaLnBrk="1" fontAlgn="base" hangingPunct="1">
-              <a:spcBef>
-                <a:spcPct val="30000"/>
-              </a:spcBef>
-              <a:spcAft>
-                <a:spcPct val="0"/>
-              </a:spcAft>
-              <a:buClr>
-                <a:schemeClr val="hlink"/>
-              </a:buClr>
-              <a:buFont typeface="Wingdings 2" pitchFamily="18" charset="2"/>
-              <a:buChar char="¡"/>
-              <a:defRPr sz="2000">
-                <a:solidFill>
-                  <a:schemeClr val="tx1"/>
-                </a:solidFill>
-                <a:latin typeface="+mn-lt"/>
-                <a:ea typeface="+mn-ea"/>
-              </a:defRPr>
-            </a:lvl9pPr>
-          </a:lstStyle>
-          <a:p>
-            <a:r>
-              <a:rPr lang="en-US" altLang="zh-CN" sz="2400" kern="0" dirty="0">
-                <a:latin typeface="+mn-lt"/>
-                <a:cs typeface="Times New Roman" panose="02020603050405020304" pitchFamily="18" charset="0"/>
-              </a:rPr>
-              <a:t>RETAU5200</a:t>
-            </a:r>
-            <a:endParaRPr lang="en-US" altLang="zh-CN" sz="2000" kern="0" dirty="0">
-              <a:latin typeface="+mn-lt"/>
-              <a:cs typeface="Times New Roman" panose="02020603050405020304" pitchFamily="18" charset="0"/>
-            </a:endParaRPr>
-          </a:p>
-          <a:p>
-            <a:pPr lvl="1"/>
-            <a:r>
-              <a:rPr lang="en-US" altLang="zh-CN" sz="2000" dirty="0">
-                <a:latin typeface="+mn-lt"/>
-                <a:cs typeface="Times New Roman" panose="02020603050405020304" pitchFamily="18" charset="0"/>
-              </a:rPr>
-              <a:t>Simplified viscous terms produce a bit better results on coarse grids, but nearly the same results on the finest grid</a:t>
-            </a:r>
-          </a:p>
-        </p:txBody>
-      </p:sp>
-      <p:pic>
-        <p:nvPicPr>
-          <p:cNvPr id="4" name="Picture 3">
-            <a:extLst>
-              <a:ext uri="{FF2B5EF4-FFF2-40B4-BE49-F238E27FC236}">
-                <a16:creationId xmlns:a16="http://schemas.microsoft.com/office/drawing/2014/main" id="{50EE1709-EABB-454A-53B1-315DA164832A}"/>
-              </a:ext>
-            </a:extLst>
-          </p:cNvPr>
-          <p:cNvPicPr>
-            <a:picLocks noChangeAspect="1"/>
-          </p:cNvPicPr>
-          <p:nvPr/>
-        </p:nvPicPr>
-        <p:blipFill>
-          <a:blip r:embed="rId3"/>
-          <a:stretch>
-            <a:fillRect/>
-          </a:stretch>
-        </p:blipFill>
-        <p:spPr>
-          <a:xfrm>
-            <a:off x="1295400" y="4672308"/>
-            <a:ext cx="3200400" cy="2390042"/>
-          </a:xfrm>
-          <a:prstGeom prst="rect">
-            <a:avLst/>
-          </a:prstGeom>
-        </p:spPr>
-      </p:pic>
-      <p:pic>
-        <p:nvPicPr>
-          <p:cNvPr id="6" name="Picture 5">
-            <a:extLst>
-              <a:ext uri="{FF2B5EF4-FFF2-40B4-BE49-F238E27FC236}">
-                <a16:creationId xmlns:a16="http://schemas.microsoft.com/office/drawing/2014/main" id="{75FAD4A9-F8BA-3F98-7D08-F79BDD909E55}"/>
-              </a:ext>
-            </a:extLst>
-          </p:cNvPr>
-          <p:cNvPicPr>
-            <a:picLocks noChangeAspect="1"/>
-          </p:cNvPicPr>
-          <p:nvPr/>
-        </p:nvPicPr>
-        <p:blipFill>
-          <a:blip r:embed="rId4"/>
-          <a:stretch>
-            <a:fillRect/>
-          </a:stretch>
-        </p:blipFill>
-        <p:spPr>
-          <a:xfrm>
-            <a:off x="4495800" y="2299948"/>
-            <a:ext cx="3200400" cy="2372360"/>
-          </a:xfrm>
-          <a:prstGeom prst="rect">
-            <a:avLst/>
-          </a:prstGeom>
-        </p:spPr>
-      </p:pic>
-      <p:pic>
-        <p:nvPicPr>
-          <p:cNvPr id="8" name="Picture 7">
-            <a:extLst>
-              <a:ext uri="{FF2B5EF4-FFF2-40B4-BE49-F238E27FC236}">
-                <a16:creationId xmlns:a16="http://schemas.microsoft.com/office/drawing/2014/main" id="{900089F2-6F03-AC4F-47FB-B494550D41D8}"/>
-              </a:ext>
-            </a:extLst>
-          </p:cNvPr>
-          <p:cNvPicPr>
-            <a:picLocks noChangeAspect="1"/>
-          </p:cNvPicPr>
-          <p:nvPr/>
-        </p:nvPicPr>
-        <p:blipFill>
-          <a:blip r:embed="rId5"/>
-          <a:stretch>
-            <a:fillRect/>
-          </a:stretch>
-        </p:blipFill>
-        <p:spPr>
-          <a:xfrm>
-            <a:off x="1295400" y="2286000"/>
-            <a:ext cx="3200400" cy="2386308"/>
-          </a:xfrm>
-          <a:prstGeom prst="rect">
-            <a:avLst/>
-          </a:prstGeom>
-        </p:spPr>
-      </p:pic>
-      <p:pic>
-        <p:nvPicPr>
-          <p:cNvPr id="13" name="Picture 12">
-            <a:extLst>
-              <a:ext uri="{FF2B5EF4-FFF2-40B4-BE49-F238E27FC236}">
-                <a16:creationId xmlns:a16="http://schemas.microsoft.com/office/drawing/2014/main" id="{7FA17928-4EAE-2C6F-0C99-5C67EDC2AB39}"/>
-              </a:ext>
-            </a:extLst>
-          </p:cNvPr>
-          <p:cNvPicPr>
-            <a:picLocks noChangeAspect="1"/>
-          </p:cNvPicPr>
-          <p:nvPr/>
-        </p:nvPicPr>
-        <p:blipFill>
-          <a:blip r:embed="rId6"/>
-          <a:stretch>
-            <a:fillRect/>
-          </a:stretch>
-        </p:blipFill>
-        <p:spPr>
-          <a:xfrm>
-            <a:off x="4495800" y="4672718"/>
-            <a:ext cx="3200400" cy="2396459"/>
-          </a:xfrm>
-          <a:prstGeom prst="rect">
-            <a:avLst/>
-          </a:prstGeom>
-        </p:spPr>
-      </p:pic>
-    </p:spTree>
-    <p:extLst>
-      <p:ext uri="{BB962C8B-B14F-4D97-AF65-F5344CB8AC3E}">
-        <p14:creationId xmlns:p14="http://schemas.microsoft.com/office/powerpoint/2010/main" val="1166957128"/>
       </p:ext>
     </p:extLst>
   </p:cSld>
@@ -30872,6 +30844,511 @@
         <p:spPr bwMode="auto">
           <a:xfrm>
             <a:off x="93652" y="1068113"/>
+            <a:ext cx="8610600" cy="1211060"/>
+          </a:xfrm>
+          <a:prstGeom prst="rect">
+            <a:avLst/>
+          </a:prstGeom>
+          <a:noFill/>
+          <a:ln>
+            <a:noFill/>
+          </a:ln>
+          <a:extLst>
+            <a:ext uri="{909E8E84-426E-40DD-AFC4-6F175D3DCCD1}">
+              <a14:hiddenFill xmlns:a14="http://schemas.microsoft.com/office/drawing/2010/main">
+                <a:solidFill>
+                  <a:srgbClr val="FFFFFF"/>
+                </a:solidFill>
+              </a14:hiddenFill>
+            </a:ext>
+            <a:ext uri="{91240B29-F687-4F45-9708-019B960494DF}">
+              <a14:hiddenLine xmlns:a14="http://schemas.microsoft.com/office/drawing/2010/main" w="28575">
+                <a:solidFill>
+                  <a:srgbClr val="000000"/>
+                </a:solidFill>
+                <a:miter lim="800000"/>
+                <a:headEnd/>
+                <a:tailEnd/>
+              </a14:hiddenLine>
+            </a:ext>
+          </a:extLst>
+        </p:spPr>
+        <p:txBody>
+          <a:bodyPr vert="horz" wrap="square" lIns="91440" tIns="45720" rIns="91440" bIns="45720" numCol="1" anchor="t" anchorCtr="0" compatLnSpc="1">
+            <a:prstTxWarp prst="textNoShape">
+              <a:avLst/>
+            </a:prstTxWarp>
+          </a:bodyPr>
+          <a:lstStyle>
+            <a:lvl1pPr marL="342900" indent="-342900" algn="l" rtl="0" eaLnBrk="1" fontAlgn="base" hangingPunct="1">
+              <a:spcBef>
+                <a:spcPct val="30000"/>
+              </a:spcBef>
+              <a:spcAft>
+                <a:spcPct val="0"/>
+              </a:spcAft>
+              <a:buClr>
+                <a:schemeClr val="hlink"/>
+              </a:buClr>
+              <a:buFont typeface="Wingdings" pitchFamily="2" charset="2"/>
+              <a:buChar char="§"/>
+              <a:defRPr sz="3200">
+                <a:solidFill>
+                  <a:srgbClr val="000066"/>
+                </a:solidFill>
+                <a:latin typeface="微软雅黑" pitchFamily="34" charset="-122"/>
+                <a:ea typeface="微软雅黑" pitchFamily="34" charset="-122"/>
+                <a:cs typeface="+mn-cs"/>
+              </a:defRPr>
+            </a:lvl1pPr>
+            <a:lvl2pPr marL="742950" indent="-285750" algn="l" rtl="0" eaLnBrk="1" fontAlgn="base" hangingPunct="1">
+              <a:spcBef>
+                <a:spcPct val="30000"/>
+              </a:spcBef>
+              <a:spcAft>
+                <a:spcPct val="0"/>
+              </a:spcAft>
+              <a:buClr>
+                <a:schemeClr val="tx2"/>
+              </a:buClr>
+              <a:buSzPct val="85000"/>
+              <a:buFont typeface="Wingdings" pitchFamily="2" charset="2"/>
+              <a:buChar char="Ø"/>
+              <a:defRPr sz="2800">
+                <a:solidFill>
+                  <a:srgbClr val="006666"/>
+                </a:solidFill>
+                <a:latin typeface="微软雅黑" pitchFamily="34" charset="-122"/>
+                <a:ea typeface="微软雅黑" pitchFamily="34" charset="-122"/>
+              </a:defRPr>
+            </a:lvl2pPr>
+            <a:lvl3pPr marL="1143000" indent="-228600" algn="l" rtl="0" eaLnBrk="1" fontAlgn="base" hangingPunct="1">
+              <a:spcBef>
+                <a:spcPct val="30000"/>
+              </a:spcBef>
+              <a:spcAft>
+                <a:spcPct val="0"/>
+              </a:spcAft>
+              <a:buClr>
+                <a:schemeClr val="hlink"/>
+              </a:buClr>
+              <a:buSzPct val="95000"/>
+              <a:buFont typeface="Wingdings 2" pitchFamily="18" charset="2"/>
+              <a:buChar char="¡"/>
+              <a:defRPr sz="2400">
+                <a:solidFill>
+                  <a:schemeClr val="hlink"/>
+                </a:solidFill>
+                <a:latin typeface="微软雅黑" pitchFamily="34" charset="-122"/>
+                <a:ea typeface="微软雅黑" pitchFamily="34" charset="-122"/>
+              </a:defRPr>
+            </a:lvl3pPr>
+            <a:lvl4pPr marL="1600200" indent="-228600" algn="l" rtl="0" eaLnBrk="1" fontAlgn="base" hangingPunct="1">
+              <a:spcBef>
+                <a:spcPct val="30000"/>
+              </a:spcBef>
+              <a:spcAft>
+                <a:spcPct val="0"/>
+              </a:spcAft>
+              <a:buClr>
+                <a:schemeClr val="tx2"/>
+              </a:buClr>
+              <a:buSzPct val="90000"/>
+              <a:buFont typeface="Wingdings" pitchFamily="2" charset="2"/>
+              <a:buChar char="Ø"/>
+              <a:defRPr sz="2000">
+                <a:solidFill>
+                  <a:srgbClr val="990099"/>
+                </a:solidFill>
+                <a:latin typeface="微软雅黑" pitchFamily="34" charset="-122"/>
+                <a:ea typeface="微软雅黑" pitchFamily="34" charset="-122"/>
+              </a:defRPr>
+            </a:lvl4pPr>
+            <a:lvl5pPr marL="2057400" indent="-228600" algn="l" rtl="0" eaLnBrk="1" fontAlgn="base" hangingPunct="1">
+              <a:spcBef>
+                <a:spcPct val="30000"/>
+              </a:spcBef>
+              <a:spcAft>
+                <a:spcPct val="0"/>
+              </a:spcAft>
+              <a:buClr>
+                <a:schemeClr val="hlink"/>
+              </a:buClr>
+              <a:buFont typeface="Wingdings 2" pitchFamily="18" charset="2"/>
+              <a:buChar char="¡"/>
+              <a:defRPr sz="2000">
+                <a:solidFill>
+                  <a:schemeClr val="tx1"/>
+                </a:solidFill>
+                <a:latin typeface="微软雅黑" pitchFamily="34" charset="-122"/>
+                <a:ea typeface="微软雅黑" pitchFamily="34" charset="-122"/>
+              </a:defRPr>
+            </a:lvl5pPr>
+            <a:lvl6pPr marL="2514600" indent="-228600" algn="l" rtl="0" eaLnBrk="1" fontAlgn="base" hangingPunct="1">
+              <a:spcBef>
+                <a:spcPct val="30000"/>
+              </a:spcBef>
+              <a:spcAft>
+                <a:spcPct val="0"/>
+              </a:spcAft>
+              <a:buClr>
+                <a:schemeClr val="hlink"/>
+              </a:buClr>
+              <a:buFont typeface="Wingdings 2" pitchFamily="18" charset="2"/>
+              <a:buChar char="¡"/>
+              <a:defRPr sz="2000">
+                <a:solidFill>
+                  <a:schemeClr val="tx1"/>
+                </a:solidFill>
+                <a:latin typeface="+mn-lt"/>
+                <a:ea typeface="+mn-ea"/>
+              </a:defRPr>
+            </a:lvl6pPr>
+            <a:lvl7pPr marL="2971800" indent="-228600" algn="l" rtl="0" eaLnBrk="1" fontAlgn="base" hangingPunct="1">
+              <a:spcBef>
+                <a:spcPct val="30000"/>
+              </a:spcBef>
+              <a:spcAft>
+                <a:spcPct val="0"/>
+              </a:spcAft>
+              <a:buClr>
+                <a:schemeClr val="hlink"/>
+              </a:buClr>
+              <a:buFont typeface="Wingdings 2" pitchFamily="18" charset="2"/>
+              <a:buChar char="¡"/>
+              <a:defRPr sz="2000">
+                <a:solidFill>
+                  <a:schemeClr val="tx1"/>
+                </a:solidFill>
+                <a:latin typeface="+mn-lt"/>
+                <a:ea typeface="+mn-ea"/>
+              </a:defRPr>
+            </a:lvl7pPr>
+            <a:lvl8pPr marL="3429000" indent="-228600" algn="l" rtl="0" eaLnBrk="1" fontAlgn="base" hangingPunct="1">
+              <a:spcBef>
+                <a:spcPct val="30000"/>
+              </a:spcBef>
+              <a:spcAft>
+                <a:spcPct val="0"/>
+              </a:spcAft>
+              <a:buClr>
+                <a:schemeClr val="hlink"/>
+              </a:buClr>
+              <a:buFont typeface="Wingdings 2" pitchFamily="18" charset="2"/>
+              <a:buChar char="¡"/>
+              <a:defRPr sz="2000">
+                <a:solidFill>
+                  <a:schemeClr val="tx1"/>
+                </a:solidFill>
+                <a:latin typeface="+mn-lt"/>
+                <a:ea typeface="+mn-ea"/>
+              </a:defRPr>
+            </a:lvl8pPr>
+            <a:lvl9pPr marL="3886200" indent="-228600" algn="l" rtl="0" eaLnBrk="1" fontAlgn="base" hangingPunct="1">
+              <a:spcBef>
+                <a:spcPct val="30000"/>
+              </a:spcBef>
+              <a:spcAft>
+                <a:spcPct val="0"/>
+              </a:spcAft>
+              <a:buClr>
+                <a:schemeClr val="hlink"/>
+              </a:buClr>
+              <a:buFont typeface="Wingdings 2" pitchFamily="18" charset="2"/>
+              <a:buChar char="¡"/>
+              <a:defRPr sz="2000">
+                <a:solidFill>
+                  <a:schemeClr val="tx1"/>
+                </a:solidFill>
+                <a:latin typeface="+mn-lt"/>
+                <a:ea typeface="+mn-ea"/>
+              </a:defRPr>
+            </a:lvl9pPr>
+          </a:lstStyle>
+          <a:p>
+            <a:r>
+              <a:rPr lang="en-US" altLang="zh-CN" sz="2400" kern="0" dirty="0">
+                <a:latin typeface="+mn-lt"/>
+                <a:cs typeface="Times New Roman" panose="02020603050405020304" pitchFamily="18" charset="0"/>
+              </a:rPr>
+              <a:t>RETAU5200</a:t>
+            </a:r>
+            <a:endParaRPr lang="en-US" altLang="zh-CN" sz="2000" kern="0" dirty="0">
+              <a:latin typeface="+mn-lt"/>
+              <a:cs typeface="Times New Roman" panose="02020603050405020304" pitchFamily="18" charset="0"/>
+            </a:endParaRPr>
+          </a:p>
+          <a:p>
+            <a:pPr lvl="1"/>
+            <a:r>
+              <a:rPr lang="en-US" altLang="zh-CN" sz="2000" dirty="0">
+                <a:latin typeface="+mn-lt"/>
+                <a:cs typeface="Times New Roman" panose="02020603050405020304" pitchFamily="18" charset="0"/>
+              </a:rPr>
+              <a:t>Simplified viscous terms produce a bit better results on coarse grids, but nearly the same results on the finest grid</a:t>
+            </a:r>
+          </a:p>
+        </p:txBody>
+      </p:sp>
+      <p:pic>
+        <p:nvPicPr>
+          <p:cNvPr id="4" name="Picture 3">
+            <a:extLst>
+              <a:ext uri="{FF2B5EF4-FFF2-40B4-BE49-F238E27FC236}">
+                <a16:creationId xmlns:a16="http://schemas.microsoft.com/office/drawing/2014/main" id="{50EE1709-EABB-454A-53B1-315DA164832A}"/>
+              </a:ext>
+            </a:extLst>
+          </p:cNvPr>
+          <p:cNvPicPr>
+            <a:picLocks noChangeAspect="1"/>
+          </p:cNvPicPr>
+          <p:nvPr/>
+        </p:nvPicPr>
+        <p:blipFill>
+          <a:blip r:embed="rId3"/>
+          <a:stretch>
+            <a:fillRect/>
+          </a:stretch>
+        </p:blipFill>
+        <p:spPr>
+          <a:xfrm>
+            <a:off x="1295400" y="4672308"/>
+            <a:ext cx="3200400" cy="2390042"/>
+          </a:xfrm>
+          <a:prstGeom prst="rect">
+            <a:avLst/>
+          </a:prstGeom>
+        </p:spPr>
+      </p:pic>
+      <p:pic>
+        <p:nvPicPr>
+          <p:cNvPr id="6" name="Picture 5">
+            <a:extLst>
+              <a:ext uri="{FF2B5EF4-FFF2-40B4-BE49-F238E27FC236}">
+                <a16:creationId xmlns:a16="http://schemas.microsoft.com/office/drawing/2014/main" id="{75FAD4A9-F8BA-3F98-7D08-F79BDD909E55}"/>
+              </a:ext>
+            </a:extLst>
+          </p:cNvPr>
+          <p:cNvPicPr>
+            <a:picLocks noChangeAspect="1"/>
+          </p:cNvPicPr>
+          <p:nvPr/>
+        </p:nvPicPr>
+        <p:blipFill>
+          <a:blip r:embed="rId4"/>
+          <a:stretch>
+            <a:fillRect/>
+          </a:stretch>
+        </p:blipFill>
+        <p:spPr>
+          <a:xfrm>
+            <a:off x="4495800" y="2299948"/>
+            <a:ext cx="3200400" cy="2372360"/>
+          </a:xfrm>
+          <a:prstGeom prst="rect">
+            <a:avLst/>
+          </a:prstGeom>
+        </p:spPr>
+      </p:pic>
+      <p:pic>
+        <p:nvPicPr>
+          <p:cNvPr id="8" name="Picture 7">
+            <a:extLst>
+              <a:ext uri="{FF2B5EF4-FFF2-40B4-BE49-F238E27FC236}">
+                <a16:creationId xmlns:a16="http://schemas.microsoft.com/office/drawing/2014/main" id="{900089F2-6F03-AC4F-47FB-B494550D41D8}"/>
+              </a:ext>
+            </a:extLst>
+          </p:cNvPr>
+          <p:cNvPicPr>
+            <a:picLocks noChangeAspect="1"/>
+          </p:cNvPicPr>
+          <p:nvPr/>
+        </p:nvPicPr>
+        <p:blipFill>
+          <a:blip r:embed="rId5"/>
+          <a:stretch>
+            <a:fillRect/>
+          </a:stretch>
+        </p:blipFill>
+        <p:spPr>
+          <a:xfrm>
+            <a:off x="1295400" y="2286000"/>
+            <a:ext cx="3200400" cy="2386308"/>
+          </a:xfrm>
+          <a:prstGeom prst="rect">
+            <a:avLst/>
+          </a:prstGeom>
+        </p:spPr>
+      </p:pic>
+      <p:pic>
+        <p:nvPicPr>
+          <p:cNvPr id="13" name="Picture 12">
+            <a:extLst>
+              <a:ext uri="{FF2B5EF4-FFF2-40B4-BE49-F238E27FC236}">
+                <a16:creationId xmlns:a16="http://schemas.microsoft.com/office/drawing/2014/main" id="{7FA17928-4EAE-2C6F-0C99-5C67EDC2AB39}"/>
+              </a:ext>
+            </a:extLst>
+          </p:cNvPr>
+          <p:cNvPicPr>
+            <a:picLocks noChangeAspect="1"/>
+          </p:cNvPicPr>
+          <p:nvPr/>
+        </p:nvPicPr>
+        <p:blipFill>
+          <a:blip r:embed="rId6"/>
+          <a:stretch>
+            <a:fillRect/>
+          </a:stretch>
+        </p:blipFill>
+        <p:spPr>
+          <a:xfrm>
+            <a:off x="4495800" y="4672718"/>
+            <a:ext cx="3200400" cy="2396459"/>
+          </a:xfrm>
+          <a:prstGeom prst="rect">
+            <a:avLst/>
+          </a:prstGeom>
+        </p:spPr>
+      </p:pic>
+    </p:spTree>
+    <p:extLst>
+      <p:ext uri="{BB962C8B-B14F-4D97-AF65-F5344CB8AC3E}">
+        <p14:creationId xmlns:p14="http://schemas.microsoft.com/office/powerpoint/2010/main" val="1166957128"/>
+      </p:ext>
+    </p:extLst>
+  </p:cSld>
+  <p:clrMapOvr>
+    <a:masterClrMapping/>
+  </p:clrMapOvr>
+  <p:transition spd="med" advTm="63997"/>
+</p:sld>
+</file>
+
+<file path=ppt/slides/slide21.xml><?xml version="1.0" encoding="utf-8"?>
+<p:sld xmlns:a="http://schemas.openxmlformats.org/drawingml/2006/main" xmlns:r="http://schemas.openxmlformats.org/officeDocument/2006/relationships" xmlns:p="http://schemas.openxmlformats.org/presentationml/2006/main">
+  <p:cSld>
+    <p:spTree>
+      <p:nvGrpSpPr>
+        <p:cNvPr id="1" name=""/>
+        <p:cNvGrpSpPr/>
+        <p:nvPr/>
+      </p:nvGrpSpPr>
+      <p:grpSpPr>
+        <a:xfrm>
+          <a:off x="0" y="0"/>
+          <a:ext cx="0" cy="0"/>
+          <a:chOff x="0" y="0"/>
+          <a:chExt cx="0" cy="0"/>
+        </a:xfrm>
+      </p:grpSpPr>
+      <p:sp>
+        <p:nvSpPr>
+          <p:cNvPr id="2" name="Title 1"/>
+          <p:cNvSpPr>
+            <a:spLocks noGrp="1"/>
+          </p:cNvSpPr>
+          <p:nvPr>
+            <p:ph type="title"/>
+          </p:nvPr>
+        </p:nvSpPr>
+        <p:spPr>
+          <a:xfrm>
+            <a:off x="152400" y="152400"/>
+            <a:ext cx="8610600" cy="838200"/>
+          </a:xfrm>
+        </p:spPr>
+        <p:txBody>
+          <a:bodyPr/>
+          <a:lstStyle/>
+          <a:p>
+            <a:r>
+              <a:rPr lang="en-US" altLang="zh-CN" dirty="0"/>
+              <a:t>Channel</a:t>
+            </a:r>
+            <a:endParaRPr lang="zh-CN" altLang="en-US" dirty="0"/>
+          </a:p>
+        </p:txBody>
+      </p:sp>
+      <p:sp>
+        <p:nvSpPr>
+          <p:cNvPr id="9" name="Rectangle 2"/>
+          <p:cNvSpPr>
+            <a:spLocks noChangeArrowheads="1"/>
+          </p:cNvSpPr>
+          <p:nvPr/>
+        </p:nvSpPr>
+        <p:spPr bwMode="auto">
+          <a:xfrm>
+            <a:off x="0" y="0"/>
+            <a:ext cx="9144000" cy="0"/>
+          </a:xfrm>
+          <a:prstGeom prst="rect">
+            <a:avLst/>
+          </a:prstGeom>
+          <a:noFill/>
+          <a:ln>
+            <a:noFill/>
+          </a:ln>
+          <a:effectLst/>
+          <a:extLst>
+            <a:ext uri="{909E8E84-426E-40DD-AFC4-6F175D3DCCD1}">
+              <a14:hiddenFill xmlns:a14="http://schemas.microsoft.com/office/drawing/2010/main">
+                <a:solidFill>
+                  <a:schemeClr val="accent1"/>
+                </a:solidFill>
+              </a14:hiddenFill>
+            </a:ext>
+            <a:ext uri="{91240B29-F687-4F45-9708-019B960494DF}">
+              <a14:hiddenLine xmlns:a14="http://schemas.microsoft.com/office/drawing/2010/main" w="9525">
+                <a:solidFill>
+                  <a:schemeClr val="tx1"/>
+                </a:solidFill>
+                <a:miter lim="800000"/>
+                <a:headEnd/>
+                <a:tailEnd/>
+              </a14:hiddenLine>
+            </a:ext>
+            <a:ext uri="{AF507438-7753-43E0-B8FC-AC1667EBCBE1}">
+              <a14:hiddenEffects xmlns:a14="http://schemas.microsoft.com/office/drawing/2010/main">
+                <a:effectLst>
+                  <a:outerShdw dist="35921" dir="2700000" algn="ctr" rotWithShape="0">
+                    <a:schemeClr val="bg2"/>
+                  </a:outerShdw>
+                </a:effectLst>
+              </a14:hiddenEffects>
+            </a:ext>
+          </a:extLst>
+        </p:spPr>
+        <p:txBody>
+          <a:bodyPr vert="horz" wrap="none" lIns="91440" tIns="45720" rIns="91440" bIns="45720" numCol="1" anchor="ctr" anchorCtr="0" compatLnSpc="1">
+            <a:prstTxWarp prst="textNoShape">
+              <a:avLst/>
+            </a:prstTxWarp>
+            <a:spAutoFit/>
+          </a:bodyPr>
+          <a:lstStyle/>
+          <a:p>
+            <a:endParaRPr lang="zh-CN" altLang="en-US"/>
+          </a:p>
+        </p:txBody>
+      </p:sp>
+      <p:sp>
+        <p:nvSpPr>
+          <p:cNvPr id="17" name="内容占位符 2">
+            <a:extLst>
+              <a:ext uri="{FF2B5EF4-FFF2-40B4-BE49-F238E27FC236}">
+                <a16:creationId xmlns:a16="http://schemas.microsoft.com/office/drawing/2014/main" id="{D7B13CA5-CF5D-287A-9ACB-EF5CA77485F1}"/>
+              </a:ext>
+            </a:extLst>
+          </p:cNvPr>
+          <p:cNvSpPr txBox="1">
+            <a:spLocks/>
+          </p:cNvSpPr>
+          <p:nvPr/>
+        </p:nvSpPr>
+        <p:spPr bwMode="auto">
+          <a:xfrm>
+            <a:off x="93652" y="1068113"/>
             <a:ext cx="8610600" cy="932338"/>
           </a:xfrm>
           <a:prstGeom prst="rect">
@@ -31252,7 +31729,7 @@
 </p:sld>
 </file>
 
-<file path=ppt/slides/slide21.xml><?xml version="1.0" encoding="utf-8"?>
+<file path=ppt/slides/slide22.xml><?xml version="1.0" encoding="utf-8"?>
 <p:sld xmlns:a="http://schemas.openxmlformats.org/drawingml/2006/main" xmlns:r="http://schemas.openxmlformats.org/officeDocument/2006/relationships" xmlns:p="http://schemas.openxmlformats.org/presentationml/2006/main">
   <p:cSld>
     <p:spTree>
@@ -31757,7 +32234,7 @@
 </p:sld>
 </file>
 
-<file path=ppt/slides/slide22.xml><?xml version="1.0" encoding="utf-8"?>
+<file path=ppt/slides/slide23.xml><?xml version="1.0" encoding="utf-8"?>
 <p:sld xmlns:a="http://schemas.openxmlformats.org/drawingml/2006/main" xmlns:r="http://schemas.openxmlformats.org/officeDocument/2006/relationships" xmlns:p="http://schemas.openxmlformats.org/presentationml/2006/main">
   <p:cSld>
     <p:spTree>
@@ -32262,7 +32739,7 @@
 </p:sld>
 </file>
 
-<file path=ppt/slides/slide23.xml><?xml version="1.0" encoding="utf-8"?>
+<file path=ppt/slides/slide24.xml><?xml version="1.0" encoding="utf-8"?>
 <p:sld xmlns:a="http://schemas.openxmlformats.org/drawingml/2006/main" xmlns:r="http://schemas.openxmlformats.org/officeDocument/2006/relationships" xmlns:p="http://schemas.openxmlformats.org/presentationml/2006/main">
   <p:cSld>
     <p:spTree>
@@ -32750,7 +33227,7 @@
 </p:sld>
 </file>
 
-<file path=ppt/slides/slide24.xml><?xml version="1.0" encoding="utf-8"?>
+<file path=ppt/slides/slide25.xml><?xml version="1.0" encoding="utf-8"?>
 <p:sld xmlns:a="http://schemas.openxmlformats.org/drawingml/2006/main" xmlns:r="http://schemas.openxmlformats.org/officeDocument/2006/relationships" xmlns:p="http://schemas.openxmlformats.org/presentationml/2006/main">
   <p:cSld>
     <p:spTree>
@@ -33198,7 +33675,7 @@
 </p:sld>
 </file>
 
-<file path=ppt/slides/slide25.xml><?xml version="1.0" encoding="utf-8"?>
+<file path=ppt/slides/slide26.xml><?xml version="1.0" encoding="utf-8"?>
 <p:sld xmlns:a="http://schemas.openxmlformats.org/drawingml/2006/main" xmlns:r="http://schemas.openxmlformats.org/officeDocument/2006/relationships" xmlns:p="http://schemas.openxmlformats.org/presentationml/2006/main">
   <p:cSld>
     <p:spTree>
@@ -33703,7 +34180,7 @@
 </p:sld>
 </file>
 
-<file path=ppt/slides/slide26.xml><?xml version="1.0" encoding="utf-8"?>
+<file path=ppt/slides/slide27.xml><?xml version="1.0" encoding="utf-8"?>
 <p:sld xmlns:a="http://schemas.openxmlformats.org/drawingml/2006/main" xmlns:r="http://schemas.openxmlformats.org/officeDocument/2006/relationships" xmlns:p="http://schemas.openxmlformats.org/presentationml/2006/main">
   <p:cSld>
     <p:spTree>
@@ -34208,7 +34685,7 @@
 </p:sld>
 </file>
 
-<file path=ppt/slides/slide27.xml><?xml version="1.0" encoding="utf-8"?>
+<file path=ppt/slides/slide28.xml><?xml version="1.0" encoding="utf-8"?>
 <p:sld xmlns:a="http://schemas.openxmlformats.org/drawingml/2006/main" xmlns:r="http://schemas.openxmlformats.org/officeDocument/2006/relationships" xmlns:p="http://schemas.openxmlformats.org/presentationml/2006/main">
   <p:cSld>
     <p:spTree>
@@ -34729,7 +35206,7 @@
 </p:sld>
 </file>
 
-<file path=ppt/slides/slide28.xml><?xml version="1.0" encoding="utf-8"?>
+<file path=ppt/slides/slide29.xml><?xml version="1.0" encoding="utf-8"?>
 <p:sld xmlns:a="http://schemas.openxmlformats.org/drawingml/2006/main" xmlns:r="http://schemas.openxmlformats.org/officeDocument/2006/relationships" xmlns:p="http://schemas.openxmlformats.org/presentationml/2006/main">
   <p:cSld>
     <p:spTree>
@@ -35099,316 +35576,6 @@
     <p:extLst>
       <p:ext uri="{BB962C8B-B14F-4D97-AF65-F5344CB8AC3E}">
         <p14:creationId xmlns:p14="http://schemas.microsoft.com/office/powerpoint/2010/main" val="1891939900"/>
-      </p:ext>
-    </p:extLst>
-  </p:cSld>
-  <p:clrMapOvr>
-    <a:masterClrMapping/>
-  </p:clrMapOvr>
-  <p:transition spd="med" advTm="63997"/>
-</p:sld>
-</file>
-
-<file path=ppt/slides/slide29.xml><?xml version="1.0" encoding="utf-8"?>
-<p:sld xmlns:a="http://schemas.openxmlformats.org/drawingml/2006/main" xmlns:r="http://schemas.openxmlformats.org/officeDocument/2006/relationships" xmlns:p="http://schemas.openxmlformats.org/presentationml/2006/main">
-  <p:cSld>
-    <p:spTree>
-      <p:nvGrpSpPr>
-        <p:cNvPr id="1" name="">
-          <a:extLst>
-            <a:ext uri="{FF2B5EF4-FFF2-40B4-BE49-F238E27FC236}">
-              <a16:creationId xmlns:a16="http://schemas.microsoft.com/office/drawing/2014/main" id="{FD51F8A1-C545-C753-B009-0A022151AB5E}"/>
-            </a:ext>
-          </a:extLst>
-        </p:cNvPr>
-        <p:cNvGrpSpPr/>
-        <p:nvPr/>
-      </p:nvGrpSpPr>
-      <p:grpSpPr>
-        <a:xfrm>
-          <a:off x="0" y="0"/>
-          <a:ext cx="0" cy="0"/>
-          <a:chOff x="0" y="0"/>
-          <a:chExt cx="0" cy="0"/>
-        </a:xfrm>
-      </p:grpSpPr>
-      <p:sp>
-        <p:nvSpPr>
-          <p:cNvPr id="2" name="Title 1">
-            <a:extLst>
-              <a:ext uri="{FF2B5EF4-FFF2-40B4-BE49-F238E27FC236}">
-                <a16:creationId xmlns:a16="http://schemas.microsoft.com/office/drawing/2014/main" id="{29DD39E9-7677-88D7-3BB8-B65B4DFD9039}"/>
-              </a:ext>
-            </a:extLst>
-          </p:cNvPr>
-          <p:cNvSpPr>
-            <a:spLocks noGrp="1"/>
-          </p:cNvSpPr>
-          <p:nvPr>
-            <p:ph type="title"/>
-          </p:nvPr>
-        </p:nvSpPr>
-        <p:spPr>
-          <a:xfrm>
-            <a:off x="152400" y="152400"/>
-            <a:ext cx="8610600" cy="838200"/>
-          </a:xfrm>
-        </p:spPr>
-        <p:txBody>
-          <a:bodyPr/>
-          <a:lstStyle/>
-          <a:p>
-            <a:r>
-              <a:rPr lang="en-US" altLang="zh-CN" dirty="0"/>
-              <a:t>Channel</a:t>
-            </a:r>
-            <a:endParaRPr lang="zh-CN" altLang="en-US" dirty="0"/>
-          </a:p>
-        </p:txBody>
-      </p:sp>
-      <p:sp>
-        <p:nvSpPr>
-          <p:cNvPr id="7" name="内容占位符 2">
-            <a:extLst>
-              <a:ext uri="{FF2B5EF4-FFF2-40B4-BE49-F238E27FC236}">
-                <a16:creationId xmlns:a16="http://schemas.microsoft.com/office/drawing/2014/main" id="{0F9127B6-8915-E052-521C-E8C25F1A38CF}"/>
-              </a:ext>
-            </a:extLst>
-          </p:cNvPr>
-          <p:cNvSpPr>
-            <a:spLocks noGrp="1"/>
-          </p:cNvSpPr>
-          <p:nvPr>
-            <p:ph idx="4294967295"/>
-          </p:nvPr>
-        </p:nvSpPr>
-        <p:spPr>
-          <a:xfrm>
-            <a:off x="93652" y="1068111"/>
-            <a:ext cx="9050348" cy="2376129"/>
-          </a:xfrm>
-        </p:spPr>
-        <p:txBody>
-          <a:bodyPr/>
-          <a:lstStyle/>
-          <a:p>
-            <a:r>
-              <a:rPr lang="pt-BR" altLang="zh-CN" sz="2400" dirty="0">
-                <a:latin typeface="+mn-lt"/>
-                <a:cs typeface="Times New Roman" panose="02020603050405020304" pitchFamily="18" charset="0"/>
-              </a:rPr>
-              <a:t>Explicit vs implicit1D</a:t>
-            </a:r>
-            <a:endParaRPr lang="en-US" altLang="zh-CN" sz="2000" dirty="0">
-              <a:latin typeface="+mn-lt"/>
-              <a:cs typeface="Times New Roman" panose="02020603050405020304" pitchFamily="18" charset="0"/>
-            </a:endParaRPr>
-          </a:p>
-          <a:p>
-            <a:pPr lvl="1"/>
-            <a:r>
-              <a:rPr lang="en-US" altLang="zh-CN" sz="2000" dirty="0">
-                <a:latin typeface="+mn-lt"/>
-                <a:cs typeface="Times New Roman" panose="02020603050405020304" pitchFamily="18" charset="0"/>
-              </a:rPr>
-              <a:t>The results from the explicit and the implicit1D schemes are almost the same</a:t>
-            </a:r>
-            <a:endParaRPr lang="en-US" altLang="zh-CN" sz="2000" baseline="30000" dirty="0">
-              <a:latin typeface="+mn-lt"/>
-              <a:cs typeface="Times New Roman" panose="02020603050405020304" pitchFamily="18" charset="0"/>
-            </a:endParaRPr>
-          </a:p>
-          <a:p>
-            <a:pPr marL="457200" lvl="1" indent="0">
-              <a:buNone/>
-            </a:pPr>
-            <a:endParaRPr lang="en-US" altLang="zh-CN" sz="2000" baseline="30000" dirty="0">
-              <a:latin typeface="+mn-lt"/>
-              <a:cs typeface="Times New Roman" panose="02020603050405020304" pitchFamily="18" charset="0"/>
-            </a:endParaRPr>
-          </a:p>
-          <a:p>
-            <a:pPr marL="457200" lvl="1" indent="0">
-              <a:buNone/>
-            </a:pPr>
-            <a:endParaRPr lang="en-US" altLang="zh-CN" sz="2000" baseline="30000" dirty="0">
-              <a:latin typeface="+mn-lt"/>
-              <a:cs typeface="Times New Roman" panose="02020603050405020304" pitchFamily="18" charset="0"/>
-            </a:endParaRPr>
-          </a:p>
-          <a:p>
-            <a:pPr marL="457200" lvl="1" indent="0">
-              <a:buNone/>
-            </a:pPr>
-            <a:endParaRPr lang="en-US" altLang="zh-CN" sz="2000" baseline="30000" dirty="0">
-              <a:latin typeface="+mn-lt"/>
-              <a:cs typeface="Times New Roman" panose="02020603050405020304" pitchFamily="18" charset="0"/>
-            </a:endParaRPr>
-          </a:p>
-          <a:p>
-            <a:pPr marL="457200" lvl="1" indent="0">
-              <a:buNone/>
-            </a:pPr>
-            <a:endParaRPr lang="en-US" altLang="zh-CN" sz="2000" baseline="30000" dirty="0">
-              <a:latin typeface="+mn-lt"/>
-              <a:cs typeface="Times New Roman" panose="02020603050405020304" pitchFamily="18" charset="0"/>
-            </a:endParaRPr>
-          </a:p>
-          <a:p>
-            <a:pPr marL="457200" lvl="1" indent="0">
-              <a:buNone/>
-            </a:pPr>
-            <a:endParaRPr lang="en-US" altLang="zh-CN" sz="2000" baseline="30000" dirty="0">
-              <a:latin typeface="+mn-lt"/>
-              <a:cs typeface="Times New Roman" panose="02020603050405020304" pitchFamily="18" charset="0"/>
-            </a:endParaRPr>
-          </a:p>
-          <a:p>
-            <a:pPr marL="457200" lvl="1" indent="0">
-              <a:buNone/>
-            </a:pPr>
-            <a:endParaRPr lang="en-US" altLang="zh-CN" sz="2000" baseline="30000" dirty="0">
-              <a:latin typeface="+mn-lt"/>
-              <a:cs typeface="Times New Roman" panose="02020603050405020304" pitchFamily="18" charset="0"/>
-            </a:endParaRPr>
-          </a:p>
-          <a:p>
-            <a:pPr marL="457200" lvl="1" indent="0">
-              <a:buNone/>
-            </a:pPr>
-            <a:endParaRPr lang="en-US" altLang="zh-CN" sz="2000" baseline="30000" dirty="0">
-              <a:latin typeface="+mn-lt"/>
-              <a:cs typeface="Times New Roman" panose="02020603050405020304" pitchFamily="18" charset="0"/>
-            </a:endParaRPr>
-          </a:p>
-          <a:p>
-            <a:pPr>
-              <a:lnSpc>
-                <a:spcPct val="125000"/>
-              </a:lnSpc>
-            </a:pPr>
-            <a:endParaRPr lang="en-US" altLang="zh-CN" sz="2400" dirty="0">
-              <a:latin typeface="+mn-lt"/>
-              <a:cs typeface="Times New Roman" panose="02020603050405020304" pitchFamily="18" charset="0"/>
-            </a:endParaRPr>
-          </a:p>
-          <a:p>
-            <a:pPr marL="457200" lvl="1" indent="0">
-              <a:lnSpc>
-                <a:spcPct val="125000"/>
-              </a:lnSpc>
-              <a:buNone/>
-            </a:pPr>
-            <a:endParaRPr lang="en-US" altLang="zh-CN" sz="2000" dirty="0">
-              <a:latin typeface="+mn-lt"/>
-              <a:cs typeface="Times New Roman" panose="02020603050405020304" pitchFamily="18" charset="0"/>
-            </a:endParaRPr>
-          </a:p>
-        </p:txBody>
-      </p:sp>
-      <p:sp>
-        <p:nvSpPr>
-          <p:cNvPr id="9" name="Rectangle 2">
-            <a:extLst>
-              <a:ext uri="{FF2B5EF4-FFF2-40B4-BE49-F238E27FC236}">
-                <a16:creationId xmlns:a16="http://schemas.microsoft.com/office/drawing/2014/main" id="{A7EC59C2-06EC-9DCB-0F67-A96A07EDBA34}"/>
-              </a:ext>
-            </a:extLst>
-          </p:cNvPr>
-          <p:cNvSpPr>
-            <a:spLocks noChangeArrowheads="1"/>
-          </p:cNvSpPr>
-          <p:nvPr/>
-        </p:nvSpPr>
-        <p:spPr bwMode="auto">
-          <a:xfrm>
-            <a:off x="0" y="0"/>
-            <a:ext cx="9144000" cy="0"/>
-          </a:xfrm>
-          <a:prstGeom prst="rect">
-            <a:avLst/>
-          </a:prstGeom>
-          <a:noFill/>
-          <a:ln>
-            <a:noFill/>
-          </a:ln>
-          <a:effectLst/>
-          <a:extLst>
-            <a:ext uri="{909E8E84-426E-40DD-AFC4-6F175D3DCCD1}">
-              <a14:hiddenFill xmlns:a14="http://schemas.microsoft.com/office/drawing/2010/main">
-                <a:solidFill>
-                  <a:schemeClr val="accent1"/>
-                </a:solidFill>
-              </a14:hiddenFill>
-            </a:ext>
-            <a:ext uri="{91240B29-F687-4F45-9708-019B960494DF}">
-              <a14:hiddenLine xmlns:a14="http://schemas.microsoft.com/office/drawing/2010/main" w="9525">
-                <a:solidFill>
-                  <a:schemeClr val="tx1"/>
-                </a:solidFill>
-                <a:miter lim="800000"/>
-                <a:headEnd/>
-                <a:tailEnd/>
-              </a14:hiddenLine>
-            </a:ext>
-            <a:ext uri="{AF507438-7753-43E0-B8FC-AC1667EBCBE1}">
-              <a14:hiddenEffects xmlns:a14="http://schemas.microsoft.com/office/drawing/2010/main">
-                <a:effectLst>
-                  <a:outerShdw dist="35921" dir="2700000" algn="ctr" rotWithShape="0">
-                    <a:schemeClr val="bg2"/>
-                  </a:outerShdw>
-                </a:effectLst>
-              </a14:hiddenEffects>
-            </a:ext>
-          </a:extLst>
-        </p:spPr>
-        <p:txBody>
-          <a:bodyPr vert="horz" wrap="none" lIns="91440" tIns="45720" rIns="91440" bIns="45720" numCol="1" anchor="ctr" anchorCtr="0" compatLnSpc="1">
-            <a:prstTxWarp prst="textNoShape">
-              <a:avLst/>
-            </a:prstTxWarp>
-            <a:spAutoFit/>
-          </a:bodyPr>
-          <a:lstStyle/>
-          <a:p>
-            <a:endParaRPr lang="zh-CN" altLang="en-US"/>
-          </a:p>
-        </p:txBody>
-      </p:sp>
-      <p:pic>
-        <p:nvPicPr>
-          <p:cNvPr id="6" name="Picture 5">
-            <a:extLst>
-              <a:ext uri="{FF2B5EF4-FFF2-40B4-BE49-F238E27FC236}">
-                <a16:creationId xmlns:a16="http://schemas.microsoft.com/office/drawing/2014/main" id="{B4478B1B-B0A1-67F4-8FAF-EE7B7DF675B3}"/>
-              </a:ext>
-            </a:extLst>
-          </p:cNvPr>
-          <p:cNvPicPr>
-            <a:picLocks noChangeAspect="1"/>
-          </p:cNvPicPr>
-          <p:nvPr/>
-        </p:nvPicPr>
-        <p:blipFill>
-          <a:blip r:embed="rId3"/>
-          <a:stretch>
-            <a:fillRect/>
-          </a:stretch>
-        </p:blipFill>
-        <p:spPr>
-          <a:xfrm>
-            <a:off x="762000" y="3409974"/>
-            <a:ext cx="3200400" cy="2379915"/>
-          </a:xfrm>
-          <a:prstGeom prst="rect">
-            <a:avLst/>
-          </a:prstGeom>
-        </p:spPr>
-      </p:pic>
-    </p:spTree>
-    <p:extLst>
-      <p:ext uri="{BB962C8B-B14F-4D97-AF65-F5344CB8AC3E}">
-        <p14:creationId xmlns:p14="http://schemas.microsoft.com/office/powerpoint/2010/main" val="1082512099"/>
       </p:ext>
     </p:extLst>
   </p:cSld>
@@ -35864,6 +36031,316 @@
     <a:masterClrMapping/>
   </p:clrMapOvr>
   <p:transition spd="med"/>
+</p:sld>
+</file>
+
+<file path=ppt/slides/slide30.xml><?xml version="1.0" encoding="utf-8"?>
+<p:sld xmlns:a="http://schemas.openxmlformats.org/drawingml/2006/main" xmlns:r="http://schemas.openxmlformats.org/officeDocument/2006/relationships" xmlns:p="http://schemas.openxmlformats.org/presentationml/2006/main">
+  <p:cSld>
+    <p:spTree>
+      <p:nvGrpSpPr>
+        <p:cNvPr id="1" name="">
+          <a:extLst>
+            <a:ext uri="{FF2B5EF4-FFF2-40B4-BE49-F238E27FC236}">
+              <a16:creationId xmlns:a16="http://schemas.microsoft.com/office/drawing/2014/main" id="{FD51F8A1-C545-C753-B009-0A022151AB5E}"/>
+            </a:ext>
+          </a:extLst>
+        </p:cNvPr>
+        <p:cNvGrpSpPr/>
+        <p:nvPr/>
+      </p:nvGrpSpPr>
+      <p:grpSpPr>
+        <a:xfrm>
+          <a:off x="0" y="0"/>
+          <a:ext cx="0" cy="0"/>
+          <a:chOff x="0" y="0"/>
+          <a:chExt cx="0" cy="0"/>
+        </a:xfrm>
+      </p:grpSpPr>
+      <p:sp>
+        <p:nvSpPr>
+          <p:cNvPr id="2" name="Title 1">
+            <a:extLst>
+              <a:ext uri="{FF2B5EF4-FFF2-40B4-BE49-F238E27FC236}">
+                <a16:creationId xmlns:a16="http://schemas.microsoft.com/office/drawing/2014/main" id="{29DD39E9-7677-88D7-3BB8-B65B4DFD9039}"/>
+              </a:ext>
+            </a:extLst>
+          </p:cNvPr>
+          <p:cNvSpPr>
+            <a:spLocks noGrp="1"/>
+          </p:cNvSpPr>
+          <p:nvPr>
+            <p:ph type="title"/>
+          </p:nvPr>
+        </p:nvSpPr>
+        <p:spPr>
+          <a:xfrm>
+            <a:off x="152400" y="152400"/>
+            <a:ext cx="8610600" cy="838200"/>
+          </a:xfrm>
+        </p:spPr>
+        <p:txBody>
+          <a:bodyPr/>
+          <a:lstStyle/>
+          <a:p>
+            <a:r>
+              <a:rPr lang="en-US" altLang="zh-CN" dirty="0"/>
+              <a:t>Channel</a:t>
+            </a:r>
+            <a:endParaRPr lang="zh-CN" altLang="en-US" dirty="0"/>
+          </a:p>
+        </p:txBody>
+      </p:sp>
+      <p:sp>
+        <p:nvSpPr>
+          <p:cNvPr id="7" name="内容占位符 2">
+            <a:extLst>
+              <a:ext uri="{FF2B5EF4-FFF2-40B4-BE49-F238E27FC236}">
+                <a16:creationId xmlns:a16="http://schemas.microsoft.com/office/drawing/2014/main" id="{0F9127B6-8915-E052-521C-E8C25F1A38CF}"/>
+              </a:ext>
+            </a:extLst>
+          </p:cNvPr>
+          <p:cNvSpPr>
+            <a:spLocks noGrp="1"/>
+          </p:cNvSpPr>
+          <p:nvPr>
+            <p:ph idx="4294967295"/>
+          </p:nvPr>
+        </p:nvSpPr>
+        <p:spPr>
+          <a:xfrm>
+            <a:off x="93652" y="1068111"/>
+            <a:ext cx="9050348" cy="2376129"/>
+          </a:xfrm>
+        </p:spPr>
+        <p:txBody>
+          <a:bodyPr/>
+          <a:lstStyle/>
+          <a:p>
+            <a:r>
+              <a:rPr lang="pt-BR" altLang="zh-CN" sz="2400" dirty="0">
+                <a:latin typeface="+mn-lt"/>
+                <a:cs typeface="Times New Roman" panose="02020603050405020304" pitchFamily="18" charset="0"/>
+              </a:rPr>
+              <a:t>Explicit vs implicit1D</a:t>
+            </a:r>
+            <a:endParaRPr lang="en-US" altLang="zh-CN" sz="2000" dirty="0">
+              <a:latin typeface="+mn-lt"/>
+              <a:cs typeface="Times New Roman" panose="02020603050405020304" pitchFamily="18" charset="0"/>
+            </a:endParaRPr>
+          </a:p>
+          <a:p>
+            <a:pPr lvl="1"/>
+            <a:r>
+              <a:rPr lang="en-US" altLang="zh-CN" sz="2000" dirty="0">
+                <a:latin typeface="+mn-lt"/>
+                <a:cs typeface="Times New Roman" panose="02020603050405020304" pitchFamily="18" charset="0"/>
+              </a:rPr>
+              <a:t>The results from the explicit and the implicit1D schemes are almost the same</a:t>
+            </a:r>
+            <a:endParaRPr lang="en-US" altLang="zh-CN" sz="2000" baseline="30000" dirty="0">
+              <a:latin typeface="+mn-lt"/>
+              <a:cs typeface="Times New Roman" panose="02020603050405020304" pitchFamily="18" charset="0"/>
+            </a:endParaRPr>
+          </a:p>
+          <a:p>
+            <a:pPr marL="457200" lvl="1" indent="0">
+              <a:buNone/>
+            </a:pPr>
+            <a:endParaRPr lang="en-US" altLang="zh-CN" sz="2000" baseline="30000" dirty="0">
+              <a:latin typeface="+mn-lt"/>
+              <a:cs typeface="Times New Roman" panose="02020603050405020304" pitchFamily="18" charset="0"/>
+            </a:endParaRPr>
+          </a:p>
+          <a:p>
+            <a:pPr marL="457200" lvl="1" indent="0">
+              <a:buNone/>
+            </a:pPr>
+            <a:endParaRPr lang="en-US" altLang="zh-CN" sz="2000" baseline="30000" dirty="0">
+              <a:latin typeface="+mn-lt"/>
+              <a:cs typeface="Times New Roman" panose="02020603050405020304" pitchFamily="18" charset="0"/>
+            </a:endParaRPr>
+          </a:p>
+          <a:p>
+            <a:pPr marL="457200" lvl="1" indent="0">
+              <a:buNone/>
+            </a:pPr>
+            <a:endParaRPr lang="en-US" altLang="zh-CN" sz="2000" baseline="30000" dirty="0">
+              <a:latin typeface="+mn-lt"/>
+              <a:cs typeface="Times New Roman" panose="02020603050405020304" pitchFamily="18" charset="0"/>
+            </a:endParaRPr>
+          </a:p>
+          <a:p>
+            <a:pPr marL="457200" lvl="1" indent="0">
+              <a:buNone/>
+            </a:pPr>
+            <a:endParaRPr lang="en-US" altLang="zh-CN" sz="2000" baseline="30000" dirty="0">
+              <a:latin typeface="+mn-lt"/>
+              <a:cs typeface="Times New Roman" panose="02020603050405020304" pitchFamily="18" charset="0"/>
+            </a:endParaRPr>
+          </a:p>
+          <a:p>
+            <a:pPr marL="457200" lvl="1" indent="0">
+              <a:buNone/>
+            </a:pPr>
+            <a:endParaRPr lang="en-US" altLang="zh-CN" sz="2000" baseline="30000" dirty="0">
+              <a:latin typeface="+mn-lt"/>
+              <a:cs typeface="Times New Roman" panose="02020603050405020304" pitchFamily="18" charset="0"/>
+            </a:endParaRPr>
+          </a:p>
+          <a:p>
+            <a:pPr marL="457200" lvl="1" indent="0">
+              <a:buNone/>
+            </a:pPr>
+            <a:endParaRPr lang="en-US" altLang="zh-CN" sz="2000" baseline="30000" dirty="0">
+              <a:latin typeface="+mn-lt"/>
+              <a:cs typeface="Times New Roman" panose="02020603050405020304" pitchFamily="18" charset="0"/>
+            </a:endParaRPr>
+          </a:p>
+          <a:p>
+            <a:pPr marL="457200" lvl="1" indent="0">
+              <a:buNone/>
+            </a:pPr>
+            <a:endParaRPr lang="en-US" altLang="zh-CN" sz="2000" baseline="30000" dirty="0">
+              <a:latin typeface="+mn-lt"/>
+              <a:cs typeface="Times New Roman" panose="02020603050405020304" pitchFamily="18" charset="0"/>
+            </a:endParaRPr>
+          </a:p>
+          <a:p>
+            <a:pPr>
+              <a:lnSpc>
+                <a:spcPct val="125000"/>
+              </a:lnSpc>
+            </a:pPr>
+            <a:endParaRPr lang="en-US" altLang="zh-CN" sz="2400" dirty="0">
+              <a:latin typeface="+mn-lt"/>
+              <a:cs typeface="Times New Roman" panose="02020603050405020304" pitchFamily="18" charset="0"/>
+            </a:endParaRPr>
+          </a:p>
+          <a:p>
+            <a:pPr marL="457200" lvl="1" indent="0">
+              <a:lnSpc>
+                <a:spcPct val="125000"/>
+              </a:lnSpc>
+              <a:buNone/>
+            </a:pPr>
+            <a:endParaRPr lang="en-US" altLang="zh-CN" sz="2000" dirty="0">
+              <a:latin typeface="+mn-lt"/>
+              <a:cs typeface="Times New Roman" panose="02020603050405020304" pitchFamily="18" charset="0"/>
+            </a:endParaRPr>
+          </a:p>
+        </p:txBody>
+      </p:sp>
+      <p:sp>
+        <p:nvSpPr>
+          <p:cNvPr id="9" name="Rectangle 2">
+            <a:extLst>
+              <a:ext uri="{FF2B5EF4-FFF2-40B4-BE49-F238E27FC236}">
+                <a16:creationId xmlns:a16="http://schemas.microsoft.com/office/drawing/2014/main" id="{A7EC59C2-06EC-9DCB-0F67-A96A07EDBA34}"/>
+              </a:ext>
+            </a:extLst>
+          </p:cNvPr>
+          <p:cNvSpPr>
+            <a:spLocks noChangeArrowheads="1"/>
+          </p:cNvSpPr>
+          <p:nvPr/>
+        </p:nvSpPr>
+        <p:spPr bwMode="auto">
+          <a:xfrm>
+            <a:off x="0" y="0"/>
+            <a:ext cx="9144000" cy="0"/>
+          </a:xfrm>
+          <a:prstGeom prst="rect">
+            <a:avLst/>
+          </a:prstGeom>
+          <a:noFill/>
+          <a:ln>
+            <a:noFill/>
+          </a:ln>
+          <a:effectLst/>
+          <a:extLst>
+            <a:ext uri="{909E8E84-426E-40DD-AFC4-6F175D3DCCD1}">
+              <a14:hiddenFill xmlns:a14="http://schemas.microsoft.com/office/drawing/2010/main">
+                <a:solidFill>
+                  <a:schemeClr val="accent1"/>
+                </a:solidFill>
+              </a14:hiddenFill>
+            </a:ext>
+            <a:ext uri="{91240B29-F687-4F45-9708-019B960494DF}">
+              <a14:hiddenLine xmlns:a14="http://schemas.microsoft.com/office/drawing/2010/main" w="9525">
+                <a:solidFill>
+                  <a:schemeClr val="tx1"/>
+                </a:solidFill>
+                <a:miter lim="800000"/>
+                <a:headEnd/>
+                <a:tailEnd/>
+              </a14:hiddenLine>
+            </a:ext>
+            <a:ext uri="{AF507438-7753-43E0-B8FC-AC1667EBCBE1}">
+              <a14:hiddenEffects xmlns:a14="http://schemas.microsoft.com/office/drawing/2010/main">
+                <a:effectLst>
+                  <a:outerShdw dist="35921" dir="2700000" algn="ctr" rotWithShape="0">
+                    <a:schemeClr val="bg2"/>
+                  </a:outerShdw>
+                </a:effectLst>
+              </a14:hiddenEffects>
+            </a:ext>
+          </a:extLst>
+        </p:spPr>
+        <p:txBody>
+          <a:bodyPr vert="horz" wrap="none" lIns="91440" tIns="45720" rIns="91440" bIns="45720" numCol="1" anchor="ctr" anchorCtr="0" compatLnSpc="1">
+            <a:prstTxWarp prst="textNoShape">
+              <a:avLst/>
+            </a:prstTxWarp>
+            <a:spAutoFit/>
+          </a:bodyPr>
+          <a:lstStyle/>
+          <a:p>
+            <a:endParaRPr lang="zh-CN" altLang="en-US"/>
+          </a:p>
+        </p:txBody>
+      </p:sp>
+      <p:pic>
+        <p:nvPicPr>
+          <p:cNvPr id="6" name="Picture 5">
+            <a:extLst>
+              <a:ext uri="{FF2B5EF4-FFF2-40B4-BE49-F238E27FC236}">
+                <a16:creationId xmlns:a16="http://schemas.microsoft.com/office/drawing/2014/main" id="{B4478B1B-B0A1-67F4-8FAF-EE7B7DF675B3}"/>
+              </a:ext>
+            </a:extLst>
+          </p:cNvPr>
+          <p:cNvPicPr>
+            <a:picLocks noChangeAspect="1"/>
+          </p:cNvPicPr>
+          <p:nvPr/>
+        </p:nvPicPr>
+        <p:blipFill>
+          <a:blip r:embed="rId3"/>
+          <a:stretch>
+            <a:fillRect/>
+          </a:stretch>
+        </p:blipFill>
+        <p:spPr>
+          <a:xfrm>
+            <a:off x="762000" y="3409974"/>
+            <a:ext cx="3200400" cy="2379915"/>
+          </a:xfrm>
+          <a:prstGeom prst="rect">
+            <a:avLst/>
+          </a:prstGeom>
+        </p:spPr>
+      </p:pic>
+    </p:spTree>
+    <p:extLst>
+      <p:ext uri="{BB962C8B-B14F-4D97-AF65-F5344CB8AC3E}">
+        <p14:creationId xmlns:p14="http://schemas.microsoft.com/office/powerpoint/2010/main" val="1082512099"/>
+      </p:ext>
+    </p:extLst>
+  </p:cSld>
+  <p:clrMapOvr>
+    <a:masterClrMapping/>
+  </p:clrMapOvr>
+  <p:transition spd="med" advTm="63997"/>
 </p:sld>
 </file>
 
@@ -36637,17 +37114,17 @@
                 <a:latin typeface="+mn-lt"/>
                 <a:cs typeface="Times New Roman" panose="02020603050405020304" pitchFamily="18" charset="0"/>
               </a:rPr>
-              <a:t> setting, except Reb=13750 (not 13000) </a:t>
+              <a:t> setting, Reb=13750 </a:t>
             </a:r>
           </a:p>
         </p:txBody>
       </p:sp>
       <p:pic>
         <p:nvPicPr>
-          <p:cNvPr id="8" name="Picture 7">
+          <p:cNvPr id="11" name="Picture 10">
             <a:extLst>
               <a:ext uri="{FF2B5EF4-FFF2-40B4-BE49-F238E27FC236}">
-                <a16:creationId xmlns:a16="http://schemas.microsoft.com/office/drawing/2014/main" id="{F417901C-3C6D-4A5E-4ED9-BF573F86F7A4}"/>
+                <a16:creationId xmlns:a16="http://schemas.microsoft.com/office/drawing/2014/main" id="{CF96AF93-7E3C-615E-9690-7F985DBD6F3D}"/>
               </a:ext>
             </a:extLst>
           </p:cNvPr>
@@ -36664,8 +37141,8 @@
         </p:blipFill>
         <p:spPr>
           <a:xfrm>
-            <a:off x="762000" y="2057400"/>
-            <a:ext cx="3200400" cy="2408068"/>
+            <a:off x="1295400" y="2057400"/>
+            <a:ext cx="5934903" cy="4448796"/>
           </a:xfrm>
           <a:prstGeom prst="rect">
             <a:avLst/>
@@ -38009,7 +38486,7 @@
         <p:spPr bwMode="auto">
           <a:xfrm>
             <a:off x="93652" y="1068113"/>
-            <a:ext cx="8897948" cy="1625630"/>
+            <a:ext cx="8897948" cy="2307566"/>
           </a:xfrm>
           <a:prstGeom prst="rect">
             <a:avLst/>
@@ -38263,6 +38740,16 @@
               <a:t>CS0.16 produces the best overall results (CS0.15, best log law)</a:t>
             </a:r>
           </a:p>
+          <a:p>
+            <a:pPr lvl="1"/>
+            <a:r>
+              <a:rPr lang="en-US" altLang="zh-CN" sz="2000" dirty="0">
+                <a:latin typeface="+mn-lt"/>
+                <a:cs typeface="Times New Roman" panose="02020603050405020304" pitchFamily="18" charset="0"/>
+              </a:rPr>
+              <a:t>CS0.11 produces the best results with coarse resolutions in the wall-normal direction</a:t>
+            </a:r>
+          </a:p>
         </p:txBody>
       </p:sp>
       <p:pic>
@@ -38287,7 +38774,7 @@
         </p:blipFill>
         <p:spPr>
           <a:xfrm>
-            <a:off x="4495800" y="2693743"/>
+            <a:off x="4343400" y="3429000"/>
             <a:ext cx="3200400" cy="2406742"/>
           </a:xfrm>
           <a:prstGeom prst="rect">
@@ -38317,7 +38804,7 @@
         </p:blipFill>
         <p:spPr>
           <a:xfrm>
-            <a:off x="1219200" y="5087785"/>
+            <a:off x="1066800" y="5823042"/>
             <a:ext cx="3200400" cy="2387519"/>
           </a:xfrm>
           <a:prstGeom prst="rect">
@@ -38347,7 +38834,7 @@
         </p:blipFill>
         <p:spPr>
           <a:xfrm>
-            <a:off x="4495800" y="5138338"/>
+            <a:off x="4343400" y="5873595"/>
             <a:ext cx="3200400" cy="2405462"/>
           </a:xfrm>
           <a:prstGeom prst="rect">
@@ -38377,7 +38864,7 @@
         </p:blipFill>
         <p:spPr>
           <a:xfrm>
-            <a:off x="1336239" y="2702706"/>
+            <a:off x="1183839" y="3437963"/>
             <a:ext cx="3200400" cy="2388815"/>
           </a:xfrm>
           <a:prstGeom prst="rect">

</xml_diff>

<commit_message>
compute sgs once a physical time step
</commit_message>
<xml_diff>
--- a/docs/vv.pptx
+++ b/docs/vv.pptx
@@ -5,10 +5,10 @@
     <p:sldMasterId id="2147483660" r:id="rId1"/>
   </p:sldMasterIdLst>
   <p:notesMasterIdLst>
-    <p:notesMasterId r:id="rId32"/>
+    <p:notesMasterId r:id="rId33"/>
   </p:notesMasterIdLst>
   <p:handoutMasterIdLst>
-    <p:handoutMasterId r:id="rId33"/>
+    <p:handoutMasterId r:id="rId34"/>
   </p:handoutMasterIdLst>
   <p:sldIdLst>
     <p:sldId id="256" r:id="rId2"/>
@@ -21,26 +21,27 @@
     <p:sldId id="677" r:id="rId9"/>
     <p:sldId id="682" r:id="rId10"/>
     <p:sldId id="684" r:id="rId11"/>
-    <p:sldId id="650" r:id="rId12"/>
-    <p:sldId id="667" r:id="rId13"/>
-    <p:sldId id="679" r:id="rId14"/>
-    <p:sldId id="681" r:id="rId15"/>
-    <p:sldId id="645" r:id="rId16"/>
-    <p:sldId id="658" r:id="rId17"/>
-    <p:sldId id="669" r:id="rId18"/>
-    <p:sldId id="673" r:id="rId19"/>
-    <p:sldId id="661" r:id="rId20"/>
-    <p:sldId id="662" r:id="rId21"/>
-    <p:sldId id="676" r:id="rId22"/>
-    <p:sldId id="663" r:id="rId23"/>
-    <p:sldId id="678" r:id="rId24"/>
-    <p:sldId id="668" r:id="rId25"/>
-    <p:sldId id="670" r:id="rId26"/>
-    <p:sldId id="664" r:id="rId27"/>
-    <p:sldId id="675" r:id="rId28"/>
-    <p:sldId id="655" r:id="rId29"/>
-    <p:sldId id="649" r:id="rId30"/>
-    <p:sldId id="680" r:id="rId31"/>
+    <p:sldId id="685" r:id="rId12"/>
+    <p:sldId id="650" r:id="rId13"/>
+    <p:sldId id="667" r:id="rId14"/>
+    <p:sldId id="679" r:id="rId15"/>
+    <p:sldId id="681" r:id="rId16"/>
+    <p:sldId id="645" r:id="rId17"/>
+    <p:sldId id="658" r:id="rId18"/>
+    <p:sldId id="669" r:id="rId19"/>
+    <p:sldId id="673" r:id="rId20"/>
+    <p:sldId id="661" r:id="rId21"/>
+    <p:sldId id="662" r:id="rId22"/>
+    <p:sldId id="676" r:id="rId23"/>
+    <p:sldId id="663" r:id="rId24"/>
+    <p:sldId id="678" r:id="rId25"/>
+    <p:sldId id="668" r:id="rId26"/>
+    <p:sldId id="670" r:id="rId27"/>
+    <p:sldId id="664" r:id="rId28"/>
+    <p:sldId id="675" r:id="rId29"/>
+    <p:sldId id="655" r:id="rId30"/>
+    <p:sldId id="649" r:id="rId31"/>
+    <p:sldId id="680" r:id="rId32"/>
   </p:sldIdLst>
   <p:sldSz cx="9144000" cy="6858000" type="screen4x3"/>
   <p:notesSz cx="6797675" cy="9931400"/>
@@ -243,7 +244,7 @@
           <a:p>
             <a:fld id="{30C704EE-38E9-4E72-9BB6-71E8241CE3C0}" type="datetimeFigureOut">
               <a:rPr lang="en-US" smtClean="0"/>
-              <a:t>5/6/2024</a:t>
+              <a:t>5/8/2024</a:t>
             </a:fld>
             <a:endParaRPr lang="en-US"/>
           </a:p>
@@ -408,7 +409,7 @@
           <a:p>
             <a:fld id="{0D66AE9B-9EE2-43DA-9A8E-D2E5656B8B43}" type="datetimeFigureOut">
               <a:rPr lang="en-US" smtClean="0"/>
-              <a:t>5/6/2024</a:t>
+              <a:t>5/8/2024</a:t>
             </a:fld>
             <a:endParaRPr lang="en-US"/>
           </a:p>
@@ -857,7 +858,7 @@
     </p:spTree>
     <p:extLst>
       <p:ext uri="{BB962C8B-B14F-4D97-AF65-F5344CB8AC3E}">
-        <p14:creationId xmlns:p14="http://schemas.microsoft.com/office/powerpoint/2010/main" val="1728248813"/>
+        <p14:creationId xmlns:p14="http://schemas.microsoft.com/office/powerpoint/2010/main" val="2389906920"/>
       </p:ext>
     </p:extLst>
   </p:cSld>
@@ -965,7 +966,7 @@
     </p:spTree>
     <p:extLst>
       <p:ext uri="{BB962C8B-B14F-4D97-AF65-F5344CB8AC3E}">
-        <p14:creationId xmlns:p14="http://schemas.microsoft.com/office/powerpoint/2010/main" val="3305118987"/>
+        <p14:creationId xmlns:p14="http://schemas.microsoft.com/office/powerpoint/2010/main" val="1728248813"/>
       </p:ext>
     </p:extLst>
   </p:cSld>
@@ -980,7 +981,13 @@
   <p:cSld>
     <p:spTree>
       <p:nvGrpSpPr>
-        <p:cNvPr id="1" name=""/>
+        <p:cNvPr id="1" name="">
+          <a:extLst>
+            <a:ext uri="{FF2B5EF4-FFF2-40B4-BE49-F238E27FC236}">
+              <a16:creationId xmlns:a16="http://schemas.microsoft.com/office/drawing/2014/main" id="{9BBB1A3A-0F8B-8CC4-7B65-DD508165D59C}"/>
+            </a:ext>
+          </a:extLst>
+        </p:cNvPr>
         <p:cNvGrpSpPr/>
         <p:nvPr/>
       </p:nvGrpSpPr>
@@ -994,7 +1001,13 @@
       </p:grpSpPr>
       <p:sp>
         <p:nvSpPr>
-          <p:cNvPr id="2" name="Slide Image Placeholder 1"/>
+          <p:cNvPr id="2" name="Slide Image Placeholder 1">
+            <a:extLst>
+              <a:ext uri="{FF2B5EF4-FFF2-40B4-BE49-F238E27FC236}">
+                <a16:creationId xmlns:a16="http://schemas.microsoft.com/office/drawing/2014/main" id="{8C48DF48-D2FF-8B3B-980F-E738BE820377}"/>
+              </a:ext>
+            </a:extLst>
+          </p:cNvPr>
           <p:cNvSpPr>
             <a:spLocks noGrp="1" noRot="1" noChangeAspect="1"/>
           </p:cNvSpPr>
@@ -1006,7 +1019,13 @@
       </p:sp>
       <p:sp>
         <p:nvSpPr>
-          <p:cNvPr id="3" name="Notes Placeholder 2"/>
+          <p:cNvPr id="3" name="Notes Placeholder 2">
+            <a:extLst>
+              <a:ext uri="{FF2B5EF4-FFF2-40B4-BE49-F238E27FC236}">
+                <a16:creationId xmlns:a16="http://schemas.microsoft.com/office/drawing/2014/main" id="{8F5F6223-BF06-5DCF-0E5F-9568F632C461}"/>
+              </a:ext>
+            </a:extLst>
+          </p:cNvPr>
           <p:cNvSpPr>
             <a:spLocks noGrp="1"/>
           </p:cNvSpPr>
@@ -1019,16 +1038,19 @@
           <a:bodyPr/>
           <a:lstStyle/>
           <a:p>
-            <a:pPr marL="0" indent="0">
-              <a:buNone/>
-            </a:pPr>
             <a:endParaRPr lang="en-US" dirty="0"/>
           </a:p>
         </p:txBody>
       </p:sp>
       <p:sp>
         <p:nvSpPr>
-          <p:cNvPr id="4" name="Slide Number Placeholder 3"/>
+          <p:cNvPr id="4" name="Slide Number Placeholder 3">
+            <a:extLst>
+              <a:ext uri="{FF2B5EF4-FFF2-40B4-BE49-F238E27FC236}">
+                <a16:creationId xmlns:a16="http://schemas.microsoft.com/office/drawing/2014/main" id="{E2AC06BD-499A-7408-23DF-16318FDE3CFF}"/>
+              </a:ext>
+            </a:extLst>
+          </p:cNvPr>
           <p:cNvSpPr>
             <a:spLocks noGrp="1"/>
           </p:cNvSpPr>
@@ -1052,7 +1074,7 @@
     </p:spTree>
     <p:extLst>
       <p:ext uri="{BB962C8B-B14F-4D97-AF65-F5344CB8AC3E}">
-        <p14:creationId xmlns:p14="http://schemas.microsoft.com/office/powerpoint/2010/main" val="2859619452"/>
+        <p14:creationId xmlns:p14="http://schemas.microsoft.com/office/powerpoint/2010/main" val="3305118987"/>
       </p:ext>
     </p:extLst>
   </p:cSld>
@@ -1139,7 +1161,7 @@
     </p:spTree>
     <p:extLst>
       <p:ext uri="{BB962C8B-B14F-4D97-AF65-F5344CB8AC3E}">
-        <p14:creationId xmlns:p14="http://schemas.microsoft.com/office/powerpoint/2010/main" val="903497370"/>
+        <p14:creationId xmlns:p14="http://schemas.microsoft.com/office/powerpoint/2010/main" val="2859619452"/>
       </p:ext>
     </p:extLst>
   </p:cSld>
@@ -1226,7 +1248,7 @@
     </p:spTree>
     <p:extLst>
       <p:ext uri="{BB962C8B-B14F-4D97-AF65-F5344CB8AC3E}">
-        <p14:creationId xmlns:p14="http://schemas.microsoft.com/office/powerpoint/2010/main" val="463014086"/>
+        <p14:creationId xmlns:p14="http://schemas.microsoft.com/office/powerpoint/2010/main" val="903497370"/>
       </p:ext>
     </p:extLst>
   </p:cSld>
@@ -1313,7 +1335,7 @@
     </p:spTree>
     <p:extLst>
       <p:ext uri="{BB962C8B-B14F-4D97-AF65-F5344CB8AC3E}">
-        <p14:creationId xmlns:p14="http://schemas.microsoft.com/office/powerpoint/2010/main" val="3705224790"/>
+        <p14:creationId xmlns:p14="http://schemas.microsoft.com/office/powerpoint/2010/main" val="463014086"/>
       </p:ext>
     </p:extLst>
   </p:cSld>
@@ -1400,7 +1422,7 @@
     </p:spTree>
     <p:extLst>
       <p:ext uri="{BB962C8B-B14F-4D97-AF65-F5344CB8AC3E}">
-        <p14:creationId xmlns:p14="http://schemas.microsoft.com/office/powerpoint/2010/main" val="104754045"/>
+        <p14:creationId xmlns:p14="http://schemas.microsoft.com/office/powerpoint/2010/main" val="3705224790"/>
       </p:ext>
     </p:extLst>
   </p:cSld>
@@ -1487,7 +1509,7 @@
     </p:spTree>
     <p:extLst>
       <p:ext uri="{BB962C8B-B14F-4D97-AF65-F5344CB8AC3E}">
-        <p14:creationId xmlns:p14="http://schemas.microsoft.com/office/powerpoint/2010/main" val="9479848"/>
+        <p14:creationId xmlns:p14="http://schemas.microsoft.com/office/powerpoint/2010/main" val="104754045"/>
       </p:ext>
     </p:extLst>
   </p:cSld>
@@ -1574,7 +1596,7 @@
     </p:spTree>
     <p:extLst>
       <p:ext uri="{BB962C8B-B14F-4D97-AF65-F5344CB8AC3E}">
-        <p14:creationId xmlns:p14="http://schemas.microsoft.com/office/powerpoint/2010/main" val="1390806527"/>
+        <p14:creationId xmlns:p14="http://schemas.microsoft.com/office/powerpoint/2010/main" val="9479848"/>
       </p:ext>
     </p:extLst>
   </p:cSld>
@@ -1661,7 +1683,7 @@
     </p:spTree>
     <p:extLst>
       <p:ext uri="{BB962C8B-B14F-4D97-AF65-F5344CB8AC3E}">
-        <p14:creationId xmlns:p14="http://schemas.microsoft.com/office/powerpoint/2010/main" val="2934220991"/>
+        <p14:creationId xmlns:p14="http://schemas.microsoft.com/office/powerpoint/2010/main" val="1390806527"/>
       </p:ext>
     </p:extLst>
   </p:cSld>
@@ -1856,7 +1878,7 @@
     </p:spTree>
     <p:extLst>
       <p:ext uri="{BB962C8B-B14F-4D97-AF65-F5344CB8AC3E}">
-        <p14:creationId xmlns:p14="http://schemas.microsoft.com/office/powerpoint/2010/main" val="2977735411"/>
+        <p14:creationId xmlns:p14="http://schemas.microsoft.com/office/powerpoint/2010/main" val="2934220991"/>
       </p:ext>
     </p:extLst>
   </p:cSld>
@@ -1934,7 +1956,7 @@
           <a:p>
             <a:fld id="{FFA5E540-6D76-429F-95AD-C7F13B3CAC82}" type="slidenum">
               <a:rPr lang="en-US" smtClean="0"/>
-              <a:t>26</a:t>
+              <a:t>24</a:t>
             </a:fld>
             <a:endParaRPr lang="en-US" dirty="0"/>
           </a:p>
@@ -1943,7 +1965,7 @@
     </p:spTree>
     <p:extLst>
       <p:ext uri="{BB962C8B-B14F-4D97-AF65-F5344CB8AC3E}">
-        <p14:creationId xmlns:p14="http://schemas.microsoft.com/office/powerpoint/2010/main" val="2519188471"/>
+        <p14:creationId xmlns:p14="http://schemas.microsoft.com/office/powerpoint/2010/main" val="2977735411"/>
       </p:ext>
     </p:extLst>
   </p:cSld>
@@ -2030,6 +2052,93 @@
     </p:spTree>
     <p:extLst>
       <p:ext uri="{BB962C8B-B14F-4D97-AF65-F5344CB8AC3E}">
+        <p14:creationId xmlns:p14="http://schemas.microsoft.com/office/powerpoint/2010/main" val="2519188471"/>
+      </p:ext>
+    </p:extLst>
+  </p:cSld>
+  <p:clrMapOvr>
+    <a:masterClrMapping/>
+  </p:clrMapOvr>
+</p:notes>
+</file>
+
+<file path=ppt/notesSlides/notesSlide23.xml><?xml version="1.0" encoding="utf-8"?>
+<p:notes xmlns:a="http://schemas.openxmlformats.org/drawingml/2006/main" xmlns:r="http://schemas.openxmlformats.org/officeDocument/2006/relationships" xmlns:p="http://schemas.openxmlformats.org/presentationml/2006/main">
+  <p:cSld>
+    <p:spTree>
+      <p:nvGrpSpPr>
+        <p:cNvPr id="1" name=""/>
+        <p:cNvGrpSpPr/>
+        <p:nvPr/>
+      </p:nvGrpSpPr>
+      <p:grpSpPr>
+        <a:xfrm>
+          <a:off x="0" y="0"/>
+          <a:ext cx="0" cy="0"/>
+          <a:chOff x="0" y="0"/>
+          <a:chExt cx="0" cy="0"/>
+        </a:xfrm>
+      </p:grpSpPr>
+      <p:sp>
+        <p:nvSpPr>
+          <p:cNvPr id="2" name="Slide Image Placeholder 1"/>
+          <p:cNvSpPr>
+            <a:spLocks noGrp="1" noRot="1" noChangeAspect="1"/>
+          </p:cNvSpPr>
+          <p:nvPr>
+            <p:ph type="sldImg"/>
+          </p:nvPr>
+        </p:nvSpPr>
+        <p:spPr/>
+      </p:sp>
+      <p:sp>
+        <p:nvSpPr>
+          <p:cNvPr id="3" name="Notes Placeholder 2"/>
+          <p:cNvSpPr>
+            <a:spLocks noGrp="1"/>
+          </p:cNvSpPr>
+          <p:nvPr>
+            <p:ph type="body" idx="1"/>
+          </p:nvPr>
+        </p:nvSpPr>
+        <p:spPr/>
+        <p:txBody>
+          <a:bodyPr/>
+          <a:lstStyle/>
+          <a:p>
+            <a:pPr marL="0" indent="0">
+              <a:buNone/>
+            </a:pPr>
+            <a:endParaRPr lang="en-US" dirty="0"/>
+          </a:p>
+        </p:txBody>
+      </p:sp>
+      <p:sp>
+        <p:nvSpPr>
+          <p:cNvPr id="4" name="Slide Number Placeholder 3"/>
+          <p:cNvSpPr>
+            <a:spLocks noGrp="1"/>
+          </p:cNvSpPr>
+          <p:nvPr>
+            <p:ph type="sldNum" sz="quarter" idx="10"/>
+          </p:nvPr>
+        </p:nvSpPr>
+        <p:spPr/>
+        <p:txBody>
+          <a:bodyPr/>
+          <a:lstStyle/>
+          <a:p>
+            <a:fld id="{FFA5E540-6D76-429F-95AD-C7F13B3CAC82}" type="slidenum">
+              <a:rPr lang="en-US" smtClean="0"/>
+              <a:t>28</a:t>
+            </a:fld>
+            <a:endParaRPr lang="en-US" dirty="0"/>
+          </a:p>
+        </p:txBody>
+      </p:sp>
+    </p:spTree>
+    <p:extLst>
+      <p:ext uri="{BB962C8B-B14F-4D97-AF65-F5344CB8AC3E}">
         <p14:creationId xmlns:p14="http://schemas.microsoft.com/office/powerpoint/2010/main" val="3841435580"/>
       </p:ext>
     </p:extLst>
@@ -2040,7 +2149,7 @@
 </p:notes>
 </file>
 
-<file path=ppt/notesSlides/notesSlide23.xml><?xml version="1.0" encoding="utf-8"?>
+<file path=ppt/notesSlides/notesSlide24.xml><?xml version="1.0" encoding="utf-8"?>
 <p:notes xmlns:a="http://schemas.openxmlformats.org/drawingml/2006/main" xmlns:r="http://schemas.openxmlformats.org/officeDocument/2006/relationships" xmlns:p="http://schemas.openxmlformats.org/presentationml/2006/main">
   <p:cSld>
     <p:spTree>
@@ -2132,7 +2241,7 @@
           <a:p>
             <a:fld id="{FFA5E540-6D76-429F-95AD-C7F13B3CAC82}" type="slidenum">
               <a:rPr lang="en-US" smtClean="0"/>
-              <a:t>28</a:t>
+              <a:t>29</a:t>
             </a:fld>
             <a:endParaRPr lang="en-US" dirty="0"/>
           </a:p>
@@ -2142,114 +2251,6 @@
     <p:extLst>
       <p:ext uri="{BB962C8B-B14F-4D97-AF65-F5344CB8AC3E}">
         <p14:creationId xmlns:p14="http://schemas.microsoft.com/office/powerpoint/2010/main" val="3186069772"/>
-      </p:ext>
-    </p:extLst>
-  </p:cSld>
-  <p:clrMapOvr>
-    <a:masterClrMapping/>
-  </p:clrMapOvr>
-</p:notes>
-</file>
-
-<file path=ppt/notesSlides/notesSlide24.xml><?xml version="1.0" encoding="utf-8"?>
-<p:notes xmlns:a="http://schemas.openxmlformats.org/drawingml/2006/main" xmlns:r="http://schemas.openxmlformats.org/officeDocument/2006/relationships" xmlns:p="http://schemas.openxmlformats.org/presentationml/2006/main">
-  <p:cSld>
-    <p:spTree>
-      <p:nvGrpSpPr>
-        <p:cNvPr id="1" name="">
-          <a:extLst>
-            <a:ext uri="{FF2B5EF4-FFF2-40B4-BE49-F238E27FC236}">
-              <a16:creationId xmlns:a16="http://schemas.microsoft.com/office/drawing/2014/main" id="{C882B80B-CB29-A50D-A6FD-FD13EE274D25}"/>
-            </a:ext>
-          </a:extLst>
-        </p:cNvPr>
-        <p:cNvGrpSpPr/>
-        <p:nvPr/>
-      </p:nvGrpSpPr>
-      <p:grpSpPr>
-        <a:xfrm>
-          <a:off x="0" y="0"/>
-          <a:ext cx="0" cy="0"/>
-          <a:chOff x="0" y="0"/>
-          <a:chExt cx="0" cy="0"/>
-        </a:xfrm>
-      </p:grpSpPr>
-      <p:sp>
-        <p:nvSpPr>
-          <p:cNvPr id="2" name="Slide Image Placeholder 1">
-            <a:extLst>
-              <a:ext uri="{FF2B5EF4-FFF2-40B4-BE49-F238E27FC236}">
-                <a16:creationId xmlns:a16="http://schemas.microsoft.com/office/drawing/2014/main" id="{3B4AD0FE-F436-7846-4C90-2D2DFA3BE74D}"/>
-              </a:ext>
-            </a:extLst>
-          </p:cNvPr>
-          <p:cNvSpPr>
-            <a:spLocks noGrp="1" noRot="1" noChangeAspect="1"/>
-          </p:cNvSpPr>
-          <p:nvPr>
-            <p:ph type="sldImg"/>
-          </p:nvPr>
-        </p:nvSpPr>
-        <p:spPr/>
-      </p:sp>
-      <p:sp>
-        <p:nvSpPr>
-          <p:cNvPr id="3" name="Notes Placeholder 2">
-            <a:extLst>
-              <a:ext uri="{FF2B5EF4-FFF2-40B4-BE49-F238E27FC236}">
-                <a16:creationId xmlns:a16="http://schemas.microsoft.com/office/drawing/2014/main" id="{C913C41C-7569-43A2-D2A2-9644A4B7406A}"/>
-              </a:ext>
-            </a:extLst>
-          </p:cNvPr>
-          <p:cNvSpPr>
-            <a:spLocks noGrp="1"/>
-          </p:cNvSpPr>
-          <p:nvPr>
-            <p:ph type="body" idx="1"/>
-          </p:nvPr>
-        </p:nvSpPr>
-        <p:spPr/>
-        <p:txBody>
-          <a:bodyPr/>
-          <a:lstStyle/>
-          <a:p>
-            <a:endParaRPr lang="en-US" dirty="0"/>
-          </a:p>
-        </p:txBody>
-      </p:sp>
-      <p:sp>
-        <p:nvSpPr>
-          <p:cNvPr id="4" name="Slide Number Placeholder 3">
-            <a:extLst>
-              <a:ext uri="{FF2B5EF4-FFF2-40B4-BE49-F238E27FC236}">
-                <a16:creationId xmlns:a16="http://schemas.microsoft.com/office/drawing/2014/main" id="{4EC37134-B491-46FE-58C3-889B9BADFCED}"/>
-              </a:ext>
-            </a:extLst>
-          </p:cNvPr>
-          <p:cNvSpPr>
-            <a:spLocks noGrp="1"/>
-          </p:cNvSpPr>
-          <p:nvPr>
-            <p:ph type="sldNum" sz="quarter" idx="10"/>
-          </p:nvPr>
-        </p:nvSpPr>
-        <p:spPr/>
-        <p:txBody>
-          <a:bodyPr/>
-          <a:lstStyle/>
-          <a:p>
-            <a:fld id="{FFA5E540-6D76-429F-95AD-C7F13B3CAC82}" type="slidenum">
-              <a:rPr lang="en-US" smtClean="0"/>
-              <a:t>29</a:t>
-            </a:fld>
-            <a:endParaRPr lang="en-US" dirty="0"/>
-          </a:p>
-        </p:txBody>
-      </p:sp>
-    </p:spTree>
-    <p:extLst>
-      <p:ext uri="{BB962C8B-B14F-4D97-AF65-F5344CB8AC3E}">
-        <p14:creationId xmlns:p14="http://schemas.microsoft.com/office/powerpoint/2010/main" val="3062646772"/>
       </p:ext>
     </p:extLst>
   </p:cSld>
@@ -2349,6 +2350,114 @@
             <a:fld id="{FFA5E540-6D76-429F-95AD-C7F13B3CAC82}" type="slidenum">
               <a:rPr lang="en-US" smtClean="0"/>
               <a:t>30</a:t>
+            </a:fld>
+            <a:endParaRPr lang="en-US" dirty="0"/>
+          </a:p>
+        </p:txBody>
+      </p:sp>
+    </p:spTree>
+    <p:extLst>
+      <p:ext uri="{BB962C8B-B14F-4D97-AF65-F5344CB8AC3E}">
+        <p14:creationId xmlns:p14="http://schemas.microsoft.com/office/powerpoint/2010/main" val="3062646772"/>
+      </p:ext>
+    </p:extLst>
+  </p:cSld>
+  <p:clrMapOvr>
+    <a:masterClrMapping/>
+  </p:clrMapOvr>
+</p:notes>
+</file>
+
+<file path=ppt/notesSlides/notesSlide26.xml><?xml version="1.0" encoding="utf-8"?>
+<p:notes xmlns:a="http://schemas.openxmlformats.org/drawingml/2006/main" xmlns:r="http://schemas.openxmlformats.org/officeDocument/2006/relationships" xmlns:p="http://schemas.openxmlformats.org/presentationml/2006/main">
+  <p:cSld>
+    <p:spTree>
+      <p:nvGrpSpPr>
+        <p:cNvPr id="1" name="">
+          <a:extLst>
+            <a:ext uri="{FF2B5EF4-FFF2-40B4-BE49-F238E27FC236}">
+              <a16:creationId xmlns:a16="http://schemas.microsoft.com/office/drawing/2014/main" id="{C882B80B-CB29-A50D-A6FD-FD13EE274D25}"/>
+            </a:ext>
+          </a:extLst>
+        </p:cNvPr>
+        <p:cNvGrpSpPr/>
+        <p:nvPr/>
+      </p:nvGrpSpPr>
+      <p:grpSpPr>
+        <a:xfrm>
+          <a:off x="0" y="0"/>
+          <a:ext cx="0" cy="0"/>
+          <a:chOff x="0" y="0"/>
+          <a:chExt cx="0" cy="0"/>
+        </a:xfrm>
+      </p:grpSpPr>
+      <p:sp>
+        <p:nvSpPr>
+          <p:cNvPr id="2" name="Slide Image Placeholder 1">
+            <a:extLst>
+              <a:ext uri="{FF2B5EF4-FFF2-40B4-BE49-F238E27FC236}">
+                <a16:creationId xmlns:a16="http://schemas.microsoft.com/office/drawing/2014/main" id="{3B4AD0FE-F436-7846-4C90-2D2DFA3BE74D}"/>
+              </a:ext>
+            </a:extLst>
+          </p:cNvPr>
+          <p:cNvSpPr>
+            <a:spLocks noGrp="1" noRot="1" noChangeAspect="1"/>
+          </p:cNvSpPr>
+          <p:nvPr>
+            <p:ph type="sldImg"/>
+          </p:nvPr>
+        </p:nvSpPr>
+        <p:spPr/>
+      </p:sp>
+      <p:sp>
+        <p:nvSpPr>
+          <p:cNvPr id="3" name="Notes Placeholder 2">
+            <a:extLst>
+              <a:ext uri="{FF2B5EF4-FFF2-40B4-BE49-F238E27FC236}">
+                <a16:creationId xmlns:a16="http://schemas.microsoft.com/office/drawing/2014/main" id="{C913C41C-7569-43A2-D2A2-9644A4B7406A}"/>
+              </a:ext>
+            </a:extLst>
+          </p:cNvPr>
+          <p:cNvSpPr>
+            <a:spLocks noGrp="1"/>
+          </p:cNvSpPr>
+          <p:nvPr>
+            <p:ph type="body" idx="1"/>
+          </p:nvPr>
+        </p:nvSpPr>
+        <p:spPr/>
+        <p:txBody>
+          <a:bodyPr/>
+          <a:lstStyle/>
+          <a:p>
+            <a:endParaRPr lang="en-US" dirty="0"/>
+          </a:p>
+        </p:txBody>
+      </p:sp>
+      <p:sp>
+        <p:nvSpPr>
+          <p:cNvPr id="4" name="Slide Number Placeholder 3">
+            <a:extLst>
+              <a:ext uri="{FF2B5EF4-FFF2-40B4-BE49-F238E27FC236}">
+                <a16:creationId xmlns:a16="http://schemas.microsoft.com/office/drawing/2014/main" id="{4EC37134-B491-46FE-58C3-889B9BADFCED}"/>
+              </a:ext>
+            </a:extLst>
+          </p:cNvPr>
+          <p:cNvSpPr>
+            <a:spLocks noGrp="1"/>
+          </p:cNvSpPr>
+          <p:nvPr>
+            <p:ph type="sldNum" sz="quarter" idx="10"/>
+          </p:nvPr>
+        </p:nvSpPr>
+        <p:spPr/>
+        <p:txBody>
+          <a:bodyPr/>
+          <a:lstStyle/>
+          <a:p>
+            <a:fld id="{FFA5E540-6D76-429F-95AD-C7F13B3CAC82}" type="slidenum">
+              <a:rPr lang="en-US" smtClean="0"/>
+              <a:t>31</a:t>
             </a:fld>
             <a:endParaRPr lang="en-US" dirty="0"/>
           </a:p>
@@ -2984,7 +3093,7 @@
     </p:spTree>
     <p:extLst>
       <p:ext uri="{BB962C8B-B14F-4D97-AF65-F5344CB8AC3E}">
-        <p14:creationId xmlns:p14="http://schemas.microsoft.com/office/powerpoint/2010/main" val="4119098890"/>
+        <p14:creationId xmlns:p14="http://schemas.microsoft.com/office/powerpoint/2010/main" val="2967000253"/>
       </p:ext>
     </p:extLst>
   </p:cSld>
@@ -3092,7 +3201,7 @@
     </p:spTree>
     <p:extLst>
       <p:ext uri="{BB962C8B-B14F-4D97-AF65-F5344CB8AC3E}">
-        <p14:creationId xmlns:p14="http://schemas.microsoft.com/office/powerpoint/2010/main" val="2389906920"/>
+        <p14:creationId xmlns:p14="http://schemas.microsoft.com/office/powerpoint/2010/main" val="4119098890"/>
       </p:ext>
     </p:extLst>
   </p:cSld>
@@ -22284,7 +22393,7 @@
           <a:p>
             <a:fld id="{F7015205-6E1C-4AA4-A1F5-F88A14739F8D}" type="datetime1">
               <a:rPr lang="en-US" altLang="zh-CN" smtClean="0"/>
-              <a:t>5/6/2024</a:t>
+              <a:t>5/8/2024</a:t>
             </a:fld>
             <a:endParaRPr lang="en-US"/>
           </a:p>
@@ -22494,7 +22603,7 @@
           <a:p>
             <a:fld id="{C5005B59-A863-49AB-8A46-4FABF628DCDB}" type="datetime1">
               <a:rPr lang="en-US" altLang="zh-CN" smtClean="0"/>
-              <a:t>5/6/2024</a:t>
+              <a:t>5/8/2024</a:t>
             </a:fld>
             <a:endParaRPr lang="en-US"/>
           </a:p>
@@ -22669,7 +22778,7 @@
           <a:p>
             <a:fld id="{B9B359B8-BB35-4942-BB3F-553087A1AB07}" type="datetime1">
               <a:rPr lang="en-US" altLang="zh-CN" smtClean="0"/>
-              <a:t>5/6/2024</a:t>
+              <a:t>5/8/2024</a:t>
             </a:fld>
             <a:endParaRPr lang="en-US"/>
           </a:p>
@@ -22834,7 +22943,7 @@
           <a:p>
             <a:fld id="{0051FDAB-E13B-4DED-ACB5-C97F04F9745D}" type="datetime1">
               <a:rPr lang="en-US" altLang="zh-CN" smtClean="0"/>
-              <a:t>5/6/2024</a:t>
+              <a:t>5/8/2024</a:t>
             </a:fld>
             <a:endParaRPr lang="en-US"/>
           </a:p>
@@ -23021,7 +23130,7 @@
           <a:p>
             <a:fld id="{411C2638-AFB1-4A52-81EA-13B8957633A2}" type="datetime1">
               <a:rPr lang="en-US" altLang="zh-CN" smtClean="0"/>
-              <a:t>5/6/2024</a:t>
+              <a:t>5/8/2024</a:t>
             </a:fld>
             <a:endParaRPr lang="en-US"/>
           </a:p>
@@ -23304,7 +23413,7 @@
           <a:p>
             <a:fld id="{86FEA545-9191-4074-8B47-064CD17714D7}" type="datetime1">
               <a:rPr lang="en-US" altLang="zh-CN" smtClean="0"/>
-              <a:t>5/6/2024</a:t>
+              <a:t>5/8/2024</a:t>
             </a:fld>
             <a:endParaRPr lang="en-US"/>
           </a:p>
@@ -23726,7 +23835,7 @@
           <a:p>
             <a:fld id="{FEDA739D-67B9-461E-9E24-584E6BDA3BCB}" type="datetime1">
               <a:rPr lang="en-US" altLang="zh-CN" smtClean="0"/>
-              <a:t>5/6/2024</a:t>
+              <a:t>5/8/2024</a:t>
             </a:fld>
             <a:endParaRPr lang="en-US"/>
           </a:p>
@@ -23839,7 +23948,7 @@
           <a:p>
             <a:fld id="{9B17A94F-F96B-45CF-824C-A53F0758AB69}" type="datetime1">
               <a:rPr lang="en-US" altLang="zh-CN" smtClean="0"/>
-              <a:t>5/6/2024</a:t>
+              <a:t>5/8/2024</a:t>
             </a:fld>
             <a:endParaRPr lang="en-US"/>
           </a:p>
@@ -23929,7 +24038,7 @@
           <a:p>
             <a:fld id="{0E7E811E-CB35-486D-A51A-D28D7B88C8A1}" type="datetime1">
               <a:rPr lang="en-US" altLang="zh-CN" smtClean="0"/>
-              <a:t>5/6/2024</a:t>
+              <a:t>5/8/2024</a:t>
             </a:fld>
             <a:endParaRPr lang="en-US"/>
           </a:p>
@@ -24201,7 +24310,7 @@
           <a:p>
             <a:fld id="{49060A9D-03E3-407A-91FE-4FD83FD5236C}" type="datetime1">
               <a:rPr lang="en-US" altLang="zh-CN" smtClean="0"/>
-              <a:t>5/6/2024</a:t>
+              <a:t>5/8/2024</a:t>
             </a:fld>
             <a:endParaRPr lang="en-US"/>
           </a:p>
@@ -24454,7 +24563,7 @@
           <a:p>
             <a:fld id="{27EABF16-FC76-43D1-8210-F66033CB86AD}" type="datetime1">
               <a:rPr lang="en-US" altLang="zh-CN" smtClean="0"/>
-              <a:t>5/6/2024</a:t>
+              <a:t>5/8/2024</a:t>
             </a:fld>
             <a:endParaRPr lang="en-US"/>
           </a:p>
@@ -24716,7 +24825,7 @@
           <a:p>
             <a:fld id="{5C24D9CC-1561-4C99-B045-95C038C2B123}" type="datetime1">
               <a:rPr lang="en-US" altLang="zh-CN" smtClean="0"/>
-              <a:t>5/6/2024</a:t>
+              <a:t>5/8/2024</a:t>
             </a:fld>
             <a:endParaRPr lang="en-US"/>
           </a:p>
@@ -26174,6 +26283,370 @@
       </p:sp>
       <p:sp>
         <p:nvSpPr>
+          <p:cNvPr id="3" name="内容占位符 2">
+            <a:extLst>
+              <a:ext uri="{FF2B5EF4-FFF2-40B4-BE49-F238E27FC236}">
+                <a16:creationId xmlns:a16="http://schemas.microsoft.com/office/drawing/2014/main" id="{546BAD6D-09F4-5710-5F64-F0C2FF48AF3D}"/>
+              </a:ext>
+            </a:extLst>
+          </p:cNvPr>
+          <p:cNvSpPr txBox="1">
+            <a:spLocks/>
+          </p:cNvSpPr>
+          <p:nvPr/>
+        </p:nvSpPr>
+        <p:spPr bwMode="auto">
+          <a:xfrm>
+            <a:off x="93652" y="1068113"/>
+            <a:ext cx="8897948" cy="1065487"/>
+          </a:xfrm>
+          <a:prstGeom prst="rect">
+            <a:avLst/>
+          </a:prstGeom>
+          <a:noFill/>
+          <a:ln>
+            <a:noFill/>
+          </a:ln>
+          <a:extLst>
+            <a:ext uri="{909E8E84-426E-40DD-AFC4-6F175D3DCCD1}">
+              <a14:hiddenFill xmlns:a14="http://schemas.microsoft.com/office/drawing/2010/main">
+                <a:solidFill>
+                  <a:srgbClr val="FFFFFF"/>
+                </a:solidFill>
+              </a14:hiddenFill>
+            </a:ext>
+            <a:ext uri="{91240B29-F687-4F45-9708-019B960494DF}">
+              <a14:hiddenLine xmlns:a14="http://schemas.microsoft.com/office/drawing/2010/main" w="28575">
+                <a:solidFill>
+                  <a:srgbClr val="000000"/>
+                </a:solidFill>
+                <a:miter lim="800000"/>
+                <a:headEnd/>
+                <a:tailEnd/>
+              </a14:hiddenLine>
+            </a:ext>
+          </a:extLst>
+        </p:spPr>
+        <p:txBody>
+          <a:bodyPr vert="horz" wrap="square" lIns="91440" tIns="45720" rIns="91440" bIns="45720" numCol="1" anchor="t" anchorCtr="0" compatLnSpc="1">
+            <a:prstTxWarp prst="textNoShape">
+              <a:avLst/>
+            </a:prstTxWarp>
+          </a:bodyPr>
+          <a:lstStyle>
+            <a:lvl1pPr marL="342900" indent="-342900" algn="l" rtl="0" eaLnBrk="1" fontAlgn="base" hangingPunct="1">
+              <a:spcBef>
+                <a:spcPct val="30000"/>
+              </a:spcBef>
+              <a:spcAft>
+                <a:spcPct val="0"/>
+              </a:spcAft>
+              <a:buClr>
+                <a:schemeClr val="hlink"/>
+              </a:buClr>
+              <a:buFont typeface="Wingdings" pitchFamily="2" charset="2"/>
+              <a:buChar char="§"/>
+              <a:defRPr sz="3200">
+                <a:solidFill>
+                  <a:srgbClr val="000066"/>
+                </a:solidFill>
+                <a:latin typeface="微软雅黑" pitchFamily="34" charset="-122"/>
+                <a:ea typeface="微软雅黑" pitchFamily="34" charset="-122"/>
+                <a:cs typeface="+mn-cs"/>
+              </a:defRPr>
+            </a:lvl1pPr>
+            <a:lvl2pPr marL="742950" indent="-285750" algn="l" rtl="0" eaLnBrk="1" fontAlgn="base" hangingPunct="1">
+              <a:spcBef>
+                <a:spcPct val="30000"/>
+              </a:spcBef>
+              <a:spcAft>
+                <a:spcPct val="0"/>
+              </a:spcAft>
+              <a:buClr>
+                <a:schemeClr val="tx2"/>
+              </a:buClr>
+              <a:buSzPct val="85000"/>
+              <a:buFont typeface="Wingdings" pitchFamily="2" charset="2"/>
+              <a:buChar char="Ø"/>
+              <a:defRPr sz="2800">
+                <a:solidFill>
+                  <a:srgbClr val="006666"/>
+                </a:solidFill>
+                <a:latin typeface="微软雅黑" pitchFamily="34" charset="-122"/>
+                <a:ea typeface="微软雅黑" pitchFamily="34" charset="-122"/>
+              </a:defRPr>
+            </a:lvl2pPr>
+            <a:lvl3pPr marL="1143000" indent="-228600" algn="l" rtl="0" eaLnBrk="1" fontAlgn="base" hangingPunct="1">
+              <a:spcBef>
+                <a:spcPct val="30000"/>
+              </a:spcBef>
+              <a:spcAft>
+                <a:spcPct val="0"/>
+              </a:spcAft>
+              <a:buClr>
+                <a:schemeClr val="hlink"/>
+              </a:buClr>
+              <a:buSzPct val="95000"/>
+              <a:buFont typeface="Wingdings 2" pitchFamily="18" charset="2"/>
+              <a:buChar char="¡"/>
+              <a:defRPr sz="2400">
+                <a:solidFill>
+                  <a:schemeClr val="hlink"/>
+                </a:solidFill>
+                <a:latin typeface="微软雅黑" pitchFamily="34" charset="-122"/>
+                <a:ea typeface="微软雅黑" pitchFamily="34" charset="-122"/>
+              </a:defRPr>
+            </a:lvl3pPr>
+            <a:lvl4pPr marL="1600200" indent="-228600" algn="l" rtl="0" eaLnBrk="1" fontAlgn="base" hangingPunct="1">
+              <a:spcBef>
+                <a:spcPct val="30000"/>
+              </a:spcBef>
+              <a:spcAft>
+                <a:spcPct val="0"/>
+              </a:spcAft>
+              <a:buClr>
+                <a:schemeClr val="tx2"/>
+              </a:buClr>
+              <a:buSzPct val="90000"/>
+              <a:buFont typeface="Wingdings" pitchFamily="2" charset="2"/>
+              <a:buChar char="Ø"/>
+              <a:defRPr sz="2000">
+                <a:solidFill>
+                  <a:srgbClr val="990099"/>
+                </a:solidFill>
+                <a:latin typeface="微软雅黑" pitchFamily="34" charset="-122"/>
+                <a:ea typeface="微软雅黑" pitchFamily="34" charset="-122"/>
+              </a:defRPr>
+            </a:lvl4pPr>
+            <a:lvl5pPr marL="2057400" indent="-228600" algn="l" rtl="0" eaLnBrk="1" fontAlgn="base" hangingPunct="1">
+              <a:spcBef>
+                <a:spcPct val="30000"/>
+              </a:spcBef>
+              <a:spcAft>
+                <a:spcPct val="0"/>
+              </a:spcAft>
+              <a:buClr>
+                <a:schemeClr val="hlink"/>
+              </a:buClr>
+              <a:buFont typeface="Wingdings 2" pitchFamily="18" charset="2"/>
+              <a:buChar char="¡"/>
+              <a:defRPr sz="2000">
+                <a:solidFill>
+                  <a:schemeClr val="tx1"/>
+                </a:solidFill>
+                <a:latin typeface="微软雅黑" pitchFamily="34" charset="-122"/>
+                <a:ea typeface="微软雅黑" pitchFamily="34" charset="-122"/>
+              </a:defRPr>
+            </a:lvl5pPr>
+            <a:lvl6pPr marL="2514600" indent="-228600" algn="l" rtl="0" eaLnBrk="1" fontAlgn="base" hangingPunct="1">
+              <a:spcBef>
+                <a:spcPct val="30000"/>
+              </a:spcBef>
+              <a:spcAft>
+                <a:spcPct val="0"/>
+              </a:spcAft>
+              <a:buClr>
+                <a:schemeClr val="hlink"/>
+              </a:buClr>
+              <a:buFont typeface="Wingdings 2" pitchFamily="18" charset="2"/>
+              <a:buChar char="¡"/>
+              <a:defRPr sz="2000">
+                <a:solidFill>
+                  <a:schemeClr val="tx1"/>
+                </a:solidFill>
+                <a:latin typeface="+mn-lt"/>
+                <a:ea typeface="+mn-ea"/>
+              </a:defRPr>
+            </a:lvl6pPr>
+            <a:lvl7pPr marL="2971800" indent="-228600" algn="l" rtl="0" eaLnBrk="1" fontAlgn="base" hangingPunct="1">
+              <a:spcBef>
+                <a:spcPct val="30000"/>
+              </a:spcBef>
+              <a:spcAft>
+                <a:spcPct val="0"/>
+              </a:spcAft>
+              <a:buClr>
+                <a:schemeClr val="hlink"/>
+              </a:buClr>
+              <a:buFont typeface="Wingdings 2" pitchFamily="18" charset="2"/>
+              <a:buChar char="¡"/>
+              <a:defRPr sz="2000">
+                <a:solidFill>
+                  <a:schemeClr val="tx1"/>
+                </a:solidFill>
+                <a:latin typeface="+mn-lt"/>
+                <a:ea typeface="+mn-ea"/>
+              </a:defRPr>
+            </a:lvl7pPr>
+            <a:lvl8pPr marL="3429000" indent="-228600" algn="l" rtl="0" eaLnBrk="1" fontAlgn="base" hangingPunct="1">
+              <a:spcBef>
+                <a:spcPct val="30000"/>
+              </a:spcBef>
+              <a:spcAft>
+                <a:spcPct val="0"/>
+              </a:spcAft>
+              <a:buClr>
+                <a:schemeClr val="hlink"/>
+              </a:buClr>
+              <a:buFont typeface="Wingdings 2" pitchFamily="18" charset="2"/>
+              <a:buChar char="¡"/>
+              <a:defRPr sz="2000">
+                <a:solidFill>
+                  <a:schemeClr val="tx1"/>
+                </a:solidFill>
+                <a:latin typeface="+mn-lt"/>
+                <a:ea typeface="+mn-ea"/>
+              </a:defRPr>
+            </a:lvl8pPr>
+            <a:lvl9pPr marL="3886200" indent="-228600" algn="l" rtl="0" eaLnBrk="1" fontAlgn="base" hangingPunct="1">
+              <a:spcBef>
+                <a:spcPct val="30000"/>
+              </a:spcBef>
+              <a:spcAft>
+                <a:spcPct val="0"/>
+              </a:spcAft>
+              <a:buClr>
+                <a:schemeClr val="hlink"/>
+              </a:buClr>
+              <a:buFont typeface="Wingdings 2" pitchFamily="18" charset="2"/>
+              <a:buChar char="¡"/>
+              <a:defRPr sz="2000">
+                <a:solidFill>
+                  <a:schemeClr val="tx1"/>
+                </a:solidFill>
+                <a:latin typeface="+mn-lt"/>
+                <a:ea typeface="+mn-ea"/>
+              </a:defRPr>
+            </a:lvl9pPr>
+          </a:lstStyle>
+          <a:p>
+            <a:r>
+              <a:rPr lang="en-US" altLang="zh-CN" sz="2400" kern="0" dirty="0">
+                <a:latin typeface="+mn-lt"/>
+                <a:cs typeface="Times New Roman" panose="02020603050405020304" pitchFamily="18" charset="0"/>
+              </a:rPr>
+              <a:t>RETAU550</a:t>
+            </a:r>
+            <a:endParaRPr lang="en-US" altLang="zh-CN" sz="2000" kern="0" dirty="0">
+              <a:latin typeface="+mn-lt"/>
+              <a:cs typeface="Times New Roman" panose="02020603050405020304" pitchFamily="18" charset="0"/>
+            </a:endParaRPr>
+          </a:p>
+          <a:p>
+            <a:pPr lvl="1"/>
+            <a:r>
+              <a:rPr lang="en-US" altLang="zh-CN" sz="2000" dirty="0">
+                <a:latin typeface="+mn-lt"/>
+                <a:cs typeface="Times New Roman" panose="02020603050405020304" pitchFamily="18" charset="0"/>
+              </a:rPr>
+              <a:t>Dynamic Smagorinsky</a:t>
+            </a:r>
+          </a:p>
+        </p:txBody>
+      </p:sp>
+      <p:pic>
+        <p:nvPicPr>
+          <p:cNvPr id="5" name="Picture 4">
+            <a:extLst>
+              <a:ext uri="{FF2B5EF4-FFF2-40B4-BE49-F238E27FC236}">
+                <a16:creationId xmlns:a16="http://schemas.microsoft.com/office/drawing/2014/main" id="{EA8A0B72-9146-92EA-D10D-032CEC70F4BD}"/>
+              </a:ext>
+            </a:extLst>
+          </p:cNvPr>
+          <p:cNvPicPr>
+            <a:picLocks noChangeAspect="1"/>
+          </p:cNvPicPr>
+          <p:nvPr/>
+        </p:nvPicPr>
+        <p:blipFill>
+          <a:blip r:embed="rId3"/>
+          <a:stretch>
+            <a:fillRect/>
+          </a:stretch>
+        </p:blipFill>
+        <p:spPr>
+          <a:xfrm>
+            <a:off x="609600" y="2895600"/>
+            <a:ext cx="3200400" cy="2410624"/>
+          </a:xfrm>
+          <a:prstGeom prst="rect">
+            <a:avLst/>
+          </a:prstGeom>
+        </p:spPr>
+      </p:pic>
+    </p:spTree>
+    <p:extLst>
+      <p:ext uri="{BB962C8B-B14F-4D97-AF65-F5344CB8AC3E}">
+        <p14:creationId xmlns:p14="http://schemas.microsoft.com/office/powerpoint/2010/main" val="906868530"/>
+      </p:ext>
+    </p:extLst>
+  </p:cSld>
+  <p:clrMapOvr>
+    <a:masterClrMapping/>
+  </p:clrMapOvr>
+  <p:transition spd="med" advTm="63997"/>
+</p:sld>
+</file>
+
+<file path=ppt/slides/slide12.xml><?xml version="1.0" encoding="utf-8"?>
+<p:sld xmlns:a="http://schemas.openxmlformats.org/drawingml/2006/main" xmlns:r="http://schemas.openxmlformats.org/officeDocument/2006/relationships" xmlns:p="http://schemas.openxmlformats.org/presentationml/2006/main">
+  <p:cSld>
+    <p:spTree>
+      <p:nvGrpSpPr>
+        <p:cNvPr id="1" name="">
+          <a:extLst>
+            <a:ext uri="{FF2B5EF4-FFF2-40B4-BE49-F238E27FC236}">
+              <a16:creationId xmlns:a16="http://schemas.microsoft.com/office/drawing/2014/main" id="{E36FAF1C-FB3C-6E4F-3EF6-B91416465A30}"/>
+            </a:ext>
+          </a:extLst>
+        </p:cNvPr>
+        <p:cNvGrpSpPr/>
+        <p:nvPr/>
+      </p:nvGrpSpPr>
+      <p:grpSpPr>
+        <a:xfrm>
+          <a:off x="0" y="0"/>
+          <a:ext cx="0" cy="0"/>
+          <a:chOff x="0" y="0"/>
+          <a:chExt cx="0" cy="0"/>
+        </a:xfrm>
+      </p:grpSpPr>
+      <p:sp>
+        <p:nvSpPr>
+          <p:cNvPr id="2" name="Title 1">
+            <a:extLst>
+              <a:ext uri="{FF2B5EF4-FFF2-40B4-BE49-F238E27FC236}">
+                <a16:creationId xmlns:a16="http://schemas.microsoft.com/office/drawing/2014/main" id="{5ADC8DE3-593B-5208-402D-39D2452CA6CD}"/>
+              </a:ext>
+            </a:extLst>
+          </p:cNvPr>
+          <p:cNvSpPr>
+            <a:spLocks noGrp="1"/>
+          </p:cNvSpPr>
+          <p:nvPr>
+            <p:ph type="title"/>
+          </p:nvPr>
+        </p:nvSpPr>
+        <p:spPr>
+          <a:xfrm>
+            <a:off x="152400" y="152400"/>
+            <a:ext cx="8610600" cy="838200"/>
+          </a:xfrm>
+        </p:spPr>
+        <p:txBody>
+          <a:bodyPr/>
+          <a:lstStyle/>
+          <a:p>
+            <a:r>
+              <a:rPr lang="en-US" altLang="zh-CN" dirty="0"/>
+              <a:t>Channel</a:t>
+            </a:r>
+            <a:endParaRPr lang="zh-CN" altLang="en-US" dirty="0"/>
+          </a:p>
+        </p:txBody>
+      </p:sp>
+      <p:sp>
+        <p:nvSpPr>
           <p:cNvPr id="7" name="内容占位符 2">
             <a:extLst>
               <a:ext uri="{FF2B5EF4-FFF2-40B4-BE49-F238E27FC236}">
@@ -26511,7 +26984,7 @@
 </p:sld>
 </file>
 
-<file path=ppt/slides/slide12.xml><?xml version="1.0" encoding="utf-8"?>
+<file path=ppt/slides/slide13.xml><?xml version="1.0" encoding="utf-8"?>
 <p:sld xmlns:a="http://schemas.openxmlformats.org/drawingml/2006/main" xmlns:r="http://schemas.openxmlformats.org/officeDocument/2006/relationships" xmlns:p="http://schemas.openxmlformats.org/presentationml/2006/main">
   <p:cSld>
     <p:spTree>
@@ -26959,7 +27432,7 @@
 </p:sld>
 </file>
 
-<file path=ppt/slides/slide13.xml><?xml version="1.0" encoding="utf-8"?>
+<file path=ppt/slides/slide14.xml><?xml version="1.0" encoding="utf-8"?>
 <p:sld xmlns:a="http://schemas.openxmlformats.org/drawingml/2006/main" xmlns:r="http://schemas.openxmlformats.org/officeDocument/2006/relationships" xmlns:p="http://schemas.openxmlformats.org/presentationml/2006/main">
   <p:cSld>
     <p:spTree>
@@ -27413,7 +27886,7 @@
 </p:sld>
 </file>
 
-<file path=ppt/slides/slide14.xml><?xml version="1.0" encoding="utf-8"?>
+<file path=ppt/slides/slide15.xml><?xml version="1.0" encoding="utf-8"?>
 <p:sld xmlns:a="http://schemas.openxmlformats.org/drawingml/2006/main" xmlns:r="http://schemas.openxmlformats.org/officeDocument/2006/relationships" xmlns:p="http://schemas.openxmlformats.org/presentationml/2006/main">
   <p:cSld>
     <p:spTree>
@@ -27891,7 +28364,7 @@
 </p:sld>
 </file>
 
-<file path=ppt/slides/slide15.xml><?xml version="1.0" encoding="utf-8"?>
+<file path=ppt/slides/slide16.xml><?xml version="1.0" encoding="utf-8"?>
 <p:sld xmlns:a="http://schemas.openxmlformats.org/drawingml/2006/main" xmlns:r="http://schemas.openxmlformats.org/officeDocument/2006/relationships" xmlns:p="http://schemas.openxmlformats.org/presentationml/2006/main">
   <p:cSld>
     <p:spTree>
@@ -28416,7 +28889,7 @@
 </p:sld>
 </file>
 
-<file path=ppt/slides/slide16.xml><?xml version="1.0" encoding="utf-8"?>
+<file path=ppt/slides/slide17.xml><?xml version="1.0" encoding="utf-8"?>
 <p:sld xmlns:a="http://schemas.openxmlformats.org/drawingml/2006/main" xmlns:r="http://schemas.openxmlformats.org/officeDocument/2006/relationships" xmlns:p="http://schemas.openxmlformats.org/presentationml/2006/main">
   <p:cSld>
     <p:spTree>
@@ -28901,7 +29374,7 @@
 </p:sld>
 </file>
 
-<file path=ppt/slides/slide17.xml><?xml version="1.0" encoding="utf-8"?>
+<file path=ppt/slides/slide18.xml><?xml version="1.0" encoding="utf-8"?>
 <p:sld xmlns:a="http://schemas.openxmlformats.org/drawingml/2006/main" xmlns:r="http://schemas.openxmlformats.org/officeDocument/2006/relationships" xmlns:p="http://schemas.openxmlformats.org/presentationml/2006/main">
   <p:cSld>
     <p:spTree>
@@ -29346,7 +29819,7 @@
 </p:sld>
 </file>
 
-<file path=ppt/slides/slide18.xml><?xml version="1.0" encoding="utf-8"?>
+<file path=ppt/slides/slide19.xml><?xml version="1.0" encoding="utf-8"?>
 <p:sld xmlns:a="http://schemas.openxmlformats.org/drawingml/2006/main" xmlns:r="http://schemas.openxmlformats.org/officeDocument/2006/relationships" xmlns:p="http://schemas.openxmlformats.org/presentationml/2006/main">
   <p:cSld>
     <p:spTree>
@@ -29841,421 +30314,6 @@
     <p:extLst>
       <p:ext uri="{BB962C8B-B14F-4D97-AF65-F5344CB8AC3E}">
         <p14:creationId xmlns:p14="http://schemas.microsoft.com/office/powerpoint/2010/main" val="105129163"/>
-      </p:ext>
-    </p:extLst>
-  </p:cSld>
-  <p:clrMapOvr>
-    <a:masterClrMapping/>
-  </p:clrMapOvr>
-  <p:transition spd="med" advTm="63997"/>
-</p:sld>
-</file>
-
-<file path=ppt/slides/slide19.xml><?xml version="1.0" encoding="utf-8"?>
-<p:sld xmlns:a="http://schemas.openxmlformats.org/drawingml/2006/main" xmlns:r="http://schemas.openxmlformats.org/officeDocument/2006/relationships" xmlns:p="http://schemas.openxmlformats.org/presentationml/2006/main">
-  <p:cSld>
-    <p:spTree>
-      <p:nvGrpSpPr>
-        <p:cNvPr id="1" name=""/>
-        <p:cNvGrpSpPr/>
-        <p:nvPr/>
-      </p:nvGrpSpPr>
-      <p:grpSpPr>
-        <a:xfrm>
-          <a:off x="0" y="0"/>
-          <a:ext cx="0" cy="0"/>
-          <a:chOff x="0" y="0"/>
-          <a:chExt cx="0" cy="0"/>
-        </a:xfrm>
-      </p:grpSpPr>
-      <p:sp>
-        <p:nvSpPr>
-          <p:cNvPr id="2" name="Title 1"/>
-          <p:cNvSpPr>
-            <a:spLocks noGrp="1"/>
-          </p:cNvSpPr>
-          <p:nvPr>
-            <p:ph type="title"/>
-          </p:nvPr>
-        </p:nvSpPr>
-        <p:spPr>
-          <a:xfrm>
-            <a:off x="152400" y="152400"/>
-            <a:ext cx="8610600" cy="838200"/>
-          </a:xfrm>
-        </p:spPr>
-        <p:txBody>
-          <a:bodyPr/>
-          <a:lstStyle/>
-          <a:p>
-            <a:r>
-              <a:rPr lang="en-US" altLang="zh-CN" dirty="0"/>
-              <a:t>Channel</a:t>
-            </a:r>
-            <a:endParaRPr lang="zh-CN" altLang="en-US" dirty="0"/>
-          </a:p>
-        </p:txBody>
-      </p:sp>
-      <p:sp>
-        <p:nvSpPr>
-          <p:cNvPr id="9" name="Rectangle 2"/>
-          <p:cNvSpPr>
-            <a:spLocks noChangeArrowheads="1"/>
-          </p:cNvSpPr>
-          <p:nvPr/>
-        </p:nvSpPr>
-        <p:spPr bwMode="auto">
-          <a:xfrm>
-            <a:off x="0" y="0"/>
-            <a:ext cx="9144000" cy="0"/>
-          </a:xfrm>
-          <a:prstGeom prst="rect">
-            <a:avLst/>
-          </a:prstGeom>
-          <a:noFill/>
-          <a:ln>
-            <a:noFill/>
-          </a:ln>
-          <a:effectLst/>
-          <a:extLst>
-            <a:ext uri="{909E8E84-426E-40DD-AFC4-6F175D3DCCD1}">
-              <a14:hiddenFill xmlns:a14="http://schemas.microsoft.com/office/drawing/2010/main">
-                <a:solidFill>
-                  <a:schemeClr val="accent1"/>
-                </a:solidFill>
-              </a14:hiddenFill>
-            </a:ext>
-            <a:ext uri="{91240B29-F687-4F45-9708-019B960494DF}">
-              <a14:hiddenLine xmlns:a14="http://schemas.microsoft.com/office/drawing/2010/main" w="9525">
-                <a:solidFill>
-                  <a:schemeClr val="tx1"/>
-                </a:solidFill>
-                <a:miter lim="800000"/>
-                <a:headEnd/>
-                <a:tailEnd/>
-              </a14:hiddenLine>
-            </a:ext>
-            <a:ext uri="{AF507438-7753-43E0-B8FC-AC1667EBCBE1}">
-              <a14:hiddenEffects xmlns:a14="http://schemas.microsoft.com/office/drawing/2010/main">
-                <a:effectLst>
-                  <a:outerShdw dist="35921" dir="2700000" algn="ctr" rotWithShape="0">
-                    <a:schemeClr val="bg2"/>
-                  </a:outerShdw>
-                </a:effectLst>
-              </a14:hiddenEffects>
-            </a:ext>
-          </a:extLst>
-        </p:spPr>
-        <p:txBody>
-          <a:bodyPr vert="horz" wrap="none" lIns="91440" tIns="45720" rIns="91440" bIns="45720" numCol="1" anchor="ctr" anchorCtr="0" compatLnSpc="1">
-            <a:prstTxWarp prst="textNoShape">
-              <a:avLst/>
-            </a:prstTxWarp>
-            <a:spAutoFit/>
-          </a:bodyPr>
-          <a:lstStyle/>
-          <a:p>
-            <a:endParaRPr lang="zh-CN" altLang="en-US"/>
-          </a:p>
-        </p:txBody>
-      </p:sp>
-      <p:sp>
-        <p:nvSpPr>
-          <p:cNvPr id="17" name="内容占位符 2">
-            <a:extLst>
-              <a:ext uri="{FF2B5EF4-FFF2-40B4-BE49-F238E27FC236}">
-                <a16:creationId xmlns:a16="http://schemas.microsoft.com/office/drawing/2014/main" id="{D7B13CA5-CF5D-287A-9ACB-EF5CA77485F1}"/>
-              </a:ext>
-            </a:extLst>
-          </p:cNvPr>
-          <p:cNvSpPr txBox="1">
-            <a:spLocks/>
-          </p:cNvSpPr>
-          <p:nvPr/>
-        </p:nvSpPr>
-        <p:spPr bwMode="auto">
-          <a:xfrm>
-            <a:off x="93652" y="1068112"/>
-            <a:ext cx="9144000" cy="1399397"/>
-          </a:xfrm>
-          <a:prstGeom prst="rect">
-            <a:avLst/>
-          </a:prstGeom>
-          <a:noFill/>
-          <a:ln>
-            <a:noFill/>
-          </a:ln>
-          <a:extLst>
-            <a:ext uri="{909E8E84-426E-40DD-AFC4-6F175D3DCCD1}">
-              <a14:hiddenFill xmlns:a14="http://schemas.microsoft.com/office/drawing/2010/main">
-                <a:solidFill>
-                  <a:srgbClr val="FFFFFF"/>
-                </a:solidFill>
-              </a14:hiddenFill>
-            </a:ext>
-            <a:ext uri="{91240B29-F687-4F45-9708-019B960494DF}">
-              <a14:hiddenLine xmlns:a14="http://schemas.microsoft.com/office/drawing/2010/main" w="28575">
-                <a:solidFill>
-                  <a:srgbClr val="000000"/>
-                </a:solidFill>
-                <a:miter lim="800000"/>
-                <a:headEnd/>
-                <a:tailEnd/>
-              </a14:hiddenLine>
-            </a:ext>
-          </a:extLst>
-        </p:spPr>
-        <p:txBody>
-          <a:bodyPr vert="horz" wrap="square" lIns="91440" tIns="45720" rIns="91440" bIns="45720" numCol="1" anchor="t" anchorCtr="0" compatLnSpc="1">
-            <a:prstTxWarp prst="textNoShape">
-              <a:avLst/>
-            </a:prstTxWarp>
-          </a:bodyPr>
-          <a:lstStyle>
-            <a:lvl1pPr marL="342900" indent="-342900" algn="l" rtl="0" eaLnBrk="1" fontAlgn="base" hangingPunct="1">
-              <a:spcBef>
-                <a:spcPct val="30000"/>
-              </a:spcBef>
-              <a:spcAft>
-                <a:spcPct val="0"/>
-              </a:spcAft>
-              <a:buClr>
-                <a:schemeClr val="hlink"/>
-              </a:buClr>
-              <a:buFont typeface="Wingdings" pitchFamily="2" charset="2"/>
-              <a:buChar char="§"/>
-              <a:defRPr sz="3200">
-                <a:solidFill>
-                  <a:srgbClr val="000066"/>
-                </a:solidFill>
-                <a:latin typeface="微软雅黑" pitchFamily="34" charset="-122"/>
-                <a:ea typeface="微软雅黑" pitchFamily="34" charset="-122"/>
-                <a:cs typeface="+mn-cs"/>
-              </a:defRPr>
-            </a:lvl1pPr>
-            <a:lvl2pPr marL="742950" indent="-285750" algn="l" rtl="0" eaLnBrk="1" fontAlgn="base" hangingPunct="1">
-              <a:spcBef>
-                <a:spcPct val="30000"/>
-              </a:spcBef>
-              <a:spcAft>
-                <a:spcPct val="0"/>
-              </a:spcAft>
-              <a:buClr>
-                <a:schemeClr val="tx2"/>
-              </a:buClr>
-              <a:buSzPct val="85000"/>
-              <a:buFont typeface="Wingdings" pitchFamily="2" charset="2"/>
-              <a:buChar char="Ø"/>
-              <a:defRPr sz="2800">
-                <a:solidFill>
-                  <a:srgbClr val="006666"/>
-                </a:solidFill>
-                <a:latin typeface="微软雅黑" pitchFamily="34" charset="-122"/>
-                <a:ea typeface="微软雅黑" pitchFamily="34" charset="-122"/>
-              </a:defRPr>
-            </a:lvl2pPr>
-            <a:lvl3pPr marL="1143000" indent="-228600" algn="l" rtl="0" eaLnBrk="1" fontAlgn="base" hangingPunct="1">
-              <a:spcBef>
-                <a:spcPct val="30000"/>
-              </a:spcBef>
-              <a:spcAft>
-                <a:spcPct val="0"/>
-              </a:spcAft>
-              <a:buClr>
-                <a:schemeClr val="hlink"/>
-              </a:buClr>
-              <a:buSzPct val="95000"/>
-              <a:buFont typeface="Wingdings 2" pitchFamily="18" charset="2"/>
-              <a:buChar char="¡"/>
-              <a:defRPr sz="2400">
-                <a:solidFill>
-                  <a:schemeClr val="hlink"/>
-                </a:solidFill>
-                <a:latin typeface="微软雅黑" pitchFamily="34" charset="-122"/>
-                <a:ea typeface="微软雅黑" pitchFamily="34" charset="-122"/>
-              </a:defRPr>
-            </a:lvl3pPr>
-            <a:lvl4pPr marL="1600200" indent="-228600" algn="l" rtl="0" eaLnBrk="1" fontAlgn="base" hangingPunct="1">
-              <a:spcBef>
-                <a:spcPct val="30000"/>
-              </a:spcBef>
-              <a:spcAft>
-                <a:spcPct val="0"/>
-              </a:spcAft>
-              <a:buClr>
-                <a:schemeClr val="tx2"/>
-              </a:buClr>
-              <a:buSzPct val="90000"/>
-              <a:buFont typeface="Wingdings" pitchFamily="2" charset="2"/>
-              <a:buChar char="Ø"/>
-              <a:defRPr sz="2000">
-                <a:solidFill>
-                  <a:srgbClr val="990099"/>
-                </a:solidFill>
-                <a:latin typeface="微软雅黑" pitchFamily="34" charset="-122"/>
-                <a:ea typeface="微软雅黑" pitchFamily="34" charset="-122"/>
-              </a:defRPr>
-            </a:lvl4pPr>
-            <a:lvl5pPr marL="2057400" indent="-228600" algn="l" rtl="0" eaLnBrk="1" fontAlgn="base" hangingPunct="1">
-              <a:spcBef>
-                <a:spcPct val="30000"/>
-              </a:spcBef>
-              <a:spcAft>
-                <a:spcPct val="0"/>
-              </a:spcAft>
-              <a:buClr>
-                <a:schemeClr val="hlink"/>
-              </a:buClr>
-              <a:buFont typeface="Wingdings 2" pitchFamily="18" charset="2"/>
-              <a:buChar char="¡"/>
-              <a:defRPr sz="2000">
-                <a:solidFill>
-                  <a:schemeClr val="tx1"/>
-                </a:solidFill>
-                <a:latin typeface="微软雅黑" pitchFamily="34" charset="-122"/>
-                <a:ea typeface="微软雅黑" pitchFamily="34" charset="-122"/>
-              </a:defRPr>
-            </a:lvl5pPr>
-            <a:lvl6pPr marL="2514600" indent="-228600" algn="l" rtl="0" eaLnBrk="1" fontAlgn="base" hangingPunct="1">
-              <a:spcBef>
-                <a:spcPct val="30000"/>
-              </a:spcBef>
-              <a:spcAft>
-                <a:spcPct val="0"/>
-              </a:spcAft>
-              <a:buClr>
-                <a:schemeClr val="hlink"/>
-              </a:buClr>
-              <a:buFont typeface="Wingdings 2" pitchFamily="18" charset="2"/>
-              <a:buChar char="¡"/>
-              <a:defRPr sz="2000">
-                <a:solidFill>
-                  <a:schemeClr val="tx1"/>
-                </a:solidFill>
-                <a:latin typeface="+mn-lt"/>
-                <a:ea typeface="+mn-ea"/>
-              </a:defRPr>
-            </a:lvl6pPr>
-            <a:lvl7pPr marL="2971800" indent="-228600" algn="l" rtl="0" eaLnBrk="1" fontAlgn="base" hangingPunct="1">
-              <a:spcBef>
-                <a:spcPct val="30000"/>
-              </a:spcBef>
-              <a:spcAft>
-                <a:spcPct val="0"/>
-              </a:spcAft>
-              <a:buClr>
-                <a:schemeClr val="hlink"/>
-              </a:buClr>
-              <a:buFont typeface="Wingdings 2" pitchFamily="18" charset="2"/>
-              <a:buChar char="¡"/>
-              <a:defRPr sz="2000">
-                <a:solidFill>
-                  <a:schemeClr val="tx1"/>
-                </a:solidFill>
-                <a:latin typeface="+mn-lt"/>
-                <a:ea typeface="+mn-ea"/>
-              </a:defRPr>
-            </a:lvl7pPr>
-            <a:lvl8pPr marL="3429000" indent="-228600" algn="l" rtl="0" eaLnBrk="1" fontAlgn="base" hangingPunct="1">
-              <a:spcBef>
-                <a:spcPct val="30000"/>
-              </a:spcBef>
-              <a:spcAft>
-                <a:spcPct val="0"/>
-              </a:spcAft>
-              <a:buClr>
-                <a:schemeClr val="hlink"/>
-              </a:buClr>
-              <a:buFont typeface="Wingdings 2" pitchFamily="18" charset="2"/>
-              <a:buChar char="¡"/>
-              <a:defRPr sz="2000">
-                <a:solidFill>
-                  <a:schemeClr val="tx1"/>
-                </a:solidFill>
-                <a:latin typeface="+mn-lt"/>
-                <a:ea typeface="+mn-ea"/>
-              </a:defRPr>
-            </a:lvl8pPr>
-            <a:lvl9pPr marL="3886200" indent="-228600" algn="l" rtl="0" eaLnBrk="1" fontAlgn="base" hangingPunct="1">
-              <a:spcBef>
-                <a:spcPct val="30000"/>
-              </a:spcBef>
-              <a:spcAft>
-                <a:spcPct val="0"/>
-              </a:spcAft>
-              <a:buClr>
-                <a:schemeClr val="hlink"/>
-              </a:buClr>
-              <a:buFont typeface="Wingdings 2" pitchFamily="18" charset="2"/>
-              <a:buChar char="¡"/>
-              <a:defRPr sz="2000">
-                <a:solidFill>
-                  <a:schemeClr val="tx1"/>
-                </a:solidFill>
-                <a:latin typeface="+mn-lt"/>
-                <a:ea typeface="+mn-ea"/>
-              </a:defRPr>
-            </a:lvl9pPr>
-          </a:lstStyle>
-          <a:p>
-            <a:r>
-              <a:rPr lang="en-US" altLang="zh-CN" sz="2400" kern="0" dirty="0">
-                <a:latin typeface="+mn-lt"/>
-                <a:cs typeface="Times New Roman" panose="02020603050405020304" pitchFamily="18" charset="0"/>
-              </a:rPr>
-              <a:t>RETAU5200</a:t>
-            </a:r>
-            <a:endParaRPr lang="en-US" altLang="zh-CN" sz="2000" kern="0" dirty="0">
-              <a:latin typeface="+mn-lt"/>
-              <a:cs typeface="Times New Roman" panose="02020603050405020304" pitchFamily="18" charset="0"/>
-            </a:endParaRPr>
-          </a:p>
-          <a:p>
-            <a:pPr lvl="1"/>
-            <a:r>
-              <a:rPr lang="en-US" altLang="zh-CN" sz="2000" dirty="0">
-                <a:latin typeface="+mn-lt"/>
-                <a:cs typeface="Times New Roman" panose="02020603050405020304" pitchFamily="18" charset="0"/>
-              </a:rPr>
-              <a:t>CS0 reproduces the statistics without SGS</a:t>
-            </a:r>
-          </a:p>
-        </p:txBody>
-      </p:sp>
-      <p:pic>
-        <p:nvPicPr>
-          <p:cNvPr id="19" name="Picture 18">
-            <a:extLst>
-              <a:ext uri="{FF2B5EF4-FFF2-40B4-BE49-F238E27FC236}">
-                <a16:creationId xmlns:a16="http://schemas.microsoft.com/office/drawing/2014/main" id="{77F3895B-202B-3D41-46E4-68AC6908346D}"/>
-              </a:ext>
-            </a:extLst>
-          </p:cNvPr>
-          <p:cNvPicPr>
-            <a:picLocks noChangeAspect="1"/>
-          </p:cNvPicPr>
-          <p:nvPr/>
-        </p:nvPicPr>
-        <p:blipFill>
-          <a:blip r:embed="rId3"/>
-          <a:stretch>
-            <a:fillRect/>
-          </a:stretch>
-        </p:blipFill>
-        <p:spPr>
-          <a:xfrm>
-            <a:off x="1828800" y="2209800"/>
-            <a:ext cx="5189905" cy="3886200"/>
-          </a:xfrm>
-          <a:prstGeom prst="rect">
-            <a:avLst/>
-          </a:prstGeom>
-        </p:spPr>
-      </p:pic>
-    </p:spTree>
-    <p:extLst>
-      <p:ext uri="{BB962C8B-B14F-4D97-AF65-F5344CB8AC3E}">
-        <p14:creationId xmlns:p14="http://schemas.microsoft.com/office/powerpoint/2010/main" val="1101504850"/>
       </p:ext>
     </p:extLst>
   </p:cSld>
@@ -30873,6 +30931,421 @@
         </p:nvSpPr>
         <p:spPr bwMode="auto">
           <a:xfrm>
+            <a:off x="93652" y="1068112"/>
+            <a:ext cx="9144000" cy="1399397"/>
+          </a:xfrm>
+          <a:prstGeom prst="rect">
+            <a:avLst/>
+          </a:prstGeom>
+          <a:noFill/>
+          <a:ln>
+            <a:noFill/>
+          </a:ln>
+          <a:extLst>
+            <a:ext uri="{909E8E84-426E-40DD-AFC4-6F175D3DCCD1}">
+              <a14:hiddenFill xmlns:a14="http://schemas.microsoft.com/office/drawing/2010/main">
+                <a:solidFill>
+                  <a:srgbClr val="FFFFFF"/>
+                </a:solidFill>
+              </a14:hiddenFill>
+            </a:ext>
+            <a:ext uri="{91240B29-F687-4F45-9708-019B960494DF}">
+              <a14:hiddenLine xmlns:a14="http://schemas.microsoft.com/office/drawing/2010/main" w="28575">
+                <a:solidFill>
+                  <a:srgbClr val="000000"/>
+                </a:solidFill>
+                <a:miter lim="800000"/>
+                <a:headEnd/>
+                <a:tailEnd/>
+              </a14:hiddenLine>
+            </a:ext>
+          </a:extLst>
+        </p:spPr>
+        <p:txBody>
+          <a:bodyPr vert="horz" wrap="square" lIns="91440" tIns="45720" rIns="91440" bIns="45720" numCol="1" anchor="t" anchorCtr="0" compatLnSpc="1">
+            <a:prstTxWarp prst="textNoShape">
+              <a:avLst/>
+            </a:prstTxWarp>
+          </a:bodyPr>
+          <a:lstStyle>
+            <a:lvl1pPr marL="342900" indent="-342900" algn="l" rtl="0" eaLnBrk="1" fontAlgn="base" hangingPunct="1">
+              <a:spcBef>
+                <a:spcPct val="30000"/>
+              </a:spcBef>
+              <a:spcAft>
+                <a:spcPct val="0"/>
+              </a:spcAft>
+              <a:buClr>
+                <a:schemeClr val="hlink"/>
+              </a:buClr>
+              <a:buFont typeface="Wingdings" pitchFamily="2" charset="2"/>
+              <a:buChar char="§"/>
+              <a:defRPr sz="3200">
+                <a:solidFill>
+                  <a:srgbClr val="000066"/>
+                </a:solidFill>
+                <a:latin typeface="微软雅黑" pitchFamily="34" charset="-122"/>
+                <a:ea typeface="微软雅黑" pitchFamily="34" charset="-122"/>
+                <a:cs typeface="+mn-cs"/>
+              </a:defRPr>
+            </a:lvl1pPr>
+            <a:lvl2pPr marL="742950" indent="-285750" algn="l" rtl="0" eaLnBrk="1" fontAlgn="base" hangingPunct="1">
+              <a:spcBef>
+                <a:spcPct val="30000"/>
+              </a:spcBef>
+              <a:spcAft>
+                <a:spcPct val="0"/>
+              </a:spcAft>
+              <a:buClr>
+                <a:schemeClr val="tx2"/>
+              </a:buClr>
+              <a:buSzPct val="85000"/>
+              <a:buFont typeface="Wingdings" pitchFamily="2" charset="2"/>
+              <a:buChar char="Ø"/>
+              <a:defRPr sz="2800">
+                <a:solidFill>
+                  <a:srgbClr val="006666"/>
+                </a:solidFill>
+                <a:latin typeface="微软雅黑" pitchFamily="34" charset="-122"/>
+                <a:ea typeface="微软雅黑" pitchFamily="34" charset="-122"/>
+              </a:defRPr>
+            </a:lvl2pPr>
+            <a:lvl3pPr marL="1143000" indent="-228600" algn="l" rtl="0" eaLnBrk="1" fontAlgn="base" hangingPunct="1">
+              <a:spcBef>
+                <a:spcPct val="30000"/>
+              </a:spcBef>
+              <a:spcAft>
+                <a:spcPct val="0"/>
+              </a:spcAft>
+              <a:buClr>
+                <a:schemeClr val="hlink"/>
+              </a:buClr>
+              <a:buSzPct val="95000"/>
+              <a:buFont typeface="Wingdings 2" pitchFamily="18" charset="2"/>
+              <a:buChar char="¡"/>
+              <a:defRPr sz="2400">
+                <a:solidFill>
+                  <a:schemeClr val="hlink"/>
+                </a:solidFill>
+                <a:latin typeface="微软雅黑" pitchFamily="34" charset="-122"/>
+                <a:ea typeface="微软雅黑" pitchFamily="34" charset="-122"/>
+              </a:defRPr>
+            </a:lvl3pPr>
+            <a:lvl4pPr marL="1600200" indent="-228600" algn="l" rtl="0" eaLnBrk="1" fontAlgn="base" hangingPunct="1">
+              <a:spcBef>
+                <a:spcPct val="30000"/>
+              </a:spcBef>
+              <a:spcAft>
+                <a:spcPct val="0"/>
+              </a:spcAft>
+              <a:buClr>
+                <a:schemeClr val="tx2"/>
+              </a:buClr>
+              <a:buSzPct val="90000"/>
+              <a:buFont typeface="Wingdings" pitchFamily="2" charset="2"/>
+              <a:buChar char="Ø"/>
+              <a:defRPr sz="2000">
+                <a:solidFill>
+                  <a:srgbClr val="990099"/>
+                </a:solidFill>
+                <a:latin typeface="微软雅黑" pitchFamily="34" charset="-122"/>
+                <a:ea typeface="微软雅黑" pitchFamily="34" charset="-122"/>
+              </a:defRPr>
+            </a:lvl4pPr>
+            <a:lvl5pPr marL="2057400" indent="-228600" algn="l" rtl="0" eaLnBrk="1" fontAlgn="base" hangingPunct="1">
+              <a:spcBef>
+                <a:spcPct val="30000"/>
+              </a:spcBef>
+              <a:spcAft>
+                <a:spcPct val="0"/>
+              </a:spcAft>
+              <a:buClr>
+                <a:schemeClr val="hlink"/>
+              </a:buClr>
+              <a:buFont typeface="Wingdings 2" pitchFamily="18" charset="2"/>
+              <a:buChar char="¡"/>
+              <a:defRPr sz="2000">
+                <a:solidFill>
+                  <a:schemeClr val="tx1"/>
+                </a:solidFill>
+                <a:latin typeface="微软雅黑" pitchFamily="34" charset="-122"/>
+                <a:ea typeface="微软雅黑" pitchFamily="34" charset="-122"/>
+              </a:defRPr>
+            </a:lvl5pPr>
+            <a:lvl6pPr marL="2514600" indent="-228600" algn="l" rtl="0" eaLnBrk="1" fontAlgn="base" hangingPunct="1">
+              <a:spcBef>
+                <a:spcPct val="30000"/>
+              </a:spcBef>
+              <a:spcAft>
+                <a:spcPct val="0"/>
+              </a:spcAft>
+              <a:buClr>
+                <a:schemeClr val="hlink"/>
+              </a:buClr>
+              <a:buFont typeface="Wingdings 2" pitchFamily="18" charset="2"/>
+              <a:buChar char="¡"/>
+              <a:defRPr sz="2000">
+                <a:solidFill>
+                  <a:schemeClr val="tx1"/>
+                </a:solidFill>
+                <a:latin typeface="+mn-lt"/>
+                <a:ea typeface="+mn-ea"/>
+              </a:defRPr>
+            </a:lvl6pPr>
+            <a:lvl7pPr marL="2971800" indent="-228600" algn="l" rtl="0" eaLnBrk="1" fontAlgn="base" hangingPunct="1">
+              <a:spcBef>
+                <a:spcPct val="30000"/>
+              </a:spcBef>
+              <a:spcAft>
+                <a:spcPct val="0"/>
+              </a:spcAft>
+              <a:buClr>
+                <a:schemeClr val="hlink"/>
+              </a:buClr>
+              <a:buFont typeface="Wingdings 2" pitchFamily="18" charset="2"/>
+              <a:buChar char="¡"/>
+              <a:defRPr sz="2000">
+                <a:solidFill>
+                  <a:schemeClr val="tx1"/>
+                </a:solidFill>
+                <a:latin typeface="+mn-lt"/>
+                <a:ea typeface="+mn-ea"/>
+              </a:defRPr>
+            </a:lvl7pPr>
+            <a:lvl8pPr marL="3429000" indent="-228600" algn="l" rtl="0" eaLnBrk="1" fontAlgn="base" hangingPunct="1">
+              <a:spcBef>
+                <a:spcPct val="30000"/>
+              </a:spcBef>
+              <a:spcAft>
+                <a:spcPct val="0"/>
+              </a:spcAft>
+              <a:buClr>
+                <a:schemeClr val="hlink"/>
+              </a:buClr>
+              <a:buFont typeface="Wingdings 2" pitchFamily="18" charset="2"/>
+              <a:buChar char="¡"/>
+              <a:defRPr sz="2000">
+                <a:solidFill>
+                  <a:schemeClr val="tx1"/>
+                </a:solidFill>
+                <a:latin typeface="+mn-lt"/>
+                <a:ea typeface="+mn-ea"/>
+              </a:defRPr>
+            </a:lvl8pPr>
+            <a:lvl9pPr marL="3886200" indent="-228600" algn="l" rtl="0" eaLnBrk="1" fontAlgn="base" hangingPunct="1">
+              <a:spcBef>
+                <a:spcPct val="30000"/>
+              </a:spcBef>
+              <a:spcAft>
+                <a:spcPct val="0"/>
+              </a:spcAft>
+              <a:buClr>
+                <a:schemeClr val="hlink"/>
+              </a:buClr>
+              <a:buFont typeface="Wingdings 2" pitchFamily="18" charset="2"/>
+              <a:buChar char="¡"/>
+              <a:defRPr sz="2000">
+                <a:solidFill>
+                  <a:schemeClr val="tx1"/>
+                </a:solidFill>
+                <a:latin typeface="+mn-lt"/>
+                <a:ea typeface="+mn-ea"/>
+              </a:defRPr>
+            </a:lvl9pPr>
+          </a:lstStyle>
+          <a:p>
+            <a:r>
+              <a:rPr lang="en-US" altLang="zh-CN" sz="2400" kern="0" dirty="0">
+                <a:latin typeface="+mn-lt"/>
+                <a:cs typeface="Times New Roman" panose="02020603050405020304" pitchFamily="18" charset="0"/>
+              </a:rPr>
+              <a:t>RETAU5200</a:t>
+            </a:r>
+            <a:endParaRPr lang="en-US" altLang="zh-CN" sz="2000" kern="0" dirty="0">
+              <a:latin typeface="+mn-lt"/>
+              <a:cs typeface="Times New Roman" panose="02020603050405020304" pitchFamily="18" charset="0"/>
+            </a:endParaRPr>
+          </a:p>
+          <a:p>
+            <a:pPr lvl="1"/>
+            <a:r>
+              <a:rPr lang="en-US" altLang="zh-CN" sz="2000" dirty="0">
+                <a:latin typeface="+mn-lt"/>
+                <a:cs typeface="Times New Roman" panose="02020603050405020304" pitchFamily="18" charset="0"/>
+              </a:rPr>
+              <a:t>CS0 reproduces the statistics without SGS</a:t>
+            </a:r>
+          </a:p>
+        </p:txBody>
+      </p:sp>
+      <p:pic>
+        <p:nvPicPr>
+          <p:cNvPr id="19" name="Picture 18">
+            <a:extLst>
+              <a:ext uri="{FF2B5EF4-FFF2-40B4-BE49-F238E27FC236}">
+                <a16:creationId xmlns:a16="http://schemas.microsoft.com/office/drawing/2014/main" id="{77F3895B-202B-3D41-46E4-68AC6908346D}"/>
+              </a:ext>
+            </a:extLst>
+          </p:cNvPr>
+          <p:cNvPicPr>
+            <a:picLocks noChangeAspect="1"/>
+          </p:cNvPicPr>
+          <p:nvPr/>
+        </p:nvPicPr>
+        <p:blipFill>
+          <a:blip r:embed="rId3"/>
+          <a:stretch>
+            <a:fillRect/>
+          </a:stretch>
+        </p:blipFill>
+        <p:spPr>
+          <a:xfrm>
+            <a:off x="1828800" y="2209800"/>
+            <a:ext cx="5189905" cy="3886200"/>
+          </a:xfrm>
+          <a:prstGeom prst="rect">
+            <a:avLst/>
+          </a:prstGeom>
+        </p:spPr>
+      </p:pic>
+    </p:spTree>
+    <p:extLst>
+      <p:ext uri="{BB962C8B-B14F-4D97-AF65-F5344CB8AC3E}">
+        <p14:creationId xmlns:p14="http://schemas.microsoft.com/office/powerpoint/2010/main" val="1101504850"/>
+      </p:ext>
+    </p:extLst>
+  </p:cSld>
+  <p:clrMapOvr>
+    <a:masterClrMapping/>
+  </p:clrMapOvr>
+  <p:transition spd="med" advTm="63997"/>
+</p:sld>
+</file>
+
+<file path=ppt/slides/slide21.xml><?xml version="1.0" encoding="utf-8"?>
+<p:sld xmlns:a="http://schemas.openxmlformats.org/drawingml/2006/main" xmlns:r="http://schemas.openxmlformats.org/officeDocument/2006/relationships" xmlns:p="http://schemas.openxmlformats.org/presentationml/2006/main">
+  <p:cSld>
+    <p:spTree>
+      <p:nvGrpSpPr>
+        <p:cNvPr id="1" name=""/>
+        <p:cNvGrpSpPr/>
+        <p:nvPr/>
+      </p:nvGrpSpPr>
+      <p:grpSpPr>
+        <a:xfrm>
+          <a:off x="0" y="0"/>
+          <a:ext cx="0" cy="0"/>
+          <a:chOff x="0" y="0"/>
+          <a:chExt cx="0" cy="0"/>
+        </a:xfrm>
+      </p:grpSpPr>
+      <p:sp>
+        <p:nvSpPr>
+          <p:cNvPr id="2" name="Title 1"/>
+          <p:cNvSpPr>
+            <a:spLocks noGrp="1"/>
+          </p:cNvSpPr>
+          <p:nvPr>
+            <p:ph type="title"/>
+          </p:nvPr>
+        </p:nvSpPr>
+        <p:spPr>
+          <a:xfrm>
+            <a:off x="152400" y="152400"/>
+            <a:ext cx="8610600" cy="838200"/>
+          </a:xfrm>
+        </p:spPr>
+        <p:txBody>
+          <a:bodyPr/>
+          <a:lstStyle/>
+          <a:p>
+            <a:r>
+              <a:rPr lang="en-US" altLang="zh-CN" dirty="0"/>
+              <a:t>Channel</a:t>
+            </a:r>
+            <a:endParaRPr lang="zh-CN" altLang="en-US" dirty="0"/>
+          </a:p>
+        </p:txBody>
+      </p:sp>
+      <p:sp>
+        <p:nvSpPr>
+          <p:cNvPr id="9" name="Rectangle 2"/>
+          <p:cNvSpPr>
+            <a:spLocks noChangeArrowheads="1"/>
+          </p:cNvSpPr>
+          <p:nvPr/>
+        </p:nvSpPr>
+        <p:spPr bwMode="auto">
+          <a:xfrm>
+            <a:off x="0" y="0"/>
+            <a:ext cx="9144000" cy="0"/>
+          </a:xfrm>
+          <a:prstGeom prst="rect">
+            <a:avLst/>
+          </a:prstGeom>
+          <a:noFill/>
+          <a:ln>
+            <a:noFill/>
+          </a:ln>
+          <a:effectLst/>
+          <a:extLst>
+            <a:ext uri="{909E8E84-426E-40DD-AFC4-6F175D3DCCD1}">
+              <a14:hiddenFill xmlns:a14="http://schemas.microsoft.com/office/drawing/2010/main">
+                <a:solidFill>
+                  <a:schemeClr val="accent1"/>
+                </a:solidFill>
+              </a14:hiddenFill>
+            </a:ext>
+            <a:ext uri="{91240B29-F687-4F45-9708-019B960494DF}">
+              <a14:hiddenLine xmlns:a14="http://schemas.microsoft.com/office/drawing/2010/main" w="9525">
+                <a:solidFill>
+                  <a:schemeClr val="tx1"/>
+                </a:solidFill>
+                <a:miter lim="800000"/>
+                <a:headEnd/>
+                <a:tailEnd/>
+              </a14:hiddenLine>
+            </a:ext>
+            <a:ext uri="{AF507438-7753-43E0-B8FC-AC1667EBCBE1}">
+              <a14:hiddenEffects xmlns:a14="http://schemas.microsoft.com/office/drawing/2010/main">
+                <a:effectLst>
+                  <a:outerShdw dist="35921" dir="2700000" algn="ctr" rotWithShape="0">
+                    <a:schemeClr val="bg2"/>
+                  </a:outerShdw>
+                </a:effectLst>
+              </a14:hiddenEffects>
+            </a:ext>
+          </a:extLst>
+        </p:spPr>
+        <p:txBody>
+          <a:bodyPr vert="horz" wrap="none" lIns="91440" tIns="45720" rIns="91440" bIns="45720" numCol="1" anchor="ctr" anchorCtr="0" compatLnSpc="1">
+            <a:prstTxWarp prst="textNoShape">
+              <a:avLst/>
+            </a:prstTxWarp>
+            <a:spAutoFit/>
+          </a:bodyPr>
+          <a:lstStyle/>
+          <a:p>
+            <a:endParaRPr lang="zh-CN" altLang="en-US"/>
+          </a:p>
+        </p:txBody>
+      </p:sp>
+      <p:sp>
+        <p:nvSpPr>
+          <p:cNvPr id="17" name="内容占位符 2">
+            <a:extLst>
+              <a:ext uri="{FF2B5EF4-FFF2-40B4-BE49-F238E27FC236}">
+                <a16:creationId xmlns:a16="http://schemas.microsoft.com/office/drawing/2014/main" id="{D7B13CA5-CF5D-287A-9ACB-EF5CA77485F1}"/>
+              </a:ext>
+            </a:extLst>
+          </p:cNvPr>
+          <p:cNvSpPr txBox="1">
+            <a:spLocks/>
+          </p:cNvSpPr>
+          <p:nvPr/>
+        </p:nvSpPr>
+        <p:spPr bwMode="auto">
+          <a:xfrm>
             <a:off x="93652" y="1068113"/>
             <a:ext cx="8610600" cy="1211060"/>
           </a:xfrm>
@@ -31254,7 +31727,7 @@
 </p:sld>
 </file>
 
-<file path=ppt/slides/slide21.xml><?xml version="1.0" encoding="utf-8"?>
+<file path=ppt/slides/slide22.xml><?xml version="1.0" encoding="utf-8"?>
 <p:sld xmlns:a="http://schemas.openxmlformats.org/drawingml/2006/main" xmlns:r="http://schemas.openxmlformats.org/officeDocument/2006/relationships" xmlns:p="http://schemas.openxmlformats.org/presentationml/2006/main">
   <p:cSld>
     <p:spTree>
@@ -31759,7 +32232,7 @@
 </p:sld>
 </file>
 
-<file path=ppt/slides/slide22.xml><?xml version="1.0" encoding="utf-8"?>
+<file path=ppt/slides/slide23.xml><?xml version="1.0" encoding="utf-8"?>
 <p:sld xmlns:a="http://schemas.openxmlformats.org/drawingml/2006/main" xmlns:r="http://schemas.openxmlformats.org/officeDocument/2006/relationships" xmlns:p="http://schemas.openxmlformats.org/presentationml/2006/main">
   <p:cSld>
     <p:spTree>
@@ -32264,7 +32737,7 @@
 </p:sld>
 </file>
 
-<file path=ppt/slides/slide23.xml><?xml version="1.0" encoding="utf-8"?>
+<file path=ppt/slides/slide24.xml><?xml version="1.0" encoding="utf-8"?>
 <p:sld xmlns:a="http://schemas.openxmlformats.org/drawingml/2006/main" xmlns:r="http://schemas.openxmlformats.org/officeDocument/2006/relationships" xmlns:p="http://schemas.openxmlformats.org/presentationml/2006/main">
   <p:cSld>
     <p:spTree>
@@ -32769,7 +33242,7 @@
 </p:sld>
 </file>
 
-<file path=ppt/slides/slide24.xml><?xml version="1.0" encoding="utf-8"?>
+<file path=ppt/slides/slide25.xml><?xml version="1.0" encoding="utf-8"?>
 <p:sld xmlns:a="http://schemas.openxmlformats.org/drawingml/2006/main" xmlns:r="http://schemas.openxmlformats.org/officeDocument/2006/relationships" xmlns:p="http://schemas.openxmlformats.org/presentationml/2006/main">
   <p:cSld>
     <p:spTree>
@@ -33257,7 +33730,7 @@
 </p:sld>
 </file>
 
-<file path=ppt/slides/slide25.xml><?xml version="1.0" encoding="utf-8"?>
+<file path=ppt/slides/slide26.xml><?xml version="1.0" encoding="utf-8"?>
 <p:sld xmlns:a="http://schemas.openxmlformats.org/drawingml/2006/main" xmlns:r="http://schemas.openxmlformats.org/officeDocument/2006/relationships" xmlns:p="http://schemas.openxmlformats.org/presentationml/2006/main">
   <p:cSld>
     <p:spTree>
@@ -33705,7 +34178,7 @@
 </p:sld>
 </file>
 
-<file path=ppt/slides/slide26.xml><?xml version="1.0" encoding="utf-8"?>
+<file path=ppt/slides/slide27.xml><?xml version="1.0" encoding="utf-8"?>
 <p:sld xmlns:a="http://schemas.openxmlformats.org/drawingml/2006/main" xmlns:r="http://schemas.openxmlformats.org/officeDocument/2006/relationships" xmlns:p="http://schemas.openxmlformats.org/presentationml/2006/main">
   <p:cSld>
     <p:spTree>
@@ -34210,7 +34683,7 @@
 </p:sld>
 </file>
 
-<file path=ppt/slides/slide27.xml><?xml version="1.0" encoding="utf-8"?>
+<file path=ppt/slides/slide28.xml><?xml version="1.0" encoding="utf-8"?>
 <p:sld xmlns:a="http://schemas.openxmlformats.org/drawingml/2006/main" xmlns:r="http://schemas.openxmlformats.org/officeDocument/2006/relationships" xmlns:p="http://schemas.openxmlformats.org/presentationml/2006/main">
   <p:cSld>
     <p:spTree>
@@ -34715,7 +35188,7 @@
 </p:sld>
 </file>
 
-<file path=ppt/slides/slide28.xml><?xml version="1.0" encoding="utf-8"?>
+<file path=ppt/slides/slide29.xml><?xml version="1.0" encoding="utf-8"?>
 <p:sld xmlns:a="http://schemas.openxmlformats.org/drawingml/2006/main" xmlns:r="http://schemas.openxmlformats.org/officeDocument/2006/relationships" xmlns:p="http://schemas.openxmlformats.org/presentationml/2006/main">
   <p:cSld>
     <p:spTree>
@@ -35236,386 +35709,6 @@
 </p:sld>
 </file>
 
-<file path=ppt/slides/slide29.xml><?xml version="1.0" encoding="utf-8"?>
-<p:sld xmlns:a="http://schemas.openxmlformats.org/drawingml/2006/main" xmlns:r="http://schemas.openxmlformats.org/officeDocument/2006/relationships" xmlns:p="http://schemas.openxmlformats.org/presentationml/2006/main">
-  <p:cSld>
-    <p:spTree>
-      <p:nvGrpSpPr>
-        <p:cNvPr id="1" name="">
-          <a:extLst>
-            <a:ext uri="{FF2B5EF4-FFF2-40B4-BE49-F238E27FC236}">
-              <a16:creationId xmlns:a16="http://schemas.microsoft.com/office/drawing/2014/main" id="{FD51F8A1-C545-C753-B009-0A022151AB5E}"/>
-            </a:ext>
-          </a:extLst>
-        </p:cNvPr>
-        <p:cNvGrpSpPr/>
-        <p:nvPr/>
-      </p:nvGrpSpPr>
-      <p:grpSpPr>
-        <a:xfrm>
-          <a:off x="0" y="0"/>
-          <a:ext cx="0" cy="0"/>
-          <a:chOff x="0" y="0"/>
-          <a:chExt cx="0" cy="0"/>
-        </a:xfrm>
-      </p:grpSpPr>
-      <p:sp>
-        <p:nvSpPr>
-          <p:cNvPr id="2" name="Title 1">
-            <a:extLst>
-              <a:ext uri="{FF2B5EF4-FFF2-40B4-BE49-F238E27FC236}">
-                <a16:creationId xmlns:a16="http://schemas.microsoft.com/office/drawing/2014/main" id="{29DD39E9-7677-88D7-3BB8-B65B4DFD9039}"/>
-              </a:ext>
-            </a:extLst>
-          </p:cNvPr>
-          <p:cNvSpPr>
-            <a:spLocks noGrp="1"/>
-          </p:cNvSpPr>
-          <p:nvPr>
-            <p:ph type="title"/>
-          </p:nvPr>
-        </p:nvSpPr>
-        <p:spPr>
-          <a:xfrm>
-            <a:off x="152400" y="152400"/>
-            <a:ext cx="8610600" cy="838200"/>
-          </a:xfrm>
-        </p:spPr>
-        <p:txBody>
-          <a:bodyPr/>
-          <a:lstStyle/>
-          <a:p>
-            <a:r>
-              <a:rPr lang="en-US" altLang="zh-CN" dirty="0"/>
-              <a:t>Channel</a:t>
-            </a:r>
-            <a:endParaRPr lang="zh-CN" altLang="en-US" dirty="0"/>
-          </a:p>
-        </p:txBody>
-      </p:sp>
-      <p:sp>
-        <p:nvSpPr>
-          <p:cNvPr id="7" name="内容占位符 2">
-            <a:extLst>
-              <a:ext uri="{FF2B5EF4-FFF2-40B4-BE49-F238E27FC236}">
-                <a16:creationId xmlns:a16="http://schemas.microsoft.com/office/drawing/2014/main" id="{0F9127B6-8915-E052-521C-E8C25F1A38CF}"/>
-              </a:ext>
-            </a:extLst>
-          </p:cNvPr>
-          <p:cNvSpPr>
-            <a:spLocks noGrp="1"/>
-          </p:cNvSpPr>
-          <p:nvPr>
-            <p:ph idx="4294967295"/>
-          </p:nvPr>
-        </p:nvSpPr>
-        <p:spPr>
-          <a:xfrm>
-            <a:off x="93652" y="1068111"/>
-            <a:ext cx="9050348" cy="2376129"/>
-          </a:xfrm>
-        </p:spPr>
-        <p:txBody>
-          <a:bodyPr/>
-          <a:lstStyle/>
-          <a:p>
-            <a:r>
-              <a:rPr lang="pt-BR" altLang="zh-CN" sz="2400" dirty="0">
-                <a:latin typeface="+mn-lt"/>
-                <a:cs typeface="Times New Roman" panose="02020603050405020304" pitchFamily="18" charset="0"/>
-              </a:rPr>
-              <a:t>Explicit vs implicit1D</a:t>
-            </a:r>
-            <a:endParaRPr lang="en-US" altLang="zh-CN" sz="2000" dirty="0">
-              <a:latin typeface="+mn-lt"/>
-              <a:cs typeface="Times New Roman" panose="02020603050405020304" pitchFamily="18" charset="0"/>
-            </a:endParaRPr>
-          </a:p>
-          <a:p>
-            <a:pPr lvl="1"/>
-            <a:r>
-              <a:rPr lang="en-US" altLang="zh-CN" sz="2000" dirty="0">
-                <a:latin typeface="+mn-lt"/>
-                <a:cs typeface="Times New Roman" panose="02020603050405020304" pitchFamily="18" charset="0"/>
-              </a:rPr>
-              <a:t>The results from the explicit and the implicit1D schemes are almost the same</a:t>
-            </a:r>
-            <a:endParaRPr lang="en-US" altLang="zh-CN" sz="2000" baseline="30000" dirty="0">
-              <a:latin typeface="+mn-lt"/>
-              <a:cs typeface="Times New Roman" panose="02020603050405020304" pitchFamily="18" charset="0"/>
-            </a:endParaRPr>
-          </a:p>
-          <a:p>
-            <a:pPr marL="457200" lvl="1" indent="0">
-              <a:buNone/>
-            </a:pPr>
-            <a:endParaRPr lang="en-US" altLang="zh-CN" sz="2000" baseline="30000" dirty="0">
-              <a:latin typeface="+mn-lt"/>
-              <a:cs typeface="Times New Roman" panose="02020603050405020304" pitchFamily="18" charset="0"/>
-            </a:endParaRPr>
-          </a:p>
-          <a:p>
-            <a:pPr marL="457200" lvl="1" indent="0">
-              <a:buNone/>
-            </a:pPr>
-            <a:endParaRPr lang="en-US" altLang="zh-CN" sz="2000" baseline="30000" dirty="0">
-              <a:latin typeface="+mn-lt"/>
-              <a:cs typeface="Times New Roman" panose="02020603050405020304" pitchFamily="18" charset="0"/>
-            </a:endParaRPr>
-          </a:p>
-          <a:p>
-            <a:pPr marL="457200" lvl="1" indent="0">
-              <a:buNone/>
-            </a:pPr>
-            <a:endParaRPr lang="en-US" altLang="zh-CN" sz="2000" baseline="30000" dirty="0">
-              <a:latin typeface="+mn-lt"/>
-              <a:cs typeface="Times New Roman" panose="02020603050405020304" pitchFamily="18" charset="0"/>
-            </a:endParaRPr>
-          </a:p>
-          <a:p>
-            <a:pPr marL="457200" lvl="1" indent="0">
-              <a:buNone/>
-            </a:pPr>
-            <a:endParaRPr lang="en-US" altLang="zh-CN" sz="2000" baseline="30000" dirty="0">
-              <a:latin typeface="+mn-lt"/>
-              <a:cs typeface="Times New Roman" panose="02020603050405020304" pitchFamily="18" charset="0"/>
-            </a:endParaRPr>
-          </a:p>
-          <a:p>
-            <a:pPr marL="457200" lvl="1" indent="0">
-              <a:buNone/>
-            </a:pPr>
-            <a:endParaRPr lang="en-US" altLang="zh-CN" sz="2000" baseline="30000" dirty="0">
-              <a:latin typeface="+mn-lt"/>
-              <a:cs typeface="Times New Roman" panose="02020603050405020304" pitchFamily="18" charset="0"/>
-            </a:endParaRPr>
-          </a:p>
-          <a:p>
-            <a:pPr marL="457200" lvl="1" indent="0">
-              <a:buNone/>
-            </a:pPr>
-            <a:endParaRPr lang="en-US" altLang="zh-CN" sz="2000" baseline="30000" dirty="0">
-              <a:latin typeface="+mn-lt"/>
-              <a:cs typeface="Times New Roman" panose="02020603050405020304" pitchFamily="18" charset="0"/>
-            </a:endParaRPr>
-          </a:p>
-          <a:p>
-            <a:pPr marL="457200" lvl="1" indent="0">
-              <a:buNone/>
-            </a:pPr>
-            <a:endParaRPr lang="en-US" altLang="zh-CN" sz="2000" baseline="30000" dirty="0">
-              <a:latin typeface="+mn-lt"/>
-              <a:cs typeface="Times New Roman" panose="02020603050405020304" pitchFamily="18" charset="0"/>
-            </a:endParaRPr>
-          </a:p>
-          <a:p>
-            <a:pPr>
-              <a:lnSpc>
-                <a:spcPct val="125000"/>
-              </a:lnSpc>
-            </a:pPr>
-            <a:endParaRPr lang="en-US" altLang="zh-CN" sz="2400" dirty="0">
-              <a:latin typeface="+mn-lt"/>
-              <a:cs typeface="Times New Roman" panose="02020603050405020304" pitchFamily="18" charset="0"/>
-            </a:endParaRPr>
-          </a:p>
-          <a:p>
-            <a:pPr marL="457200" lvl="1" indent="0">
-              <a:lnSpc>
-                <a:spcPct val="125000"/>
-              </a:lnSpc>
-              <a:buNone/>
-            </a:pPr>
-            <a:endParaRPr lang="en-US" altLang="zh-CN" sz="2000" dirty="0">
-              <a:latin typeface="+mn-lt"/>
-              <a:cs typeface="Times New Roman" panose="02020603050405020304" pitchFamily="18" charset="0"/>
-            </a:endParaRPr>
-          </a:p>
-        </p:txBody>
-      </p:sp>
-      <p:sp>
-        <p:nvSpPr>
-          <p:cNvPr id="9" name="Rectangle 2">
-            <a:extLst>
-              <a:ext uri="{FF2B5EF4-FFF2-40B4-BE49-F238E27FC236}">
-                <a16:creationId xmlns:a16="http://schemas.microsoft.com/office/drawing/2014/main" id="{A7EC59C2-06EC-9DCB-0F67-A96A07EDBA34}"/>
-              </a:ext>
-            </a:extLst>
-          </p:cNvPr>
-          <p:cNvSpPr>
-            <a:spLocks noChangeArrowheads="1"/>
-          </p:cNvSpPr>
-          <p:nvPr/>
-        </p:nvSpPr>
-        <p:spPr bwMode="auto">
-          <a:xfrm>
-            <a:off x="0" y="0"/>
-            <a:ext cx="9144000" cy="0"/>
-          </a:xfrm>
-          <a:prstGeom prst="rect">
-            <a:avLst/>
-          </a:prstGeom>
-          <a:noFill/>
-          <a:ln>
-            <a:noFill/>
-          </a:ln>
-          <a:effectLst/>
-          <a:extLst>
-            <a:ext uri="{909E8E84-426E-40DD-AFC4-6F175D3DCCD1}">
-              <a14:hiddenFill xmlns:a14="http://schemas.microsoft.com/office/drawing/2010/main">
-                <a:solidFill>
-                  <a:schemeClr val="accent1"/>
-                </a:solidFill>
-              </a14:hiddenFill>
-            </a:ext>
-            <a:ext uri="{91240B29-F687-4F45-9708-019B960494DF}">
-              <a14:hiddenLine xmlns:a14="http://schemas.microsoft.com/office/drawing/2010/main" w="9525">
-                <a:solidFill>
-                  <a:schemeClr val="tx1"/>
-                </a:solidFill>
-                <a:miter lim="800000"/>
-                <a:headEnd/>
-                <a:tailEnd/>
-              </a14:hiddenLine>
-            </a:ext>
-            <a:ext uri="{AF507438-7753-43E0-B8FC-AC1667EBCBE1}">
-              <a14:hiddenEffects xmlns:a14="http://schemas.microsoft.com/office/drawing/2010/main">
-                <a:effectLst>
-                  <a:outerShdw dist="35921" dir="2700000" algn="ctr" rotWithShape="0">
-                    <a:schemeClr val="bg2"/>
-                  </a:outerShdw>
-                </a:effectLst>
-              </a14:hiddenEffects>
-            </a:ext>
-          </a:extLst>
-        </p:spPr>
-        <p:txBody>
-          <a:bodyPr vert="horz" wrap="none" lIns="91440" tIns="45720" rIns="91440" bIns="45720" numCol="1" anchor="ctr" anchorCtr="0" compatLnSpc="1">
-            <a:prstTxWarp prst="textNoShape">
-              <a:avLst/>
-            </a:prstTxWarp>
-            <a:spAutoFit/>
-          </a:bodyPr>
-          <a:lstStyle/>
-          <a:p>
-            <a:endParaRPr lang="zh-CN" altLang="en-US"/>
-          </a:p>
-        </p:txBody>
-      </p:sp>
-      <p:sp>
-        <p:nvSpPr>
-          <p:cNvPr id="59" name="TextBox 58">
-            <a:extLst>
-              <a:ext uri="{FF2B5EF4-FFF2-40B4-BE49-F238E27FC236}">
-                <a16:creationId xmlns:a16="http://schemas.microsoft.com/office/drawing/2014/main" id="{1899DD4C-C3EE-1C3A-C921-86950782D14F}"/>
-              </a:ext>
-            </a:extLst>
-          </p:cNvPr>
-          <p:cNvSpPr txBox="1"/>
-          <p:nvPr/>
-        </p:nvSpPr>
-        <p:spPr>
-          <a:xfrm>
-            <a:off x="1786861" y="6412468"/>
-            <a:ext cx="1184940" cy="369332"/>
-          </a:xfrm>
-          <a:prstGeom prst="rect">
-            <a:avLst/>
-          </a:prstGeom>
-          <a:noFill/>
-        </p:spPr>
-        <p:txBody>
-          <a:bodyPr wrap="none" rtlCol="0">
-            <a:spAutoFit/>
-          </a:bodyPr>
-          <a:lstStyle/>
-          <a:p>
-            <a:r>
-              <a:rPr lang="en-US" dirty="0"/>
-              <a:t>Neumann</a:t>
-            </a:r>
-          </a:p>
-        </p:txBody>
-      </p:sp>
-      <p:sp>
-        <p:nvSpPr>
-          <p:cNvPr id="60" name="TextBox 59">
-            <a:extLst>
-              <a:ext uri="{FF2B5EF4-FFF2-40B4-BE49-F238E27FC236}">
-                <a16:creationId xmlns:a16="http://schemas.microsoft.com/office/drawing/2014/main" id="{D2F5FEBF-0D64-2DE9-F76A-A146EBCD6406}"/>
-              </a:ext>
-            </a:extLst>
-          </p:cNvPr>
-          <p:cNvSpPr txBox="1"/>
-          <p:nvPr/>
-        </p:nvSpPr>
-        <p:spPr>
-          <a:xfrm>
-            <a:off x="6039727" y="6412468"/>
-            <a:ext cx="1317412" cy="369332"/>
-          </a:xfrm>
-          <a:prstGeom prst="rect">
-            <a:avLst/>
-          </a:prstGeom>
-          <a:noFill/>
-        </p:spPr>
-        <p:txBody>
-          <a:bodyPr wrap="none" rtlCol="0">
-            <a:spAutoFit/>
-          </a:bodyPr>
-          <a:lstStyle/>
-          <a:p>
-            <a:r>
-              <a:rPr lang="en-US" dirty="0"/>
-              <a:t>Wall model</a:t>
-            </a:r>
-          </a:p>
-        </p:txBody>
-      </p:sp>
-      <p:pic>
-        <p:nvPicPr>
-          <p:cNvPr id="8" name="Picture 7">
-            <a:extLst>
-              <a:ext uri="{FF2B5EF4-FFF2-40B4-BE49-F238E27FC236}">
-                <a16:creationId xmlns:a16="http://schemas.microsoft.com/office/drawing/2014/main" id="{F9137558-4943-B470-22BB-28A23C7F1A73}"/>
-              </a:ext>
-            </a:extLst>
-          </p:cNvPr>
-          <p:cNvPicPr>
-            <a:picLocks noChangeAspect="1"/>
-          </p:cNvPicPr>
-          <p:nvPr/>
-        </p:nvPicPr>
-        <p:blipFill>
-          <a:blip r:embed="rId3"/>
-          <a:stretch>
-            <a:fillRect/>
-          </a:stretch>
-        </p:blipFill>
-        <p:spPr>
-          <a:xfrm>
-            <a:off x="4774995" y="3439203"/>
-            <a:ext cx="3988005" cy="2978303"/>
-          </a:xfrm>
-          <a:prstGeom prst="rect">
-            <a:avLst/>
-          </a:prstGeom>
-        </p:spPr>
-      </p:pic>
-    </p:spTree>
-    <p:extLst>
-      <p:ext uri="{BB962C8B-B14F-4D97-AF65-F5344CB8AC3E}">
-        <p14:creationId xmlns:p14="http://schemas.microsoft.com/office/powerpoint/2010/main" val="1891939900"/>
-      </p:ext>
-    </p:extLst>
-  </p:cSld>
-  <p:clrMapOvr>
-    <a:masterClrMapping/>
-  </p:clrMapOvr>
-  <p:transition spd="med" advTm="63997"/>
-</p:sld>
-</file>
-
 <file path=ppt/slides/slide3.xml><?xml version="1.0" encoding="utf-8"?>
 <p:sld xmlns:a="http://schemas.openxmlformats.org/drawingml/2006/main" xmlns:r="http://schemas.openxmlformats.org/officeDocument/2006/relationships" xmlns:p="http://schemas.openxmlformats.org/presentationml/2006/main">
   <p:cSld>
@@ -36065,6 +36158,386 @@
 </file>
 
 <file path=ppt/slides/slide30.xml><?xml version="1.0" encoding="utf-8"?>
+<p:sld xmlns:a="http://schemas.openxmlformats.org/drawingml/2006/main" xmlns:r="http://schemas.openxmlformats.org/officeDocument/2006/relationships" xmlns:p="http://schemas.openxmlformats.org/presentationml/2006/main">
+  <p:cSld>
+    <p:spTree>
+      <p:nvGrpSpPr>
+        <p:cNvPr id="1" name="">
+          <a:extLst>
+            <a:ext uri="{FF2B5EF4-FFF2-40B4-BE49-F238E27FC236}">
+              <a16:creationId xmlns:a16="http://schemas.microsoft.com/office/drawing/2014/main" id="{FD51F8A1-C545-C753-B009-0A022151AB5E}"/>
+            </a:ext>
+          </a:extLst>
+        </p:cNvPr>
+        <p:cNvGrpSpPr/>
+        <p:nvPr/>
+      </p:nvGrpSpPr>
+      <p:grpSpPr>
+        <a:xfrm>
+          <a:off x="0" y="0"/>
+          <a:ext cx="0" cy="0"/>
+          <a:chOff x="0" y="0"/>
+          <a:chExt cx="0" cy="0"/>
+        </a:xfrm>
+      </p:grpSpPr>
+      <p:sp>
+        <p:nvSpPr>
+          <p:cNvPr id="2" name="Title 1">
+            <a:extLst>
+              <a:ext uri="{FF2B5EF4-FFF2-40B4-BE49-F238E27FC236}">
+                <a16:creationId xmlns:a16="http://schemas.microsoft.com/office/drawing/2014/main" id="{29DD39E9-7677-88D7-3BB8-B65B4DFD9039}"/>
+              </a:ext>
+            </a:extLst>
+          </p:cNvPr>
+          <p:cNvSpPr>
+            <a:spLocks noGrp="1"/>
+          </p:cNvSpPr>
+          <p:nvPr>
+            <p:ph type="title"/>
+          </p:nvPr>
+        </p:nvSpPr>
+        <p:spPr>
+          <a:xfrm>
+            <a:off x="152400" y="152400"/>
+            <a:ext cx="8610600" cy="838200"/>
+          </a:xfrm>
+        </p:spPr>
+        <p:txBody>
+          <a:bodyPr/>
+          <a:lstStyle/>
+          <a:p>
+            <a:r>
+              <a:rPr lang="en-US" altLang="zh-CN" dirty="0"/>
+              <a:t>Channel</a:t>
+            </a:r>
+            <a:endParaRPr lang="zh-CN" altLang="en-US" dirty="0"/>
+          </a:p>
+        </p:txBody>
+      </p:sp>
+      <p:sp>
+        <p:nvSpPr>
+          <p:cNvPr id="7" name="内容占位符 2">
+            <a:extLst>
+              <a:ext uri="{FF2B5EF4-FFF2-40B4-BE49-F238E27FC236}">
+                <a16:creationId xmlns:a16="http://schemas.microsoft.com/office/drawing/2014/main" id="{0F9127B6-8915-E052-521C-E8C25F1A38CF}"/>
+              </a:ext>
+            </a:extLst>
+          </p:cNvPr>
+          <p:cNvSpPr>
+            <a:spLocks noGrp="1"/>
+          </p:cNvSpPr>
+          <p:nvPr>
+            <p:ph idx="4294967295"/>
+          </p:nvPr>
+        </p:nvSpPr>
+        <p:spPr>
+          <a:xfrm>
+            <a:off x="93652" y="1068111"/>
+            <a:ext cx="9050348" cy="2376129"/>
+          </a:xfrm>
+        </p:spPr>
+        <p:txBody>
+          <a:bodyPr/>
+          <a:lstStyle/>
+          <a:p>
+            <a:r>
+              <a:rPr lang="pt-BR" altLang="zh-CN" sz="2400" dirty="0">
+                <a:latin typeface="+mn-lt"/>
+                <a:cs typeface="Times New Roman" panose="02020603050405020304" pitchFamily="18" charset="0"/>
+              </a:rPr>
+              <a:t>Explicit vs implicit1D</a:t>
+            </a:r>
+            <a:endParaRPr lang="en-US" altLang="zh-CN" sz="2000" dirty="0">
+              <a:latin typeface="+mn-lt"/>
+              <a:cs typeface="Times New Roman" panose="02020603050405020304" pitchFamily="18" charset="0"/>
+            </a:endParaRPr>
+          </a:p>
+          <a:p>
+            <a:pPr lvl="1"/>
+            <a:r>
+              <a:rPr lang="en-US" altLang="zh-CN" sz="2000" dirty="0">
+                <a:latin typeface="+mn-lt"/>
+                <a:cs typeface="Times New Roman" panose="02020603050405020304" pitchFamily="18" charset="0"/>
+              </a:rPr>
+              <a:t>The results from the explicit and the implicit1D schemes are almost the same</a:t>
+            </a:r>
+            <a:endParaRPr lang="en-US" altLang="zh-CN" sz="2000" baseline="30000" dirty="0">
+              <a:latin typeface="+mn-lt"/>
+              <a:cs typeface="Times New Roman" panose="02020603050405020304" pitchFamily="18" charset="0"/>
+            </a:endParaRPr>
+          </a:p>
+          <a:p>
+            <a:pPr marL="457200" lvl="1" indent="0">
+              <a:buNone/>
+            </a:pPr>
+            <a:endParaRPr lang="en-US" altLang="zh-CN" sz="2000" baseline="30000" dirty="0">
+              <a:latin typeface="+mn-lt"/>
+              <a:cs typeface="Times New Roman" panose="02020603050405020304" pitchFamily="18" charset="0"/>
+            </a:endParaRPr>
+          </a:p>
+          <a:p>
+            <a:pPr marL="457200" lvl="1" indent="0">
+              <a:buNone/>
+            </a:pPr>
+            <a:endParaRPr lang="en-US" altLang="zh-CN" sz="2000" baseline="30000" dirty="0">
+              <a:latin typeface="+mn-lt"/>
+              <a:cs typeface="Times New Roman" panose="02020603050405020304" pitchFamily="18" charset="0"/>
+            </a:endParaRPr>
+          </a:p>
+          <a:p>
+            <a:pPr marL="457200" lvl="1" indent="0">
+              <a:buNone/>
+            </a:pPr>
+            <a:endParaRPr lang="en-US" altLang="zh-CN" sz="2000" baseline="30000" dirty="0">
+              <a:latin typeface="+mn-lt"/>
+              <a:cs typeface="Times New Roman" panose="02020603050405020304" pitchFamily="18" charset="0"/>
+            </a:endParaRPr>
+          </a:p>
+          <a:p>
+            <a:pPr marL="457200" lvl="1" indent="0">
+              <a:buNone/>
+            </a:pPr>
+            <a:endParaRPr lang="en-US" altLang="zh-CN" sz="2000" baseline="30000" dirty="0">
+              <a:latin typeface="+mn-lt"/>
+              <a:cs typeface="Times New Roman" panose="02020603050405020304" pitchFamily="18" charset="0"/>
+            </a:endParaRPr>
+          </a:p>
+          <a:p>
+            <a:pPr marL="457200" lvl="1" indent="0">
+              <a:buNone/>
+            </a:pPr>
+            <a:endParaRPr lang="en-US" altLang="zh-CN" sz="2000" baseline="30000" dirty="0">
+              <a:latin typeface="+mn-lt"/>
+              <a:cs typeface="Times New Roman" panose="02020603050405020304" pitchFamily="18" charset="0"/>
+            </a:endParaRPr>
+          </a:p>
+          <a:p>
+            <a:pPr marL="457200" lvl="1" indent="0">
+              <a:buNone/>
+            </a:pPr>
+            <a:endParaRPr lang="en-US" altLang="zh-CN" sz="2000" baseline="30000" dirty="0">
+              <a:latin typeface="+mn-lt"/>
+              <a:cs typeface="Times New Roman" panose="02020603050405020304" pitchFamily="18" charset="0"/>
+            </a:endParaRPr>
+          </a:p>
+          <a:p>
+            <a:pPr marL="457200" lvl="1" indent="0">
+              <a:buNone/>
+            </a:pPr>
+            <a:endParaRPr lang="en-US" altLang="zh-CN" sz="2000" baseline="30000" dirty="0">
+              <a:latin typeface="+mn-lt"/>
+              <a:cs typeface="Times New Roman" panose="02020603050405020304" pitchFamily="18" charset="0"/>
+            </a:endParaRPr>
+          </a:p>
+          <a:p>
+            <a:pPr>
+              <a:lnSpc>
+                <a:spcPct val="125000"/>
+              </a:lnSpc>
+            </a:pPr>
+            <a:endParaRPr lang="en-US" altLang="zh-CN" sz="2400" dirty="0">
+              <a:latin typeface="+mn-lt"/>
+              <a:cs typeface="Times New Roman" panose="02020603050405020304" pitchFamily="18" charset="0"/>
+            </a:endParaRPr>
+          </a:p>
+          <a:p>
+            <a:pPr marL="457200" lvl="1" indent="0">
+              <a:lnSpc>
+                <a:spcPct val="125000"/>
+              </a:lnSpc>
+              <a:buNone/>
+            </a:pPr>
+            <a:endParaRPr lang="en-US" altLang="zh-CN" sz="2000" dirty="0">
+              <a:latin typeface="+mn-lt"/>
+              <a:cs typeface="Times New Roman" panose="02020603050405020304" pitchFamily="18" charset="0"/>
+            </a:endParaRPr>
+          </a:p>
+        </p:txBody>
+      </p:sp>
+      <p:sp>
+        <p:nvSpPr>
+          <p:cNvPr id="9" name="Rectangle 2">
+            <a:extLst>
+              <a:ext uri="{FF2B5EF4-FFF2-40B4-BE49-F238E27FC236}">
+                <a16:creationId xmlns:a16="http://schemas.microsoft.com/office/drawing/2014/main" id="{A7EC59C2-06EC-9DCB-0F67-A96A07EDBA34}"/>
+              </a:ext>
+            </a:extLst>
+          </p:cNvPr>
+          <p:cNvSpPr>
+            <a:spLocks noChangeArrowheads="1"/>
+          </p:cNvSpPr>
+          <p:nvPr/>
+        </p:nvSpPr>
+        <p:spPr bwMode="auto">
+          <a:xfrm>
+            <a:off x="0" y="0"/>
+            <a:ext cx="9144000" cy="0"/>
+          </a:xfrm>
+          <a:prstGeom prst="rect">
+            <a:avLst/>
+          </a:prstGeom>
+          <a:noFill/>
+          <a:ln>
+            <a:noFill/>
+          </a:ln>
+          <a:effectLst/>
+          <a:extLst>
+            <a:ext uri="{909E8E84-426E-40DD-AFC4-6F175D3DCCD1}">
+              <a14:hiddenFill xmlns:a14="http://schemas.microsoft.com/office/drawing/2010/main">
+                <a:solidFill>
+                  <a:schemeClr val="accent1"/>
+                </a:solidFill>
+              </a14:hiddenFill>
+            </a:ext>
+            <a:ext uri="{91240B29-F687-4F45-9708-019B960494DF}">
+              <a14:hiddenLine xmlns:a14="http://schemas.microsoft.com/office/drawing/2010/main" w="9525">
+                <a:solidFill>
+                  <a:schemeClr val="tx1"/>
+                </a:solidFill>
+                <a:miter lim="800000"/>
+                <a:headEnd/>
+                <a:tailEnd/>
+              </a14:hiddenLine>
+            </a:ext>
+            <a:ext uri="{AF507438-7753-43E0-B8FC-AC1667EBCBE1}">
+              <a14:hiddenEffects xmlns:a14="http://schemas.microsoft.com/office/drawing/2010/main">
+                <a:effectLst>
+                  <a:outerShdw dist="35921" dir="2700000" algn="ctr" rotWithShape="0">
+                    <a:schemeClr val="bg2"/>
+                  </a:outerShdw>
+                </a:effectLst>
+              </a14:hiddenEffects>
+            </a:ext>
+          </a:extLst>
+        </p:spPr>
+        <p:txBody>
+          <a:bodyPr vert="horz" wrap="none" lIns="91440" tIns="45720" rIns="91440" bIns="45720" numCol="1" anchor="ctr" anchorCtr="0" compatLnSpc="1">
+            <a:prstTxWarp prst="textNoShape">
+              <a:avLst/>
+            </a:prstTxWarp>
+            <a:spAutoFit/>
+          </a:bodyPr>
+          <a:lstStyle/>
+          <a:p>
+            <a:endParaRPr lang="zh-CN" altLang="en-US"/>
+          </a:p>
+        </p:txBody>
+      </p:sp>
+      <p:sp>
+        <p:nvSpPr>
+          <p:cNvPr id="59" name="TextBox 58">
+            <a:extLst>
+              <a:ext uri="{FF2B5EF4-FFF2-40B4-BE49-F238E27FC236}">
+                <a16:creationId xmlns:a16="http://schemas.microsoft.com/office/drawing/2014/main" id="{1899DD4C-C3EE-1C3A-C921-86950782D14F}"/>
+              </a:ext>
+            </a:extLst>
+          </p:cNvPr>
+          <p:cNvSpPr txBox="1"/>
+          <p:nvPr/>
+        </p:nvSpPr>
+        <p:spPr>
+          <a:xfrm>
+            <a:off x="1786861" y="6412468"/>
+            <a:ext cx="1184940" cy="369332"/>
+          </a:xfrm>
+          <a:prstGeom prst="rect">
+            <a:avLst/>
+          </a:prstGeom>
+          <a:noFill/>
+        </p:spPr>
+        <p:txBody>
+          <a:bodyPr wrap="none" rtlCol="0">
+            <a:spAutoFit/>
+          </a:bodyPr>
+          <a:lstStyle/>
+          <a:p>
+            <a:r>
+              <a:rPr lang="en-US" dirty="0"/>
+              <a:t>Neumann</a:t>
+            </a:r>
+          </a:p>
+        </p:txBody>
+      </p:sp>
+      <p:sp>
+        <p:nvSpPr>
+          <p:cNvPr id="60" name="TextBox 59">
+            <a:extLst>
+              <a:ext uri="{FF2B5EF4-FFF2-40B4-BE49-F238E27FC236}">
+                <a16:creationId xmlns:a16="http://schemas.microsoft.com/office/drawing/2014/main" id="{D2F5FEBF-0D64-2DE9-F76A-A146EBCD6406}"/>
+              </a:ext>
+            </a:extLst>
+          </p:cNvPr>
+          <p:cNvSpPr txBox="1"/>
+          <p:nvPr/>
+        </p:nvSpPr>
+        <p:spPr>
+          <a:xfrm>
+            <a:off x="6039727" y="6412468"/>
+            <a:ext cx="1317412" cy="369332"/>
+          </a:xfrm>
+          <a:prstGeom prst="rect">
+            <a:avLst/>
+          </a:prstGeom>
+          <a:noFill/>
+        </p:spPr>
+        <p:txBody>
+          <a:bodyPr wrap="none" rtlCol="0">
+            <a:spAutoFit/>
+          </a:bodyPr>
+          <a:lstStyle/>
+          <a:p>
+            <a:r>
+              <a:rPr lang="en-US" dirty="0"/>
+              <a:t>Wall model</a:t>
+            </a:r>
+          </a:p>
+        </p:txBody>
+      </p:sp>
+      <p:pic>
+        <p:nvPicPr>
+          <p:cNvPr id="8" name="Picture 7">
+            <a:extLst>
+              <a:ext uri="{FF2B5EF4-FFF2-40B4-BE49-F238E27FC236}">
+                <a16:creationId xmlns:a16="http://schemas.microsoft.com/office/drawing/2014/main" id="{F9137558-4943-B470-22BB-28A23C7F1A73}"/>
+              </a:ext>
+            </a:extLst>
+          </p:cNvPr>
+          <p:cNvPicPr>
+            <a:picLocks noChangeAspect="1"/>
+          </p:cNvPicPr>
+          <p:nvPr/>
+        </p:nvPicPr>
+        <p:blipFill>
+          <a:blip r:embed="rId3"/>
+          <a:stretch>
+            <a:fillRect/>
+          </a:stretch>
+        </p:blipFill>
+        <p:spPr>
+          <a:xfrm>
+            <a:off x="4774995" y="3439203"/>
+            <a:ext cx="3988005" cy="2978303"/>
+          </a:xfrm>
+          <a:prstGeom prst="rect">
+            <a:avLst/>
+          </a:prstGeom>
+        </p:spPr>
+      </p:pic>
+    </p:spTree>
+    <p:extLst>
+      <p:ext uri="{BB962C8B-B14F-4D97-AF65-F5344CB8AC3E}">
+        <p14:creationId xmlns:p14="http://schemas.microsoft.com/office/powerpoint/2010/main" val="1891939900"/>
+      </p:ext>
+    </p:extLst>
+  </p:cSld>
+  <p:clrMapOvr>
+    <a:masterClrMapping/>
+  </p:clrMapOvr>
+  <p:transition spd="med" advTm="63997"/>
+</p:sld>
+</file>
+
+<file path=ppt/slides/slide31.xml><?xml version="1.0" encoding="utf-8"?>
 <p:sld xmlns:a="http://schemas.openxmlformats.org/drawingml/2006/main" xmlns:r="http://schemas.openxmlformats.org/officeDocument/2006/relationships" xmlns:p="http://schemas.openxmlformats.org/presentationml/2006/main">
   <p:cSld>
     <p:spTree>

</xml_diff>

<commit_message>
allocate arrays outside of cmpt_sgs
</commit_message>
<xml_diff>
--- a/docs/vv.pptx
+++ b/docs/vv.pptx
@@ -26298,7 +26298,7 @@
         <p:spPr bwMode="auto">
           <a:xfrm>
             <a:off x="93652" y="1068113"/>
-            <a:ext cx="8135948" cy="1065487"/>
+            <a:ext cx="8135948" cy="1294087"/>
           </a:xfrm>
           <a:prstGeom prst="rect">
             <a:avLst/>
@@ -26542,14 +26542,24 @@
               <a:t>Dynamic Smagorinsky</a:t>
             </a:r>
           </a:p>
+          <a:p>
+            <a:pPr lvl="1"/>
+            <a:r>
+              <a:rPr lang="en-US" altLang="zh-CN" sz="2000" dirty="0">
+                <a:latin typeface="+mn-lt"/>
+                <a:cs typeface="Times New Roman" panose="02020603050405020304" pitchFamily="18" charset="0"/>
+              </a:rPr>
+              <a:t>Set alpha2=2.52 for the first off-wall layer of cells fits the first principle</a:t>
+            </a:r>
+          </a:p>
         </p:txBody>
       </p:sp>
       <p:pic>
         <p:nvPicPr>
-          <p:cNvPr id="11" name="Picture 10">
+          <p:cNvPr id="13" name="Picture 12">
             <a:extLst>
               <a:ext uri="{FF2B5EF4-FFF2-40B4-BE49-F238E27FC236}">
-                <a16:creationId xmlns:a16="http://schemas.microsoft.com/office/drawing/2014/main" id="{217B17F6-9276-5F44-4565-1B9A3C51362F}"/>
+                <a16:creationId xmlns:a16="http://schemas.microsoft.com/office/drawing/2014/main" id="{1A1588A9-3543-0A5F-5B25-C5589038CE45}"/>
               </a:ext>
             </a:extLst>
           </p:cNvPr>
@@ -26566,8 +26576,38 @@
         </p:blipFill>
         <p:spPr>
           <a:xfrm>
-            <a:off x="533400" y="2895600"/>
-            <a:ext cx="3200400" cy="2405462"/>
+            <a:off x="1066800" y="2971800"/>
+            <a:ext cx="3200400" cy="2413247"/>
+          </a:xfrm>
+          <a:prstGeom prst="rect">
+            <a:avLst/>
+          </a:prstGeom>
+        </p:spPr>
+      </p:pic>
+      <p:pic>
+        <p:nvPicPr>
+          <p:cNvPr id="17" name="Picture 16">
+            <a:extLst>
+              <a:ext uri="{FF2B5EF4-FFF2-40B4-BE49-F238E27FC236}">
+                <a16:creationId xmlns:a16="http://schemas.microsoft.com/office/drawing/2014/main" id="{CBC2323D-69B6-72B5-1F7E-EBEDA419ACE8}"/>
+              </a:ext>
+            </a:extLst>
+          </p:cNvPr>
+          <p:cNvPicPr>
+            <a:picLocks noChangeAspect="1"/>
+          </p:cNvPicPr>
+          <p:nvPr/>
+        </p:nvPicPr>
+        <p:blipFill>
+          <a:blip r:embed="rId4"/>
+          <a:stretch>
+            <a:fillRect/>
+          </a:stretch>
+        </p:blipFill>
+        <p:spPr>
+          <a:xfrm>
+            <a:off x="4457700" y="2971800"/>
+            <a:ext cx="3200400" cy="2408018"/>
           </a:xfrm>
           <a:prstGeom prst="rect">
             <a:avLst/>

</xml_diff>

<commit_message>
restore the bug temporarily for test purpose
</commit_message>
<xml_diff>
--- a/docs/vv.pptx
+++ b/docs/vv.pptx
@@ -244,7 +244,7 @@
           <a:p>
             <a:fld id="{30C704EE-38E9-4E72-9BB6-71E8241CE3C0}" type="datetimeFigureOut">
               <a:rPr lang="en-US" smtClean="0"/>
-              <a:t>5/8/2024</a:t>
+              <a:t>5/11/2024</a:t>
             </a:fld>
             <a:endParaRPr lang="en-US"/>
           </a:p>
@@ -409,7 +409,7 @@
           <a:p>
             <a:fld id="{0D66AE9B-9EE2-43DA-9A8E-D2E5656B8B43}" type="datetimeFigureOut">
               <a:rPr lang="en-US" smtClean="0"/>
-              <a:t>5/8/2024</a:t>
+              <a:t>5/11/2024</a:t>
             </a:fld>
             <a:endParaRPr lang="en-US"/>
           </a:p>
@@ -22393,7 +22393,7 @@
           <a:p>
             <a:fld id="{F7015205-6E1C-4AA4-A1F5-F88A14739F8D}" type="datetime1">
               <a:rPr lang="en-US" altLang="zh-CN" smtClean="0"/>
-              <a:t>5/8/2024</a:t>
+              <a:t>5/11/2024</a:t>
             </a:fld>
             <a:endParaRPr lang="en-US"/>
           </a:p>
@@ -22603,7 +22603,7 @@
           <a:p>
             <a:fld id="{C5005B59-A863-49AB-8A46-4FABF628DCDB}" type="datetime1">
               <a:rPr lang="en-US" altLang="zh-CN" smtClean="0"/>
-              <a:t>5/8/2024</a:t>
+              <a:t>5/11/2024</a:t>
             </a:fld>
             <a:endParaRPr lang="en-US"/>
           </a:p>
@@ -22778,7 +22778,7 @@
           <a:p>
             <a:fld id="{B9B359B8-BB35-4942-BB3F-553087A1AB07}" type="datetime1">
               <a:rPr lang="en-US" altLang="zh-CN" smtClean="0"/>
-              <a:t>5/8/2024</a:t>
+              <a:t>5/11/2024</a:t>
             </a:fld>
             <a:endParaRPr lang="en-US"/>
           </a:p>
@@ -22943,7 +22943,7 @@
           <a:p>
             <a:fld id="{0051FDAB-E13B-4DED-ACB5-C97F04F9745D}" type="datetime1">
               <a:rPr lang="en-US" altLang="zh-CN" smtClean="0"/>
-              <a:t>5/8/2024</a:t>
+              <a:t>5/11/2024</a:t>
             </a:fld>
             <a:endParaRPr lang="en-US"/>
           </a:p>
@@ -23130,7 +23130,7 @@
           <a:p>
             <a:fld id="{411C2638-AFB1-4A52-81EA-13B8957633A2}" type="datetime1">
               <a:rPr lang="en-US" altLang="zh-CN" smtClean="0"/>
-              <a:t>5/8/2024</a:t>
+              <a:t>5/11/2024</a:t>
             </a:fld>
             <a:endParaRPr lang="en-US"/>
           </a:p>
@@ -23413,7 +23413,7 @@
           <a:p>
             <a:fld id="{86FEA545-9191-4074-8B47-064CD17714D7}" type="datetime1">
               <a:rPr lang="en-US" altLang="zh-CN" smtClean="0"/>
-              <a:t>5/8/2024</a:t>
+              <a:t>5/11/2024</a:t>
             </a:fld>
             <a:endParaRPr lang="en-US"/>
           </a:p>
@@ -23835,7 +23835,7 @@
           <a:p>
             <a:fld id="{FEDA739D-67B9-461E-9E24-584E6BDA3BCB}" type="datetime1">
               <a:rPr lang="en-US" altLang="zh-CN" smtClean="0"/>
-              <a:t>5/8/2024</a:t>
+              <a:t>5/11/2024</a:t>
             </a:fld>
             <a:endParaRPr lang="en-US"/>
           </a:p>
@@ -23948,7 +23948,7 @@
           <a:p>
             <a:fld id="{9B17A94F-F96B-45CF-824C-A53F0758AB69}" type="datetime1">
               <a:rPr lang="en-US" altLang="zh-CN" smtClean="0"/>
-              <a:t>5/8/2024</a:t>
+              <a:t>5/11/2024</a:t>
             </a:fld>
             <a:endParaRPr lang="en-US"/>
           </a:p>
@@ -24038,7 +24038,7 @@
           <a:p>
             <a:fld id="{0E7E811E-CB35-486D-A51A-D28D7B88C8A1}" type="datetime1">
               <a:rPr lang="en-US" altLang="zh-CN" smtClean="0"/>
-              <a:t>5/8/2024</a:t>
+              <a:t>5/11/2024</a:t>
             </a:fld>
             <a:endParaRPr lang="en-US"/>
           </a:p>
@@ -24310,7 +24310,7 @@
           <a:p>
             <a:fld id="{49060A9D-03E3-407A-91FE-4FD83FD5236C}" type="datetime1">
               <a:rPr lang="en-US" altLang="zh-CN" smtClean="0"/>
-              <a:t>5/8/2024</a:t>
+              <a:t>5/11/2024</a:t>
             </a:fld>
             <a:endParaRPr lang="en-US"/>
           </a:p>
@@ -24563,7 +24563,7 @@
           <a:p>
             <a:fld id="{27EABF16-FC76-43D1-8210-F66033CB86AD}" type="datetime1">
               <a:rPr lang="en-US" altLang="zh-CN" smtClean="0"/>
-              <a:t>5/8/2024</a:t>
+              <a:t>5/11/2024</a:t>
             </a:fld>
             <a:endParaRPr lang="en-US"/>
           </a:p>
@@ -24825,7 +24825,7 @@
           <a:p>
             <a:fld id="{5C24D9CC-1561-4C99-B045-95C038C2B123}" type="datetime1">
               <a:rPr lang="en-US" altLang="zh-CN" smtClean="0"/>
-              <a:t>5/8/2024</a:t>
+              <a:t>5/11/2024</a:t>
             </a:fld>
             <a:endParaRPr lang="en-US"/>
           </a:p>
@@ -26549,7 +26549,21 @@
                 <a:latin typeface="+mn-lt"/>
                 <a:cs typeface="Times New Roman" panose="02020603050405020304" pitchFamily="18" charset="0"/>
               </a:rPr>
-              <a:t>Set alpha2=2.52 for the first off-wall layer of cells fits the first principle</a:t>
+              <a:t>Set alpha2=2.52 for the first off-wall layer </a:t>
+            </a:r>
+            <a:r>
+              <a:rPr lang="en-US" altLang="zh-CN" sz="2000">
+                <a:latin typeface="+mn-lt"/>
+                <a:cs typeface="Times New Roman" panose="02020603050405020304" pitchFamily="18" charset="0"/>
+              </a:rPr>
+              <a:t>of cells </a:t>
+            </a:r>
+            <a:r>
+              <a:rPr lang="en-US" altLang="zh-CN" sz="2000" dirty="0">
+                <a:latin typeface="+mn-lt"/>
+                <a:cs typeface="Times New Roman" panose="02020603050405020304" pitchFamily="18" charset="0"/>
+              </a:rPr>
+              <a:t>fits the first principle</a:t>
             </a:r>
           </a:p>
         </p:txBody>

</xml_diff>